<commit_message>
Added assumptions, requirements, wish-list, template agent, and design models
</commit_message>
<xml_diff>
--- a/GroupD_ProjectPresentation.pptx
+++ b/GroupD_ProjectPresentation.pptx
@@ -8,7 +8,15 @@
     <p:sldId id="257" r:id="rId5"/>
     <p:sldId id="258" r:id="rId6"/>
     <p:sldId id="259" r:id="rId7"/>
-    <p:sldId id="260" r:id="rId8"/>
+    <p:sldId id="261" r:id="rId8"/>
+    <p:sldId id="262" r:id="rId9"/>
+    <p:sldId id="264" r:id="rId10"/>
+    <p:sldId id="265" r:id="rId11"/>
+    <p:sldId id="260" r:id="rId12"/>
+    <p:sldId id="263" r:id="rId13"/>
+    <p:sldId id="266" r:id="rId14"/>
+    <p:sldId id="267" r:id="rId15"/>
+    <p:sldId id="268" r:id="rId16"/>
   </p:sldIdLst>
   <p:sldSz cx="12192000" cy="6858000"/>
   <p:notesSz cx="6858000" cy="9144000"/>
@@ -3766,16 +3774,6 @@
               </a:spcAft>
             </a:pPr>
             <a:r>
-              <a:rPr lang="en-US" dirty="0" smtClean="0">
-                <a:solidFill>
-                  <a:srgbClr val="000000"/>
-                </a:solidFill>
-                <a:latin typeface="Tahoma" pitchFamily="34" charset="0"/>
-                <a:ea typeface="ＭＳ Ｐゴシック" pitchFamily="50" charset="-128"/>
-              </a:rPr>
-              <a:t>SENG696 </a:t>
-            </a:r>
-            <a:r>
               <a:rPr lang="en-US" dirty="0">
                 <a:solidFill>
                   <a:srgbClr val="000000"/>
@@ -3783,17 +3781,7 @@
                 <a:latin typeface="Tahoma" pitchFamily="34" charset="0"/>
                 <a:ea typeface="ＭＳ Ｐゴシック" pitchFamily="50" charset="-128"/>
               </a:rPr>
-              <a:t>(Fall </a:t>
-            </a:r>
-            <a:r>
-              <a:rPr lang="en-US" dirty="0" smtClean="0">
-                <a:solidFill>
-                  <a:srgbClr val="000000"/>
-                </a:solidFill>
-                <a:latin typeface="Tahoma" pitchFamily="34" charset="0"/>
-                <a:ea typeface="ＭＳ Ｐゴシック" pitchFamily="50" charset="-128"/>
-              </a:rPr>
-              <a:t>2021)</a:t>
+              <a:t>SENG696 (Fall 2021)</a:t>
             </a:r>
             <a:endParaRPr lang="en-US" altLang="ja-JP" dirty="0">
               <a:solidFill>
@@ -3878,13 +3866,8 @@
           <a:p>
             <a:r>
               <a:rPr lang="en-CA" dirty="0"/>
-              <a:t>1. Business </a:t>
-            </a:r>
-            <a:r>
-              <a:rPr lang="en-CA" dirty="0" smtClean="0"/>
-              <a:t>Case</a:t>
-            </a:r>
-            <a:endParaRPr lang="en-CA" dirty="0"/>
+              <a:t>1. Business Case</a:t>
+            </a:r>
           </a:p>
         </p:txBody>
       </p:sp>
@@ -3920,56 +3903,21 @@
                 <a:latin typeface="Times New Roman" panose="02020603050405020304" pitchFamily="18" charset="0"/>
                 <a:cs typeface="Times New Roman" panose="02020603050405020304" pitchFamily="18" charset="0"/>
               </a:rPr>
-              <a:t>In Canada, around 58% of households report that they own at least a </a:t>
-            </a:r>
-            <a:r>
-              <a:rPr lang="en-US" sz="2400" dirty="0" smtClean="0">
+              <a:t>In Canada, around 58% of households report that they own at least a cat or a dog, and they are in a constant need to visit the </a:t>
+            </a:r>
+            <a:r>
+              <a:rPr lang="en-US" sz="2400">
                 <a:latin typeface="Times New Roman" panose="02020603050405020304" pitchFamily="18" charset="0"/>
                 <a:cs typeface="Times New Roman" panose="02020603050405020304" pitchFamily="18" charset="0"/>
               </a:rPr>
-              <a:t>cat </a:t>
+              <a:t>Pet clinic </a:t>
             </a:r>
             <a:r>
               <a:rPr lang="en-US" sz="2400" dirty="0">
                 <a:latin typeface="Times New Roman" panose="02020603050405020304" pitchFamily="18" charset="0"/>
                 <a:cs typeface="Times New Roman" panose="02020603050405020304" pitchFamily="18" charset="0"/>
               </a:rPr>
-              <a:t>or a dog, and they are in a constant need to visit the </a:t>
-            </a:r>
-            <a:r>
-              <a:rPr lang="en-US" sz="2400">
-                <a:latin typeface="Times New Roman" panose="02020603050405020304" pitchFamily="18" charset="0"/>
-                <a:cs typeface="Times New Roman" panose="02020603050405020304" pitchFamily="18" charset="0"/>
-              </a:rPr>
-              <a:t>Pet </a:t>
-            </a:r>
-            <a:r>
-              <a:rPr lang="en-US" sz="2400" smtClean="0">
-                <a:latin typeface="Times New Roman" panose="02020603050405020304" pitchFamily="18" charset="0"/>
-                <a:cs typeface="Times New Roman" panose="02020603050405020304" pitchFamily="18" charset="0"/>
-              </a:rPr>
-              <a:t>clinic </a:t>
-            </a:r>
-            <a:r>
-              <a:rPr lang="en-US" sz="2400" dirty="0">
-                <a:latin typeface="Times New Roman" panose="02020603050405020304" pitchFamily="18" charset="0"/>
-                <a:cs typeface="Times New Roman" panose="02020603050405020304" pitchFamily="18" charset="0"/>
-              </a:rPr>
-              <a:t>for their pet’s health-checkup. Pet-owners, amidst their busy schedule, await a website that can assist them in addressing their </a:t>
-            </a:r>
-            <a:r>
-              <a:rPr lang="en-US" sz="2400" dirty="0" smtClean="0">
-                <a:latin typeface="Times New Roman" panose="02020603050405020304" pitchFamily="18" charset="0"/>
-                <a:cs typeface="Times New Roman" panose="02020603050405020304" pitchFamily="18" charset="0"/>
-              </a:rPr>
-              <a:t>pet’s </a:t>
-            </a:r>
-            <a:r>
-              <a:rPr lang="en-US" sz="2400" dirty="0">
-                <a:latin typeface="Times New Roman" panose="02020603050405020304" pitchFamily="18" charset="0"/>
-                <a:cs typeface="Times New Roman" panose="02020603050405020304" pitchFamily="18" charset="0"/>
-              </a:rPr>
-              <a:t>well-being requirements.</a:t>
+              <a:t>for their pet’s health-checkup. Pet-owners, amidst their busy schedule, await a website that can assist them in addressing their pet’s well-being requirements.</a:t>
             </a:r>
           </a:p>
           <a:p>
@@ -4001,35 +3949,7 @@
                 <a:latin typeface="Times New Roman" panose="02020603050405020304" pitchFamily="18" charset="0"/>
                 <a:cs typeface="Times New Roman" panose="02020603050405020304" pitchFamily="18" charset="0"/>
               </a:rPr>
-              <a:t>These records can be shared </a:t>
-            </a:r>
-            <a:r>
-              <a:rPr lang="en-US" sz="2400" dirty="0" smtClean="0">
-                <a:latin typeface="Times New Roman" panose="02020603050405020304" pitchFamily="18" charset="0"/>
-                <a:cs typeface="Times New Roman" panose="02020603050405020304" pitchFamily="18" charset="0"/>
-              </a:rPr>
-              <a:t>globally, </a:t>
-            </a:r>
-            <a:r>
-              <a:rPr lang="en-US" sz="2400" dirty="0">
-                <a:latin typeface="Times New Roman" panose="02020603050405020304" pitchFamily="18" charset="0"/>
-                <a:cs typeface="Times New Roman" panose="02020603050405020304" pitchFamily="18" charset="0"/>
-              </a:rPr>
-              <a:t>helping veterinarians around the world to diagnose diseases based on the similarity of symptoms found in the same breeds in another part of the </a:t>
-            </a:r>
-            <a:r>
-              <a:rPr lang="en-US" sz="2400" dirty="0" smtClean="0">
-                <a:latin typeface="Times New Roman" panose="02020603050405020304" pitchFamily="18" charset="0"/>
-                <a:cs typeface="Times New Roman" panose="02020603050405020304" pitchFamily="18" charset="0"/>
-              </a:rPr>
-              <a:t>world</a:t>
-            </a:r>
-            <a:r>
-              <a:rPr lang="en-US" sz="2400" dirty="0">
-                <a:latin typeface="Times New Roman" panose="02020603050405020304" pitchFamily="18" charset="0"/>
-                <a:cs typeface="Times New Roman" panose="02020603050405020304" pitchFamily="18" charset="0"/>
-              </a:rPr>
-              <a:t>.</a:t>
+              <a:t>These records can be shared globally, helping veterinarians around the world to diagnose diseases based on the similarity of symptoms found in the same breeds in another part of the world.</a:t>
             </a:r>
           </a:p>
         </p:txBody>
@@ -4038,6 +3958,1262 @@
     <p:extLst>
       <p:ext uri="{BB962C8B-B14F-4D97-AF65-F5344CB8AC3E}">
         <p14:creationId xmlns:p14="http://schemas.microsoft.com/office/powerpoint/2010/main" val="3678948777"/>
+      </p:ext>
+    </p:extLst>
+  </p:cSld>
+  <p:clrMapOvr>
+    <a:masterClrMapping/>
+  </p:clrMapOvr>
+  <p:transition>
+    <p:dissolve/>
+  </p:transition>
+</p:sld>
+</file>
+
+<file path=ppt/slides/slide10.xml><?xml version="1.0" encoding="utf-8"?>
+<p:sld xmlns:a="http://schemas.openxmlformats.org/drawingml/2006/main" xmlns:r="http://schemas.openxmlformats.org/officeDocument/2006/relationships" xmlns:p="http://schemas.openxmlformats.org/presentationml/2006/main">
+  <p:cSld>
+    <p:spTree>
+      <p:nvGrpSpPr>
+        <p:cNvPr id="1" name=""/>
+        <p:cNvGrpSpPr/>
+        <p:nvPr/>
+      </p:nvGrpSpPr>
+      <p:grpSpPr>
+        <a:xfrm>
+          <a:off x="0" y="0"/>
+          <a:ext cx="0" cy="0"/>
+          <a:chOff x="0" y="0"/>
+          <a:chExt cx="0" cy="0"/>
+        </a:xfrm>
+      </p:grpSpPr>
+      <p:sp>
+        <p:nvSpPr>
+          <p:cNvPr id="2" name="Title 1">
+            <a:extLst>
+              <a:ext uri="{FF2B5EF4-FFF2-40B4-BE49-F238E27FC236}">
+                <a16:creationId xmlns:a16="http://schemas.microsoft.com/office/drawing/2014/main" id="{D6B34C92-3919-48E4-9245-580696DFB2E4}"/>
+              </a:ext>
+            </a:extLst>
+          </p:cNvPr>
+          <p:cNvSpPr>
+            <a:spLocks noGrp="1"/>
+          </p:cNvSpPr>
+          <p:nvPr>
+            <p:ph type="title"/>
+          </p:nvPr>
+        </p:nvSpPr>
+        <p:spPr/>
+        <p:txBody>
+          <a:bodyPr/>
+          <a:lstStyle/>
+          <a:p>
+            <a:r>
+              <a:rPr lang="en-CA" dirty="0"/>
+              <a:t>6. Design: Agent Model</a:t>
+            </a:r>
+          </a:p>
+        </p:txBody>
+      </p:sp>
+      <p:sp>
+        <p:nvSpPr>
+          <p:cNvPr id="4" name="Date Placeholder 3">
+            <a:extLst>
+              <a:ext uri="{FF2B5EF4-FFF2-40B4-BE49-F238E27FC236}">
+                <a16:creationId xmlns:a16="http://schemas.microsoft.com/office/drawing/2014/main" id="{B070015F-E0D1-41B1-A468-1A0BA6DB7630}"/>
+              </a:ext>
+            </a:extLst>
+          </p:cNvPr>
+          <p:cNvSpPr>
+            <a:spLocks noGrp="1"/>
+          </p:cNvSpPr>
+          <p:nvPr>
+            <p:ph type="dt" sz="half" idx="10"/>
+          </p:nvPr>
+        </p:nvSpPr>
+        <p:spPr/>
+        <p:txBody>
+          <a:bodyPr/>
+          <a:lstStyle/>
+          <a:p>
+            <a:r>
+              <a:rPr lang="en-US"/>
+              <a:t>SENG697 (Fall 2007)</a:t>
+            </a:r>
+            <a:endParaRPr lang="en-US" altLang="ja-JP"/>
+          </a:p>
+        </p:txBody>
+      </p:sp>
+      <p:sp>
+        <p:nvSpPr>
+          <p:cNvPr id="5" name="Footer Placeholder 4">
+            <a:extLst>
+              <a:ext uri="{FF2B5EF4-FFF2-40B4-BE49-F238E27FC236}">
+                <a16:creationId xmlns:a16="http://schemas.microsoft.com/office/drawing/2014/main" id="{83D5D197-11C8-4973-8F6B-D7AF01BED68D}"/>
+              </a:ext>
+            </a:extLst>
+          </p:cNvPr>
+          <p:cNvSpPr>
+            <a:spLocks noGrp="1"/>
+          </p:cNvSpPr>
+          <p:nvPr>
+            <p:ph type="ftr" sz="quarter" idx="11"/>
+          </p:nvPr>
+        </p:nvSpPr>
+        <p:spPr/>
+        <p:txBody>
+          <a:bodyPr/>
+          <a:lstStyle/>
+          <a:p>
+            <a:r>
+              <a:rPr lang="ja-JP" altLang="en-US"/>
+              <a:t>far@ucalgary.ca</a:t>
+            </a:r>
+            <a:endParaRPr lang="en-US" altLang="ja-JP"/>
+          </a:p>
+        </p:txBody>
+      </p:sp>
+      <p:sp>
+        <p:nvSpPr>
+          <p:cNvPr id="6" name="Slide Number Placeholder 5">
+            <a:extLst>
+              <a:ext uri="{FF2B5EF4-FFF2-40B4-BE49-F238E27FC236}">
+                <a16:creationId xmlns:a16="http://schemas.microsoft.com/office/drawing/2014/main" id="{AE609BDF-7C75-4440-8723-8A99DD2DD05D}"/>
+              </a:ext>
+            </a:extLst>
+          </p:cNvPr>
+          <p:cNvSpPr>
+            <a:spLocks noGrp="1"/>
+          </p:cNvSpPr>
+          <p:nvPr>
+            <p:ph type="sldNum" sz="quarter" idx="12"/>
+          </p:nvPr>
+        </p:nvSpPr>
+        <p:spPr/>
+        <p:txBody>
+          <a:bodyPr/>
+          <a:lstStyle/>
+          <a:p>
+            <a:fld id="{A4BAB868-1E00-44C6-B1AB-DFCC5F9865BA}" type="slidenum">
+              <a:rPr lang="ja-JP" altLang="en-US" smtClean="0"/>
+              <a:pPr/>
+              <a:t>10</a:t>
+            </a:fld>
+            <a:endParaRPr lang="en-US" altLang="ja-JP"/>
+          </a:p>
+        </p:txBody>
+      </p:sp>
+      <p:pic>
+        <p:nvPicPr>
+          <p:cNvPr id="12" name="Picture 11">
+            <a:extLst>
+              <a:ext uri="{FF2B5EF4-FFF2-40B4-BE49-F238E27FC236}">
+                <a16:creationId xmlns:a16="http://schemas.microsoft.com/office/drawing/2014/main" id="{2DA05C07-7FF6-4B38-B836-CBA63805377B}"/>
+              </a:ext>
+            </a:extLst>
+          </p:cNvPr>
+          <p:cNvPicPr>
+            <a:picLocks noChangeAspect="1"/>
+          </p:cNvPicPr>
+          <p:nvPr/>
+        </p:nvPicPr>
+        <p:blipFill>
+          <a:blip r:embed="rId2"/>
+          <a:stretch>
+            <a:fillRect/>
+          </a:stretch>
+        </p:blipFill>
+        <p:spPr>
+          <a:xfrm>
+            <a:off x="2162176" y="1628774"/>
+            <a:ext cx="8391524" cy="4486275"/>
+          </a:xfrm>
+          <a:prstGeom prst="rect">
+            <a:avLst/>
+          </a:prstGeom>
+        </p:spPr>
+      </p:pic>
+    </p:spTree>
+    <p:extLst>
+      <p:ext uri="{BB962C8B-B14F-4D97-AF65-F5344CB8AC3E}">
+        <p14:creationId xmlns:p14="http://schemas.microsoft.com/office/powerpoint/2010/main" val="4077683043"/>
+      </p:ext>
+    </p:extLst>
+  </p:cSld>
+  <p:clrMapOvr>
+    <a:masterClrMapping/>
+  </p:clrMapOvr>
+  <p:transition>
+    <p:dissolve/>
+  </p:transition>
+</p:sld>
+</file>
+
+<file path=ppt/slides/slide11.xml><?xml version="1.0" encoding="utf-8"?>
+<p:sld xmlns:a="http://schemas.openxmlformats.org/drawingml/2006/main" xmlns:r="http://schemas.openxmlformats.org/officeDocument/2006/relationships" xmlns:p="http://schemas.openxmlformats.org/presentationml/2006/main">
+  <p:cSld>
+    <p:spTree>
+      <p:nvGrpSpPr>
+        <p:cNvPr id="1" name=""/>
+        <p:cNvGrpSpPr/>
+        <p:nvPr/>
+      </p:nvGrpSpPr>
+      <p:grpSpPr>
+        <a:xfrm>
+          <a:off x="0" y="0"/>
+          <a:ext cx="0" cy="0"/>
+          <a:chOff x="0" y="0"/>
+          <a:chExt cx="0" cy="0"/>
+        </a:xfrm>
+      </p:grpSpPr>
+      <p:sp>
+        <p:nvSpPr>
+          <p:cNvPr id="2" name="Title 1">
+            <a:extLst>
+              <a:ext uri="{FF2B5EF4-FFF2-40B4-BE49-F238E27FC236}">
+                <a16:creationId xmlns:a16="http://schemas.microsoft.com/office/drawing/2014/main" id="{6E98BFB5-DE3F-4793-966B-7D7CF7DC2465}"/>
+              </a:ext>
+            </a:extLst>
+          </p:cNvPr>
+          <p:cNvSpPr>
+            <a:spLocks noGrp="1"/>
+          </p:cNvSpPr>
+          <p:nvPr>
+            <p:ph type="title"/>
+          </p:nvPr>
+        </p:nvSpPr>
+        <p:spPr/>
+        <p:txBody>
+          <a:bodyPr/>
+          <a:lstStyle/>
+          <a:p>
+            <a:r>
+              <a:rPr lang="en-CA" dirty="0"/>
+              <a:t>7. Design: Service Model</a:t>
+            </a:r>
+          </a:p>
+        </p:txBody>
+      </p:sp>
+      <p:graphicFrame>
+        <p:nvGraphicFramePr>
+          <p:cNvPr id="7" name="Content Placeholder 6">
+            <a:extLst>
+              <a:ext uri="{FF2B5EF4-FFF2-40B4-BE49-F238E27FC236}">
+                <a16:creationId xmlns:a16="http://schemas.microsoft.com/office/drawing/2014/main" id="{4A9D8EBD-C665-44F7-8C37-7580611C4BB2}"/>
+              </a:ext>
+            </a:extLst>
+          </p:cNvPr>
+          <p:cNvGraphicFramePr>
+            <a:graphicFrameLocks noGrp="1"/>
+          </p:cNvGraphicFramePr>
+          <p:nvPr>
+            <p:ph idx="1"/>
+            <p:extLst>
+              <p:ext uri="{D42A27DB-BD31-4B8C-83A1-F6EECF244321}">
+                <p14:modId xmlns:p14="http://schemas.microsoft.com/office/powerpoint/2010/main" val="445344895"/>
+              </p:ext>
+            </p:extLst>
+          </p:nvPr>
+        </p:nvGraphicFramePr>
+        <p:xfrm>
+          <a:off x="1622613" y="1918447"/>
+          <a:ext cx="8803340" cy="3517152"/>
+        </p:xfrm>
+        <a:graphic>
+          <a:graphicData uri="http://schemas.openxmlformats.org/drawingml/2006/table">
+            <a:tbl>
+              <a:tblPr firstRow="1" firstCol="1" bandRow="1">
+                <a:tableStyleId>{5C22544A-7EE6-4342-B048-85BDC9FD1C3A}</a:tableStyleId>
+              </a:tblPr>
+              <a:tblGrid>
+                <a:gridCol w="1484209">
+                  <a:extLst>
+                    <a:ext uri="{9D8B030D-6E8A-4147-A177-3AD203B41FA5}">
+                      <a16:colId xmlns:a16="http://schemas.microsoft.com/office/drawing/2014/main" val="1214902364"/>
+                    </a:ext>
+                  </a:extLst>
+                </a:gridCol>
+                <a:gridCol w="1365164">
+                  <a:extLst>
+                    <a:ext uri="{9D8B030D-6E8A-4147-A177-3AD203B41FA5}">
+                      <a16:colId xmlns:a16="http://schemas.microsoft.com/office/drawing/2014/main" val="229060225"/>
+                    </a:ext>
+                  </a:extLst>
+                </a:gridCol>
+                <a:gridCol w="2204475">
+                  <a:extLst>
+                    <a:ext uri="{9D8B030D-6E8A-4147-A177-3AD203B41FA5}">
+                      <a16:colId xmlns:a16="http://schemas.microsoft.com/office/drawing/2014/main" val="2494628635"/>
+                    </a:ext>
+                  </a:extLst>
+                </a:gridCol>
+                <a:gridCol w="1888449">
+                  <a:extLst>
+                    <a:ext uri="{9D8B030D-6E8A-4147-A177-3AD203B41FA5}">
+                      <a16:colId xmlns:a16="http://schemas.microsoft.com/office/drawing/2014/main" val="377801537"/>
+                    </a:ext>
+                  </a:extLst>
+                </a:gridCol>
+                <a:gridCol w="1861043">
+                  <a:extLst>
+                    <a:ext uri="{9D8B030D-6E8A-4147-A177-3AD203B41FA5}">
+                      <a16:colId xmlns:a16="http://schemas.microsoft.com/office/drawing/2014/main" val="28876286"/>
+                    </a:ext>
+                  </a:extLst>
+                </a:gridCol>
+              </a:tblGrid>
+              <a:tr h="542910">
+                <a:tc>
+                  <a:txBody>
+                    <a:bodyPr/>
+                    <a:lstStyle/>
+                    <a:p>
+                      <a:pPr algn="ctr">
+                        <a:lnSpc>
+                          <a:spcPct val="107000"/>
+                        </a:lnSpc>
+                        <a:spcAft>
+                          <a:spcPts val="800"/>
+                        </a:spcAft>
+                      </a:pPr>
+                      <a:r>
+                        <a:rPr lang="en-CA" sz="1100" dirty="0">
+                          <a:effectLst/>
+                        </a:rPr>
+                        <a:t>Service</a:t>
+                      </a:r>
+                      <a:endParaRPr lang="en-CA" sz="1100" dirty="0">
+                        <a:effectLst/>
+                        <a:latin typeface="Calibri" panose="020F0502020204030204" pitchFamily="34" charset="0"/>
+                        <a:ea typeface="Calibri" panose="020F0502020204030204" pitchFamily="34" charset="0"/>
+                        <a:cs typeface="Times New Roman" panose="02020603050405020304" pitchFamily="18" charset="0"/>
+                      </a:endParaRPr>
+                    </a:p>
+                  </a:txBody>
+                  <a:tcPr marL="68580" marR="68580" marT="0" marB="0"/>
+                </a:tc>
+                <a:tc>
+                  <a:txBody>
+                    <a:bodyPr/>
+                    <a:lstStyle/>
+                    <a:p>
+                      <a:pPr algn="ctr">
+                        <a:lnSpc>
+                          <a:spcPct val="107000"/>
+                        </a:lnSpc>
+                        <a:spcAft>
+                          <a:spcPts val="800"/>
+                        </a:spcAft>
+                      </a:pPr>
+                      <a:r>
+                        <a:rPr lang="en-CA" sz="1100">
+                          <a:effectLst/>
+                        </a:rPr>
+                        <a:t>Input</a:t>
+                      </a:r>
+                      <a:endParaRPr lang="en-CA" sz="1100">
+                        <a:effectLst/>
+                        <a:latin typeface="Calibri" panose="020F0502020204030204" pitchFamily="34" charset="0"/>
+                        <a:ea typeface="Calibri" panose="020F0502020204030204" pitchFamily="34" charset="0"/>
+                        <a:cs typeface="Times New Roman" panose="02020603050405020304" pitchFamily="18" charset="0"/>
+                      </a:endParaRPr>
+                    </a:p>
+                  </a:txBody>
+                  <a:tcPr marL="68580" marR="68580" marT="0" marB="0"/>
+                </a:tc>
+                <a:tc>
+                  <a:txBody>
+                    <a:bodyPr/>
+                    <a:lstStyle/>
+                    <a:p>
+                      <a:pPr algn="ctr">
+                        <a:lnSpc>
+                          <a:spcPct val="107000"/>
+                        </a:lnSpc>
+                        <a:spcAft>
+                          <a:spcPts val="800"/>
+                        </a:spcAft>
+                      </a:pPr>
+                      <a:r>
+                        <a:rPr lang="en-CA" sz="1100" dirty="0">
+                          <a:effectLst/>
+                        </a:rPr>
+                        <a:t>Output</a:t>
+                      </a:r>
+                      <a:endParaRPr lang="en-CA" sz="1100" dirty="0">
+                        <a:effectLst/>
+                        <a:latin typeface="Calibri" panose="020F0502020204030204" pitchFamily="34" charset="0"/>
+                        <a:ea typeface="Calibri" panose="020F0502020204030204" pitchFamily="34" charset="0"/>
+                        <a:cs typeface="Times New Roman" panose="02020603050405020304" pitchFamily="18" charset="0"/>
+                      </a:endParaRPr>
+                    </a:p>
+                  </a:txBody>
+                  <a:tcPr marL="68580" marR="68580" marT="0" marB="0"/>
+                </a:tc>
+                <a:tc>
+                  <a:txBody>
+                    <a:bodyPr/>
+                    <a:lstStyle/>
+                    <a:p>
+                      <a:pPr algn="ctr">
+                        <a:lnSpc>
+                          <a:spcPct val="107000"/>
+                        </a:lnSpc>
+                        <a:spcAft>
+                          <a:spcPts val="800"/>
+                        </a:spcAft>
+                      </a:pPr>
+                      <a:r>
+                        <a:rPr lang="en-CA" sz="1100" dirty="0">
+                          <a:effectLst/>
+                        </a:rPr>
+                        <a:t>Pre – Conditions</a:t>
+                      </a:r>
+                      <a:endParaRPr lang="en-CA" sz="1100" dirty="0">
+                        <a:effectLst/>
+                        <a:latin typeface="Calibri" panose="020F0502020204030204" pitchFamily="34" charset="0"/>
+                        <a:ea typeface="Calibri" panose="020F0502020204030204" pitchFamily="34" charset="0"/>
+                        <a:cs typeface="Times New Roman" panose="02020603050405020304" pitchFamily="18" charset="0"/>
+                      </a:endParaRPr>
+                    </a:p>
+                  </a:txBody>
+                  <a:tcPr marL="68580" marR="68580" marT="0" marB="0"/>
+                </a:tc>
+                <a:tc>
+                  <a:txBody>
+                    <a:bodyPr/>
+                    <a:lstStyle/>
+                    <a:p>
+                      <a:pPr algn="ctr">
+                        <a:lnSpc>
+                          <a:spcPct val="107000"/>
+                        </a:lnSpc>
+                        <a:spcAft>
+                          <a:spcPts val="800"/>
+                        </a:spcAft>
+                      </a:pPr>
+                      <a:r>
+                        <a:rPr lang="en-CA" sz="1100">
+                          <a:effectLst/>
+                        </a:rPr>
+                        <a:t>Post Conditions</a:t>
+                      </a:r>
+                      <a:endParaRPr lang="en-CA" sz="1100">
+                        <a:effectLst/>
+                        <a:latin typeface="Calibri" panose="020F0502020204030204" pitchFamily="34" charset="0"/>
+                        <a:ea typeface="Calibri" panose="020F0502020204030204" pitchFamily="34" charset="0"/>
+                        <a:cs typeface="Times New Roman" panose="02020603050405020304" pitchFamily="18" charset="0"/>
+                      </a:endParaRPr>
+                    </a:p>
+                  </a:txBody>
+                  <a:tcPr marL="68580" marR="68580" marT="0" marB="0"/>
+                </a:tc>
+                <a:extLst>
+                  <a:ext uri="{0D108BD9-81ED-4DB2-BD59-A6C34878D82A}">
+                    <a16:rowId xmlns:a16="http://schemas.microsoft.com/office/drawing/2014/main" val="638127521"/>
+                  </a:ext>
+                </a:extLst>
+              </a:tr>
+              <a:tr h="942854">
+                <a:tc>
+                  <a:txBody>
+                    <a:bodyPr/>
+                    <a:lstStyle/>
+                    <a:p>
+                      <a:pPr algn="ctr">
+                        <a:lnSpc>
+                          <a:spcPct val="107000"/>
+                        </a:lnSpc>
+                        <a:spcAft>
+                          <a:spcPts val="800"/>
+                        </a:spcAft>
+                      </a:pPr>
+                      <a:r>
+                        <a:rPr lang="en-CA" sz="1100" dirty="0">
+                          <a:effectLst/>
+                        </a:rPr>
+                        <a:t>E-Video Interaction</a:t>
+                      </a:r>
+                      <a:endParaRPr lang="en-CA" sz="1100" dirty="0">
+                        <a:effectLst/>
+                        <a:latin typeface="Calibri" panose="020F0502020204030204" pitchFamily="34" charset="0"/>
+                        <a:ea typeface="Calibri" panose="020F0502020204030204" pitchFamily="34" charset="0"/>
+                        <a:cs typeface="Times New Roman" panose="02020603050405020304" pitchFamily="18" charset="0"/>
+                      </a:endParaRPr>
+                    </a:p>
+                  </a:txBody>
+                  <a:tcPr marL="68580" marR="68580" marT="0" marB="0"/>
+                </a:tc>
+                <a:tc>
+                  <a:txBody>
+                    <a:bodyPr/>
+                    <a:lstStyle/>
+                    <a:p>
+                      <a:pPr algn="ctr">
+                        <a:lnSpc>
+                          <a:spcPct val="107000"/>
+                        </a:lnSpc>
+                        <a:spcAft>
+                          <a:spcPts val="800"/>
+                        </a:spcAft>
+                      </a:pPr>
+                      <a:r>
+                        <a:rPr lang="en-CA" sz="1100" dirty="0">
+                          <a:effectLst/>
+                        </a:rPr>
+                        <a:t>Appointment Schedule</a:t>
+                      </a:r>
+                      <a:endParaRPr lang="en-CA" sz="1100" dirty="0">
+                        <a:effectLst/>
+                        <a:latin typeface="Calibri" panose="020F0502020204030204" pitchFamily="34" charset="0"/>
+                        <a:ea typeface="Calibri" panose="020F0502020204030204" pitchFamily="34" charset="0"/>
+                        <a:cs typeface="Times New Roman" panose="02020603050405020304" pitchFamily="18" charset="0"/>
+                      </a:endParaRPr>
+                    </a:p>
+                  </a:txBody>
+                  <a:tcPr marL="68580" marR="68580" marT="0" marB="0"/>
+                </a:tc>
+                <a:tc>
+                  <a:txBody>
+                    <a:bodyPr/>
+                    <a:lstStyle/>
+                    <a:p>
+                      <a:pPr algn="ctr">
+                        <a:lnSpc>
+                          <a:spcPct val="107000"/>
+                        </a:lnSpc>
+                        <a:spcAft>
+                          <a:spcPts val="800"/>
+                        </a:spcAft>
+                      </a:pPr>
+                      <a:r>
+                        <a:rPr lang="en-CA" sz="1100" dirty="0">
+                          <a:effectLst/>
+                        </a:rPr>
+                        <a:t>Link for Video Interaction</a:t>
+                      </a:r>
+                      <a:endParaRPr lang="en-CA" sz="1100" dirty="0">
+                        <a:effectLst/>
+                        <a:latin typeface="Calibri" panose="020F0502020204030204" pitchFamily="34" charset="0"/>
+                        <a:ea typeface="Calibri" panose="020F0502020204030204" pitchFamily="34" charset="0"/>
+                        <a:cs typeface="Times New Roman" panose="02020603050405020304" pitchFamily="18" charset="0"/>
+                      </a:endParaRPr>
+                    </a:p>
+                  </a:txBody>
+                  <a:tcPr marL="68580" marR="68580" marT="0" marB="0"/>
+                </a:tc>
+                <a:tc>
+                  <a:txBody>
+                    <a:bodyPr/>
+                    <a:lstStyle/>
+                    <a:p>
+                      <a:pPr algn="ctr">
+                        <a:lnSpc>
+                          <a:spcPct val="107000"/>
+                        </a:lnSpc>
+                        <a:spcAft>
+                          <a:spcPts val="800"/>
+                        </a:spcAft>
+                      </a:pPr>
+                      <a:r>
+                        <a:rPr lang="en-CA" sz="1100">
+                          <a:effectLst/>
+                        </a:rPr>
+                        <a:t>Successful connection to ZOOM/GOOGLE API</a:t>
+                      </a:r>
+                      <a:endParaRPr lang="en-CA" sz="1100">
+                        <a:effectLst/>
+                        <a:latin typeface="Calibri" panose="020F0502020204030204" pitchFamily="34" charset="0"/>
+                        <a:ea typeface="Calibri" panose="020F0502020204030204" pitchFamily="34" charset="0"/>
+                        <a:cs typeface="Times New Roman" panose="02020603050405020304" pitchFamily="18" charset="0"/>
+                      </a:endParaRPr>
+                    </a:p>
+                  </a:txBody>
+                  <a:tcPr marL="68580" marR="68580" marT="0" marB="0"/>
+                </a:tc>
+                <a:tc>
+                  <a:txBody>
+                    <a:bodyPr/>
+                    <a:lstStyle/>
+                    <a:p>
+                      <a:pPr algn="ctr">
+                        <a:lnSpc>
+                          <a:spcPct val="107000"/>
+                        </a:lnSpc>
+                        <a:spcAft>
+                          <a:spcPts val="800"/>
+                        </a:spcAft>
+                      </a:pPr>
+                      <a:r>
+                        <a:rPr lang="en-CA" sz="1100">
+                          <a:effectLst/>
+                        </a:rPr>
+                        <a:t>Steady connection during the meeting</a:t>
+                      </a:r>
+                      <a:endParaRPr lang="en-CA" sz="1100">
+                        <a:effectLst/>
+                        <a:latin typeface="Calibri" panose="020F0502020204030204" pitchFamily="34" charset="0"/>
+                        <a:ea typeface="Calibri" panose="020F0502020204030204" pitchFamily="34" charset="0"/>
+                        <a:cs typeface="Times New Roman" panose="02020603050405020304" pitchFamily="18" charset="0"/>
+                      </a:endParaRPr>
+                    </a:p>
+                  </a:txBody>
+                  <a:tcPr marL="68580" marR="68580" marT="0" marB="0"/>
+                </a:tc>
+                <a:extLst>
+                  <a:ext uri="{0D108BD9-81ED-4DB2-BD59-A6C34878D82A}">
+                    <a16:rowId xmlns:a16="http://schemas.microsoft.com/office/drawing/2014/main" val="1400990090"/>
+                  </a:ext>
+                </a:extLst>
+              </a:tr>
+              <a:tr h="1063199">
+                <a:tc>
+                  <a:txBody>
+                    <a:bodyPr/>
+                    <a:lstStyle/>
+                    <a:p>
+                      <a:pPr algn="ctr">
+                        <a:lnSpc>
+                          <a:spcPct val="107000"/>
+                        </a:lnSpc>
+                        <a:spcAft>
+                          <a:spcPts val="800"/>
+                        </a:spcAft>
+                      </a:pPr>
+                      <a:r>
+                        <a:rPr lang="en-CA" sz="1100">
+                          <a:effectLst/>
+                        </a:rPr>
+                        <a:t>Reminder</a:t>
+                      </a:r>
+                      <a:endParaRPr lang="en-CA" sz="1100">
+                        <a:effectLst/>
+                        <a:latin typeface="Calibri" panose="020F0502020204030204" pitchFamily="34" charset="0"/>
+                        <a:ea typeface="Calibri" panose="020F0502020204030204" pitchFamily="34" charset="0"/>
+                        <a:cs typeface="Times New Roman" panose="02020603050405020304" pitchFamily="18" charset="0"/>
+                      </a:endParaRPr>
+                    </a:p>
+                  </a:txBody>
+                  <a:tcPr marL="68580" marR="68580" marT="0" marB="0"/>
+                </a:tc>
+                <a:tc>
+                  <a:txBody>
+                    <a:bodyPr/>
+                    <a:lstStyle/>
+                    <a:p>
+                      <a:pPr algn="ctr">
+                        <a:lnSpc>
+                          <a:spcPct val="107000"/>
+                        </a:lnSpc>
+                        <a:spcAft>
+                          <a:spcPts val="800"/>
+                        </a:spcAft>
+                      </a:pPr>
+                      <a:r>
+                        <a:rPr lang="en-CA" sz="1100">
+                          <a:effectLst/>
+                        </a:rPr>
+                        <a:t>Appointment Schedule</a:t>
+                      </a:r>
+                      <a:endParaRPr lang="en-CA" sz="1100">
+                        <a:effectLst/>
+                        <a:latin typeface="Calibri" panose="020F0502020204030204" pitchFamily="34" charset="0"/>
+                        <a:ea typeface="Calibri" panose="020F0502020204030204" pitchFamily="34" charset="0"/>
+                        <a:cs typeface="Times New Roman" panose="02020603050405020304" pitchFamily="18" charset="0"/>
+                      </a:endParaRPr>
+                    </a:p>
+                  </a:txBody>
+                  <a:tcPr marL="68580" marR="68580" marT="0" marB="0"/>
+                </a:tc>
+                <a:tc>
+                  <a:txBody>
+                    <a:bodyPr/>
+                    <a:lstStyle/>
+                    <a:p>
+                      <a:pPr algn="ctr">
+                        <a:lnSpc>
+                          <a:spcPct val="107000"/>
+                        </a:lnSpc>
+                        <a:spcAft>
+                          <a:spcPts val="800"/>
+                        </a:spcAft>
+                      </a:pPr>
+                      <a:r>
+                        <a:rPr lang="en-CA" sz="1100" dirty="0">
+                          <a:effectLst/>
+                        </a:rPr>
+                        <a:t>Notifications</a:t>
+                      </a:r>
+                      <a:endParaRPr lang="en-CA" sz="1100" dirty="0">
+                        <a:effectLst/>
+                        <a:latin typeface="Calibri" panose="020F0502020204030204" pitchFamily="34" charset="0"/>
+                        <a:ea typeface="Calibri" panose="020F0502020204030204" pitchFamily="34" charset="0"/>
+                        <a:cs typeface="Times New Roman" panose="02020603050405020304" pitchFamily="18" charset="0"/>
+                      </a:endParaRPr>
+                    </a:p>
+                  </a:txBody>
+                  <a:tcPr marL="68580" marR="68580" marT="0" marB="0"/>
+                </a:tc>
+                <a:tc>
+                  <a:txBody>
+                    <a:bodyPr/>
+                    <a:lstStyle/>
+                    <a:p>
+                      <a:pPr algn="ctr">
+                        <a:lnSpc>
+                          <a:spcPct val="107000"/>
+                        </a:lnSpc>
+                        <a:spcAft>
+                          <a:spcPts val="800"/>
+                        </a:spcAft>
+                      </a:pPr>
+                      <a:r>
+                        <a:rPr lang="en-CA" sz="1100">
+                          <a:effectLst/>
+                        </a:rPr>
+                        <a:t>User email-id and mobile number required</a:t>
+                      </a:r>
+                      <a:endParaRPr lang="en-CA" sz="1100">
+                        <a:effectLst/>
+                        <a:latin typeface="Calibri" panose="020F0502020204030204" pitchFamily="34" charset="0"/>
+                        <a:ea typeface="Calibri" panose="020F0502020204030204" pitchFamily="34" charset="0"/>
+                        <a:cs typeface="Times New Roman" panose="02020603050405020304" pitchFamily="18" charset="0"/>
+                      </a:endParaRPr>
+                    </a:p>
+                  </a:txBody>
+                  <a:tcPr marL="68580" marR="68580" marT="0" marB="0"/>
+                </a:tc>
+                <a:tc>
+                  <a:txBody>
+                    <a:bodyPr/>
+                    <a:lstStyle/>
+                    <a:p>
+                      <a:pPr algn="ctr">
+                        <a:lnSpc>
+                          <a:spcPct val="107000"/>
+                        </a:lnSpc>
+                        <a:spcAft>
+                          <a:spcPts val="800"/>
+                        </a:spcAft>
+                      </a:pPr>
+                      <a:r>
+                        <a:rPr lang="en-CA" sz="1100">
+                          <a:effectLst/>
+                        </a:rPr>
+                        <a:t> </a:t>
+                      </a:r>
+                      <a:endParaRPr lang="en-CA" sz="1100">
+                        <a:effectLst/>
+                        <a:latin typeface="Calibri" panose="020F0502020204030204" pitchFamily="34" charset="0"/>
+                        <a:ea typeface="Calibri" panose="020F0502020204030204" pitchFamily="34" charset="0"/>
+                        <a:cs typeface="Times New Roman" panose="02020603050405020304" pitchFamily="18" charset="0"/>
+                      </a:endParaRPr>
+                    </a:p>
+                  </a:txBody>
+                  <a:tcPr marL="68580" marR="68580" marT="0" marB="0"/>
+                </a:tc>
+                <a:extLst>
+                  <a:ext uri="{0D108BD9-81ED-4DB2-BD59-A6C34878D82A}">
+                    <a16:rowId xmlns:a16="http://schemas.microsoft.com/office/drawing/2014/main" val="377500767"/>
+                  </a:ext>
+                </a:extLst>
+              </a:tr>
+              <a:tr h="968189">
+                <a:tc>
+                  <a:txBody>
+                    <a:bodyPr/>
+                    <a:lstStyle/>
+                    <a:p>
+                      <a:pPr algn="ctr">
+                        <a:lnSpc>
+                          <a:spcPct val="107000"/>
+                        </a:lnSpc>
+                        <a:spcAft>
+                          <a:spcPts val="800"/>
+                        </a:spcAft>
+                      </a:pPr>
+                      <a:r>
+                        <a:rPr lang="en-CA" sz="1100" dirty="0">
+                          <a:effectLst/>
+                        </a:rPr>
+                        <a:t>Template</a:t>
+                      </a:r>
+                      <a:endParaRPr lang="en-CA" sz="1100" dirty="0">
+                        <a:effectLst/>
+                        <a:latin typeface="Calibri" panose="020F0502020204030204" pitchFamily="34" charset="0"/>
+                        <a:ea typeface="Calibri" panose="020F0502020204030204" pitchFamily="34" charset="0"/>
+                        <a:cs typeface="Times New Roman" panose="02020603050405020304" pitchFamily="18" charset="0"/>
+                      </a:endParaRPr>
+                    </a:p>
+                  </a:txBody>
+                  <a:tcPr marL="68580" marR="68580" marT="0" marB="0"/>
+                </a:tc>
+                <a:tc>
+                  <a:txBody>
+                    <a:bodyPr/>
+                    <a:lstStyle/>
+                    <a:p>
+                      <a:pPr algn="ctr">
+                        <a:lnSpc>
+                          <a:spcPct val="107000"/>
+                        </a:lnSpc>
+                        <a:spcAft>
+                          <a:spcPts val="800"/>
+                        </a:spcAft>
+                      </a:pPr>
+                      <a:r>
+                        <a:rPr lang="en-CA" sz="1100">
+                          <a:effectLst/>
+                        </a:rPr>
+                        <a:t>Doctor’s Feedback</a:t>
+                      </a:r>
+                      <a:endParaRPr lang="en-CA" sz="1100">
+                        <a:effectLst/>
+                        <a:latin typeface="Calibri" panose="020F0502020204030204" pitchFamily="34" charset="0"/>
+                        <a:ea typeface="Calibri" panose="020F0502020204030204" pitchFamily="34" charset="0"/>
+                        <a:cs typeface="Times New Roman" panose="02020603050405020304" pitchFamily="18" charset="0"/>
+                      </a:endParaRPr>
+                    </a:p>
+                  </a:txBody>
+                  <a:tcPr marL="68580" marR="68580" marT="0" marB="0"/>
+                </a:tc>
+                <a:tc>
+                  <a:txBody>
+                    <a:bodyPr/>
+                    <a:lstStyle/>
+                    <a:p>
+                      <a:pPr algn="ctr">
+                        <a:lnSpc>
+                          <a:spcPct val="107000"/>
+                        </a:lnSpc>
+                        <a:spcAft>
+                          <a:spcPts val="800"/>
+                        </a:spcAft>
+                      </a:pPr>
+                      <a:r>
+                        <a:rPr lang="en-CA" sz="1100" dirty="0">
+                          <a:effectLst/>
+                        </a:rPr>
+                        <a:t>Report in a PDF format</a:t>
+                      </a:r>
+                      <a:endParaRPr lang="en-CA" sz="1100" dirty="0">
+                        <a:effectLst/>
+                        <a:latin typeface="Calibri" panose="020F0502020204030204" pitchFamily="34" charset="0"/>
+                        <a:ea typeface="Calibri" panose="020F0502020204030204" pitchFamily="34" charset="0"/>
+                        <a:cs typeface="Times New Roman" panose="02020603050405020304" pitchFamily="18" charset="0"/>
+                      </a:endParaRPr>
+                    </a:p>
+                  </a:txBody>
+                  <a:tcPr marL="68580" marR="68580" marT="0" marB="0"/>
+                </a:tc>
+                <a:tc>
+                  <a:txBody>
+                    <a:bodyPr/>
+                    <a:lstStyle/>
+                    <a:p>
+                      <a:pPr algn="ctr">
+                        <a:lnSpc>
+                          <a:spcPct val="107000"/>
+                        </a:lnSpc>
+                        <a:spcAft>
+                          <a:spcPts val="800"/>
+                        </a:spcAft>
+                      </a:pPr>
+                      <a:r>
+                        <a:rPr lang="en-CA" sz="1100">
+                          <a:effectLst/>
+                        </a:rPr>
+                        <a:t>Successful completion of video interaction</a:t>
+                      </a:r>
+                      <a:endParaRPr lang="en-CA" sz="1100">
+                        <a:effectLst/>
+                        <a:latin typeface="Calibri" panose="020F0502020204030204" pitchFamily="34" charset="0"/>
+                        <a:ea typeface="Calibri" panose="020F0502020204030204" pitchFamily="34" charset="0"/>
+                        <a:cs typeface="Times New Roman" panose="02020603050405020304" pitchFamily="18" charset="0"/>
+                      </a:endParaRPr>
+                    </a:p>
+                  </a:txBody>
+                  <a:tcPr marL="68580" marR="68580" marT="0" marB="0"/>
+                </a:tc>
+                <a:tc>
+                  <a:txBody>
+                    <a:bodyPr/>
+                    <a:lstStyle/>
+                    <a:p>
+                      <a:pPr algn="ctr">
+                        <a:lnSpc>
+                          <a:spcPct val="107000"/>
+                        </a:lnSpc>
+                        <a:spcAft>
+                          <a:spcPts val="800"/>
+                        </a:spcAft>
+                      </a:pPr>
+                      <a:r>
+                        <a:rPr lang="en-CA" sz="1100" dirty="0">
+                          <a:effectLst/>
+                        </a:rPr>
+                        <a:t> </a:t>
+                      </a:r>
+                      <a:endParaRPr lang="en-CA" sz="1100" dirty="0">
+                        <a:effectLst/>
+                        <a:latin typeface="Calibri" panose="020F0502020204030204" pitchFamily="34" charset="0"/>
+                        <a:ea typeface="Calibri" panose="020F0502020204030204" pitchFamily="34" charset="0"/>
+                        <a:cs typeface="Times New Roman" panose="02020603050405020304" pitchFamily="18" charset="0"/>
+                      </a:endParaRPr>
+                    </a:p>
+                  </a:txBody>
+                  <a:tcPr marL="68580" marR="68580" marT="0" marB="0"/>
+                </a:tc>
+                <a:extLst>
+                  <a:ext uri="{0D108BD9-81ED-4DB2-BD59-A6C34878D82A}">
+                    <a16:rowId xmlns:a16="http://schemas.microsoft.com/office/drawing/2014/main" val="4260327335"/>
+                  </a:ext>
+                </a:extLst>
+              </a:tr>
+            </a:tbl>
+          </a:graphicData>
+        </a:graphic>
+      </p:graphicFrame>
+      <p:sp>
+        <p:nvSpPr>
+          <p:cNvPr id="4" name="Date Placeholder 3">
+            <a:extLst>
+              <a:ext uri="{FF2B5EF4-FFF2-40B4-BE49-F238E27FC236}">
+                <a16:creationId xmlns:a16="http://schemas.microsoft.com/office/drawing/2014/main" id="{5D1446D8-069E-47E7-AAB0-EACF0F8398F8}"/>
+              </a:ext>
+            </a:extLst>
+          </p:cNvPr>
+          <p:cNvSpPr>
+            <a:spLocks noGrp="1"/>
+          </p:cNvSpPr>
+          <p:nvPr>
+            <p:ph type="dt" sz="half" idx="10"/>
+          </p:nvPr>
+        </p:nvSpPr>
+        <p:spPr/>
+        <p:txBody>
+          <a:bodyPr/>
+          <a:lstStyle/>
+          <a:p>
+            <a:r>
+              <a:rPr lang="en-US"/>
+              <a:t>SENG697 (Fall 2007)</a:t>
+            </a:r>
+            <a:endParaRPr lang="en-US" altLang="ja-JP"/>
+          </a:p>
+        </p:txBody>
+      </p:sp>
+      <p:sp>
+        <p:nvSpPr>
+          <p:cNvPr id="5" name="Footer Placeholder 4">
+            <a:extLst>
+              <a:ext uri="{FF2B5EF4-FFF2-40B4-BE49-F238E27FC236}">
+                <a16:creationId xmlns:a16="http://schemas.microsoft.com/office/drawing/2014/main" id="{6F6B95EF-279E-4E16-A76F-649CC08B08CB}"/>
+              </a:ext>
+            </a:extLst>
+          </p:cNvPr>
+          <p:cNvSpPr>
+            <a:spLocks noGrp="1"/>
+          </p:cNvSpPr>
+          <p:nvPr>
+            <p:ph type="ftr" sz="quarter" idx="11"/>
+          </p:nvPr>
+        </p:nvSpPr>
+        <p:spPr/>
+        <p:txBody>
+          <a:bodyPr/>
+          <a:lstStyle/>
+          <a:p>
+            <a:r>
+              <a:rPr lang="ja-JP" altLang="en-US"/>
+              <a:t>far@ucalgary.ca</a:t>
+            </a:r>
+            <a:endParaRPr lang="en-US" altLang="ja-JP"/>
+          </a:p>
+        </p:txBody>
+      </p:sp>
+      <p:sp>
+        <p:nvSpPr>
+          <p:cNvPr id="6" name="Slide Number Placeholder 5">
+            <a:extLst>
+              <a:ext uri="{FF2B5EF4-FFF2-40B4-BE49-F238E27FC236}">
+                <a16:creationId xmlns:a16="http://schemas.microsoft.com/office/drawing/2014/main" id="{E5EE28F2-3E99-4270-877A-C49BD8039D32}"/>
+              </a:ext>
+            </a:extLst>
+          </p:cNvPr>
+          <p:cNvSpPr>
+            <a:spLocks noGrp="1"/>
+          </p:cNvSpPr>
+          <p:nvPr>
+            <p:ph type="sldNum" sz="quarter" idx="12"/>
+          </p:nvPr>
+        </p:nvSpPr>
+        <p:spPr/>
+        <p:txBody>
+          <a:bodyPr/>
+          <a:lstStyle/>
+          <a:p>
+            <a:fld id="{A4BAB868-1E00-44C6-B1AB-DFCC5F9865BA}" type="slidenum">
+              <a:rPr lang="ja-JP" altLang="en-US" smtClean="0"/>
+              <a:pPr/>
+              <a:t>11</a:t>
+            </a:fld>
+            <a:endParaRPr lang="en-US" altLang="ja-JP"/>
+          </a:p>
+        </p:txBody>
+      </p:sp>
+      <p:sp>
+        <p:nvSpPr>
+          <p:cNvPr id="8" name="Rectangle 1">
+            <a:extLst>
+              <a:ext uri="{FF2B5EF4-FFF2-40B4-BE49-F238E27FC236}">
+                <a16:creationId xmlns:a16="http://schemas.microsoft.com/office/drawing/2014/main" id="{46DB4099-764C-4CD1-9AD6-4911B9EC44FE}"/>
+              </a:ext>
+            </a:extLst>
+          </p:cNvPr>
+          <p:cNvSpPr>
+            <a:spLocks noChangeArrowheads="1"/>
+          </p:cNvSpPr>
+          <p:nvPr/>
+        </p:nvSpPr>
+        <p:spPr bwMode="auto">
+          <a:xfrm>
+            <a:off x="0" y="0"/>
+            <a:ext cx="12192000" cy="457200"/>
+          </a:xfrm>
+          <a:prstGeom prst="rect">
+            <a:avLst/>
+          </a:prstGeom>
+          <a:noFill/>
+          <a:ln>
+            <a:noFill/>
+          </a:ln>
+          <a:effectLst/>
+          <a:extLst>
+            <a:ext uri="{909E8E84-426E-40DD-AFC4-6F175D3DCCD1}">
+              <a14:hiddenFill xmlns:a14="http://schemas.microsoft.com/office/drawing/2010/main">
+                <a:solidFill>
+                  <a:schemeClr val="accent1"/>
+                </a:solidFill>
+              </a14:hiddenFill>
+            </a:ext>
+            <a:ext uri="{91240B29-F687-4F45-9708-019B960494DF}">
+              <a14:hiddenLine xmlns:a14="http://schemas.microsoft.com/office/drawing/2010/main" w="9525">
+                <a:solidFill>
+                  <a:schemeClr val="tx1"/>
+                </a:solidFill>
+                <a:miter lim="800000"/>
+                <a:headEnd/>
+                <a:tailEnd/>
+              </a14:hiddenLine>
+            </a:ext>
+            <a:ext uri="{AF507438-7753-43E0-B8FC-AC1667EBCBE1}">
+              <a14:hiddenEffects xmlns:a14="http://schemas.microsoft.com/office/drawing/2010/main">
+                <a:effectLst>
+                  <a:outerShdw dist="35921" dir="2700000" algn="ctr" rotWithShape="0">
+                    <a:schemeClr val="bg2"/>
+                  </a:outerShdw>
+                </a:effectLst>
+              </a14:hiddenEffects>
+            </a:ext>
+          </a:extLst>
+        </p:spPr>
+        <p:txBody>
+          <a:bodyPr vert="horz" wrap="none" lIns="91440" tIns="45720" rIns="91440" bIns="45720" numCol="1" anchor="ctr" anchorCtr="0" compatLnSpc="1">
+            <a:prstTxWarp prst="textNoShape">
+              <a:avLst/>
+            </a:prstTxWarp>
+            <a:spAutoFit/>
+          </a:bodyPr>
+          <a:lstStyle/>
+          <a:p>
+            <a:endParaRPr lang="en-CA"/>
+          </a:p>
+        </p:txBody>
+      </p:sp>
+    </p:spTree>
+    <p:extLst>
+      <p:ext uri="{BB962C8B-B14F-4D97-AF65-F5344CB8AC3E}">
+        <p14:creationId xmlns:p14="http://schemas.microsoft.com/office/powerpoint/2010/main" val="502792391"/>
+      </p:ext>
+    </p:extLst>
+  </p:cSld>
+  <p:clrMapOvr>
+    <a:masterClrMapping/>
+  </p:clrMapOvr>
+  <p:transition>
+    <p:dissolve/>
+  </p:transition>
+</p:sld>
+</file>
+
+<file path=ppt/slides/slide12.xml><?xml version="1.0" encoding="utf-8"?>
+<p:sld xmlns:a="http://schemas.openxmlformats.org/drawingml/2006/main" xmlns:r="http://schemas.openxmlformats.org/officeDocument/2006/relationships" xmlns:p="http://schemas.openxmlformats.org/presentationml/2006/main">
+  <p:cSld>
+    <p:spTree>
+      <p:nvGrpSpPr>
+        <p:cNvPr id="1" name=""/>
+        <p:cNvGrpSpPr/>
+        <p:nvPr/>
+      </p:nvGrpSpPr>
+      <p:grpSpPr>
+        <a:xfrm>
+          <a:off x="0" y="0"/>
+          <a:ext cx="0" cy="0"/>
+          <a:chOff x="0" y="0"/>
+          <a:chExt cx="0" cy="0"/>
+        </a:xfrm>
+      </p:grpSpPr>
+      <p:sp>
+        <p:nvSpPr>
+          <p:cNvPr id="2" name="Title 1">
+            <a:extLst>
+              <a:ext uri="{FF2B5EF4-FFF2-40B4-BE49-F238E27FC236}">
+                <a16:creationId xmlns:a16="http://schemas.microsoft.com/office/drawing/2014/main" id="{368323DE-B14C-4317-AD02-07F45A5F21DE}"/>
+              </a:ext>
+            </a:extLst>
+          </p:cNvPr>
+          <p:cNvSpPr>
+            <a:spLocks noGrp="1"/>
+          </p:cNvSpPr>
+          <p:nvPr>
+            <p:ph type="title"/>
+          </p:nvPr>
+        </p:nvSpPr>
+        <p:spPr/>
+        <p:txBody>
+          <a:bodyPr/>
+          <a:lstStyle/>
+          <a:p>
+            <a:r>
+              <a:rPr lang="en-CA" dirty="0"/>
+              <a:t>8. Design: Acquaintance Model</a:t>
+            </a:r>
+          </a:p>
+        </p:txBody>
+      </p:sp>
+      <p:sp>
+        <p:nvSpPr>
+          <p:cNvPr id="4" name="Date Placeholder 3">
+            <a:extLst>
+              <a:ext uri="{FF2B5EF4-FFF2-40B4-BE49-F238E27FC236}">
+                <a16:creationId xmlns:a16="http://schemas.microsoft.com/office/drawing/2014/main" id="{D6734280-F370-40C7-964C-AD71EE1EED72}"/>
+              </a:ext>
+            </a:extLst>
+          </p:cNvPr>
+          <p:cNvSpPr>
+            <a:spLocks noGrp="1"/>
+          </p:cNvSpPr>
+          <p:nvPr>
+            <p:ph type="dt" sz="half" idx="10"/>
+          </p:nvPr>
+        </p:nvSpPr>
+        <p:spPr/>
+        <p:txBody>
+          <a:bodyPr/>
+          <a:lstStyle/>
+          <a:p>
+            <a:r>
+              <a:rPr lang="en-US"/>
+              <a:t>SENG697 (Fall 2007)</a:t>
+            </a:r>
+            <a:endParaRPr lang="en-US" altLang="ja-JP"/>
+          </a:p>
+        </p:txBody>
+      </p:sp>
+      <p:sp>
+        <p:nvSpPr>
+          <p:cNvPr id="5" name="Footer Placeholder 4">
+            <a:extLst>
+              <a:ext uri="{FF2B5EF4-FFF2-40B4-BE49-F238E27FC236}">
+                <a16:creationId xmlns:a16="http://schemas.microsoft.com/office/drawing/2014/main" id="{12DBA186-B9C1-4890-8088-91889D328408}"/>
+              </a:ext>
+            </a:extLst>
+          </p:cNvPr>
+          <p:cNvSpPr>
+            <a:spLocks noGrp="1"/>
+          </p:cNvSpPr>
+          <p:nvPr>
+            <p:ph type="ftr" sz="quarter" idx="11"/>
+          </p:nvPr>
+        </p:nvSpPr>
+        <p:spPr/>
+        <p:txBody>
+          <a:bodyPr/>
+          <a:lstStyle/>
+          <a:p>
+            <a:r>
+              <a:rPr lang="ja-JP" altLang="en-US"/>
+              <a:t>far@ucalgary.ca</a:t>
+            </a:r>
+            <a:endParaRPr lang="en-US" altLang="ja-JP"/>
+          </a:p>
+        </p:txBody>
+      </p:sp>
+      <p:sp>
+        <p:nvSpPr>
+          <p:cNvPr id="6" name="Slide Number Placeholder 5">
+            <a:extLst>
+              <a:ext uri="{FF2B5EF4-FFF2-40B4-BE49-F238E27FC236}">
+                <a16:creationId xmlns:a16="http://schemas.microsoft.com/office/drawing/2014/main" id="{778E3DC4-4281-44F4-9D4C-E7DAB213D0EE}"/>
+              </a:ext>
+            </a:extLst>
+          </p:cNvPr>
+          <p:cNvSpPr>
+            <a:spLocks noGrp="1"/>
+          </p:cNvSpPr>
+          <p:nvPr>
+            <p:ph type="sldNum" sz="quarter" idx="12"/>
+          </p:nvPr>
+        </p:nvSpPr>
+        <p:spPr/>
+        <p:txBody>
+          <a:bodyPr/>
+          <a:lstStyle/>
+          <a:p>
+            <a:fld id="{A4BAB868-1E00-44C6-B1AB-DFCC5F9865BA}" type="slidenum">
+              <a:rPr lang="ja-JP" altLang="en-US" smtClean="0"/>
+              <a:pPr/>
+              <a:t>12</a:t>
+            </a:fld>
+            <a:endParaRPr lang="en-US" altLang="ja-JP"/>
+          </a:p>
+        </p:txBody>
+      </p:sp>
+      <p:pic>
+        <p:nvPicPr>
+          <p:cNvPr id="10" name="Picture 9">
+            <a:extLst>
+              <a:ext uri="{FF2B5EF4-FFF2-40B4-BE49-F238E27FC236}">
+                <a16:creationId xmlns:a16="http://schemas.microsoft.com/office/drawing/2014/main" id="{BEE8B78B-2092-4A87-B0E9-F1171148EF02}"/>
+              </a:ext>
+            </a:extLst>
+          </p:cNvPr>
+          <p:cNvPicPr>
+            <a:picLocks noChangeAspect="1"/>
+          </p:cNvPicPr>
+          <p:nvPr/>
+        </p:nvPicPr>
+        <p:blipFill>
+          <a:blip r:embed="rId2"/>
+          <a:stretch>
+            <a:fillRect/>
+          </a:stretch>
+        </p:blipFill>
+        <p:spPr>
+          <a:xfrm>
+            <a:off x="1219200" y="1492470"/>
+            <a:ext cx="9886950" cy="4771696"/>
+          </a:xfrm>
+          <a:prstGeom prst="rect">
+            <a:avLst/>
+          </a:prstGeom>
+        </p:spPr>
+      </p:pic>
+    </p:spTree>
+    <p:extLst>
+      <p:ext uri="{BB962C8B-B14F-4D97-AF65-F5344CB8AC3E}">
+        <p14:creationId xmlns:p14="http://schemas.microsoft.com/office/powerpoint/2010/main" val="358017946"/>
       </p:ext>
     </p:extLst>
   </p:cSld>
@@ -4096,16 +5272,6 @@
               </a:spcAft>
             </a:pPr>
             <a:r>
-              <a:rPr lang="en-US" dirty="0" smtClean="0">
-                <a:solidFill>
-                  <a:srgbClr val="000000"/>
-                </a:solidFill>
-                <a:latin typeface="Tahoma" pitchFamily="34" charset="0"/>
-                <a:ea typeface="ＭＳ Ｐゴシック" pitchFamily="50" charset="-128"/>
-              </a:rPr>
-              <a:t>SENG696 </a:t>
-            </a:r>
-            <a:r>
               <a:rPr lang="en-US" dirty="0">
                 <a:solidFill>
                   <a:srgbClr val="000000"/>
@@ -4113,17 +5279,7 @@
                 <a:latin typeface="Tahoma" pitchFamily="34" charset="0"/>
                 <a:ea typeface="ＭＳ Ｐゴシック" pitchFamily="50" charset="-128"/>
               </a:rPr>
-              <a:t>(Fall </a:t>
-            </a:r>
-            <a:r>
-              <a:rPr lang="en-US" dirty="0" smtClean="0">
-                <a:solidFill>
-                  <a:srgbClr val="000000"/>
-                </a:solidFill>
-                <a:latin typeface="Tahoma" pitchFamily="34" charset="0"/>
-                <a:ea typeface="ＭＳ Ｐゴシック" pitchFamily="50" charset="-128"/>
-              </a:rPr>
-              <a:t>2021)</a:t>
+              <a:t>SENG696 (Fall 2021)</a:t>
             </a:r>
             <a:endParaRPr lang="en-US" altLang="ja-JP" dirty="0">
               <a:solidFill>
@@ -4241,16 +5397,12 @@
               <a:buChar char="§"/>
             </a:pPr>
             <a:r>
-              <a:rPr lang="en-US" sz="2400" dirty="0" smtClean="0">
+              <a:rPr lang="en-US" sz="2400" dirty="0">
                 <a:latin typeface="Times New Roman" panose="02020603050405020304" pitchFamily="18" charset="0"/>
                 <a:cs typeface="Times New Roman" panose="02020603050405020304" pitchFamily="18" charset="0"/>
               </a:rPr>
               <a:t>Pet-owners are dependent on calls from the veterinary clinic to schedule timely appointments that match their routine and visit in person to get their pets examined. There is no provision to avail these services from home.</a:t>
             </a:r>
-            <a:endParaRPr lang="en-US" sz="2400" dirty="0">
-              <a:latin typeface="Times New Roman" panose="02020603050405020304" pitchFamily="18" charset="0"/>
-              <a:cs typeface="Times New Roman" panose="02020603050405020304" pitchFamily="18" charset="0"/>
-            </a:endParaRPr>
           </a:p>
           <a:p>
             <a:pPr marL="285750" indent="-285750">
@@ -4261,7 +5413,7 @@
               <a:buChar char="§"/>
             </a:pPr>
             <a:r>
-              <a:rPr lang="en-US" sz="2400" dirty="0" smtClean="0">
+              <a:rPr lang="en-US" sz="2400" dirty="0">
                 <a:latin typeface="Times New Roman" panose="02020603050405020304" pitchFamily="18" charset="0"/>
                 <a:cs typeface="Times New Roman" panose="02020603050405020304" pitchFamily="18" charset="0"/>
               </a:rPr>
@@ -4277,7 +5429,7 @@
               <a:buChar char="§"/>
             </a:pPr>
             <a:r>
-              <a:rPr lang="en-US" sz="2400" dirty="0" smtClean="0">
+              <a:rPr lang="en-US" sz="2400" dirty="0">
                 <a:latin typeface="Times New Roman" panose="02020603050405020304" pitchFamily="18" charset="0"/>
                 <a:cs typeface="Times New Roman" panose="02020603050405020304" pitchFamily="18" charset="0"/>
               </a:rPr>
@@ -4294,29 +5446,9 @@
             </a:pPr>
             <a:r>
               <a:rPr lang="en-CA" sz="2400" dirty="0"/>
-              <a:t>In this </a:t>
-            </a:r>
-            <a:r>
-              <a:rPr lang="en-CA" sz="2400" dirty="0" smtClean="0"/>
-              <a:t>situation, </a:t>
-            </a:r>
-            <a:r>
-              <a:rPr lang="en-CA" sz="2400" dirty="0"/>
-              <a:t>intelligent agents have a great potential in helping the </a:t>
-            </a:r>
-            <a:r>
-              <a:rPr lang="en-CA" sz="2400" dirty="0" smtClean="0"/>
-              <a:t>owners </a:t>
-            </a:r>
-            <a:r>
-              <a:rPr lang="en-CA" sz="2400" dirty="0"/>
-              <a:t>get </a:t>
-            </a:r>
-            <a:r>
-              <a:rPr lang="en-CA" sz="2400" dirty="0" smtClean="0"/>
-              <a:t>timely appointments and prevent deprivation of proper care and diagnosis for their pets.</a:t>
-            </a:r>
-            <a:endParaRPr lang="en-US" sz="2400" dirty="0" smtClean="0">
+              <a:t>In this situation, intelligent agents have a great potential in helping the owners get timely appointments and prevent deprivation of proper care and diagnosis for their pets.</a:t>
+            </a:r>
+            <a:endParaRPr lang="en-US" sz="2400" dirty="0">
               <a:latin typeface="Times New Roman" panose="02020603050405020304" pitchFamily="18" charset="0"/>
               <a:cs typeface="Times New Roman" panose="02020603050405020304" pitchFamily="18" charset="0"/>
             </a:endParaRPr>
@@ -4329,7 +5461,7 @@
               <a:buFont typeface="Wingdings" panose="05000000000000000000" pitchFamily="2" charset="2"/>
               <a:buChar char="§"/>
             </a:pPr>
-            <a:endParaRPr lang="en-US" sz="2400" dirty="0" smtClean="0">
+            <a:endParaRPr lang="en-US" sz="2400" dirty="0">
               <a:latin typeface="Times New Roman" panose="02020603050405020304" pitchFamily="18" charset="0"/>
               <a:cs typeface="Times New Roman" panose="02020603050405020304" pitchFamily="18" charset="0"/>
             </a:endParaRPr>
@@ -4393,16 +5525,6 @@
               </a:spcAft>
             </a:pPr>
             <a:r>
-              <a:rPr lang="en-US" dirty="0" smtClean="0">
-                <a:solidFill>
-                  <a:srgbClr val="000000"/>
-                </a:solidFill>
-                <a:latin typeface="Tahoma" pitchFamily="34" charset="0"/>
-                <a:ea typeface="ＭＳ Ｐゴシック" pitchFamily="50" charset="-128"/>
-              </a:rPr>
-              <a:t>SENG696 </a:t>
-            </a:r>
-            <a:r>
               <a:rPr lang="en-US" dirty="0">
                 <a:solidFill>
                   <a:srgbClr val="000000"/>
@@ -4410,17 +5532,7 @@
                 <a:latin typeface="Tahoma" pitchFamily="34" charset="0"/>
                 <a:ea typeface="ＭＳ Ｐゴシック" pitchFamily="50" charset="-128"/>
               </a:rPr>
-              <a:t>(Fall </a:t>
-            </a:r>
-            <a:r>
-              <a:rPr lang="en-US" dirty="0" smtClean="0">
-                <a:solidFill>
-                  <a:srgbClr val="000000"/>
-                </a:solidFill>
-                <a:latin typeface="Tahoma" pitchFamily="34" charset="0"/>
-                <a:ea typeface="ＭＳ Ｐゴシック" pitchFamily="50" charset="-128"/>
-              </a:rPr>
-              <a:t>2021)</a:t>
+              <a:t>SENG696 (Fall 2021)</a:t>
             </a:r>
             <a:endParaRPr lang="en-US" altLang="ja-JP" dirty="0">
               <a:solidFill>
@@ -4542,7 +5654,7 @@
               <a:t>The proposed </a:t>
             </a:r>
             <a:r>
-              <a:rPr lang="en-CA" sz="2600" b="1" dirty="0" smtClean="0">
+              <a:rPr lang="en-CA" sz="2600" b="1" dirty="0">
                 <a:solidFill>
                   <a:srgbClr val="D60093"/>
                 </a:solidFill>
@@ -4550,28 +5662,8 @@
               <a:t>E-Vet System(EVS)</a:t>
             </a:r>
             <a:r>
-              <a:rPr lang="en-CA" sz="2600" dirty="0" smtClean="0"/>
-              <a:t> </a:t>
-            </a:r>
-            <a:r>
               <a:rPr lang="en-CA" sz="2600" dirty="0"/>
-              <a:t>is a multi-agent system designed to </a:t>
-            </a:r>
-            <a:r>
-              <a:rPr lang="en-CA" sz="2600" dirty="0" smtClean="0"/>
-              <a:t>render multiple functionalities to simplify the appointment booking process to the pet-owner(user) based </a:t>
-            </a:r>
-            <a:r>
-              <a:rPr lang="en-CA" sz="2600" dirty="0"/>
-              <a:t>on </a:t>
-            </a:r>
-            <a:r>
-              <a:rPr lang="en-CA" sz="2600" dirty="0" smtClean="0"/>
-              <a:t>the owner’s </a:t>
-            </a:r>
-            <a:r>
-              <a:rPr lang="en-CA" sz="2600" dirty="0"/>
-              <a:t>preferences. </a:t>
+              <a:t> is a multi-agent system designed to render multiple functionalities to simplify the appointment booking process to the pet-owner(user) based on the owner’s preferences. </a:t>
             </a:r>
           </a:p>
           <a:p>
@@ -4584,37 +5676,8 @@
             </a:pPr>
             <a:r>
               <a:rPr lang="en-CA" sz="2600" dirty="0"/>
-              <a:t>The </a:t>
-            </a:r>
-            <a:r>
-              <a:rPr lang="en-CA" sz="2600" dirty="0" smtClean="0"/>
-              <a:t>clinic package is </a:t>
-            </a:r>
-            <a:r>
-              <a:rPr lang="en-CA" sz="2600" dirty="0"/>
-              <a:t>composed of a </a:t>
-            </a:r>
-            <a:r>
-              <a:rPr lang="en-CA" sz="2600" dirty="0" smtClean="0"/>
-              <a:t>Video Interaction system, </a:t>
-            </a:r>
-            <a:r>
-              <a:rPr lang="en-CA" sz="2600" dirty="0"/>
-              <a:t>a </a:t>
-            </a:r>
-            <a:r>
-              <a:rPr lang="en-CA" sz="2600" dirty="0" smtClean="0"/>
-              <a:t>Reminder generator, </a:t>
-            </a:r>
-            <a:r>
-              <a:rPr lang="en-CA" sz="2600" dirty="0"/>
-              <a:t>and a </a:t>
-            </a:r>
-            <a:r>
-              <a:rPr lang="en-CA" sz="2600" dirty="0" smtClean="0"/>
-              <a:t>utility to generate medical reports.</a:t>
-            </a:r>
-            <a:endParaRPr lang="en-CA" sz="2600" dirty="0"/>
+              <a:t>The clinic package is composed of a Video Interaction system, a Reminder generator, and a utility to generate medical reports.</a:t>
+            </a:r>
           </a:p>
           <a:p>
             <a:pPr>
@@ -4629,7 +5692,7 @@
               <a:t>The </a:t>
             </a:r>
             <a:r>
-              <a:rPr lang="en-CA" sz="2600" b="1" dirty="0" smtClean="0">
+              <a:rPr lang="en-CA" sz="2600" b="1" dirty="0">
                 <a:solidFill>
                   <a:srgbClr val="D60093"/>
                 </a:solidFill>
@@ -4638,37 +5701,8 @@
             </a:r>
             <a:r>
               <a:rPr lang="en-CA" sz="2600" dirty="0"/>
-              <a:t>application deals with </a:t>
-            </a:r>
-            <a:r>
-              <a:rPr lang="en-CA" sz="2600" dirty="0" smtClean="0"/>
-              <a:t>a doctor’s multiple available schedules to </a:t>
-            </a:r>
-            <a:r>
-              <a:rPr lang="en-CA" sz="2600" dirty="0"/>
-              <a:t>find the optimum </a:t>
-            </a:r>
-            <a:r>
-              <a:rPr lang="en-CA" sz="2600" dirty="0" smtClean="0"/>
-              <a:t>appointment window </a:t>
-            </a:r>
-            <a:r>
-              <a:rPr lang="en-CA" sz="2600" dirty="0"/>
-              <a:t>for </a:t>
-            </a:r>
-            <a:r>
-              <a:rPr lang="en-CA" sz="2600" dirty="0" smtClean="0"/>
-              <a:t>the </a:t>
-            </a:r>
-            <a:r>
-              <a:rPr lang="en-CA" sz="2600" dirty="0" smtClean="0"/>
-              <a:t>pet-owner, </a:t>
-            </a:r>
-            <a:r>
-              <a:rPr lang="en-CA" sz="2600" dirty="0" smtClean="0"/>
-              <a:t>taking into consideration the related fees and severity of the symptoms. </a:t>
-            </a:r>
-            <a:endParaRPr lang="en-CA" sz="2600" dirty="0"/>
+              <a:t>application deals with a doctor’s multiple available schedules to find the optimum appointment window for the pet-owner, taking into consideration the related fees and severity of the symptoms. </a:t>
+            </a:r>
           </a:p>
           <a:p>
             <a:pPr>
@@ -4680,13 +5714,8 @@
             </a:pPr>
             <a:r>
               <a:rPr lang="en-CA" sz="2600" dirty="0"/>
-              <a:t>The application has to schedule </a:t>
-            </a:r>
-            <a:r>
-              <a:rPr lang="en-CA" sz="2600" dirty="0" smtClean="0"/>
-              <a:t>the appointment and send regular reminders for the appointment dates to the pet-owner. It also generates a medical report based upon the doctor’s feedback and stores it for future references.</a:t>
-            </a:r>
-            <a:endParaRPr lang="en-CA" sz="2600" dirty="0"/>
+              <a:t>The application has to schedule the appointment and send regular reminders for the appointment dates to the pet-owner. It also generates a medical report based upon the doctor’s feedback and stores it for future references.</a:t>
+            </a:r>
           </a:p>
         </p:txBody>
       </p:sp>
@@ -4725,6 +5754,1085 @@
       </p:grpSpPr>
       <p:sp>
         <p:nvSpPr>
+          <p:cNvPr id="2" name="Title 1">
+            <a:extLst>
+              <a:ext uri="{FF2B5EF4-FFF2-40B4-BE49-F238E27FC236}">
+                <a16:creationId xmlns:a16="http://schemas.microsoft.com/office/drawing/2014/main" id="{73DFDF9A-39FF-430D-AA90-98C73FA65194}"/>
+              </a:ext>
+            </a:extLst>
+          </p:cNvPr>
+          <p:cNvSpPr>
+            <a:spLocks noGrp="1"/>
+          </p:cNvSpPr>
+          <p:nvPr>
+            <p:ph type="title"/>
+          </p:nvPr>
+        </p:nvSpPr>
+        <p:spPr/>
+        <p:txBody>
+          <a:bodyPr/>
+          <a:lstStyle/>
+          <a:p>
+            <a:r>
+              <a:rPr lang="en-CA" dirty="0"/>
+              <a:t>System Description (cont’d)</a:t>
+            </a:r>
+          </a:p>
+        </p:txBody>
+      </p:sp>
+      <p:pic>
+        <p:nvPicPr>
+          <p:cNvPr id="8" name="Content Placeholder 7">
+            <a:extLst>
+              <a:ext uri="{FF2B5EF4-FFF2-40B4-BE49-F238E27FC236}">
+                <a16:creationId xmlns:a16="http://schemas.microsoft.com/office/drawing/2014/main" id="{8396EF12-6BB4-4419-9359-C4A6DEE170B5}"/>
+              </a:ext>
+            </a:extLst>
+          </p:cNvPr>
+          <p:cNvPicPr>
+            <a:picLocks noGrp="1" noChangeAspect="1"/>
+          </p:cNvPicPr>
+          <p:nvPr>
+            <p:ph idx="1"/>
+          </p:nvPr>
+        </p:nvPicPr>
+        <p:blipFill>
+          <a:blip r:embed="rId2"/>
+          <a:stretch>
+            <a:fillRect/>
+          </a:stretch>
+        </p:blipFill>
+        <p:spPr>
+          <a:xfrm>
+            <a:off x="2733676" y="1504950"/>
+            <a:ext cx="6517240" cy="4733925"/>
+          </a:xfrm>
+        </p:spPr>
+      </p:pic>
+      <p:sp>
+        <p:nvSpPr>
+          <p:cNvPr id="4" name="Date Placeholder 3">
+            <a:extLst>
+              <a:ext uri="{FF2B5EF4-FFF2-40B4-BE49-F238E27FC236}">
+                <a16:creationId xmlns:a16="http://schemas.microsoft.com/office/drawing/2014/main" id="{498642DC-E69F-4259-982E-D88A957ACE32}"/>
+              </a:ext>
+            </a:extLst>
+          </p:cNvPr>
+          <p:cNvSpPr>
+            <a:spLocks noGrp="1"/>
+          </p:cNvSpPr>
+          <p:nvPr>
+            <p:ph type="dt" sz="half" idx="10"/>
+          </p:nvPr>
+        </p:nvSpPr>
+        <p:spPr/>
+        <p:txBody>
+          <a:bodyPr/>
+          <a:lstStyle/>
+          <a:p>
+            <a:r>
+              <a:rPr lang="en-US"/>
+              <a:t>SENG697 (Fall 2007)</a:t>
+            </a:r>
+            <a:endParaRPr lang="en-US" altLang="ja-JP"/>
+          </a:p>
+        </p:txBody>
+      </p:sp>
+      <p:sp>
+        <p:nvSpPr>
+          <p:cNvPr id="5" name="Footer Placeholder 4">
+            <a:extLst>
+              <a:ext uri="{FF2B5EF4-FFF2-40B4-BE49-F238E27FC236}">
+                <a16:creationId xmlns:a16="http://schemas.microsoft.com/office/drawing/2014/main" id="{A682DE8B-2FA9-4A99-82E8-43115EDFE4C3}"/>
+              </a:ext>
+            </a:extLst>
+          </p:cNvPr>
+          <p:cNvSpPr>
+            <a:spLocks noGrp="1"/>
+          </p:cNvSpPr>
+          <p:nvPr>
+            <p:ph type="ftr" sz="quarter" idx="11"/>
+          </p:nvPr>
+        </p:nvSpPr>
+        <p:spPr/>
+        <p:txBody>
+          <a:bodyPr/>
+          <a:lstStyle/>
+          <a:p>
+            <a:r>
+              <a:rPr lang="ja-JP" altLang="en-US"/>
+              <a:t>far@ucalgary.ca</a:t>
+            </a:r>
+            <a:endParaRPr lang="en-US" altLang="ja-JP"/>
+          </a:p>
+        </p:txBody>
+      </p:sp>
+      <p:sp>
+        <p:nvSpPr>
+          <p:cNvPr id="6" name="Slide Number Placeholder 5">
+            <a:extLst>
+              <a:ext uri="{FF2B5EF4-FFF2-40B4-BE49-F238E27FC236}">
+                <a16:creationId xmlns:a16="http://schemas.microsoft.com/office/drawing/2014/main" id="{1A19D266-15FF-4116-BD0D-F82DFC0D1A7A}"/>
+              </a:ext>
+            </a:extLst>
+          </p:cNvPr>
+          <p:cNvSpPr>
+            <a:spLocks noGrp="1"/>
+          </p:cNvSpPr>
+          <p:nvPr>
+            <p:ph type="sldNum" sz="quarter" idx="12"/>
+          </p:nvPr>
+        </p:nvSpPr>
+        <p:spPr/>
+        <p:txBody>
+          <a:bodyPr/>
+          <a:lstStyle/>
+          <a:p>
+            <a:fld id="{A4BAB868-1E00-44C6-B1AB-DFCC5F9865BA}" type="slidenum">
+              <a:rPr lang="ja-JP" altLang="en-US" smtClean="0"/>
+              <a:pPr/>
+              <a:t>4</a:t>
+            </a:fld>
+            <a:endParaRPr lang="en-US" altLang="ja-JP"/>
+          </a:p>
+        </p:txBody>
+      </p:sp>
+    </p:spTree>
+    <p:extLst>
+      <p:ext uri="{BB962C8B-B14F-4D97-AF65-F5344CB8AC3E}">
+        <p14:creationId xmlns:p14="http://schemas.microsoft.com/office/powerpoint/2010/main" val="864621906"/>
+      </p:ext>
+    </p:extLst>
+  </p:cSld>
+  <p:clrMapOvr>
+    <a:masterClrMapping/>
+  </p:clrMapOvr>
+  <p:transition>
+    <p:dissolve/>
+  </p:transition>
+</p:sld>
+</file>
+
+<file path=ppt/slides/slide5.xml><?xml version="1.0" encoding="utf-8"?>
+<p:sld xmlns:a="http://schemas.openxmlformats.org/drawingml/2006/main" xmlns:r="http://schemas.openxmlformats.org/officeDocument/2006/relationships" xmlns:p="http://schemas.openxmlformats.org/presentationml/2006/main">
+  <p:cSld>
+    <p:spTree>
+      <p:nvGrpSpPr>
+        <p:cNvPr id="1" name=""/>
+        <p:cNvGrpSpPr/>
+        <p:nvPr/>
+      </p:nvGrpSpPr>
+      <p:grpSpPr>
+        <a:xfrm>
+          <a:off x="0" y="0"/>
+          <a:ext cx="0" cy="0"/>
+          <a:chOff x="0" y="0"/>
+          <a:chExt cx="0" cy="0"/>
+        </a:xfrm>
+      </p:grpSpPr>
+      <p:sp>
+        <p:nvSpPr>
+          <p:cNvPr id="2" name="Title 1">
+            <a:extLst>
+              <a:ext uri="{FF2B5EF4-FFF2-40B4-BE49-F238E27FC236}">
+                <a16:creationId xmlns:a16="http://schemas.microsoft.com/office/drawing/2014/main" id="{32FFF423-63D7-42A4-A812-BA4E971840A2}"/>
+              </a:ext>
+            </a:extLst>
+          </p:cNvPr>
+          <p:cNvSpPr>
+            <a:spLocks noGrp="1"/>
+          </p:cNvSpPr>
+          <p:nvPr>
+            <p:ph type="title"/>
+          </p:nvPr>
+        </p:nvSpPr>
+        <p:spPr/>
+        <p:txBody>
+          <a:bodyPr/>
+          <a:lstStyle/>
+          <a:p>
+            <a:r>
+              <a:rPr lang="en-CA" dirty="0"/>
+              <a:t>3. Assumptions</a:t>
+            </a:r>
+          </a:p>
+        </p:txBody>
+      </p:sp>
+      <p:sp>
+        <p:nvSpPr>
+          <p:cNvPr id="3" name="Content Placeholder 2">
+            <a:extLst>
+              <a:ext uri="{FF2B5EF4-FFF2-40B4-BE49-F238E27FC236}">
+                <a16:creationId xmlns:a16="http://schemas.microsoft.com/office/drawing/2014/main" id="{9289CBD4-8B82-4598-8DFA-C98950A290A8}"/>
+              </a:ext>
+            </a:extLst>
+          </p:cNvPr>
+          <p:cNvSpPr>
+            <a:spLocks noGrp="1"/>
+          </p:cNvSpPr>
+          <p:nvPr>
+            <p:ph idx="1"/>
+          </p:nvPr>
+        </p:nvSpPr>
+        <p:spPr/>
+        <p:txBody>
+          <a:bodyPr/>
+          <a:lstStyle/>
+          <a:p>
+            <a:pPr>
+              <a:lnSpc>
+                <a:spcPct val="107000"/>
+              </a:lnSpc>
+              <a:spcAft>
+                <a:spcPts val="800"/>
+              </a:spcAft>
+            </a:pPr>
+            <a:r>
+              <a:rPr lang="en-US" sz="2800" dirty="0">
+                <a:effectLst/>
+                <a:latin typeface="Calibri" panose="020F0502020204030204" pitchFamily="34" charset="0"/>
+                <a:ea typeface="Calibri" panose="020F0502020204030204" pitchFamily="34" charset="0"/>
+                <a:cs typeface="Times New Roman" panose="02020603050405020304" pitchFamily="18" charset="0"/>
+              </a:rPr>
+              <a:t>To enable video interaction between the doctor and the patient, the system will use existing video conferencing platforms (ZOOM/ Google Meet, etc.)</a:t>
+            </a:r>
+            <a:endParaRPr lang="en-CA" sz="2800" dirty="0">
+              <a:effectLst/>
+              <a:latin typeface="Calibri" panose="020F0502020204030204" pitchFamily="34" charset="0"/>
+              <a:ea typeface="Calibri" panose="020F0502020204030204" pitchFamily="34" charset="0"/>
+              <a:cs typeface="Times New Roman" panose="02020603050405020304" pitchFamily="18" charset="0"/>
+            </a:endParaRPr>
+          </a:p>
+          <a:p>
+            <a:pPr>
+              <a:lnSpc>
+                <a:spcPct val="107000"/>
+              </a:lnSpc>
+              <a:spcAft>
+                <a:spcPts val="800"/>
+              </a:spcAft>
+            </a:pPr>
+            <a:r>
+              <a:rPr lang="en-US" sz="2800" dirty="0">
+                <a:effectLst/>
+                <a:latin typeface="Calibri" panose="020F0502020204030204" pitchFamily="34" charset="0"/>
+                <a:ea typeface="Calibri" panose="020F0502020204030204" pitchFamily="34" charset="0"/>
+                <a:cs typeface="Times New Roman" panose="02020603050405020304" pitchFamily="18" charset="0"/>
+              </a:rPr>
+              <a:t>The user schedules their appointment using a web interface. The interface captures the user preferences and updates the available time slots in real time. </a:t>
+            </a:r>
+            <a:endParaRPr lang="en-CA" sz="2800" dirty="0">
+              <a:effectLst/>
+              <a:latin typeface="Calibri" panose="020F0502020204030204" pitchFamily="34" charset="0"/>
+              <a:ea typeface="Calibri" panose="020F0502020204030204" pitchFamily="34" charset="0"/>
+              <a:cs typeface="Times New Roman" panose="02020603050405020304" pitchFamily="18" charset="0"/>
+            </a:endParaRPr>
+          </a:p>
+          <a:p>
+            <a:endParaRPr lang="en-CA" dirty="0"/>
+          </a:p>
+        </p:txBody>
+      </p:sp>
+      <p:sp>
+        <p:nvSpPr>
+          <p:cNvPr id="4" name="Date Placeholder 3">
+            <a:extLst>
+              <a:ext uri="{FF2B5EF4-FFF2-40B4-BE49-F238E27FC236}">
+                <a16:creationId xmlns:a16="http://schemas.microsoft.com/office/drawing/2014/main" id="{86A4CBD5-3533-4D86-A639-ECFD24CDB124}"/>
+              </a:ext>
+            </a:extLst>
+          </p:cNvPr>
+          <p:cNvSpPr>
+            <a:spLocks noGrp="1"/>
+          </p:cNvSpPr>
+          <p:nvPr>
+            <p:ph type="dt" sz="half" idx="10"/>
+          </p:nvPr>
+        </p:nvSpPr>
+        <p:spPr/>
+        <p:txBody>
+          <a:bodyPr/>
+          <a:lstStyle/>
+          <a:p>
+            <a:r>
+              <a:rPr lang="en-US"/>
+              <a:t>SENG697 (Fall 2007)</a:t>
+            </a:r>
+            <a:endParaRPr lang="en-US" altLang="ja-JP"/>
+          </a:p>
+        </p:txBody>
+      </p:sp>
+      <p:sp>
+        <p:nvSpPr>
+          <p:cNvPr id="5" name="Footer Placeholder 4">
+            <a:extLst>
+              <a:ext uri="{FF2B5EF4-FFF2-40B4-BE49-F238E27FC236}">
+                <a16:creationId xmlns:a16="http://schemas.microsoft.com/office/drawing/2014/main" id="{2A1626FC-42F2-45F3-9435-6BF913541F40}"/>
+              </a:ext>
+            </a:extLst>
+          </p:cNvPr>
+          <p:cNvSpPr>
+            <a:spLocks noGrp="1"/>
+          </p:cNvSpPr>
+          <p:nvPr>
+            <p:ph type="ftr" sz="quarter" idx="11"/>
+          </p:nvPr>
+        </p:nvSpPr>
+        <p:spPr/>
+        <p:txBody>
+          <a:bodyPr/>
+          <a:lstStyle/>
+          <a:p>
+            <a:r>
+              <a:rPr lang="ja-JP" altLang="en-US"/>
+              <a:t>far@ucalgary.ca</a:t>
+            </a:r>
+            <a:endParaRPr lang="en-US" altLang="ja-JP"/>
+          </a:p>
+        </p:txBody>
+      </p:sp>
+      <p:sp>
+        <p:nvSpPr>
+          <p:cNvPr id="6" name="Slide Number Placeholder 5">
+            <a:extLst>
+              <a:ext uri="{FF2B5EF4-FFF2-40B4-BE49-F238E27FC236}">
+                <a16:creationId xmlns:a16="http://schemas.microsoft.com/office/drawing/2014/main" id="{F7548F90-2286-44AF-8464-EFD8AFFCA42B}"/>
+              </a:ext>
+            </a:extLst>
+          </p:cNvPr>
+          <p:cNvSpPr>
+            <a:spLocks noGrp="1"/>
+          </p:cNvSpPr>
+          <p:nvPr>
+            <p:ph type="sldNum" sz="quarter" idx="12"/>
+          </p:nvPr>
+        </p:nvSpPr>
+        <p:spPr/>
+        <p:txBody>
+          <a:bodyPr/>
+          <a:lstStyle/>
+          <a:p>
+            <a:fld id="{A4BAB868-1E00-44C6-B1AB-DFCC5F9865BA}" type="slidenum">
+              <a:rPr lang="ja-JP" altLang="en-US" smtClean="0"/>
+              <a:pPr/>
+              <a:t>5</a:t>
+            </a:fld>
+            <a:endParaRPr lang="en-US" altLang="ja-JP"/>
+          </a:p>
+        </p:txBody>
+      </p:sp>
+    </p:spTree>
+    <p:extLst>
+      <p:ext uri="{BB962C8B-B14F-4D97-AF65-F5344CB8AC3E}">
+        <p14:creationId xmlns:p14="http://schemas.microsoft.com/office/powerpoint/2010/main" val="4014871096"/>
+      </p:ext>
+    </p:extLst>
+  </p:cSld>
+  <p:clrMapOvr>
+    <a:masterClrMapping/>
+  </p:clrMapOvr>
+  <p:transition>
+    <p:dissolve/>
+  </p:transition>
+</p:sld>
+</file>
+
+<file path=ppt/slides/slide6.xml><?xml version="1.0" encoding="utf-8"?>
+<p:sld xmlns:a="http://schemas.openxmlformats.org/drawingml/2006/main" xmlns:r="http://schemas.openxmlformats.org/officeDocument/2006/relationships" xmlns:p="http://schemas.openxmlformats.org/presentationml/2006/main">
+  <p:cSld>
+    <p:spTree>
+      <p:nvGrpSpPr>
+        <p:cNvPr id="1" name=""/>
+        <p:cNvGrpSpPr/>
+        <p:nvPr/>
+      </p:nvGrpSpPr>
+      <p:grpSpPr>
+        <a:xfrm>
+          <a:off x="0" y="0"/>
+          <a:ext cx="0" cy="0"/>
+          <a:chOff x="0" y="0"/>
+          <a:chExt cx="0" cy="0"/>
+        </a:xfrm>
+      </p:grpSpPr>
+      <p:sp>
+        <p:nvSpPr>
+          <p:cNvPr id="2" name="Title 1">
+            <a:extLst>
+              <a:ext uri="{FF2B5EF4-FFF2-40B4-BE49-F238E27FC236}">
+                <a16:creationId xmlns:a16="http://schemas.microsoft.com/office/drawing/2014/main" id="{1BF1EC54-958A-4175-AA58-D1E21C455378}"/>
+              </a:ext>
+            </a:extLst>
+          </p:cNvPr>
+          <p:cNvSpPr>
+            <a:spLocks noGrp="1"/>
+          </p:cNvSpPr>
+          <p:nvPr>
+            <p:ph type="title"/>
+          </p:nvPr>
+        </p:nvSpPr>
+        <p:spPr/>
+        <p:txBody>
+          <a:bodyPr/>
+          <a:lstStyle/>
+          <a:p>
+            <a:r>
+              <a:rPr lang="en-CA" dirty="0"/>
+              <a:t>4. Requirements</a:t>
+            </a:r>
+          </a:p>
+        </p:txBody>
+      </p:sp>
+      <p:sp>
+        <p:nvSpPr>
+          <p:cNvPr id="3" name="Content Placeholder 2">
+            <a:extLst>
+              <a:ext uri="{FF2B5EF4-FFF2-40B4-BE49-F238E27FC236}">
+                <a16:creationId xmlns:a16="http://schemas.microsoft.com/office/drawing/2014/main" id="{6516E77E-81FF-4DBD-B925-6D12C53DCBCE}"/>
+              </a:ext>
+            </a:extLst>
+          </p:cNvPr>
+          <p:cNvSpPr>
+            <a:spLocks noGrp="1"/>
+          </p:cNvSpPr>
+          <p:nvPr>
+            <p:ph idx="1"/>
+          </p:nvPr>
+        </p:nvSpPr>
+        <p:spPr/>
+        <p:txBody>
+          <a:bodyPr/>
+          <a:lstStyle/>
+          <a:p>
+            <a:pPr>
+              <a:lnSpc>
+                <a:spcPct val="107000"/>
+              </a:lnSpc>
+              <a:spcAft>
+                <a:spcPts val="800"/>
+              </a:spcAft>
+            </a:pPr>
+            <a:r>
+              <a:rPr lang="en-CA" sz="2400" dirty="0">
+                <a:effectLst/>
+                <a:latin typeface="Calibri" panose="020F0502020204030204" pitchFamily="34" charset="0"/>
+                <a:ea typeface="Calibri" panose="020F0502020204030204" pitchFamily="34" charset="0"/>
+                <a:cs typeface="Times New Roman" panose="02020603050405020304" pitchFamily="18" charset="0"/>
+              </a:rPr>
+              <a:t>The Video Enabled e-Vet System shall provide a web interface allowing the clients to login and register themselves.</a:t>
+            </a:r>
+          </a:p>
+          <a:p>
+            <a:pPr>
+              <a:lnSpc>
+                <a:spcPct val="107000"/>
+              </a:lnSpc>
+              <a:spcAft>
+                <a:spcPts val="800"/>
+              </a:spcAft>
+            </a:pPr>
+            <a:r>
+              <a:rPr lang="en-CA" sz="2400" dirty="0">
+                <a:effectLst/>
+                <a:latin typeface="Calibri" panose="020F0502020204030204" pitchFamily="34" charset="0"/>
+                <a:ea typeface="Calibri" panose="020F0502020204030204" pitchFamily="34" charset="0"/>
+                <a:cs typeface="Times New Roman" panose="02020603050405020304" pitchFamily="18" charset="0"/>
+              </a:rPr>
+              <a:t>It shall allow patients to schedule their appointments.</a:t>
+            </a:r>
+          </a:p>
+          <a:p>
+            <a:pPr>
+              <a:lnSpc>
+                <a:spcPct val="107000"/>
+              </a:lnSpc>
+              <a:spcAft>
+                <a:spcPts val="800"/>
+              </a:spcAft>
+            </a:pPr>
+            <a:r>
+              <a:rPr lang="en-CA" sz="2400" dirty="0">
+                <a:effectLst/>
+                <a:latin typeface="Calibri" panose="020F0502020204030204" pitchFamily="34" charset="0"/>
+                <a:ea typeface="Calibri" panose="020F0502020204030204" pitchFamily="34" charset="0"/>
+                <a:cs typeface="Times New Roman" panose="02020603050405020304" pitchFamily="18" charset="0"/>
+              </a:rPr>
+              <a:t>It shall record patient’s profile in a database and display it based on their name/id.</a:t>
+            </a:r>
+          </a:p>
+          <a:p>
+            <a:pPr>
+              <a:lnSpc>
+                <a:spcPct val="107000"/>
+              </a:lnSpc>
+              <a:spcAft>
+                <a:spcPts val="800"/>
+              </a:spcAft>
+            </a:pPr>
+            <a:r>
+              <a:rPr lang="en-CA" sz="2400" dirty="0">
+                <a:effectLst/>
+                <a:latin typeface="Calibri" panose="020F0502020204030204" pitchFamily="34" charset="0"/>
+                <a:ea typeface="Calibri" panose="020F0502020204030204" pitchFamily="34" charset="0"/>
+                <a:cs typeface="Times New Roman" panose="02020603050405020304" pitchFamily="18" charset="0"/>
+              </a:rPr>
+              <a:t>It shall remind patients of their appointments.</a:t>
+            </a:r>
+          </a:p>
+          <a:p>
+            <a:pPr>
+              <a:lnSpc>
+                <a:spcPct val="107000"/>
+              </a:lnSpc>
+              <a:spcAft>
+                <a:spcPts val="800"/>
+              </a:spcAft>
+            </a:pPr>
+            <a:r>
+              <a:rPr lang="en-CA" sz="2400" dirty="0">
+                <a:effectLst/>
+                <a:latin typeface="Calibri" panose="020F0502020204030204" pitchFamily="34" charset="0"/>
+                <a:ea typeface="Calibri" panose="020F0502020204030204" pitchFamily="34" charset="0"/>
+                <a:cs typeface="Times New Roman" panose="02020603050405020304" pitchFamily="18" charset="0"/>
+              </a:rPr>
+              <a:t>It shall send an appointment confirmation to the patient, including an invitation to the scheduled video enabled meeting</a:t>
+            </a:r>
+          </a:p>
+          <a:p>
+            <a:pPr>
+              <a:lnSpc>
+                <a:spcPct val="107000"/>
+              </a:lnSpc>
+              <a:spcAft>
+                <a:spcPts val="800"/>
+              </a:spcAft>
+            </a:pPr>
+            <a:r>
+              <a:rPr lang="en-CA" sz="2400" dirty="0">
+                <a:effectLst/>
+                <a:latin typeface="Calibri" panose="020F0502020204030204" pitchFamily="34" charset="0"/>
+                <a:ea typeface="Calibri" panose="020F0502020204030204" pitchFamily="34" charset="0"/>
+                <a:cs typeface="Times New Roman" panose="02020603050405020304" pitchFamily="18" charset="0"/>
+              </a:rPr>
+              <a:t>It shall provide multiple printable letter templates to doctors</a:t>
+            </a:r>
+          </a:p>
+          <a:p>
+            <a:endParaRPr lang="en-CA" dirty="0"/>
+          </a:p>
+        </p:txBody>
+      </p:sp>
+      <p:sp>
+        <p:nvSpPr>
+          <p:cNvPr id="4" name="Date Placeholder 3">
+            <a:extLst>
+              <a:ext uri="{FF2B5EF4-FFF2-40B4-BE49-F238E27FC236}">
+                <a16:creationId xmlns:a16="http://schemas.microsoft.com/office/drawing/2014/main" id="{A4BCE89F-4A52-4ED6-B41A-7DED88BD455E}"/>
+              </a:ext>
+            </a:extLst>
+          </p:cNvPr>
+          <p:cNvSpPr>
+            <a:spLocks noGrp="1"/>
+          </p:cNvSpPr>
+          <p:nvPr>
+            <p:ph type="dt" sz="half" idx="10"/>
+          </p:nvPr>
+        </p:nvSpPr>
+        <p:spPr/>
+        <p:txBody>
+          <a:bodyPr/>
+          <a:lstStyle/>
+          <a:p>
+            <a:r>
+              <a:rPr lang="en-US"/>
+              <a:t>SENG697 (Fall 2007)</a:t>
+            </a:r>
+            <a:endParaRPr lang="en-US" altLang="ja-JP"/>
+          </a:p>
+        </p:txBody>
+      </p:sp>
+      <p:sp>
+        <p:nvSpPr>
+          <p:cNvPr id="5" name="Footer Placeholder 4">
+            <a:extLst>
+              <a:ext uri="{FF2B5EF4-FFF2-40B4-BE49-F238E27FC236}">
+                <a16:creationId xmlns:a16="http://schemas.microsoft.com/office/drawing/2014/main" id="{32DE061E-FF76-45A3-9443-976C82D5186F}"/>
+              </a:ext>
+            </a:extLst>
+          </p:cNvPr>
+          <p:cNvSpPr>
+            <a:spLocks noGrp="1"/>
+          </p:cNvSpPr>
+          <p:nvPr>
+            <p:ph type="ftr" sz="quarter" idx="11"/>
+          </p:nvPr>
+        </p:nvSpPr>
+        <p:spPr/>
+        <p:txBody>
+          <a:bodyPr/>
+          <a:lstStyle/>
+          <a:p>
+            <a:r>
+              <a:rPr lang="ja-JP" altLang="en-US"/>
+              <a:t>far@ucalgary.ca</a:t>
+            </a:r>
+            <a:endParaRPr lang="en-US" altLang="ja-JP"/>
+          </a:p>
+        </p:txBody>
+      </p:sp>
+      <p:sp>
+        <p:nvSpPr>
+          <p:cNvPr id="6" name="Slide Number Placeholder 5">
+            <a:extLst>
+              <a:ext uri="{FF2B5EF4-FFF2-40B4-BE49-F238E27FC236}">
+                <a16:creationId xmlns:a16="http://schemas.microsoft.com/office/drawing/2014/main" id="{C41DE093-F6E5-43CD-9D59-A0A41ACF3575}"/>
+              </a:ext>
+            </a:extLst>
+          </p:cNvPr>
+          <p:cNvSpPr>
+            <a:spLocks noGrp="1"/>
+          </p:cNvSpPr>
+          <p:nvPr>
+            <p:ph type="sldNum" sz="quarter" idx="12"/>
+          </p:nvPr>
+        </p:nvSpPr>
+        <p:spPr/>
+        <p:txBody>
+          <a:bodyPr/>
+          <a:lstStyle/>
+          <a:p>
+            <a:fld id="{A4BAB868-1E00-44C6-B1AB-DFCC5F9865BA}" type="slidenum">
+              <a:rPr lang="ja-JP" altLang="en-US" smtClean="0"/>
+              <a:pPr/>
+              <a:t>6</a:t>
+            </a:fld>
+            <a:endParaRPr lang="en-US" altLang="ja-JP"/>
+          </a:p>
+        </p:txBody>
+      </p:sp>
+    </p:spTree>
+    <p:extLst>
+      <p:ext uri="{BB962C8B-B14F-4D97-AF65-F5344CB8AC3E}">
+        <p14:creationId xmlns:p14="http://schemas.microsoft.com/office/powerpoint/2010/main" val="3411063368"/>
+      </p:ext>
+    </p:extLst>
+  </p:cSld>
+  <p:clrMapOvr>
+    <a:masterClrMapping/>
+  </p:clrMapOvr>
+  <p:transition>
+    <p:dissolve/>
+  </p:transition>
+</p:sld>
+</file>
+
+<file path=ppt/slides/slide7.xml><?xml version="1.0" encoding="utf-8"?>
+<p:sld xmlns:a="http://schemas.openxmlformats.org/drawingml/2006/main" xmlns:r="http://schemas.openxmlformats.org/officeDocument/2006/relationships" xmlns:p="http://schemas.openxmlformats.org/presentationml/2006/main">
+  <p:cSld>
+    <p:spTree>
+      <p:nvGrpSpPr>
+        <p:cNvPr id="1" name=""/>
+        <p:cNvGrpSpPr/>
+        <p:nvPr/>
+      </p:nvGrpSpPr>
+      <p:grpSpPr>
+        <a:xfrm>
+          <a:off x="0" y="0"/>
+          <a:ext cx="0" cy="0"/>
+          <a:chOff x="0" y="0"/>
+          <a:chExt cx="0" cy="0"/>
+        </a:xfrm>
+      </p:grpSpPr>
+      <p:sp>
+        <p:nvSpPr>
+          <p:cNvPr id="2" name="Title 1">
+            <a:extLst>
+              <a:ext uri="{FF2B5EF4-FFF2-40B4-BE49-F238E27FC236}">
+                <a16:creationId xmlns:a16="http://schemas.microsoft.com/office/drawing/2014/main" id="{4E4485ED-C838-4CE7-8CF1-C057477BC67B}"/>
+              </a:ext>
+            </a:extLst>
+          </p:cNvPr>
+          <p:cNvSpPr>
+            <a:spLocks noGrp="1"/>
+          </p:cNvSpPr>
+          <p:nvPr>
+            <p:ph type="title"/>
+          </p:nvPr>
+        </p:nvSpPr>
+        <p:spPr/>
+        <p:txBody>
+          <a:bodyPr/>
+          <a:lstStyle/>
+          <a:p>
+            <a:r>
+              <a:rPr lang="en-US" dirty="0"/>
+              <a:t>5. Wish List (Not Implemented)</a:t>
+            </a:r>
+            <a:endParaRPr lang="en-CA" dirty="0"/>
+          </a:p>
+        </p:txBody>
+      </p:sp>
+      <p:sp>
+        <p:nvSpPr>
+          <p:cNvPr id="3" name="Content Placeholder 2">
+            <a:extLst>
+              <a:ext uri="{FF2B5EF4-FFF2-40B4-BE49-F238E27FC236}">
+                <a16:creationId xmlns:a16="http://schemas.microsoft.com/office/drawing/2014/main" id="{25C1EB07-E637-4A15-80A8-5ACC9A52E17F}"/>
+              </a:ext>
+            </a:extLst>
+          </p:cNvPr>
+          <p:cNvSpPr>
+            <a:spLocks noGrp="1"/>
+          </p:cNvSpPr>
+          <p:nvPr>
+            <p:ph idx="1"/>
+          </p:nvPr>
+        </p:nvSpPr>
+        <p:spPr/>
+        <p:txBody>
+          <a:bodyPr/>
+          <a:lstStyle/>
+          <a:p>
+            <a:pPr>
+              <a:lnSpc>
+                <a:spcPct val="107000"/>
+              </a:lnSpc>
+              <a:spcAft>
+                <a:spcPts val="800"/>
+              </a:spcAft>
+            </a:pPr>
+            <a:r>
+              <a:rPr lang="en-CA" sz="1600" dirty="0">
+                <a:effectLst/>
+                <a:latin typeface="Calibri" panose="020F0502020204030204" pitchFamily="34" charset="0"/>
+                <a:ea typeface="Calibri" panose="020F0502020204030204" pitchFamily="34" charset="0"/>
+                <a:cs typeface="Times New Roman" panose="02020603050405020304" pitchFamily="18" charset="0"/>
+              </a:rPr>
+              <a:t>The e-vet system can send a recommendation letter to specialists on behalf of doctors.</a:t>
+            </a:r>
+          </a:p>
+          <a:p>
+            <a:pPr>
+              <a:lnSpc>
+                <a:spcPct val="107000"/>
+              </a:lnSpc>
+              <a:spcAft>
+                <a:spcPts val="800"/>
+              </a:spcAft>
+            </a:pPr>
+            <a:r>
+              <a:rPr lang="en-CA" sz="1600" dirty="0">
+                <a:latin typeface="Calibri" panose="020F0502020204030204" pitchFamily="34" charset="0"/>
+                <a:ea typeface="Calibri" panose="020F0502020204030204" pitchFamily="34" charset="0"/>
+                <a:cs typeface="Times New Roman" panose="02020603050405020304" pitchFamily="18" charset="0"/>
+              </a:rPr>
+              <a:t>The system</a:t>
+            </a:r>
+            <a:r>
+              <a:rPr lang="en-CA" sz="1600" dirty="0">
+                <a:effectLst/>
+                <a:latin typeface="Calibri" panose="020F0502020204030204" pitchFamily="34" charset="0"/>
+                <a:ea typeface="Calibri" panose="020F0502020204030204" pitchFamily="34" charset="0"/>
+                <a:cs typeface="Times New Roman" panose="02020603050405020304" pitchFamily="18" charset="0"/>
+              </a:rPr>
+              <a:t> should offer multiple payment options.</a:t>
+            </a:r>
+          </a:p>
+          <a:p>
+            <a:pPr>
+              <a:lnSpc>
+                <a:spcPct val="107000"/>
+              </a:lnSpc>
+              <a:spcAft>
+                <a:spcPts val="800"/>
+              </a:spcAft>
+            </a:pPr>
+            <a:r>
+              <a:rPr lang="en-CA" sz="1600" dirty="0">
+                <a:latin typeface="Calibri" panose="020F0502020204030204" pitchFamily="34" charset="0"/>
+                <a:ea typeface="Calibri" panose="020F0502020204030204" pitchFamily="34" charset="0"/>
+                <a:cs typeface="Times New Roman" panose="02020603050405020304" pitchFamily="18" charset="0"/>
+              </a:rPr>
+              <a:t>The system</a:t>
+            </a:r>
+            <a:r>
+              <a:rPr lang="en-CA" sz="1600" dirty="0">
+                <a:effectLst/>
+                <a:latin typeface="Calibri" panose="020F0502020204030204" pitchFamily="34" charset="0"/>
+                <a:ea typeface="Calibri" panose="020F0502020204030204" pitchFamily="34" charset="0"/>
+                <a:cs typeface="Times New Roman" panose="02020603050405020304" pitchFamily="18" charset="0"/>
+              </a:rPr>
+              <a:t> should have a mechanism to reply to instant scientific questions to physicians (similar to an encyclopedia).</a:t>
+            </a:r>
+          </a:p>
+          <a:p>
+            <a:pPr>
+              <a:lnSpc>
+                <a:spcPct val="107000"/>
+              </a:lnSpc>
+              <a:spcAft>
+                <a:spcPts val="800"/>
+              </a:spcAft>
+            </a:pPr>
+            <a:r>
+              <a:rPr lang="en-CA" sz="1600" dirty="0">
+                <a:latin typeface="Calibri" panose="020F0502020204030204" pitchFamily="34" charset="0"/>
+                <a:ea typeface="Calibri" panose="020F0502020204030204" pitchFamily="34" charset="0"/>
+                <a:cs typeface="Times New Roman" panose="02020603050405020304" pitchFamily="18" charset="0"/>
+              </a:rPr>
+              <a:t>The system</a:t>
+            </a:r>
+            <a:r>
+              <a:rPr lang="en-CA" sz="1600" dirty="0">
+                <a:effectLst/>
+                <a:latin typeface="Calibri" panose="020F0502020204030204" pitchFamily="34" charset="0"/>
+                <a:ea typeface="Calibri" panose="020F0502020204030204" pitchFamily="34" charset="0"/>
+                <a:cs typeface="Times New Roman" panose="02020603050405020304" pitchFamily="18" charset="0"/>
+              </a:rPr>
+              <a:t> can search in the ontology for relevant documents. </a:t>
+            </a:r>
+          </a:p>
+          <a:p>
+            <a:pPr>
+              <a:lnSpc>
+                <a:spcPct val="107000"/>
+              </a:lnSpc>
+              <a:spcAft>
+                <a:spcPts val="800"/>
+              </a:spcAft>
+            </a:pPr>
+            <a:r>
+              <a:rPr lang="en-CA" sz="1600" dirty="0">
+                <a:effectLst/>
+                <a:latin typeface="Calibri" panose="020F0502020204030204" pitchFamily="34" charset="0"/>
+                <a:ea typeface="Calibri" panose="020F0502020204030204" pitchFamily="34" charset="0"/>
+                <a:cs typeface="Times New Roman" panose="02020603050405020304" pitchFamily="18" charset="0"/>
+              </a:rPr>
+              <a:t>Doctors can also register themselves on the portal, giving the client freedom to choose their doctor(s).</a:t>
+            </a:r>
+          </a:p>
+          <a:p>
+            <a:pPr>
+              <a:lnSpc>
+                <a:spcPct val="107000"/>
+              </a:lnSpc>
+              <a:spcAft>
+                <a:spcPts val="800"/>
+              </a:spcAft>
+            </a:pPr>
+            <a:r>
+              <a:rPr lang="en-CA" sz="1600" dirty="0">
+                <a:effectLst/>
+                <a:latin typeface="Calibri" panose="020F0502020204030204" pitchFamily="34" charset="0"/>
+                <a:ea typeface="Calibri" panose="020F0502020204030204" pitchFamily="34" charset="0"/>
+                <a:cs typeface="Times New Roman" panose="02020603050405020304" pitchFamily="18" charset="0"/>
+              </a:rPr>
+              <a:t>Recording patient feedback on the doctor and doctor feedback on the patient.</a:t>
+            </a:r>
+          </a:p>
+          <a:p>
+            <a:pPr>
+              <a:lnSpc>
+                <a:spcPct val="107000"/>
+              </a:lnSpc>
+              <a:spcAft>
+                <a:spcPts val="800"/>
+              </a:spcAft>
+            </a:pPr>
+            <a:r>
+              <a:rPr lang="en-CA" sz="1600" dirty="0">
+                <a:effectLst/>
+                <a:latin typeface="Calibri" panose="020F0502020204030204" pitchFamily="34" charset="0"/>
+                <a:ea typeface="Calibri" panose="020F0502020204030204" pitchFamily="34" charset="0"/>
+                <a:cs typeface="Times New Roman" panose="02020603050405020304" pitchFamily="18" charset="0"/>
+              </a:rPr>
+              <a:t>E-pharmacy: customers can purchase medicines and other essentials through the portal and get them delivered to their homes. </a:t>
+            </a:r>
+          </a:p>
+          <a:p>
+            <a:pPr>
+              <a:lnSpc>
+                <a:spcPct val="107000"/>
+              </a:lnSpc>
+              <a:spcAft>
+                <a:spcPts val="800"/>
+              </a:spcAft>
+            </a:pPr>
+            <a:r>
+              <a:rPr lang="en-CA" sz="1600" dirty="0">
+                <a:effectLst/>
+                <a:latin typeface="Calibri" panose="020F0502020204030204" pitchFamily="34" charset="0"/>
+                <a:ea typeface="Calibri" panose="020F0502020204030204" pitchFamily="34" charset="0"/>
+                <a:cs typeface="Times New Roman" panose="02020603050405020304" pitchFamily="18" charset="0"/>
+              </a:rPr>
+              <a:t>Patients can complete a lab requisition through the portal.</a:t>
+            </a:r>
+          </a:p>
+          <a:p>
+            <a:pPr>
+              <a:lnSpc>
+                <a:spcPct val="107000"/>
+              </a:lnSpc>
+              <a:spcAft>
+                <a:spcPts val="800"/>
+              </a:spcAft>
+            </a:pPr>
+            <a:r>
+              <a:rPr lang="en-CA" sz="1600" dirty="0">
+                <a:effectLst/>
+                <a:latin typeface="Calibri" panose="020F0502020204030204" pitchFamily="34" charset="0"/>
+                <a:ea typeface="Calibri" panose="020F0502020204030204" pitchFamily="34" charset="0"/>
+                <a:cs typeface="Times New Roman" panose="02020603050405020304" pitchFamily="18" charset="0"/>
+              </a:rPr>
+              <a:t>Patients can communicate with the doctor via text messaging.</a:t>
+            </a:r>
+          </a:p>
+          <a:p>
+            <a:pPr>
+              <a:lnSpc>
+                <a:spcPct val="107000"/>
+              </a:lnSpc>
+              <a:spcAft>
+                <a:spcPts val="800"/>
+              </a:spcAft>
+            </a:pPr>
+            <a:r>
+              <a:rPr lang="en-CA" sz="1600" dirty="0">
+                <a:effectLst/>
+                <a:latin typeface="Calibri" panose="020F0502020204030204" pitchFamily="34" charset="0"/>
+                <a:ea typeface="Calibri" panose="020F0502020204030204" pitchFamily="34" charset="0"/>
+                <a:cs typeface="Times New Roman" panose="02020603050405020304" pitchFamily="18" charset="0"/>
+              </a:rPr>
+              <a:t>The system should display desired graphs and statistics based on a patient’s profile.</a:t>
+            </a:r>
+          </a:p>
+          <a:p>
+            <a:endParaRPr lang="en-CA" sz="1600" dirty="0"/>
+          </a:p>
+        </p:txBody>
+      </p:sp>
+      <p:sp>
+        <p:nvSpPr>
+          <p:cNvPr id="4" name="Date Placeholder 3">
+            <a:extLst>
+              <a:ext uri="{FF2B5EF4-FFF2-40B4-BE49-F238E27FC236}">
+                <a16:creationId xmlns:a16="http://schemas.microsoft.com/office/drawing/2014/main" id="{238C31FC-A43B-4549-90CD-30DDC16EF8B2}"/>
+              </a:ext>
+            </a:extLst>
+          </p:cNvPr>
+          <p:cNvSpPr>
+            <a:spLocks noGrp="1"/>
+          </p:cNvSpPr>
+          <p:nvPr>
+            <p:ph type="dt" sz="half" idx="10"/>
+          </p:nvPr>
+        </p:nvSpPr>
+        <p:spPr/>
+        <p:txBody>
+          <a:bodyPr/>
+          <a:lstStyle/>
+          <a:p>
+            <a:r>
+              <a:rPr lang="en-US"/>
+              <a:t>SENG697 (Fall 2007)</a:t>
+            </a:r>
+            <a:endParaRPr lang="en-US" altLang="ja-JP"/>
+          </a:p>
+        </p:txBody>
+      </p:sp>
+      <p:sp>
+        <p:nvSpPr>
+          <p:cNvPr id="5" name="Footer Placeholder 4">
+            <a:extLst>
+              <a:ext uri="{FF2B5EF4-FFF2-40B4-BE49-F238E27FC236}">
+                <a16:creationId xmlns:a16="http://schemas.microsoft.com/office/drawing/2014/main" id="{1C26CB11-AD2B-494F-AE28-0EB843999953}"/>
+              </a:ext>
+            </a:extLst>
+          </p:cNvPr>
+          <p:cNvSpPr>
+            <a:spLocks noGrp="1"/>
+          </p:cNvSpPr>
+          <p:nvPr>
+            <p:ph type="ftr" sz="quarter" idx="11"/>
+          </p:nvPr>
+        </p:nvSpPr>
+        <p:spPr/>
+        <p:txBody>
+          <a:bodyPr/>
+          <a:lstStyle/>
+          <a:p>
+            <a:r>
+              <a:rPr lang="ja-JP" altLang="en-US"/>
+              <a:t>far@ucalgary.ca</a:t>
+            </a:r>
+            <a:endParaRPr lang="en-US" altLang="ja-JP"/>
+          </a:p>
+        </p:txBody>
+      </p:sp>
+      <p:sp>
+        <p:nvSpPr>
+          <p:cNvPr id="6" name="Slide Number Placeholder 5">
+            <a:extLst>
+              <a:ext uri="{FF2B5EF4-FFF2-40B4-BE49-F238E27FC236}">
+                <a16:creationId xmlns:a16="http://schemas.microsoft.com/office/drawing/2014/main" id="{C7F525BB-50AA-400B-8264-41DBA2FFC0D1}"/>
+              </a:ext>
+            </a:extLst>
+          </p:cNvPr>
+          <p:cNvSpPr>
+            <a:spLocks noGrp="1"/>
+          </p:cNvSpPr>
+          <p:nvPr>
+            <p:ph type="sldNum" sz="quarter" idx="12"/>
+          </p:nvPr>
+        </p:nvSpPr>
+        <p:spPr/>
+        <p:txBody>
+          <a:bodyPr/>
+          <a:lstStyle/>
+          <a:p>
+            <a:fld id="{A4BAB868-1E00-44C6-B1AB-DFCC5F9865BA}" type="slidenum">
+              <a:rPr lang="ja-JP" altLang="en-US" smtClean="0"/>
+              <a:pPr/>
+              <a:t>7</a:t>
+            </a:fld>
+            <a:endParaRPr lang="en-US" altLang="ja-JP" dirty="0"/>
+          </a:p>
+        </p:txBody>
+      </p:sp>
+    </p:spTree>
+    <p:extLst>
+      <p:ext uri="{BB962C8B-B14F-4D97-AF65-F5344CB8AC3E}">
+        <p14:creationId xmlns:p14="http://schemas.microsoft.com/office/powerpoint/2010/main" val="2641871472"/>
+      </p:ext>
+    </p:extLst>
+  </p:cSld>
+  <p:clrMapOvr>
+    <a:masterClrMapping/>
+  </p:clrMapOvr>
+  <p:transition>
+    <p:dissolve/>
+  </p:transition>
+</p:sld>
+</file>
+
+<file path=ppt/slides/slide8.xml><?xml version="1.0" encoding="utf-8"?>
+<p:sld xmlns:a="http://schemas.openxmlformats.org/drawingml/2006/main" xmlns:r="http://schemas.openxmlformats.org/officeDocument/2006/relationships" xmlns:p="http://schemas.openxmlformats.org/presentationml/2006/main">
+  <p:cSld>
+    <p:spTree>
+      <p:nvGrpSpPr>
+        <p:cNvPr id="1" name=""/>
+        <p:cNvGrpSpPr/>
+        <p:nvPr/>
+      </p:nvGrpSpPr>
+      <p:grpSpPr>
+        <a:xfrm>
+          <a:off x="0" y="0"/>
+          <a:ext cx="0" cy="0"/>
+          <a:chOff x="0" y="0"/>
+          <a:chExt cx="0" cy="0"/>
+        </a:xfrm>
+      </p:grpSpPr>
+      <p:sp>
+        <p:nvSpPr>
           <p:cNvPr id="4" name="Date Placeholder 3"/>
           <p:cNvSpPr>
             <a:spLocks noGrp="1"/>
@@ -4848,7 +6956,7 @@
                   <a:spcPct val="0"/>
                 </a:spcAft>
               </a:pPr>
-              <a:t>4</a:t>
+              <a:t>8</a:t>
             </a:fld>
             <a:endParaRPr lang="en-US" altLang="ja-JP">
               <a:solidFill>
@@ -4910,7 +7018,7 @@
               <a:buNone/>
             </a:pPr>
             <a:r>
-              <a:rPr lang="en-US" sz="2000" b="1" i="1" dirty="0" smtClean="0">
+              <a:rPr lang="en-US" sz="2000" b="1" i="1" dirty="0">
                 <a:solidFill>
                   <a:srgbClr val="D60093"/>
                 </a:solidFill>
@@ -4952,19 +7060,7 @@
             </a:pPr>
             <a:r>
               <a:rPr lang="en-CA" sz="1600" dirty="0"/>
-              <a:t>The </a:t>
-            </a:r>
-            <a:r>
-              <a:rPr lang="en-CA" sz="1600" dirty="0" smtClean="0"/>
-              <a:t>Reminder </a:t>
-            </a:r>
-            <a:r>
-              <a:rPr lang="en-CA" sz="1600" dirty="0"/>
-              <a:t>Agent communicates with the </a:t>
-            </a:r>
-            <a:r>
-              <a:rPr lang="en-CA" sz="1600" dirty="0" smtClean="0"/>
-              <a:t>Clinic Agent, by waiting for its signals after an appointment is booked. If the user has activated reminders at the time of booking an appointment, the Reminder Agent would be sending automated SMS messages and e-mail notifications to the user on his/her registered e-mail account and mobile number. </a:t>
+              <a:t>The Reminder Agent communicates with the Clinic Agent, by waiting for its signals after an appointment is booked. If the user has activated reminders at the time of booking an appointment, the Reminder Agent would be sending automated SMS messages and e-mail notifications to the user on his/her registered e-mail account and mobile number. </a:t>
             </a:r>
           </a:p>
           <a:p>
@@ -4976,10 +7072,9 @@
               <a:buChar char="§"/>
             </a:pPr>
             <a:r>
-              <a:rPr lang="en-CA" sz="1600" dirty="0" smtClean="0"/>
+              <a:rPr lang="en-CA" sz="1600" dirty="0"/>
               <a:t>Instead of a receptionist logging in every time to trigger a reminder, the Agent by itself sends the message at regular intervals(hours/days) as chosen by the user.</a:t>
             </a:r>
-            <a:endParaRPr lang="en-CA" sz="1600" dirty="0"/>
           </a:p>
           <a:p>
             <a:pPr>
@@ -4990,7 +7085,7 @@
               <a:buChar char="§"/>
             </a:pPr>
             <a:r>
-              <a:rPr lang="en-CA" sz="1600" dirty="0" smtClean="0"/>
+              <a:rPr lang="en-CA" sz="1600" dirty="0"/>
               <a:t>In case the appointment is cancelled or updated, the Reminder Agent also intelligently updates the text message and sends an updated notification to the user. </a:t>
             </a:r>
           </a:p>
@@ -5003,10 +7098,9 @@
               <a:buChar char="§"/>
             </a:pPr>
             <a:r>
-              <a:rPr lang="en-CA" sz="1600" dirty="0" smtClean="0"/>
+              <a:rPr lang="en-CA" sz="1600" dirty="0"/>
               <a:t>Once the appointment is complete, the Reminder Agent directly accesses the database to disable the alerting mechanism for that particular appointment. </a:t>
             </a:r>
-            <a:endParaRPr lang="en-CA" sz="1600" dirty="0"/>
           </a:p>
           <a:p>
             <a:pPr>
@@ -5017,7 +7111,7 @@
               <a:buChar char="§"/>
             </a:pPr>
             <a:r>
-              <a:rPr lang="en-CA" sz="1600" dirty="0" smtClean="0"/>
+              <a:rPr lang="en-CA" sz="1600" dirty="0"/>
               <a:t>In order to check if the registered email/phone number is valid, the Reminder Agent will trigger an acknowledgement  message at the time of booking the appointment. Subsequently, the other reminder messages will be forwarded in due course.</a:t>
             </a:r>
           </a:p>
@@ -5030,7 +7124,7 @@
               <a:buChar char="§"/>
             </a:pPr>
             <a:r>
-              <a:rPr lang="en-CA" sz="1600" dirty="0" smtClean="0"/>
+              <a:rPr lang="en-CA" sz="1600" dirty="0"/>
               <a:t>The Reminder Agent also triggers a notification once the report has been generated, based upon the feedback from the veterinarian. In this case, it will await signal from the Template Agent.</a:t>
             </a:r>
           </a:p>
@@ -5043,7 +7137,7 @@
               <a:buChar char="§"/>
             </a:pPr>
             <a:r>
-              <a:rPr lang="en-CA" sz="1600" dirty="0" smtClean="0"/>
+              <a:rPr lang="en-CA" sz="1600" dirty="0"/>
               <a:t>The Agent will keep a track of all the reminders sent to a particular number in the database for tracking purposes.</a:t>
             </a:r>
           </a:p>
@@ -5061,6 +7155,225 @@
     <p:extLst>
       <p:ext uri="{BB962C8B-B14F-4D97-AF65-F5344CB8AC3E}">
         <p14:creationId xmlns:p14="http://schemas.microsoft.com/office/powerpoint/2010/main" val="1716397028"/>
+      </p:ext>
+    </p:extLst>
+  </p:cSld>
+  <p:clrMapOvr>
+    <a:masterClrMapping/>
+  </p:clrMapOvr>
+  <p:transition>
+    <p:dissolve/>
+  </p:transition>
+</p:sld>
+</file>
+
+<file path=ppt/slides/slide9.xml><?xml version="1.0" encoding="utf-8"?>
+<p:sld xmlns:a="http://schemas.openxmlformats.org/drawingml/2006/main" xmlns:r="http://schemas.openxmlformats.org/officeDocument/2006/relationships" xmlns:p="http://schemas.openxmlformats.org/presentationml/2006/main">
+  <p:cSld>
+    <p:spTree>
+      <p:nvGrpSpPr>
+        <p:cNvPr id="1" name=""/>
+        <p:cNvGrpSpPr/>
+        <p:nvPr/>
+      </p:nvGrpSpPr>
+      <p:grpSpPr>
+        <a:xfrm>
+          <a:off x="0" y="0"/>
+          <a:ext cx="0" cy="0"/>
+          <a:chOff x="0" y="0"/>
+          <a:chExt cx="0" cy="0"/>
+        </a:xfrm>
+      </p:grpSpPr>
+      <p:sp>
+        <p:nvSpPr>
+          <p:cNvPr id="2" name="Title 1">
+            <a:extLst>
+              <a:ext uri="{FF2B5EF4-FFF2-40B4-BE49-F238E27FC236}">
+                <a16:creationId xmlns:a16="http://schemas.microsoft.com/office/drawing/2014/main" id="{E1A18D8D-D50E-48B9-A318-86EA2B96F6B7}"/>
+              </a:ext>
+            </a:extLst>
+          </p:cNvPr>
+          <p:cNvSpPr>
+            <a:spLocks noGrp="1"/>
+          </p:cNvSpPr>
+          <p:nvPr>
+            <p:ph type="title"/>
+          </p:nvPr>
+        </p:nvSpPr>
+        <p:spPr/>
+        <p:txBody>
+          <a:bodyPr/>
+          <a:lstStyle/>
+          <a:p>
+            <a:r>
+              <a:rPr lang="en-CA" dirty="0"/>
+              <a:t>Agent Description (cont’d)</a:t>
+            </a:r>
+          </a:p>
+        </p:txBody>
+      </p:sp>
+      <p:sp>
+        <p:nvSpPr>
+          <p:cNvPr id="3" name="Content Placeholder 2">
+            <a:extLst>
+              <a:ext uri="{FF2B5EF4-FFF2-40B4-BE49-F238E27FC236}">
+                <a16:creationId xmlns:a16="http://schemas.microsoft.com/office/drawing/2014/main" id="{CE8243DA-4F7C-4C3A-B874-DF6CE800B16E}"/>
+              </a:ext>
+            </a:extLst>
+          </p:cNvPr>
+          <p:cNvSpPr>
+            <a:spLocks noGrp="1"/>
+          </p:cNvSpPr>
+          <p:nvPr>
+            <p:ph idx="1"/>
+          </p:nvPr>
+        </p:nvSpPr>
+        <p:spPr>
+          <a:xfrm>
+            <a:off x="1200151" y="1560513"/>
+            <a:ext cx="10502900" cy="4532312"/>
+          </a:xfrm>
+        </p:spPr>
+        <p:txBody>
+          <a:bodyPr/>
+          <a:lstStyle/>
+          <a:p>
+            <a:pPr marL="0" indent="0">
+              <a:buNone/>
+            </a:pPr>
+            <a:r>
+              <a:rPr lang="en-US" sz="2400" b="1" i="1" dirty="0">
+                <a:solidFill>
+                  <a:srgbClr val="D60093"/>
+                </a:solidFill>
+                <a:effectLst>
+                  <a:outerShdw blurRad="38100" dist="38100" dir="2700000" algn="tl">
+                    <a:srgbClr val="C0C0C0"/>
+                  </a:outerShdw>
+                </a:effectLst>
+              </a:rPr>
+              <a:t>Template Agent</a:t>
+            </a:r>
+          </a:p>
+          <a:p>
+            <a:r>
+              <a:rPr lang="en-US" sz="2400" dirty="0"/>
+              <a:t>The Template Agent provides the doctor with different letter templates. Depending upon the video interaction between the doctor and the patient, the doctor can select and use the in-built template to report their diagnosis.</a:t>
+            </a:r>
+          </a:p>
+          <a:p>
+            <a:r>
+              <a:rPr lang="en-US" sz="2400" dirty="0"/>
+              <a:t>The Template Agent communicates with the Clinic System Agent after the video interaction between the client and doctor is complete. </a:t>
+            </a:r>
+          </a:p>
+          <a:p>
+            <a:r>
+              <a:rPr lang="en-US" sz="2400" dirty="0"/>
+              <a:t>If the Template Agent receives a request from the Clinic System Agent, the doctor is requested to input their feedback. </a:t>
+            </a:r>
+          </a:p>
+          <a:p>
+            <a:r>
+              <a:rPr lang="en-US" sz="2400" dirty="0"/>
+              <a:t>A medical report is generated based on the doctor’s feedback and sent to the Clinic System Agent, which presents it to the user.</a:t>
+            </a:r>
+            <a:endParaRPr lang="en-CA" sz="2400" dirty="0"/>
+          </a:p>
+        </p:txBody>
+      </p:sp>
+      <p:sp>
+        <p:nvSpPr>
+          <p:cNvPr id="4" name="Date Placeholder 3">
+            <a:extLst>
+              <a:ext uri="{FF2B5EF4-FFF2-40B4-BE49-F238E27FC236}">
+                <a16:creationId xmlns:a16="http://schemas.microsoft.com/office/drawing/2014/main" id="{2FAB1A17-C298-4F53-B04A-C760E48BF7B7}"/>
+              </a:ext>
+            </a:extLst>
+          </p:cNvPr>
+          <p:cNvSpPr>
+            <a:spLocks noGrp="1"/>
+          </p:cNvSpPr>
+          <p:nvPr>
+            <p:ph type="dt" sz="half" idx="10"/>
+          </p:nvPr>
+        </p:nvSpPr>
+        <p:spPr/>
+        <p:txBody>
+          <a:bodyPr/>
+          <a:lstStyle/>
+          <a:p>
+            <a:r>
+              <a:rPr lang="en-US"/>
+              <a:t>SENG697 (Fall 2007)</a:t>
+            </a:r>
+            <a:endParaRPr lang="en-US" altLang="ja-JP"/>
+          </a:p>
+        </p:txBody>
+      </p:sp>
+      <p:sp>
+        <p:nvSpPr>
+          <p:cNvPr id="5" name="Footer Placeholder 4">
+            <a:extLst>
+              <a:ext uri="{FF2B5EF4-FFF2-40B4-BE49-F238E27FC236}">
+                <a16:creationId xmlns:a16="http://schemas.microsoft.com/office/drawing/2014/main" id="{EEFA3970-61F0-43F0-8D7E-ECE5C55E945D}"/>
+              </a:ext>
+            </a:extLst>
+          </p:cNvPr>
+          <p:cNvSpPr>
+            <a:spLocks noGrp="1"/>
+          </p:cNvSpPr>
+          <p:nvPr>
+            <p:ph type="ftr" sz="quarter" idx="11"/>
+          </p:nvPr>
+        </p:nvSpPr>
+        <p:spPr/>
+        <p:txBody>
+          <a:bodyPr/>
+          <a:lstStyle/>
+          <a:p>
+            <a:r>
+              <a:rPr lang="ja-JP" altLang="en-US"/>
+              <a:t>far@ucalgary.ca</a:t>
+            </a:r>
+            <a:endParaRPr lang="en-US" altLang="ja-JP"/>
+          </a:p>
+        </p:txBody>
+      </p:sp>
+      <p:sp>
+        <p:nvSpPr>
+          <p:cNvPr id="6" name="Slide Number Placeholder 5">
+            <a:extLst>
+              <a:ext uri="{FF2B5EF4-FFF2-40B4-BE49-F238E27FC236}">
+                <a16:creationId xmlns:a16="http://schemas.microsoft.com/office/drawing/2014/main" id="{F36303D7-60BC-434B-A3A9-DD9D89830AC1}"/>
+              </a:ext>
+            </a:extLst>
+          </p:cNvPr>
+          <p:cNvSpPr>
+            <a:spLocks noGrp="1"/>
+          </p:cNvSpPr>
+          <p:nvPr>
+            <p:ph type="sldNum" sz="quarter" idx="12"/>
+          </p:nvPr>
+        </p:nvSpPr>
+        <p:spPr/>
+        <p:txBody>
+          <a:bodyPr/>
+          <a:lstStyle/>
+          <a:p>
+            <a:fld id="{A4BAB868-1E00-44C6-B1AB-DFCC5F9865BA}" type="slidenum">
+              <a:rPr lang="ja-JP" altLang="en-US" smtClean="0"/>
+              <a:pPr/>
+              <a:t>9</a:t>
+            </a:fld>
+            <a:endParaRPr lang="en-US" altLang="ja-JP" dirty="0"/>
+          </a:p>
+        </p:txBody>
+      </p:sp>
+    </p:spTree>
+    <p:extLst>
+      <p:ext uri="{BB962C8B-B14F-4D97-AF65-F5344CB8AC3E}">
+        <p14:creationId xmlns:p14="http://schemas.microsoft.com/office/powerpoint/2010/main" val="1814967249"/>
       </p:ext>
     </p:extLst>
   </p:cSld>
@@ -5714,6 +8027,15 @@
 </file>
 
 <file path=customXml/item1.xml><?xml version="1.0" encoding="utf-8"?>
+<?mso-contentType ?>
+<FormTemplates xmlns="http://schemas.microsoft.com/sharepoint/v3/contenttype/forms">
+  <Display>DocumentLibraryForm</Display>
+  <Edit>DocumentLibraryForm</Edit>
+  <New>DocumentLibraryForm</New>
+</FormTemplates>
+</file>
+
+<file path=customXml/item2.xml><?xml version="1.0" encoding="utf-8"?>
 <ct:contentTypeSchema xmlns:ct="http://schemas.microsoft.com/office/2006/metadata/contentType" xmlns:ma="http://schemas.microsoft.com/office/2006/metadata/properties/metaAttributes" ct:_="" ma:_="" ma:contentTypeName="Document" ma:contentTypeID="0x010100167A42814A0A7A429FBAAD58A3662C43" ma:contentTypeVersion="14" ma:contentTypeDescription="Create a new document." ma:contentTypeScope="" ma:versionID="2e0f0b35447dfaef00fa2716150d7de8">
   <xsd:schema xmlns:xsd="http://www.w3.org/2001/XMLSchema" xmlns:xs="http://www.w3.org/2001/XMLSchema" xmlns:p="http://schemas.microsoft.com/office/2006/metadata/properties" xmlns:ns3="d8a3f0a0-49e1-415f-8d7d-9b51d0eb93e8" xmlns:ns4="ce8d2f3a-208b-4f58-bb79-4192d7cf8650" targetNamespace="http://schemas.microsoft.com/office/2006/metadata/properties" ma:root="true" ma:fieldsID="d9b4fe6bd1d6509f7a3dbc01590a646f" ns3:_="" ns4:_="">
     <xsd:import namespace="d8a3f0a0-49e1-415f-8d7d-9b51d0eb93e8"/>
@@ -5942,22 +8264,21 @@
 </ct:contentTypeSchema>
 </file>
 
-<file path=customXml/item2.xml><?xml version="1.0" encoding="utf-8"?>
+<file path=customXml/item3.xml><?xml version="1.0" encoding="utf-8"?>
 <p:properties xmlns:p="http://schemas.microsoft.com/office/2006/metadata/properties" xmlns:xsi="http://www.w3.org/2001/XMLSchema-instance" xmlns:pc="http://schemas.microsoft.com/office/infopath/2007/PartnerControls">
   <documentManagement/>
 </p:properties>
 </file>
 
-<file path=customXml/item3.xml><?xml version="1.0" encoding="utf-8"?>
-<?mso-contentType ?>
-<FormTemplates xmlns="http://schemas.microsoft.com/sharepoint/v3/contenttype/forms">
-  <Display>DocumentLibraryForm</Display>
-  <Edit>DocumentLibraryForm</Edit>
-  <New>DocumentLibraryForm</New>
-</FormTemplates>
+<file path=customXml/itemProps1.xml><?xml version="1.0" encoding="utf-8"?>
+<ds:datastoreItem xmlns:ds="http://schemas.openxmlformats.org/officeDocument/2006/customXml" ds:itemID="{66358C42-DD22-4F23-85C0-029A1B03C7F8}">
+  <ds:schemaRefs>
+    <ds:schemaRef ds:uri="http://schemas.microsoft.com/sharepoint/v3/contenttype/forms"/>
+  </ds:schemaRefs>
+</ds:datastoreItem>
 </file>
 
-<file path=customXml/itemProps1.xml><?xml version="1.0" encoding="utf-8"?>
+<file path=customXml/itemProps2.xml><?xml version="1.0" encoding="utf-8"?>
 <ds:datastoreItem xmlns:ds="http://schemas.openxmlformats.org/officeDocument/2006/customXml" ds:itemID="{25CCB28B-163E-40CA-8CCE-69A7F4A1A4B7}">
   <ds:schemaRefs>
     <ds:schemaRef ds:uri="http://schemas.microsoft.com/office/2006/metadata/contentType"/>
@@ -5976,7 +8297,7 @@
 </ds:datastoreItem>
 </file>
 
-<file path=customXml/itemProps2.xml><?xml version="1.0" encoding="utf-8"?>
+<file path=customXml/itemProps3.xml><?xml version="1.0" encoding="utf-8"?>
 <ds:datastoreItem xmlns:ds="http://schemas.openxmlformats.org/officeDocument/2006/customXml" ds:itemID="{B84EF1B3-7571-4E02-A7DC-7272CEC15FB7}">
   <ds:schemaRefs>
     <ds:schemaRef ds:uri="http://schemas.microsoft.com/office/infopath/2007/PartnerControls"/>
@@ -5991,12 +8312,4 @@
     <ds:schemaRef ds:uri="http://www.w3.org/XML/1998/namespace"/>
   </ds:schemaRefs>
 </ds:datastoreItem>
-</file>
-
-<file path=customXml/itemProps3.xml><?xml version="1.0" encoding="utf-8"?>
-<ds:datastoreItem xmlns:ds="http://schemas.openxmlformats.org/officeDocument/2006/customXml" ds:itemID="{66358C42-DD22-4F23-85C0-029A1B03C7F8}">
-  <ds:schemaRefs>
-    <ds:schemaRef ds:uri="http://schemas.microsoft.com/sharepoint/v3/contenttype/forms"/>
-  </ds:schemaRefs>
-</ds:datastoreItem>
 </file>
</xml_diff>

<commit_message>
Added clinic system agent description and appointment system agent description, updated role schema and interaction model
</commit_message>
<xml_diff>
--- a/GroupD_ProjectPresentation.pptx
+++ b/GroupD_ProjectPresentation.pptx
@@ -12,11 +12,13 @@
     <p:sldId id="262" r:id="rId9"/>
     <p:sldId id="264" r:id="rId10"/>
     <p:sldId id="265" r:id="rId11"/>
-    <p:sldId id="260" r:id="rId12"/>
-    <p:sldId id="263" r:id="rId13"/>
-    <p:sldId id="266" r:id="rId14"/>
-    <p:sldId id="267" r:id="rId15"/>
-    <p:sldId id="268" r:id="rId16"/>
+    <p:sldId id="269" r:id="rId12"/>
+    <p:sldId id="270" r:id="rId13"/>
+    <p:sldId id="260" r:id="rId14"/>
+    <p:sldId id="263" r:id="rId15"/>
+    <p:sldId id="266" r:id="rId16"/>
+    <p:sldId id="267" r:id="rId17"/>
+    <p:sldId id="268" r:id="rId18"/>
   </p:sldIdLst>
   <p:sldSz cx="12192000" cy="6858000"/>
   <p:notesSz cx="6858000" cy="9144000"/>
@@ -121,6 +123,66 @@
     </p:ext>
   </p:extLst>
 </p:presentation>
+</file>
+
+<file path=ppt/changesInfos/changesInfo1.xml><?xml version="1.0" encoding="utf-8"?>
+<pc:chgInfo xmlns:a="http://schemas.openxmlformats.org/drawingml/2006/main" xmlns:r="http://schemas.openxmlformats.org/officeDocument/2006/relationships" xmlns:ac="http://schemas.microsoft.com/office/drawing/2013/main/command" xmlns:pc="http://schemas.microsoft.com/office/powerpoint/2013/main/command">
+  <pc:docChgLst>
+    <pc:chgData name="Sampreet Vaidya" userId="8006a4da2089a8b4" providerId="LiveId" clId="{4D2302AB-89EE-424C-B325-F40F5C494C8E}"/>
+    <pc:docChg chg="undo custSel addSld modSld">
+      <pc:chgData name="Sampreet Vaidya" userId="8006a4da2089a8b4" providerId="LiveId" clId="{4D2302AB-89EE-424C-B325-F40F5C494C8E}" dt="2021-10-23T04:13:52.787" v="89" actId="12"/>
+      <pc:docMkLst>
+        <pc:docMk/>
+      </pc:docMkLst>
+      <pc:sldChg chg="modSp new mod">
+        <pc:chgData name="Sampreet Vaidya" userId="8006a4da2089a8b4" providerId="LiveId" clId="{4D2302AB-89EE-424C-B325-F40F5C494C8E}" dt="2021-10-23T04:11:31.734" v="53" actId="20577"/>
+        <pc:sldMkLst>
+          <pc:docMk/>
+          <pc:sldMk cId="89349740" sldId="269"/>
+        </pc:sldMkLst>
+        <pc:spChg chg="mod">
+          <ac:chgData name="Sampreet Vaidya" userId="8006a4da2089a8b4" providerId="LiveId" clId="{4D2302AB-89EE-424C-B325-F40F5C494C8E}" dt="2021-10-23T04:09:29.615" v="22" actId="20577"/>
+          <ac:spMkLst>
+            <pc:docMk/>
+            <pc:sldMk cId="89349740" sldId="269"/>
+            <ac:spMk id="2" creationId="{634D368D-2965-437B-96BF-B4396F3F5A09}"/>
+          </ac:spMkLst>
+        </pc:spChg>
+        <pc:spChg chg="mod">
+          <ac:chgData name="Sampreet Vaidya" userId="8006a4da2089a8b4" providerId="LiveId" clId="{4D2302AB-89EE-424C-B325-F40F5C494C8E}" dt="2021-10-23T04:11:31.734" v="53" actId="20577"/>
+          <ac:spMkLst>
+            <pc:docMk/>
+            <pc:sldMk cId="89349740" sldId="269"/>
+            <ac:spMk id="3" creationId="{61675DF3-05BC-424C-B391-CB7B68B04456}"/>
+          </ac:spMkLst>
+        </pc:spChg>
+      </pc:sldChg>
+      <pc:sldChg chg="modSp new mod">
+        <pc:chgData name="Sampreet Vaidya" userId="8006a4da2089a8b4" providerId="LiveId" clId="{4D2302AB-89EE-424C-B325-F40F5C494C8E}" dt="2021-10-23T04:13:52.787" v="89" actId="12"/>
+        <pc:sldMkLst>
+          <pc:docMk/>
+          <pc:sldMk cId="1590150963" sldId="270"/>
+        </pc:sldMkLst>
+        <pc:spChg chg="mod">
+          <ac:chgData name="Sampreet Vaidya" userId="8006a4da2089a8b4" providerId="LiveId" clId="{4D2302AB-89EE-424C-B325-F40F5C494C8E}" dt="2021-10-23T04:10:48.453" v="26"/>
+          <ac:spMkLst>
+            <pc:docMk/>
+            <pc:sldMk cId="1590150963" sldId="270"/>
+            <ac:spMk id="2" creationId="{BC19915F-4B57-4C66-B739-FC877E4166FA}"/>
+          </ac:spMkLst>
+        </pc:spChg>
+        <pc:spChg chg="mod">
+          <ac:chgData name="Sampreet Vaidya" userId="8006a4da2089a8b4" providerId="LiveId" clId="{4D2302AB-89EE-424C-B325-F40F5C494C8E}" dt="2021-10-23T04:13:52.787" v="89" actId="12"/>
+          <ac:spMkLst>
+            <pc:docMk/>
+            <pc:sldMk cId="1590150963" sldId="270"/>
+            <ac:spMk id="3" creationId="{BC5C524F-0E47-4B10-830C-F3106CA3E329}"/>
+          </ac:spMkLst>
+        </pc:spChg>
+      </pc:sldChg>
+    </pc:docChg>
+  </pc:docChgLst>
+</pc:chgInfo>
 </file>
 
 <file path=ppt/slideLayouts/slideLayout1.xml><?xml version="1.0" encoding="utf-8"?>
@@ -3989,6 +4051,578 @@
       </p:grpSpPr>
       <p:sp>
         <p:nvSpPr>
+          <p:cNvPr id="4" name="Date Placeholder 3"/>
+          <p:cNvSpPr>
+            <a:spLocks noGrp="1"/>
+          </p:cNvSpPr>
+          <p:nvPr>
+            <p:ph type="dt" sz="half" idx="10"/>
+          </p:nvPr>
+        </p:nvSpPr>
+        <p:spPr/>
+        <p:txBody>
+          <a:bodyPr/>
+          <a:lstStyle/>
+          <a:p>
+            <a:pPr fontAlgn="base">
+              <a:spcBef>
+                <a:spcPct val="0"/>
+              </a:spcBef>
+              <a:spcAft>
+                <a:spcPct val="0"/>
+              </a:spcAft>
+            </a:pPr>
+            <a:r>
+              <a:rPr lang="en-US">
+                <a:solidFill>
+                  <a:srgbClr val="000000"/>
+                </a:solidFill>
+                <a:latin typeface="Tahoma" pitchFamily="34" charset="0"/>
+                <a:ea typeface="ＭＳ Ｐゴシック" pitchFamily="50" charset="-128"/>
+              </a:rPr>
+              <a:t>SENG697 (Fall 2007)</a:t>
+            </a:r>
+            <a:endParaRPr lang="en-US" altLang="ja-JP">
+              <a:solidFill>
+                <a:srgbClr val="000000"/>
+              </a:solidFill>
+              <a:latin typeface="Tahoma" pitchFamily="34" charset="0"/>
+              <a:ea typeface="ＭＳ Ｐゴシック" pitchFamily="50" charset="-128"/>
+            </a:endParaRPr>
+          </a:p>
+        </p:txBody>
+      </p:sp>
+      <p:sp>
+        <p:nvSpPr>
+          <p:cNvPr id="5" name="Footer Placeholder 4"/>
+          <p:cNvSpPr>
+            <a:spLocks noGrp="1"/>
+          </p:cNvSpPr>
+          <p:nvPr>
+            <p:ph type="ftr" sz="quarter" idx="11"/>
+          </p:nvPr>
+        </p:nvSpPr>
+        <p:spPr/>
+        <p:txBody>
+          <a:bodyPr/>
+          <a:lstStyle/>
+          <a:p>
+            <a:pPr fontAlgn="base">
+              <a:spcBef>
+                <a:spcPct val="0"/>
+              </a:spcBef>
+              <a:spcAft>
+                <a:spcPct val="0"/>
+              </a:spcAft>
+            </a:pPr>
+            <a:r>
+              <a:rPr lang="ja-JP" altLang="en-US">
+                <a:solidFill>
+                  <a:srgbClr val="000000"/>
+                </a:solidFill>
+                <a:latin typeface="Tahoma" pitchFamily="34" charset="0"/>
+                <a:ea typeface="ＭＳ Ｐゴシック" pitchFamily="50" charset="-128"/>
+              </a:rPr>
+              <a:t>far@ucalgary.ca</a:t>
+            </a:r>
+            <a:endParaRPr lang="en-US" altLang="ja-JP">
+              <a:solidFill>
+                <a:srgbClr val="000000"/>
+              </a:solidFill>
+              <a:latin typeface="Tahoma" pitchFamily="34" charset="0"/>
+              <a:ea typeface="ＭＳ Ｐゴシック" pitchFamily="50" charset="-128"/>
+            </a:endParaRPr>
+          </a:p>
+        </p:txBody>
+      </p:sp>
+      <p:sp>
+        <p:nvSpPr>
+          <p:cNvPr id="6" name="Slide Number Placeholder 5"/>
+          <p:cNvSpPr>
+            <a:spLocks noGrp="1"/>
+          </p:cNvSpPr>
+          <p:nvPr>
+            <p:ph type="sldNum" sz="quarter" idx="12"/>
+          </p:nvPr>
+        </p:nvSpPr>
+        <p:spPr/>
+        <p:txBody>
+          <a:bodyPr/>
+          <a:lstStyle/>
+          <a:p>
+            <a:pPr fontAlgn="base">
+              <a:spcBef>
+                <a:spcPct val="0"/>
+              </a:spcBef>
+              <a:spcAft>
+                <a:spcPct val="0"/>
+              </a:spcAft>
+            </a:pPr>
+            <a:fld id="{0A39796A-6B36-48B4-B417-FA99A9C85417}" type="slidenum">
+              <a:rPr lang="ja-JP" altLang="en-US">
+                <a:solidFill>
+                  <a:srgbClr val="000000"/>
+                </a:solidFill>
+                <a:latin typeface="Tahoma" pitchFamily="34" charset="0"/>
+                <a:ea typeface="ＭＳ Ｐゴシック" pitchFamily="50" charset="-128"/>
+              </a:rPr>
+              <a:pPr fontAlgn="base">
+                <a:spcBef>
+                  <a:spcPct val="0"/>
+                </a:spcBef>
+                <a:spcAft>
+                  <a:spcPct val="0"/>
+                </a:spcAft>
+              </a:pPr>
+              <a:t>10</a:t>
+            </a:fld>
+            <a:endParaRPr lang="en-US" altLang="ja-JP">
+              <a:solidFill>
+                <a:srgbClr val="000000"/>
+              </a:solidFill>
+              <a:latin typeface="Tahoma" pitchFamily="34" charset="0"/>
+              <a:ea typeface="ＭＳ Ｐゴシック" pitchFamily="50" charset="-128"/>
+            </a:endParaRPr>
+          </a:p>
+        </p:txBody>
+      </p:sp>
+      <p:sp>
+        <p:nvSpPr>
+          <p:cNvPr id="1312770" name="Rectangle 2"/>
+          <p:cNvSpPr>
+            <a:spLocks noGrp="1" noChangeArrowheads="1"/>
+          </p:cNvSpPr>
+          <p:nvPr>
+            <p:ph type="title"/>
+          </p:nvPr>
+        </p:nvSpPr>
+        <p:spPr/>
+        <p:txBody>
+          <a:bodyPr/>
+          <a:lstStyle/>
+          <a:p>
+            <a:r>
+              <a:rPr lang="en-CA" dirty="0"/>
+              <a:t>Agent Description (cont’d)</a:t>
+            </a:r>
+          </a:p>
+        </p:txBody>
+      </p:sp>
+      <p:sp>
+        <p:nvSpPr>
+          <p:cNvPr id="1312771" name="Rectangle 3"/>
+          <p:cNvSpPr>
+            <a:spLocks noGrp="1" noChangeArrowheads="1"/>
+          </p:cNvSpPr>
+          <p:nvPr>
+            <p:ph type="body" idx="1"/>
+          </p:nvPr>
+        </p:nvSpPr>
+        <p:spPr>
+          <a:xfrm>
+            <a:off x="1219200" y="1656307"/>
+            <a:ext cx="10432869" cy="4012973"/>
+          </a:xfrm>
+        </p:spPr>
+        <p:txBody>
+          <a:bodyPr/>
+          <a:lstStyle/>
+          <a:p>
+            <a:pPr>
+              <a:lnSpc>
+                <a:spcPct val="80000"/>
+              </a:lnSpc>
+              <a:buFont typeface="Wingdings" pitchFamily="2" charset="2"/>
+              <a:buNone/>
+            </a:pPr>
+            <a:r>
+              <a:rPr lang="en-US" sz="2000" b="1" i="1" dirty="0">
+                <a:solidFill>
+                  <a:srgbClr val="D60093"/>
+                </a:solidFill>
+                <a:effectLst>
+                  <a:outerShdw blurRad="38100" dist="38100" dir="2700000" algn="tl">
+                    <a:srgbClr val="C0C0C0"/>
+                  </a:outerShdw>
+                </a:effectLst>
+              </a:rPr>
+              <a:t>Reminder Agent</a:t>
+            </a:r>
+          </a:p>
+          <a:p>
+            <a:pPr>
+              <a:lnSpc>
+                <a:spcPct val="80000"/>
+              </a:lnSpc>
+              <a:buFont typeface="Wingdings" panose="05000000000000000000" pitchFamily="2" charset="2"/>
+              <a:buChar char="§"/>
+            </a:pPr>
+            <a:endParaRPr lang="en-US" sz="1600" b="1" i="1" dirty="0">
+              <a:solidFill>
+                <a:srgbClr val="D60093"/>
+              </a:solidFill>
+              <a:effectLst>
+                <a:outerShdw blurRad="38100" dist="38100" dir="2700000" algn="tl">
+                  <a:srgbClr val="C0C0C0"/>
+                </a:outerShdw>
+              </a:effectLst>
+            </a:endParaRPr>
+          </a:p>
+          <a:p>
+            <a:pPr>
+              <a:lnSpc>
+                <a:spcPct val="80000"/>
+              </a:lnSpc>
+              <a:buFont typeface="Wingdings" panose="05000000000000000000" pitchFamily="2" charset="2"/>
+              <a:buChar char="§"/>
+            </a:pPr>
+            <a:r>
+              <a:rPr lang="en-CA" sz="1600" dirty="0"/>
+              <a:t>The Reminder Agent communicates with the Clinic Agent, by waiting for its signals after an appointment is booked. If the user has activated reminders at the time of booking an appointment, the Reminder Agent would be sending automated SMS messages and e-mail notifications to the user on his/her registered e-mail account and mobile number. </a:t>
+            </a:r>
+          </a:p>
+          <a:p>
+            <a:pPr>
+              <a:lnSpc>
+                <a:spcPct val="80000"/>
+              </a:lnSpc>
+              <a:buFont typeface="Wingdings" panose="05000000000000000000" pitchFamily="2" charset="2"/>
+              <a:buChar char="§"/>
+            </a:pPr>
+            <a:r>
+              <a:rPr lang="en-CA" sz="1600" dirty="0"/>
+              <a:t>Instead of a receptionist logging in every time to trigger a reminder, the Agent by itself sends the message at regular intervals(hours/days) as chosen by the user.</a:t>
+            </a:r>
+          </a:p>
+          <a:p>
+            <a:pPr>
+              <a:lnSpc>
+                <a:spcPct val="80000"/>
+              </a:lnSpc>
+              <a:buFont typeface="Wingdings" panose="05000000000000000000" pitchFamily="2" charset="2"/>
+              <a:buChar char="§"/>
+            </a:pPr>
+            <a:r>
+              <a:rPr lang="en-CA" sz="1600" dirty="0"/>
+              <a:t>In case the appointment is cancelled or updated, the Reminder Agent also intelligently updates the text message and sends an updated notification to the user. </a:t>
+            </a:r>
+          </a:p>
+          <a:p>
+            <a:pPr>
+              <a:lnSpc>
+                <a:spcPct val="80000"/>
+              </a:lnSpc>
+              <a:buFont typeface="Wingdings" panose="05000000000000000000" pitchFamily="2" charset="2"/>
+              <a:buChar char="§"/>
+            </a:pPr>
+            <a:r>
+              <a:rPr lang="en-CA" sz="1600" dirty="0"/>
+              <a:t>Once the appointment is complete, the Reminder Agent directly accesses the database to disable the alerting mechanism for that particular appointment. </a:t>
+            </a:r>
+          </a:p>
+          <a:p>
+            <a:pPr>
+              <a:lnSpc>
+                <a:spcPct val="80000"/>
+              </a:lnSpc>
+              <a:buFont typeface="Wingdings" panose="05000000000000000000" pitchFamily="2" charset="2"/>
+              <a:buChar char="§"/>
+            </a:pPr>
+            <a:r>
+              <a:rPr lang="en-CA" sz="1600" dirty="0"/>
+              <a:t>In order to check if the registered email/phone number is valid, the Reminder Agent will trigger an acknowledgement  message at the time of booking the appointment. Subsequently, the other reminder messages will be forwarded in due course.</a:t>
+            </a:r>
+          </a:p>
+          <a:p>
+            <a:pPr>
+              <a:lnSpc>
+                <a:spcPct val="80000"/>
+              </a:lnSpc>
+              <a:buFont typeface="Wingdings" panose="05000000000000000000" pitchFamily="2" charset="2"/>
+              <a:buChar char="§"/>
+            </a:pPr>
+            <a:r>
+              <a:rPr lang="en-CA" sz="1600" dirty="0"/>
+              <a:t>The Reminder Agent also triggers a notification once the report has been generated, based upon the feedback from the veterinarian. In this case, it will await signal from the Template Agent.</a:t>
+            </a:r>
+          </a:p>
+          <a:p>
+            <a:pPr>
+              <a:lnSpc>
+                <a:spcPct val="80000"/>
+              </a:lnSpc>
+              <a:buFont typeface="Wingdings" panose="05000000000000000000" pitchFamily="2" charset="2"/>
+              <a:buChar char="§"/>
+            </a:pPr>
+            <a:r>
+              <a:rPr lang="en-CA" sz="1600" dirty="0"/>
+              <a:t>The Agent will keep a track of all the reminders sent to a particular number in the database for tracking purposes.</a:t>
+            </a:r>
+          </a:p>
+          <a:p>
+            <a:pPr>
+              <a:lnSpc>
+                <a:spcPct val="80000"/>
+              </a:lnSpc>
+            </a:pPr>
+            <a:endParaRPr lang="en-CA" sz="1600" dirty="0"/>
+          </a:p>
+        </p:txBody>
+      </p:sp>
+    </p:spTree>
+    <p:extLst>
+      <p:ext uri="{BB962C8B-B14F-4D97-AF65-F5344CB8AC3E}">
+        <p14:creationId xmlns:p14="http://schemas.microsoft.com/office/powerpoint/2010/main" val="1716397028"/>
+      </p:ext>
+    </p:extLst>
+  </p:cSld>
+  <p:clrMapOvr>
+    <a:masterClrMapping/>
+  </p:clrMapOvr>
+  <p:transition>
+    <p:dissolve/>
+  </p:transition>
+</p:sld>
+</file>
+
+<file path=ppt/slides/slide11.xml><?xml version="1.0" encoding="utf-8"?>
+<p:sld xmlns:a="http://schemas.openxmlformats.org/drawingml/2006/main" xmlns:r="http://schemas.openxmlformats.org/officeDocument/2006/relationships" xmlns:p="http://schemas.openxmlformats.org/presentationml/2006/main">
+  <p:cSld>
+    <p:spTree>
+      <p:nvGrpSpPr>
+        <p:cNvPr id="1" name=""/>
+        <p:cNvGrpSpPr/>
+        <p:nvPr/>
+      </p:nvGrpSpPr>
+      <p:grpSpPr>
+        <a:xfrm>
+          <a:off x="0" y="0"/>
+          <a:ext cx="0" cy="0"/>
+          <a:chOff x="0" y="0"/>
+          <a:chExt cx="0" cy="0"/>
+        </a:xfrm>
+      </p:grpSpPr>
+      <p:sp>
+        <p:nvSpPr>
+          <p:cNvPr id="2" name="Title 1">
+            <a:extLst>
+              <a:ext uri="{FF2B5EF4-FFF2-40B4-BE49-F238E27FC236}">
+                <a16:creationId xmlns:a16="http://schemas.microsoft.com/office/drawing/2014/main" id="{E1A18D8D-D50E-48B9-A318-86EA2B96F6B7}"/>
+              </a:ext>
+            </a:extLst>
+          </p:cNvPr>
+          <p:cNvSpPr>
+            <a:spLocks noGrp="1"/>
+          </p:cNvSpPr>
+          <p:nvPr>
+            <p:ph type="title"/>
+          </p:nvPr>
+        </p:nvSpPr>
+        <p:spPr/>
+        <p:txBody>
+          <a:bodyPr/>
+          <a:lstStyle/>
+          <a:p>
+            <a:r>
+              <a:rPr lang="en-CA" dirty="0"/>
+              <a:t>Agent Description (cont’d)</a:t>
+            </a:r>
+          </a:p>
+        </p:txBody>
+      </p:sp>
+      <p:sp>
+        <p:nvSpPr>
+          <p:cNvPr id="3" name="Content Placeholder 2">
+            <a:extLst>
+              <a:ext uri="{FF2B5EF4-FFF2-40B4-BE49-F238E27FC236}">
+                <a16:creationId xmlns:a16="http://schemas.microsoft.com/office/drawing/2014/main" id="{CE8243DA-4F7C-4C3A-B874-DF6CE800B16E}"/>
+              </a:ext>
+            </a:extLst>
+          </p:cNvPr>
+          <p:cNvSpPr>
+            <a:spLocks noGrp="1"/>
+          </p:cNvSpPr>
+          <p:nvPr>
+            <p:ph idx="1"/>
+          </p:nvPr>
+        </p:nvSpPr>
+        <p:spPr>
+          <a:xfrm>
+            <a:off x="1200151" y="1560513"/>
+            <a:ext cx="10502900" cy="4532312"/>
+          </a:xfrm>
+        </p:spPr>
+        <p:txBody>
+          <a:bodyPr/>
+          <a:lstStyle/>
+          <a:p>
+            <a:pPr marL="0" indent="0">
+              <a:buNone/>
+            </a:pPr>
+            <a:r>
+              <a:rPr lang="en-US" sz="2400" b="1" i="1" dirty="0">
+                <a:solidFill>
+                  <a:srgbClr val="D60093"/>
+                </a:solidFill>
+                <a:effectLst>
+                  <a:outerShdw blurRad="38100" dist="38100" dir="2700000" algn="tl">
+                    <a:srgbClr val="C0C0C0"/>
+                  </a:outerShdw>
+                </a:effectLst>
+              </a:rPr>
+              <a:t>Template Agent</a:t>
+            </a:r>
+          </a:p>
+          <a:p>
+            <a:r>
+              <a:rPr lang="en-US" sz="2400" dirty="0"/>
+              <a:t>The Template Agent provides the doctor with different letter templates. Depending upon the video interaction between the doctor and the patient, the doctor can select and use the in-built template to report their diagnosis.</a:t>
+            </a:r>
+          </a:p>
+          <a:p>
+            <a:r>
+              <a:rPr lang="en-US" sz="2400" dirty="0"/>
+              <a:t>The Template Agent communicates with the Clinic System Agent after the video interaction between the client and doctor is complete. </a:t>
+            </a:r>
+          </a:p>
+          <a:p>
+            <a:r>
+              <a:rPr lang="en-US" sz="2400" dirty="0"/>
+              <a:t>If the Template Agent receives a request from the Clinic System Agent, the doctor is requested to input their feedback. </a:t>
+            </a:r>
+          </a:p>
+          <a:p>
+            <a:r>
+              <a:rPr lang="en-US" sz="2400" dirty="0"/>
+              <a:t>A medical report is generated based on the doctor’s feedback and sent to the Clinic System Agent, which presents it to the user.</a:t>
+            </a:r>
+            <a:endParaRPr lang="en-CA" sz="2400" dirty="0"/>
+          </a:p>
+        </p:txBody>
+      </p:sp>
+      <p:sp>
+        <p:nvSpPr>
+          <p:cNvPr id="4" name="Date Placeholder 3">
+            <a:extLst>
+              <a:ext uri="{FF2B5EF4-FFF2-40B4-BE49-F238E27FC236}">
+                <a16:creationId xmlns:a16="http://schemas.microsoft.com/office/drawing/2014/main" id="{2FAB1A17-C298-4F53-B04A-C760E48BF7B7}"/>
+              </a:ext>
+            </a:extLst>
+          </p:cNvPr>
+          <p:cNvSpPr>
+            <a:spLocks noGrp="1"/>
+          </p:cNvSpPr>
+          <p:nvPr>
+            <p:ph type="dt" sz="half" idx="10"/>
+          </p:nvPr>
+        </p:nvSpPr>
+        <p:spPr/>
+        <p:txBody>
+          <a:bodyPr/>
+          <a:lstStyle/>
+          <a:p>
+            <a:r>
+              <a:rPr lang="en-US"/>
+              <a:t>SENG697 (Fall 2007)</a:t>
+            </a:r>
+            <a:endParaRPr lang="en-US" altLang="ja-JP"/>
+          </a:p>
+        </p:txBody>
+      </p:sp>
+      <p:sp>
+        <p:nvSpPr>
+          <p:cNvPr id="5" name="Footer Placeholder 4">
+            <a:extLst>
+              <a:ext uri="{FF2B5EF4-FFF2-40B4-BE49-F238E27FC236}">
+                <a16:creationId xmlns:a16="http://schemas.microsoft.com/office/drawing/2014/main" id="{EEFA3970-61F0-43F0-8D7E-ECE5C55E945D}"/>
+              </a:ext>
+            </a:extLst>
+          </p:cNvPr>
+          <p:cNvSpPr>
+            <a:spLocks noGrp="1"/>
+          </p:cNvSpPr>
+          <p:nvPr>
+            <p:ph type="ftr" sz="quarter" idx="11"/>
+          </p:nvPr>
+        </p:nvSpPr>
+        <p:spPr/>
+        <p:txBody>
+          <a:bodyPr/>
+          <a:lstStyle/>
+          <a:p>
+            <a:r>
+              <a:rPr lang="ja-JP" altLang="en-US"/>
+              <a:t>far@ucalgary.ca</a:t>
+            </a:r>
+            <a:endParaRPr lang="en-US" altLang="ja-JP"/>
+          </a:p>
+        </p:txBody>
+      </p:sp>
+      <p:sp>
+        <p:nvSpPr>
+          <p:cNvPr id="6" name="Slide Number Placeholder 5">
+            <a:extLst>
+              <a:ext uri="{FF2B5EF4-FFF2-40B4-BE49-F238E27FC236}">
+                <a16:creationId xmlns:a16="http://schemas.microsoft.com/office/drawing/2014/main" id="{F36303D7-60BC-434B-A3A9-DD9D89830AC1}"/>
+              </a:ext>
+            </a:extLst>
+          </p:cNvPr>
+          <p:cNvSpPr>
+            <a:spLocks noGrp="1"/>
+          </p:cNvSpPr>
+          <p:nvPr>
+            <p:ph type="sldNum" sz="quarter" idx="12"/>
+          </p:nvPr>
+        </p:nvSpPr>
+        <p:spPr/>
+        <p:txBody>
+          <a:bodyPr/>
+          <a:lstStyle/>
+          <a:p>
+            <a:fld id="{A4BAB868-1E00-44C6-B1AB-DFCC5F9865BA}" type="slidenum">
+              <a:rPr lang="ja-JP" altLang="en-US" smtClean="0"/>
+              <a:pPr/>
+              <a:t>11</a:t>
+            </a:fld>
+            <a:endParaRPr lang="en-US" altLang="ja-JP" dirty="0"/>
+          </a:p>
+        </p:txBody>
+      </p:sp>
+    </p:spTree>
+    <p:extLst>
+      <p:ext uri="{BB962C8B-B14F-4D97-AF65-F5344CB8AC3E}">
+        <p14:creationId xmlns:p14="http://schemas.microsoft.com/office/powerpoint/2010/main" val="1814967249"/>
+      </p:ext>
+    </p:extLst>
+  </p:cSld>
+  <p:clrMapOvr>
+    <a:masterClrMapping/>
+  </p:clrMapOvr>
+  <p:transition>
+    <p:dissolve/>
+  </p:transition>
+</p:sld>
+</file>
+
+<file path=ppt/slides/slide12.xml><?xml version="1.0" encoding="utf-8"?>
+<p:sld xmlns:a="http://schemas.openxmlformats.org/drawingml/2006/main" xmlns:r="http://schemas.openxmlformats.org/officeDocument/2006/relationships" xmlns:p="http://schemas.openxmlformats.org/presentationml/2006/main">
+  <p:cSld>
+    <p:spTree>
+      <p:nvGrpSpPr>
+        <p:cNvPr id="1" name=""/>
+        <p:cNvGrpSpPr/>
+        <p:nvPr/>
+      </p:nvGrpSpPr>
+      <p:grpSpPr>
+        <a:xfrm>
+          <a:off x="0" y="0"/>
+          <a:ext cx="0" cy="0"/>
+          <a:chOff x="0" y="0"/>
+          <a:chExt cx="0" cy="0"/>
+        </a:xfrm>
+      </p:grpSpPr>
+      <p:sp>
+        <p:nvSpPr>
           <p:cNvPr id="2" name="Title 1">
             <a:extLst>
               <a:ext uri="{FF2B5EF4-FFF2-40B4-BE49-F238E27FC236}">
@@ -4097,7 +4731,7 @@
             <a:fld id="{A4BAB868-1E00-44C6-B1AB-DFCC5F9865BA}" type="slidenum">
               <a:rPr lang="ja-JP" altLang="en-US" smtClean="0"/>
               <a:pPr/>
-              <a:t>10</a:t>
+              <a:t>12</a:t>
             </a:fld>
             <a:endParaRPr lang="en-US" altLang="ja-JP"/>
           </a:p>
@@ -4149,7 +4783,7 @@
 </p:sld>
 </file>
 
-<file path=ppt/slides/slide11.xml><?xml version="1.0" encoding="utf-8"?>
+<file path=ppt/slides/slide13.xml><?xml version="1.0" encoding="utf-8"?>
 <p:sld xmlns:a="http://schemas.openxmlformats.org/drawingml/2006/main" xmlns:r="http://schemas.openxmlformats.org/officeDocument/2006/relationships" xmlns:p="http://schemas.openxmlformats.org/presentationml/2006/main">
   <p:cSld>
     <p:spTree>
@@ -4956,7 +5590,7 @@
             <a:fld id="{A4BAB868-1E00-44C6-B1AB-DFCC5F9865BA}" type="slidenum">
               <a:rPr lang="ja-JP" altLang="en-US" smtClean="0"/>
               <a:pPr/>
-              <a:t>11</a:t>
+              <a:t>13</a:t>
             </a:fld>
             <a:endParaRPr lang="en-US" altLang="ja-JP"/>
           </a:p>
@@ -5047,7 +5681,7 @@
 </p:sld>
 </file>
 
-<file path=ppt/slides/slide12.xml><?xml version="1.0" encoding="utf-8"?>
+<file path=ppt/slides/slide14.xml><?xml version="1.0" encoding="utf-8"?>
 <p:sld xmlns:a="http://schemas.openxmlformats.org/drawingml/2006/main" xmlns:r="http://schemas.openxmlformats.org/officeDocument/2006/relationships" xmlns:p="http://schemas.openxmlformats.org/presentationml/2006/main">
   <p:cSld>
     <p:spTree>
@@ -5174,7 +5808,7 @@
             <a:fld id="{A4BAB868-1E00-44C6-B1AB-DFCC5F9865BA}" type="slidenum">
               <a:rPr lang="ja-JP" altLang="en-US" smtClean="0"/>
               <a:pPr/>
-              <a:t>12</a:t>
+              <a:t>14</a:t>
             </a:fld>
             <a:endParaRPr lang="en-US" altLang="ja-JP"/>
           </a:p>
@@ -6833,12 +7467,18 @@
       </p:grpSpPr>
       <p:sp>
         <p:nvSpPr>
-          <p:cNvPr id="4" name="Date Placeholder 3"/>
-          <p:cNvSpPr>
-            <a:spLocks noGrp="1"/>
-          </p:cNvSpPr>
-          <p:nvPr>
-            <p:ph type="dt" sz="half" idx="10"/>
+          <p:cNvPr id="2" name="Title 1">
+            <a:extLst>
+              <a:ext uri="{FF2B5EF4-FFF2-40B4-BE49-F238E27FC236}">
+                <a16:creationId xmlns:a16="http://schemas.microsoft.com/office/drawing/2014/main" id="{634D368D-2965-437B-96BF-B4396F3F5A09}"/>
+              </a:ext>
+            </a:extLst>
+          </p:cNvPr>
+          <p:cNvSpPr>
+            <a:spLocks noGrp="1"/>
+          </p:cNvSpPr>
+          <p:nvPr>
+            <p:ph type="title"/>
           </p:nvPr>
         </p:nvSpPr>
         <p:spPr/>
@@ -6846,179 +7486,48 @@
           <a:bodyPr/>
           <a:lstStyle/>
           <a:p>
-            <a:pPr fontAlgn="base">
-              <a:spcBef>
-                <a:spcPct val="0"/>
-              </a:spcBef>
-              <a:spcAft>
-                <a:spcPct val="0"/>
-              </a:spcAft>
-            </a:pPr>
-            <a:r>
-              <a:rPr lang="en-US">
-                <a:solidFill>
-                  <a:srgbClr val="000000"/>
-                </a:solidFill>
-                <a:latin typeface="Tahoma" pitchFamily="34" charset="0"/>
-                <a:ea typeface="ＭＳ Ｐゴシック" pitchFamily="50" charset="-128"/>
-              </a:rPr>
-              <a:t>SENG697 (Fall 2007)</a:t>
-            </a:r>
-            <a:endParaRPr lang="en-US" altLang="ja-JP">
-              <a:solidFill>
-                <a:srgbClr val="000000"/>
-              </a:solidFill>
-              <a:latin typeface="Tahoma" pitchFamily="34" charset="0"/>
-              <a:ea typeface="ＭＳ Ｐゴシック" pitchFamily="50" charset="-128"/>
-            </a:endParaRPr>
-          </a:p>
-        </p:txBody>
-      </p:sp>
-      <p:sp>
-        <p:nvSpPr>
-          <p:cNvPr id="5" name="Footer Placeholder 4"/>
-          <p:cNvSpPr>
-            <a:spLocks noGrp="1"/>
-          </p:cNvSpPr>
-          <p:nvPr>
-            <p:ph type="ftr" sz="quarter" idx="11"/>
-          </p:nvPr>
-        </p:nvSpPr>
-        <p:spPr/>
-        <p:txBody>
-          <a:bodyPr/>
-          <a:lstStyle/>
-          <a:p>
-            <a:pPr fontAlgn="base">
-              <a:spcBef>
-                <a:spcPct val="0"/>
-              </a:spcBef>
-              <a:spcAft>
-                <a:spcPct val="0"/>
-              </a:spcAft>
-            </a:pPr>
-            <a:r>
-              <a:rPr lang="ja-JP" altLang="en-US">
-                <a:solidFill>
-                  <a:srgbClr val="000000"/>
-                </a:solidFill>
-                <a:latin typeface="Tahoma" pitchFamily="34" charset="0"/>
-                <a:ea typeface="ＭＳ Ｐゴシック" pitchFamily="50" charset="-128"/>
-              </a:rPr>
-              <a:t>far@ucalgary.ca</a:t>
-            </a:r>
-            <a:endParaRPr lang="en-US" altLang="ja-JP">
-              <a:solidFill>
-                <a:srgbClr val="000000"/>
-              </a:solidFill>
-              <a:latin typeface="Tahoma" pitchFamily="34" charset="0"/>
-              <a:ea typeface="ＭＳ Ｐゴシック" pitchFamily="50" charset="-128"/>
-            </a:endParaRPr>
-          </a:p>
-        </p:txBody>
-      </p:sp>
-      <p:sp>
-        <p:nvSpPr>
-          <p:cNvPr id="6" name="Slide Number Placeholder 5"/>
-          <p:cNvSpPr>
-            <a:spLocks noGrp="1"/>
-          </p:cNvSpPr>
-          <p:nvPr>
-            <p:ph type="sldNum" sz="quarter" idx="12"/>
-          </p:nvPr>
-        </p:nvSpPr>
-        <p:spPr/>
-        <p:txBody>
-          <a:bodyPr/>
-          <a:lstStyle/>
-          <a:p>
-            <a:pPr fontAlgn="base">
-              <a:spcBef>
-                <a:spcPct val="0"/>
-              </a:spcBef>
-              <a:spcAft>
-                <a:spcPct val="0"/>
-              </a:spcAft>
-            </a:pPr>
-            <a:fld id="{0A39796A-6B36-48B4-B417-FA99A9C85417}" type="slidenum">
-              <a:rPr lang="ja-JP" altLang="en-US">
-                <a:solidFill>
-                  <a:srgbClr val="000000"/>
-                </a:solidFill>
-                <a:latin typeface="Tahoma" pitchFamily="34" charset="0"/>
-                <a:ea typeface="ＭＳ Ｐゴシック" pitchFamily="50" charset="-128"/>
-              </a:rPr>
-              <a:pPr fontAlgn="base">
-                <a:spcBef>
-                  <a:spcPct val="0"/>
-                </a:spcBef>
-                <a:spcAft>
-                  <a:spcPct val="0"/>
-                </a:spcAft>
-              </a:pPr>
-              <a:t>8</a:t>
-            </a:fld>
-            <a:endParaRPr lang="en-US" altLang="ja-JP">
-              <a:solidFill>
-                <a:srgbClr val="000000"/>
-              </a:solidFill>
-              <a:latin typeface="Tahoma" pitchFamily="34" charset="0"/>
-              <a:ea typeface="ＭＳ Ｐゴシック" pitchFamily="50" charset="-128"/>
-            </a:endParaRPr>
-          </a:p>
-        </p:txBody>
-      </p:sp>
-      <p:sp>
-        <p:nvSpPr>
-          <p:cNvPr id="1312770" name="Rectangle 2"/>
-          <p:cNvSpPr>
-            <a:spLocks noGrp="1" noChangeArrowheads="1"/>
-          </p:cNvSpPr>
-          <p:nvPr>
-            <p:ph type="title"/>
-          </p:nvPr>
-        </p:nvSpPr>
-        <p:spPr/>
-        <p:txBody>
-          <a:bodyPr/>
-          <a:lstStyle/>
-          <a:p>
-            <a:r>
-              <a:rPr lang="en-CA"/>
-              <a:t>Agent Description (cont’d)</a:t>
-            </a:r>
-          </a:p>
-        </p:txBody>
-      </p:sp>
-      <p:sp>
-        <p:nvSpPr>
-          <p:cNvPr id="1312771" name="Rectangle 3"/>
-          <p:cNvSpPr>
-            <a:spLocks noGrp="1" noChangeArrowheads="1"/>
-          </p:cNvSpPr>
-          <p:nvPr>
-            <p:ph type="body" idx="1"/>
+            <a:r>
+              <a:rPr lang="en-US" dirty="0"/>
+              <a:t>Agent Description</a:t>
+            </a:r>
+            <a:endParaRPr lang="en-IN" dirty="0"/>
+          </a:p>
+        </p:txBody>
+      </p:sp>
+      <p:sp>
+        <p:nvSpPr>
+          <p:cNvPr id="3" name="Content Placeholder 2">
+            <a:extLst>
+              <a:ext uri="{FF2B5EF4-FFF2-40B4-BE49-F238E27FC236}">
+                <a16:creationId xmlns:a16="http://schemas.microsoft.com/office/drawing/2014/main" id="{61675DF3-05BC-424C-B391-CB7B68B04456}"/>
+              </a:ext>
+            </a:extLst>
+          </p:cNvPr>
+          <p:cNvSpPr>
+            <a:spLocks noGrp="1"/>
+          </p:cNvSpPr>
+          <p:nvPr>
+            <p:ph idx="1"/>
           </p:nvPr>
         </p:nvSpPr>
         <p:spPr>
           <a:xfrm>
-            <a:off x="1219200" y="1656307"/>
-            <a:ext cx="10432869" cy="4012973"/>
+            <a:off x="1200151" y="1560512"/>
+            <a:ext cx="10668000" cy="4821237"/>
           </a:xfrm>
         </p:spPr>
         <p:txBody>
           <a:bodyPr/>
           <a:lstStyle/>
           <a:p>
-            <a:pPr>
+            <a:pPr marL="0" indent="0">
               <a:lnSpc>
-                <a:spcPct val="80000"/>
+                <a:spcPct val="107000"/>
               </a:lnSpc>
-              <a:buFont typeface="Wingdings" pitchFamily="2" charset="2"/>
               <a:buNone/>
             </a:pPr>
             <a:r>
-              <a:rPr lang="en-US" sz="2000" b="1" i="1" dirty="0">
+              <a:rPr lang="en-US" sz="1800" b="1" i="1" dirty="0">
                 <a:solidFill>
                   <a:srgbClr val="D60093"/>
                 </a:solidFill>
@@ -7028,133 +7537,263 @@
                   </a:outerShdw>
                 </a:effectLst>
               </a:rPr>
-              <a:t>Reminder Agent</a:t>
-            </a:r>
-          </a:p>
-          <a:p>
-            <a:pPr>
+              <a:t>Clinic System Agent</a:t>
+            </a:r>
+            <a:endParaRPr lang="en-US" sz="1800" dirty="0">
+              <a:effectLst/>
+              <a:latin typeface="Calibri" panose="020F0502020204030204" pitchFamily="34" charset="0"/>
+              <a:ea typeface="Calibri" panose="020F0502020204030204" pitchFamily="34" charset="0"/>
+              <a:cs typeface="Times New Roman" panose="02020603050405020304" pitchFamily="18" charset="0"/>
+            </a:endParaRPr>
+          </a:p>
+          <a:p>
+            <a:pPr lvl="0">
               <a:lnSpc>
-                <a:spcPct val="80000"/>
+                <a:spcPct val="107000"/>
               </a:lnSpc>
               <a:buFont typeface="Wingdings" panose="05000000000000000000" pitchFamily="2" charset="2"/>
               <a:buChar char="§"/>
             </a:pPr>
-            <a:endParaRPr lang="en-US" sz="1600" b="1" i="1" dirty="0">
-              <a:solidFill>
-                <a:srgbClr val="D60093"/>
-              </a:solidFill>
-              <a:effectLst>
-                <a:outerShdw blurRad="38100" dist="38100" dir="2700000" algn="tl">
-                  <a:srgbClr val="C0C0C0"/>
-                </a:outerShdw>
-              </a:effectLst>
+            <a:r>
+              <a:rPr lang="en-US" sz="1800" dirty="0">
+                <a:effectLst/>
+                <a:latin typeface="Calibri" panose="020F0502020204030204" pitchFamily="34" charset="0"/>
+                <a:ea typeface="Calibri" panose="020F0502020204030204" pitchFamily="34" charset="0"/>
+                <a:cs typeface="Times New Roman" panose="02020603050405020304" pitchFamily="18" charset="0"/>
+              </a:rPr>
+              <a:t>The clinic system agent accesses the request sent by the patient(user) through the web interface. In our Architecture the clinic system agent handles the correspondence with all the other agents and in this way, which acts as a central hub.</a:t>
+            </a:r>
+            <a:endParaRPr lang="en-IN" sz="1800" dirty="0">
+              <a:effectLst/>
+              <a:latin typeface="Calibri" panose="020F0502020204030204" pitchFamily="34" charset="0"/>
+              <a:ea typeface="Calibri" panose="020F0502020204030204" pitchFamily="34" charset="0"/>
+              <a:cs typeface="Times New Roman" panose="02020603050405020304" pitchFamily="18" charset="0"/>
             </a:endParaRPr>
           </a:p>
           <a:p>
-            <a:pPr>
+            <a:pPr lvl="0">
               <a:lnSpc>
-                <a:spcPct val="80000"/>
+                <a:spcPct val="107000"/>
               </a:lnSpc>
               <a:buFont typeface="Wingdings" panose="05000000000000000000" pitchFamily="2" charset="2"/>
               <a:buChar char="§"/>
             </a:pPr>
             <a:r>
-              <a:rPr lang="en-CA" sz="1600" dirty="0"/>
-              <a:t>The Reminder Agent communicates with the Clinic Agent, by waiting for its signals after an appointment is booked. If the user has activated reminders at the time of booking an appointment, the Reminder Agent would be sending automated SMS messages and e-mail notifications to the user on his/her registered e-mail account and mobile number. </a:t>
-            </a:r>
-          </a:p>
-          <a:p>
-            <a:pPr>
+              <a:rPr lang="en-US" sz="1800" dirty="0">
+                <a:effectLst/>
+                <a:latin typeface="Calibri" panose="020F0502020204030204" pitchFamily="34" charset="0"/>
+                <a:ea typeface="Calibri" panose="020F0502020204030204" pitchFamily="34" charset="0"/>
+                <a:cs typeface="Times New Roman" panose="02020603050405020304" pitchFamily="18" charset="0"/>
+              </a:rPr>
+              <a:t>The clinic system agent is the main agent which has access to the database of our system.</a:t>
+            </a:r>
+            <a:endParaRPr lang="en-IN" sz="1800" dirty="0">
+              <a:effectLst/>
+              <a:latin typeface="Calibri" panose="020F0502020204030204" pitchFamily="34" charset="0"/>
+              <a:ea typeface="Calibri" panose="020F0502020204030204" pitchFamily="34" charset="0"/>
+              <a:cs typeface="Times New Roman" panose="02020603050405020304" pitchFamily="18" charset="0"/>
+            </a:endParaRPr>
+          </a:p>
+          <a:p>
+            <a:pPr lvl="0">
               <a:lnSpc>
-                <a:spcPct val="80000"/>
+                <a:spcPct val="107000"/>
               </a:lnSpc>
               <a:buFont typeface="Wingdings" panose="05000000000000000000" pitchFamily="2" charset="2"/>
               <a:buChar char="§"/>
             </a:pPr>
             <a:r>
-              <a:rPr lang="en-CA" sz="1600" dirty="0"/>
-              <a:t>Instead of a receptionist logging in every time to trigger a reminder, the Agent by itself sends the message at regular intervals(hours/days) as chosen by the user.</a:t>
-            </a:r>
-          </a:p>
-          <a:p>
-            <a:pPr>
+              <a:rPr lang="en-US" sz="1800" dirty="0">
+                <a:effectLst/>
+                <a:latin typeface="Calibri" panose="020F0502020204030204" pitchFamily="34" charset="0"/>
+                <a:ea typeface="Calibri" panose="020F0502020204030204" pitchFamily="34" charset="0"/>
+                <a:cs typeface="Times New Roman" panose="02020603050405020304" pitchFamily="18" charset="0"/>
+              </a:rPr>
+              <a:t>The clinic system agent requests appointments for the patients, search for the patient’s profile in database, shows the profile of patients to the doctor (if available!). Moreover, the clinic system agent also shows the profile of the doctor to the patients. </a:t>
+            </a:r>
+            <a:endParaRPr lang="en-IN" sz="1800" dirty="0">
+              <a:effectLst/>
+              <a:latin typeface="Calibri" panose="020F0502020204030204" pitchFamily="34" charset="0"/>
+              <a:ea typeface="Calibri" panose="020F0502020204030204" pitchFamily="34" charset="0"/>
+              <a:cs typeface="Times New Roman" panose="02020603050405020304" pitchFamily="18" charset="0"/>
+            </a:endParaRPr>
+          </a:p>
+          <a:p>
+            <a:pPr lvl="0">
               <a:lnSpc>
-                <a:spcPct val="80000"/>
+                <a:spcPct val="107000"/>
               </a:lnSpc>
               <a:buFont typeface="Wingdings" panose="05000000000000000000" pitchFamily="2" charset="2"/>
               <a:buChar char="§"/>
             </a:pPr>
             <a:r>
-              <a:rPr lang="en-CA" sz="1600" dirty="0"/>
-              <a:t>In case the appointment is cancelled or updated, the Reminder Agent also intelligently updates the text message and sends an updated notification to the user. </a:t>
-            </a:r>
-          </a:p>
-          <a:p>
-            <a:pPr>
+              <a:rPr lang="en-US" sz="1800" dirty="0">
+                <a:effectLst/>
+                <a:latin typeface="Calibri" panose="020F0502020204030204" pitchFamily="34" charset="0"/>
+                <a:ea typeface="Calibri" panose="020F0502020204030204" pitchFamily="34" charset="0"/>
+                <a:cs typeface="Times New Roman" panose="02020603050405020304" pitchFamily="18" charset="0"/>
+              </a:rPr>
+              <a:t>The clinic system agent also generates a request for the appointment agent to book an appointment whether it’s a first or a consecutive appointment.</a:t>
+            </a:r>
+            <a:endParaRPr lang="en-IN" sz="1800" dirty="0">
+              <a:effectLst/>
+              <a:latin typeface="Calibri" panose="020F0502020204030204" pitchFamily="34" charset="0"/>
+              <a:ea typeface="Calibri" panose="020F0502020204030204" pitchFamily="34" charset="0"/>
+              <a:cs typeface="Times New Roman" panose="02020603050405020304" pitchFamily="18" charset="0"/>
+            </a:endParaRPr>
+          </a:p>
+          <a:p>
+            <a:pPr lvl="0">
               <a:lnSpc>
-                <a:spcPct val="80000"/>
+                <a:spcPct val="107000"/>
               </a:lnSpc>
               <a:buFont typeface="Wingdings" panose="05000000000000000000" pitchFamily="2" charset="2"/>
               <a:buChar char="§"/>
             </a:pPr>
             <a:r>
-              <a:rPr lang="en-CA" sz="1600" dirty="0"/>
-              <a:t>Once the appointment is complete, the Reminder Agent directly accesses the database to disable the alerting mechanism for that particular appointment. </a:t>
-            </a:r>
-          </a:p>
-          <a:p>
-            <a:pPr>
+              <a:rPr lang="en-US" sz="1800" dirty="0">
+                <a:effectLst/>
+                <a:latin typeface="Calibri" panose="020F0502020204030204" pitchFamily="34" charset="0"/>
+                <a:ea typeface="Calibri" panose="020F0502020204030204" pitchFamily="34" charset="0"/>
+                <a:cs typeface="Times New Roman" panose="02020603050405020304" pitchFamily="18" charset="0"/>
+              </a:rPr>
+              <a:t>The clinic system agent also triggers the reminder agent to remind the patient about the appointments at some given times.</a:t>
+            </a:r>
+            <a:endParaRPr lang="en-IN" sz="1800" dirty="0">
+              <a:effectLst/>
+              <a:latin typeface="Calibri" panose="020F0502020204030204" pitchFamily="34" charset="0"/>
+              <a:ea typeface="Calibri" panose="020F0502020204030204" pitchFamily="34" charset="0"/>
+              <a:cs typeface="Times New Roman" panose="02020603050405020304" pitchFamily="18" charset="0"/>
+            </a:endParaRPr>
+          </a:p>
+          <a:p>
+            <a:pPr lvl="0">
               <a:lnSpc>
-                <a:spcPct val="80000"/>
+                <a:spcPct val="107000"/>
               </a:lnSpc>
+              <a:spcAft>
+                <a:spcPts val="800"/>
+              </a:spcAft>
               <a:buFont typeface="Wingdings" panose="05000000000000000000" pitchFamily="2" charset="2"/>
               <a:buChar char="§"/>
             </a:pPr>
             <a:r>
-              <a:rPr lang="en-CA" sz="1600" dirty="0"/>
-              <a:t>In order to check if the registered email/phone number is valid, the Reminder Agent will trigger an acknowledgement  message at the time of booking the appointment. Subsequently, the other reminder messages will be forwarded in due course.</a:t>
-            </a:r>
+              <a:rPr lang="en-US" sz="1800" dirty="0">
+                <a:effectLst/>
+                <a:latin typeface="Calibri" panose="020F0502020204030204" pitchFamily="34" charset="0"/>
+                <a:ea typeface="Calibri" panose="020F0502020204030204" pitchFamily="34" charset="0"/>
+                <a:cs typeface="Times New Roman" panose="02020603050405020304" pitchFamily="18" charset="0"/>
+              </a:rPr>
+              <a:t>The clinic system agent also requests template agent to generate the required template once the physician had completed the session with the patient.</a:t>
+            </a:r>
+            <a:endParaRPr lang="en-IN" sz="1800" dirty="0">
+              <a:effectLst/>
+              <a:latin typeface="Calibri" panose="020F0502020204030204" pitchFamily="34" charset="0"/>
+              <a:ea typeface="Calibri" panose="020F0502020204030204" pitchFamily="34" charset="0"/>
+              <a:cs typeface="Times New Roman" panose="02020603050405020304" pitchFamily="18" charset="0"/>
+            </a:endParaRPr>
           </a:p>
           <a:p>
             <a:pPr>
-              <a:lnSpc>
-                <a:spcPct val="80000"/>
-              </a:lnSpc>
               <a:buFont typeface="Wingdings" panose="05000000000000000000" pitchFamily="2" charset="2"/>
               <a:buChar char="§"/>
             </a:pPr>
-            <a:r>
-              <a:rPr lang="en-CA" sz="1600" dirty="0"/>
-              <a:t>The Reminder Agent also triggers a notification once the report has been generated, based upon the feedback from the veterinarian. In this case, it will await signal from the Template Agent.</a:t>
-            </a:r>
-          </a:p>
-          <a:p>
-            <a:pPr>
-              <a:lnSpc>
-                <a:spcPct val="80000"/>
-              </a:lnSpc>
-              <a:buFont typeface="Wingdings" panose="05000000000000000000" pitchFamily="2" charset="2"/>
-              <a:buChar char="§"/>
-            </a:pPr>
-            <a:r>
-              <a:rPr lang="en-CA" sz="1600" dirty="0"/>
-              <a:t>The Agent will keep a track of all the reminders sent to a particular number in the database for tracking purposes.</a:t>
-            </a:r>
-          </a:p>
-          <a:p>
-            <a:pPr>
-              <a:lnSpc>
-                <a:spcPct val="80000"/>
-              </a:lnSpc>
-            </a:pPr>
-            <a:endParaRPr lang="en-CA" sz="1600" dirty="0"/>
+            <a:endParaRPr lang="en-IN" dirty="0"/>
+          </a:p>
+        </p:txBody>
+      </p:sp>
+      <p:sp>
+        <p:nvSpPr>
+          <p:cNvPr id="4" name="Date Placeholder 3">
+            <a:extLst>
+              <a:ext uri="{FF2B5EF4-FFF2-40B4-BE49-F238E27FC236}">
+                <a16:creationId xmlns:a16="http://schemas.microsoft.com/office/drawing/2014/main" id="{AC1FD27A-80D7-42DE-BE24-2CD842F6BDDF}"/>
+              </a:ext>
+            </a:extLst>
+          </p:cNvPr>
+          <p:cNvSpPr>
+            <a:spLocks noGrp="1"/>
+          </p:cNvSpPr>
+          <p:nvPr>
+            <p:ph type="dt" sz="half" idx="10"/>
+          </p:nvPr>
+        </p:nvSpPr>
+        <p:spPr/>
+        <p:txBody>
+          <a:bodyPr/>
+          <a:lstStyle/>
+          <a:p>
+            <a:r>
+              <a:rPr lang="en-US"/>
+              <a:t>SENG697 (Fall 2007)</a:t>
+            </a:r>
+            <a:endParaRPr lang="en-US" altLang="ja-JP"/>
+          </a:p>
+        </p:txBody>
+      </p:sp>
+      <p:sp>
+        <p:nvSpPr>
+          <p:cNvPr id="5" name="Footer Placeholder 4">
+            <a:extLst>
+              <a:ext uri="{FF2B5EF4-FFF2-40B4-BE49-F238E27FC236}">
+                <a16:creationId xmlns:a16="http://schemas.microsoft.com/office/drawing/2014/main" id="{70072A60-0CEC-467D-951D-75AA39403701}"/>
+              </a:ext>
+            </a:extLst>
+          </p:cNvPr>
+          <p:cNvSpPr>
+            <a:spLocks noGrp="1"/>
+          </p:cNvSpPr>
+          <p:nvPr>
+            <p:ph type="ftr" sz="quarter" idx="11"/>
+          </p:nvPr>
+        </p:nvSpPr>
+        <p:spPr/>
+        <p:txBody>
+          <a:bodyPr/>
+          <a:lstStyle/>
+          <a:p>
+            <a:r>
+              <a:rPr lang="ja-JP" altLang="en-US"/>
+              <a:t>far@ucalgary.ca</a:t>
+            </a:r>
+            <a:endParaRPr lang="en-US" altLang="ja-JP"/>
+          </a:p>
+        </p:txBody>
+      </p:sp>
+      <p:sp>
+        <p:nvSpPr>
+          <p:cNvPr id="6" name="Slide Number Placeholder 5">
+            <a:extLst>
+              <a:ext uri="{FF2B5EF4-FFF2-40B4-BE49-F238E27FC236}">
+                <a16:creationId xmlns:a16="http://schemas.microsoft.com/office/drawing/2014/main" id="{8E8B0CB0-0C6B-4982-B9C7-521CB9F200DA}"/>
+              </a:ext>
+            </a:extLst>
+          </p:cNvPr>
+          <p:cNvSpPr>
+            <a:spLocks noGrp="1"/>
+          </p:cNvSpPr>
+          <p:nvPr>
+            <p:ph type="sldNum" sz="quarter" idx="12"/>
+          </p:nvPr>
+        </p:nvSpPr>
+        <p:spPr/>
+        <p:txBody>
+          <a:bodyPr/>
+          <a:lstStyle/>
+          <a:p>
+            <a:fld id="{A4BAB868-1E00-44C6-B1AB-DFCC5F9865BA}" type="slidenum">
+              <a:rPr lang="ja-JP" altLang="en-US" smtClean="0"/>
+              <a:pPr/>
+              <a:t>8</a:t>
+            </a:fld>
+            <a:endParaRPr lang="en-US" altLang="ja-JP"/>
           </a:p>
         </p:txBody>
       </p:sp>
     </p:spTree>
     <p:extLst>
       <p:ext uri="{BB962C8B-B14F-4D97-AF65-F5344CB8AC3E}">
-        <p14:creationId xmlns:p14="http://schemas.microsoft.com/office/powerpoint/2010/main" val="1716397028"/>
+        <p14:creationId xmlns:p14="http://schemas.microsoft.com/office/powerpoint/2010/main" val="89349740"/>
       </p:ext>
     </p:extLst>
   </p:cSld>
@@ -7189,7 +7828,7 @@
           <p:cNvPr id="2" name="Title 1">
             <a:extLst>
               <a:ext uri="{FF2B5EF4-FFF2-40B4-BE49-F238E27FC236}">
-                <a16:creationId xmlns:a16="http://schemas.microsoft.com/office/drawing/2014/main" id="{E1A18D8D-D50E-48B9-A318-86EA2B96F6B7}"/>
+                <a16:creationId xmlns:a16="http://schemas.microsoft.com/office/drawing/2014/main" id="{BC19915F-4B57-4C66-B739-FC877E4166FA}"/>
               </a:ext>
             </a:extLst>
           </p:cNvPr>
@@ -7209,6 +7848,7 @@
               <a:rPr lang="en-CA" dirty="0"/>
               <a:t>Agent Description (cont’d)</a:t>
             </a:r>
+            <a:endParaRPr lang="en-IN" dirty="0"/>
           </a:p>
         </p:txBody>
       </p:sp>
@@ -7217,7 +7857,7 @@
           <p:cNvPr id="3" name="Content Placeholder 2">
             <a:extLst>
               <a:ext uri="{FF2B5EF4-FFF2-40B4-BE49-F238E27FC236}">
-                <a16:creationId xmlns:a16="http://schemas.microsoft.com/office/drawing/2014/main" id="{CE8243DA-4F7C-4C3A-B874-DF6CE800B16E}"/>
+                <a16:creationId xmlns:a16="http://schemas.microsoft.com/office/drawing/2014/main" id="{BC5C524F-0E47-4B10-830C-F3106CA3E329}"/>
               </a:ext>
             </a:extLst>
           </p:cNvPr>
@@ -7228,21 +7868,19 @@
             <p:ph idx="1"/>
           </p:nvPr>
         </p:nvSpPr>
-        <p:spPr>
-          <a:xfrm>
-            <a:off x="1200151" y="1560513"/>
-            <a:ext cx="10502900" cy="4532312"/>
-          </a:xfrm>
-        </p:spPr>
+        <p:spPr/>
         <p:txBody>
           <a:bodyPr/>
           <a:lstStyle/>
           <a:p>
             <a:pPr marL="0" indent="0">
+              <a:lnSpc>
+                <a:spcPct val="107000"/>
+              </a:lnSpc>
               <a:buNone/>
             </a:pPr>
             <a:r>
-              <a:rPr lang="en-US" sz="2400" b="1" i="1" dirty="0">
+              <a:rPr lang="en-US" sz="1800" b="1" i="1" dirty="0">
                 <a:solidFill>
                   <a:srgbClr val="D60093"/>
                 </a:solidFill>
@@ -7252,33 +7890,116 @@
                   </a:outerShdw>
                 </a:effectLst>
               </a:rPr>
-              <a:t>Template Agent</a:t>
-            </a:r>
-          </a:p>
-          <a:p>
-            <a:r>
-              <a:rPr lang="en-US" sz="2400" dirty="0"/>
-              <a:t>The Template Agent provides the doctor with different letter templates. Depending upon the video interaction between the doctor and the patient, the doctor can select and use the in-built template to report their diagnosis.</a:t>
-            </a:r>
-          </a:p>
-          <a:p>
-            <a:r>
-              <a:rPr lang="en-US" sz="2400" dirty="0"/>
-              <a:t>The Template Agent communicates with the Clinic System Agent after the video interaction between the client and doctor is complete. </a:t>
-            </a:r>
-          </a:p>
-          <a:p>
-            <a:r>
-              <a:rPr lang="en-US" sz="2400" dirty="0"/>
-              <a:t>If the Template Agent receives a request from the Clinic System Agent, the doctor is requested to input their feedback. </a:t>
-            </a:r>
-          </a:p>
-          <a:p>
-            <a:r>
-              <a:rPr lang="en-US" sz="2400" dirty="0"/>
-              <a:t>A medical report is generated based on the doctor’s feedback and sent to the Clinic System Agent, which presents it to the user.</a:t>
-            </a:r>
-            <a:endParaRPr lang="en-CA" sz="2400" dirty="0"/>
+              <a:t>Appointment Agent</a:t>
+            </a:r>
+          </a:p>
+          <a:p>
+            <a:pPr marL="0" lvl="0" indent="0">
+              <a:lnSpc>
+                <a:spcPct val="107000"/>
+              </a:lnSpc>
+              <a:buNone/>
+            </a:pPr>
+            <a:endParaRPr lang="en-US" sz="1800" dirty="0">
+              <a:effectLst/>
+              <a:latin typeface="Calibri" panose="020F0502020204030204" pitchFamily="34" charset="0"/>
+              <a:ea typeface="Calibri" panose="020F0502020204030204" pitchFamily="34" charset="0"/>
+              <a:cs typeface="Times New Roman" panose="02020603050405020304" pitchFamily="18" charset="0"/>
+            </a:endParaRPr>
+          </a:p>
+          <a:p>
+            <a:pPr>
+              <a:lnSpc>
+                <a:spcPct val="107000"/>
+              </a:lnSpc>
+            </a:pPr>
+            <a:r>
+              <a:rPr lang="en-US" sz="1800" dirty="0">
+                <a:effectLst/>
+                <a:latin typeface="Calibri" panose="020F0502020204030204" pitchFamily="34" charset="0"/>
+                <a:ea typeface="Calibri" panose="020F0502020204030204" pitchFamily="34" charset="0"/>
+                <a:cs typeface="Times New Roman" panose="02020603050405020304" pitchFamily="18" charset="0"/>
+              </a:rPr>
+              <a:t>The appointment agent communicates with the clinic system agent to book an appointment for the patient. The clinic agent system searches the database and give the required details regarding the available slots to the appointment agent.</a:t>
+            </a:r>
+            <a:endParaRPr lang="en-IN" sz="1800" dirty="0">
+              <a:effectLst/>
+              <a:latin typeface="Calibri" panose="020F0502020204030204" pitchFamily="34" charset="0"/>
+              <a:ea typeface="Calibri" panose="020F0502020204030204" pitchFamily="34" charset="0"/>
+              <a:cs typeface="Times New Roman" panose="02020603050405020304" pitchFamily="18" charset="0"/>
+            </a:endParaRPr>
+          </a:p>
+          <a:p>
+            <a:pPr>
+              <a:lnSpc>
+                <a:spcPct val="107000"/>
+              </a:lnSpc>
+            </a:pPr>
+            <a:r>
+              <a:rPr lang="en-US" sz="1800" dirty="0">
+                <a:effectLst/>
+                <a:latin typeface="Calibri" panose="020F0502020204030204" pitchFamily="34" charset="0"/>
+                <a:ea typeface="Calibri" panose="020F0502020204030204" pitchFamily="34" charset="0"/>
+                <a:cs typeface="Times New Roman" panose="02020603050405020304" pitchFamily="18" charset="0"/>
+              </a:rPr>
+              <a:t>The appointment agent can be a new appointment for those patients who registers for the first time. </a:t>
+            </a:r>
+            <a:endParaRPr lang="en-IN" sz="1800" dirty="0">
+              <a:effectLst/>
+              <a:latin typeface="Calibri" panose="020F0502020204030204" pitchFamily="34" charset="0"/>
+              <a:ea typeface="Calibri" panose="020F0502020204030204" pitchFamily="34" charset="0"/>
+              <a:cs typeface="Times New Roman" panose="02020603050405020304" pitchFamily="18" charset="0"/>
+            </a:endParaRPr>
+          </a:p>
+          <a:p>
+            <a:pPr>
+              <a:lnSpc>
+                <a:spcPct val="107000"/>
+              </a:lnSpc>
+            </a:pPr>
+            <a:r>
+              <a:rPr lang="en-US" sz="1800" dirty="0">
+                <a:effectLst/>
+                <a:latin typeface="Calibri" panose="020F0502020204030204" pitchFamily="34" charset="0"/>
+                <a:ea typeface="Calibri" panose="020F0502020204030204" pitchFamily="34" charset="0"/>
+                <a:cs typeface="Times New Roman" panose="02020603050405020304" pitchFamily="18" charset="0"/>
+              </a:rPr>
+              <a:t>Not only for the first time, but the appointment agent will also book appointments for the patients who visits again.</a:t>
+            </a:r>
+            <a:endParaRPr lang="en-IN" sz="1800" dirty="0">
+              <a:effectLst/>
+              <a:latin typeface="Calibri" panose="020F0502020204030204" pitchFamily="34" charset="0"/>
+              <a:ea typeface="Calibri" panose="020F0502020204030204" pitchFamily="34" charset="0"/>
+              <a:cs typeface="Times New Roman" panose="02020603050405020304" pitchFamily="18" charset="0"/>
+            </a:endParaRPr>
+          </a:p>
+          <a:p>
+            <a:pPr>
+              <a:lnSpc>
+                <a:spcPct val="107000"/>
+              </a:lnSpc>
+              <a:spcAft>
+                <a:spcPts val="800"/>
+              </a:spcAft>
+            </a:pPr>
+            <a:r>
+              <a:rPr lang="en-US" sz="1800" dirty="0">
+                <a:effectLst/>
+                <a:latin typeface="Calibri" panose="020F0502020204030204" pitchFamily="34" charset="0"/>
+                <a:ea typeface="Calibri" panose="020F0502020204030204" pitchFamily="34" charset="0"/>
+                <a:cs typeface="Times New Roman" panose="02020603050405020304" pitchFamily="18" charset="0"/>
+              </a:rPr>
+              <a:t>The appointment agent will also interact with the clinic system agent to activate the signal regarding the reminder. The Reminder agent then will remind the patient when the appointment is due.</a:t>
+            </a:r>
+            <a:endParaRPr lang="en-IN" sz="1800" dirty="0">
+              <a:effectLst/>
+              <a:latin typeface="Calibri" panose="020F0502020204030204" pitchFamily="34" charset="0"/>
+              <a:ea typeface="Calibri" panose="020F0502020204030204" pitchFamily="34" charset="0"/>
+              <a:cs typeface="Times New Roman" panose="02020603050405020304" pitchFamily="18" charset="0"/>
+            </a:endParaRPr>
+          </a:p>
+          <a:p>
+            <a:endParaRPr lang="en-IN" dirty="0"/>
           </a:p>
         </p:txBody>
       </p:sp>
@@ -7287,7 +8008,7 @@
           <p:cNvPr id="4" name="Date Placeholder 3">
             <a:extLst>
               <a:ext uri="{FF2B5EF4-FFF2-40B4-BE49-F238E27FC236}">
-                <a16:creationId xmlns:a16="http://schemas.microsoft.com/office/drawing/2014/main" id="{2FAB1A17-C298-4F53-B04A-C760E48BF7B7}"/>
+                <a16:creationId xmlns:a16="http://schemas.microsoft.com/office/drawing/2014/main" id="{27ABC16C-7B60-476B-8EC1-CA6FD2886746}"/>
               </a:ext>
             </a:extLst>
           </p:cNvPr>
@@ -7316,7 +8037,7 @@
           <p:cNvPr id="5" name="Footer Placeholder 4">
             <a:extLst>
               <a:ext uri="{FF2B5EF4-FFF2-40B4-BE49-F238E27FC236}">
-                <a16:creationId xmlns:a16="http://schemas.microsoft.com/office/drawing/2014/main" id="{EEFA3970-61F0-43F0-8D7E-ECE5C55E945D}"/>
+                <a16:creationId xmlns:a16="http://schemas.microsoft.com/office/drawing/2014/main" id="{78CB4FAA-360F-4618-BB8B-D5C2C3464190}"/>
               </a:ext>
             </a:extLst>
           </p:cNvPr>
@@ -7345,7 +8066,7 @@
           <p:cNvPr id="6" name="Slide Number Placeholder 5">
             <a:extLst>
               <a:ext uri="{FF2B5EF4-FFF2-40B4-BE49-F238E27FC236}">
-                <a16:creationId xmlns:a16="http://schemas.microsoft.com/office/drawing/2014/main" id="{F36303D7-60BC-434B-A3A9-DD9D89830AC1}"/>
+                <a16:creationId xmlns:a16="http://schemas.microsoft.com/office/drawing/2014/main" id="{EEAC3FDF-3328-4A44-BFBD-A22E795BBA3B}"/>
               </a:ext>
             </a:extLst>
           </p:cNvPr>
@@ -7366,14 +8087,14 @@
               <a:pPr/>
               <a:t>9</a:t>
             </a:fld>
-            <a:endParaRPr lang="en-US" altLang="ja-JP" dirty="0"/>
+            <a:endParaRPr lang="en-US" altLang="ja-JP"/>
           </a:p>
         </p:txBody>
       </p:sp>
     </p:spTree>
     <p:extLst>
       <p:ext uri="{BB962C8B-B14F-4D97-AF65-F5344CB8AC3E}">
-        <p14:creationId xmlns:p14="http://schemas.microsoft.com/office/powerpoint/2010/main" val="1814967249"/>
+        <p14:creationId xmlns:p14="http://schemas.microsoft.com/office/powerpoint/2010/main" val="1590150963"/>
       </p:ext>
     </p:extLst>
   </p:cSld>
@@ -8027,15 +8748,6 @@
 </file>
 
 <file path=customXml/item1.xml><?xml version="1.0" encoding="utf-8"?>
-<?mso-contentType ?>
-<FormTemplates xmlns="http://schemas.microsoft.com/sharepoint/v3/contenttype/forms">
-  <Display>DocumentLibraryForm</Display>
-  <Edit>DocumentLibraryForm</Edit>
-  <New>DocumentLibraryForm</New>
-</FormTemplates>
-</file>
-
-<file path=customXml/item2.xml><?xml version="1.0" encoding="utf-8"?>
 <ct:contentTypeSchema xmlns:ct="http://schemas.microsoft.com/office/2006/metadata/contentType" xmlns:ma="http://schemas.microsoft.com/office/2006/metadata/properties/metaAttributes" ct:_="" ma:_="" ma:contentTypeName="Document" ma:contentTypeID="0x010100167A42814A0A7A429FBAAD58A3662C43" ma:contentTypeVersion="14" ma:contentTypeDescription="Create a new document." ma:contentTypeScope="" ma:versionID="2e0f0b35447dfaef00fa2716150d7de8">
   <xsd:schema xmlns:xsd="http://www.w3.org/2001/XMLSchema" xmlns:xs="http://www.w3.org/2001/XMLSchema" xmlns:p="http://schemas.microsoft.com/office/2006/metadata/properties" xmlns:ns3="d8a3f0a0-49e1-415f-8d7d-9b51d0eb93e8" xmlns:ns4="ce8d2f3a-208b-4f58-bb79-4192d7cf8650" targetNamespace="http://schemas.microsoft.com/office/2006/metadata/properties" ma:root="true" ma:fieldsID="d9b4fe6bd1d6509f7a3dbc01590a646f" ns3:_="" ns4:_="">
     <xsd:import namespace="d8a3f0a0-49e1-415f-8d7d-9b51d0eb93e8"/>
@@ -8264,6 +8976,15 @@
 </ct:contentTypeSchema>
 </file>
 
+<file path=customXml/item2.xml><?xml version="1.0" encoding="utf-8"?>
+<?mso-contentType ?>
+<FormTemplates xmlns="http://schemas.microsoft.com/sharepoint/v3/contenttype/forms">
+  <Display>DocumentLibraryForm</Display>
+  <Edit>DocumentLibraryForm</Edit>
+  <New>DocumentLibraryForm</New>
+</FormTemplates>
+</file>
+
 <file path=customXml/item3.xml><?xml version="1.0" encoding="utf-8"?>
 <p:properties xmlns:p="http://schemas.microsoft.com/office/2006/metadata/properties" xmlns:xsi="http://www.w3.org/2001/XMLSchema-instance" xmlns:pc="http://schemas.microsoft.com/office/infopath/2007/PartnerControls">
   <documentManagement/>
@@ -8271,14 +8992,6 @@
 </file>
 
 <file path=customXml/itemProps1.xml><?xml version="1.0" encoding="utf-8"?>
-<ds:datastoreItem xmlns:ds="http://schemas.openxmlformats.org/officeDocument/2006/customXml" ds:itemID="{66358C42-DD22-4F23-85C0-029A1B03C7F8}">
-  <ds:schemaRefs>
-    <ds:schemaRef ds:uri="http://schemas.microsoft.com/sharepoint/v3/contenttype/forms"/>
-  </ds:schemaRefs>
-</ds:datastoreItem>
-</file>
-
-<file path=customXml/itemProps2.xml><?xml version="1.0" encoding="utf-8"?>
 <ds:datastoreItem xmlns:ds="http://schemas.openxmlformats.org/officeDocument/2006/customXml" ds:itemID="{25CCB28B-163E-40CA-8CCE-69A7F4A1A4B7}">
   <ds:schemaRefs>
     <ds:schemaRef ds:uri="http://schemas.microsoft.com/office/2006/metadata/contentType"/>
@@ -8293,6 +9006,14 @@
     <ds:schemaRef ds:uri="http://purl.org/dc/elements/1.1/"/>
     <ds:schemaRef ds:uri="http://purl.org/dc/terms/"/>
     <ds:schemaRef ds:uri="http://schemas.microsoft.com/internal/obd"/>
+  </ds:schemaRefs>
+</ds:datastoreItem>
+</file>
+
+<file path=customXml/itemProps2.xml><?xml version="1.0" encoding="utf-8"?>
+<ds:datastoreItem xmlns:ds="http://schemas.openxmlformats.org/officeDocument/2006/customXml" ds:itemID="{66358C42-DD22-4F23-85C0-029A1B03C7F8}">
+  <ds:schemaRefs>
+    <ds:schemaRef ds:uri="http://schemas.microsoft.com/sharepoint/v3/contenttype/forms"/>
   </ds:schemaRefs>
 </ds:datastoreItem>
 </file>

</xml_diff>

<commit_message>
Added Agent Description to Presentation
</commit_message>
<xml_diff>
--- a/GroupD_ProjectPresentation.pptx
+++ b/GroupD_ProjectPresentation.pptx
@@ -16,9 +16,10 @@
     <p:sldId id="270" r:id="rId13"/>
     <p:sldId id="260" r:id="rId14"/>
     <p:sldId id="263" r:id="rId15"/>
-    <p:sldId id="266" r:id="rId16"/>
-    <p:sldId id="267" r:id="rId17"/>
-    <p:sldId id="268" r:id="rId18"/>
+    <p:sldId id="271" r:id="rId16"/>
+    <p:sldId id="266" r:id="rId17"/>
+    <p:sldId id="267" r:id="rId18"/>
+    <p:sldId id="268" r:id="rId19"/>
   </p:sldIdLst>
   <p:sldSz cx="12192000" cy="6858000"/>
   <p:notesSz cx="6858000" cy="9144000"/>
@@ -4073,59 +4074,36 @@
               </a:spcAft>
             </a:pPr>
             <a:r>
-              <a:rPr lang="en-US">
+              <a:rPr lang="en-US" dirty="0" smtClean="0">
                 <a:solidFill>
                   <a:srgbClr val="000000"/>
                 </a:solidFill>
                 <a:latin typeface="Tahoma" pitchFamily="34" charset="0"/>
                 <a:ea typeface="ＭＳ Ｐゴシック" pitchFamily="50" charset="-128"/>
               </a:rPr>
-              <a:t>SENG697 (Fall 2007)</a:t>
-            </a:r>
-            <a:endParaRPr lang="en-US" altLang="ja-JP">
-              <a:solidFill>
-                <a:srgbClr val="000000"/>
-              </a:solidFill>
-              <a:latin typeface="Tahoma" pitchFamily="34" charset="0"/>
-              <a:ea typeface="ＭＳ Ｐゴシック" pitchFamily="50" charset="-128"/>
-            </a:endParaRPr>
-          </a:p>
-        </p:txBody>
-      </p:sp>
-      <p:sp>
-        <p:nvSpPr>
-          <p:cNvPr id="5" name="Footer Placeholder 4"/>
-          <p:cNvSpPr>
-            <a:spLocks noGrp="1"/>
-          </p:cNvSpPr>
-          <p:nvPr>
-            <p:ph type="ftr" sz="quarter" idx="11"/>
-          </p:nvPr>
-        </p:nvSpPr>
-        <p:spPr/>
-        <p:txBody>
-          <a:bodyPr/>
-          <a:lstStyle/>
-          <a:p>
-            <a:pPr fontAlgn="base">
-              <a:spcBef>
-                <a:spcPct val="0"/>
-              </a:spcBef>
-              <a:spcAft>
-                <a:spcPct val="0"/>
-              </a:spcAft>
-            </a:pPr>
-            <a:r>
-              <a:rPr lang="ja-JP" altLang="en-US">
+              <a:t>SENG696 </a:t>
+            </a:r>
+            <a:r>
+              <a:rPr lang="en-US" dirty="0">
                 <a:solidFill>
                   <a:srgbClr val="000000"/>
                 </a:solidFill>
                 <a:latin typeface="Tahoma" pitchFamily="34" charset="0"/>
                 <a:ea typeface="ＭＳ Ｐゴシック" pitchFamily="50" charset="-128"/>
               </a:rPr>
-              <a:t>far@ucalgary.ca</a:t>
-            </a:r>
-            <a:endParaRPr lang="en-US" altLang="ja-JP">
+              <a:t>(Fall </a:t>
+            </a:r>
+            <a:r>
+              <a:rPr lang="en-US" dirty="0" smtClean="0">
+                <a:solidFill>
+                  <a:srgbClr val="000000"/>
+                </a:solidFill>
+                <a:latin typeface="Tahoma" pitchFamily="34" charset="0"/>
+                <a:ea typeface="ＭＳ Ｐゴシック" pitchFamily="50" charset="-128"/>
+              </a:rPr>
+              <a:t>2021)</a:t>
+            </a:r>
+            <a:endParaRPr lang="en-US" altLang="ja-JP" dirty="0">
               <a:solidFill>
                 <a:srgbClr val="000000"/>
               </a:solidFill>
@@ -4522,39 +4500,18 @@
           <a:lstStyle/>
           <a:p>
             <a:r>
-              <a:rPr lang="en-US"/>
-              <a:t>SENG697 (Fall 2007)</a:t>
-            </a:r>
-            <a:endParaRPr lang="en-US" altLang="ja-JP"/>
-          </a:p>
-        </p:txBody>
-      </p:sp>
-      <p:sp>
-        <p:nvSpPr>
-          <p:cNvPr id="5" name="Footer Placeholder 4">
-            <a:extLst>
-              <a:ext uri="{FF2B5EF4-FFF2-40B4-BE49-F238E27FC236}">
-                <a16:creationId xmlns:a16="http://schemas.microsoft.com/office/drawing/2014/main" id="{EEFA3970-61F0-43F0-8D7E-ECE5C55E945D}"/>
-              </a:ext>
-            </a:extLst>
-          </p:cNvPr>
-          <p:cNvSpPr>
-            <a:spLocks noGrp="1"/>
-          </p:cNvSpPr>
-          <p:nvPr>
-            <p:ph type="ftr" sz="quarter" idx="11"/>
-          </p:nvPr>
-        </p:nvSpPr>
-        <p:spPr/>
-        <p:txBody>
-          <a:bodyPr/>
-          <a:lstStyle/>
-          <a:p>
-            <a:r>
-              <a:rPr lang="ja-JP" altLang="en-US"/>
-              <a:t>far@ucalgary.ca</a:t>
-            </a:r>
-            <a:endParaRPr lang="en-US" altLang="ja-JP"/>
+              <a:rPr lang="en-US" dirty="0" smtClean="0"/>
+              <a:t>SENG696 </a:t>
+            </a:r>
+            <a:r>
+              <a:rPr lang="en-US" dirty="0"/>
+              <a:t>(Fall </a:t>
+            </a:r>
+            <a:r>
+              <a:rPr lang="en-US" dirty="0" smtClean="0"/>
+              <a:t>2021)</a:t>
+            </a:r>
+            <a:endParaRPr lang="en-US" altLang="ja-JP" dirty="0"/>
           </a:p>
         </p:txBody>
       </p:sp>
@@ -4626,6 +4583,275 @@
           <p:cNvPr id="2" name="Title 1">
             <a:extLst>
               <a:ext uri="{FF2B5EF4-FFF2-40B4-BE49-F238E27FC236}">
+                <a16:creationId xmlns:a16="http://schemas.microsoft.com/office/drawing/2014/main" id="{E1A18D8D-D50E-48B9-A318-86EA2B96F6B7}"/>
+              </a:ext>
+            </a:extLst>
+          </p:cNvPr>
+          <p:cNvSpPr>
+            <a:spLocks noGrp="1"/>
+          </p:cNvSpPr>
+          <p:nvPr>
+            <p:ph type="title"/>
+          </p:nvPr>
+        </p:nvSpPr>
+        <p:spPr/>
+        <p:txBody>
+          <a:bodyPr/>
+          <a:lstStyle/>
+          <a:p>
+            <a:r>
+              <a:rPr lang="en-CA" dirty="0"/>
+              <a:t>Agent Description (cont’d)</a:t>
+            </a:r>
+          </a:p>
+        </p:txBody>
+      </p:sp>
+      <p:sp>
+        <p:nvSpPr>
+          <p:cNvPr id="3" name="Content Placeholder 2">
+            <a:extLst>
+              <a:ext uri="{FF2B5EF4-FFF2-40B4-BE49-F238E27FC236}">
+                <a16:creationId xmlns:a16="http://schemas.microsoft.com/office/drawing/2014/main" id="{CE8243DA-4F7C-4C3A-B874-DF6CE800B16E}"/>
+              </a:ext>
+            </a:extLst>
+          </p:cNvPr>
+          <p:cNvSpPr>
+            <a:spLocks noGrp="1"/>
+          </p:cNvSpPr>
+          <p:nvPr>
+            <p:ph idx="1"/>
+          </p:nvPr>
+        </p:nvSpPr>
+        <p:spPr>
+          <a:xfrm>
+            <a:off x="1200151" y="1560513"/>
+            <a:ext cx="10502900" cy="4532312"/>
+          </a:xfrm>
+        </p:spPr>
+        <p:txBody>
+          <a:bodyPr/>
+          <a:lstStyle/>
+          <a:p>
+            <a:pPr marL="0" indent="0">
+              <a:buNone/>
+            </a:pPr>
+            <a:r>
+              <a:rPr lang="en-US" sz="2400" b="1" i="1" dirty="0" smtClean="0">
+                <a:solidFill>
+                  <a:srgbClr val="D60093"/>
+                </a:solidFill>
+                <a:effectLst>
+                  <a:outerShdw blurRad="38100" dist="38100" dir="2700000" algn="tl">
+                    <a:srgbClr val="C0C0C0"/>
+                  </a:outerShdw>
+                </a:effectLst>
+              </a:rPr>
+              <a:t>Video </a:t>
+            </a:r>
+            <a:r>
+              <a:rPr lang="en-US" sz="2400" b="1" i="1" dirty="0">
+                <a:solidFill>
+                  <a:srgbClr val="D60093"/>
+                </a:solidFill>
+                <a:effectLst>
+                  <a:outerShdw blurRad="38100" dist="38100" dir="2700000" algn="tl">
+                    <a:srgbClr val="C0C0C0"/>
+                  </a:outerShdw>
+                </a:effectLst>
+              </a:rPr>
+              <a:t>Agent</a:t>
+            </a:r>
+          </a:p>
+          <a:p>
+            <a:pPr>
+              <a:buFont typeface="Wingdings" panose="05000000000000000000" pitchFamily="2" charset="2"/>
+              <a:buChar char="§"/>
+            </a:pPr>
+            <a:r>
+              <a:rPr lang="en-US" sz="2200" dirty="0"/>
+              <a:t>The video agent is responsible to generate a video link at the time of the appointment of the patient and send it to the registered email id as well as the registered mobile number of the patient</a:t>
+            </a:r>
+            <a:r>
+              <a:rPr lang="en-US" sz="2200" dirty="0" smtClean="0"/>
+              <a:t>.</a:t>
+            </a:r>
+          </a:p>
+          <a:p>
+            <a:pPr>
+              <a:buFont typeface="Wingdings" panose="05000000000000000000" pitchFamily="2" charset="2"/>
+              <a:buChar char="§"/>
+            </a:pPr>
+            <a:r>
+              <a:rPr lang="en-US" sz="2200" dirty="0" smtClean="0"/>
+              <a:t>The </a:t>
+            </a:r>
+            <a:r>
+              <a:rPr lang="en-US" sz="2200" dirty="0"/>
+              <a:t>video agent directly communicates with the clinic system agent and creates the links according to the time slots selected by the patients</a:t>
+            </a:r>
+            <a:r>
+              <a:rPr lang="en-US" sz="2200" dirty="0" smtClean="0"/>
+              <a:t>.</a:t>
+            </a:r>
+          </a:p>
+          <a:p>
+            <a:pPr>
+              <a:buFont typeface="Wingdings" panose="05000000000000000000" pitchFamily="2" charset="2"/>
+              <a:buChar char="§"/>
+            </a:pPr>
+            <a:r>
+              <a:rPr lang="en-US" sz="2200" dirty="0" smtClean="0"/>
+              <a:t>To </a:t>
+            </a:r>
+            <a:r>
+              <a:rPr lang="en-US" sz="2200" dirty="0"/>
+              <a:t>facilitate video-based interaction between the doctor and patient, the system will use existing video conferencing platforms (ZOOM, Google Meet, etc</a:t>
+            </a:r>
+            <a:r>
+              <a:rPr lang="en-US" sz="2200" dirty="0" smtClean="0"/>
+              <a:t>.)</a:t>
+            </a:r>
+          </a:p>
+          <a:p>
+            <a:pPr>
+              <a:buFont typeface="Wingdings" panose="05000000000000000000" pitchFamily="2" charset="2"/>
+              <a:buChar char="§"/>
+            </a:pPr>
+            <a:r>
+              <a:rPr lang="en-US" sz="2200" dirty="0" smtClean="0"/>
+              <a:t>Patients </a:t>
+            </a:r>
+            <a:r>
+              <a:rPr lang="en-US" sz="2200" dirty="0"/>
+              <a:t>will be able to join the meeting at their scheduled appointment time and the link will expire in 30 minutes which is the maximum time for consultation</a:t>
+            </a:r>
+            <a:r>
+              <a:rPr lang="en-US" sz="2200" dirty="0" smtClean="0"/>
+              <a:t>.</a:t>
+            </a:r>
+          </a:p>
+          <a:p>
+            <a:pPr>
+              <a:buFont typeface="Wingdings" panose="05000000000000000000" pitchFamily="2" charset="2"/>
+              <a:buChar char="§"/>
+            </a:pPr>
+            <a:r>
+              <a:rPr lang="en-US" sz="2200" dirty="0" smtClean="0"/>
+              <a:t>If </a:t>
+            </a:r>
+            <a:r>
+              <a:rPr lang="en-US" sz="2200" dirty="0"/>
+              <a:t>the consultation needs more time than 30 minutes then the patient will have to make another appointment with the clinic in order to continue it.</a:t>
+            </a:r>
+            <a:endParaRPr lang="en-CA" sz="2200" dirty="0"/>
+          </a:p>
+        </p:txBody>
+      </p:sp>
+      <p:sp>
+        <p:nvSpPr>
+          <p:cNvPr id="4" name="Date Placeholder 3">
+            <a:extLst>
+              <a:ext uri="{FF2B5EF4-FFF2-40B4-BE49-F238E27FC236}">
+                <a16:creationId xmlns:a16="http://schemas.microsoft.com/office/drawing/2014/main" id="{2FAB1A17-C298-4F53-B04A-C760E48BF7B7}"/>
+              </a:ext>
+            </a:extLst>
+          </p:cNvPr>
+          <p:cNvSpPr>
+            <a:spLocks noGrp="1"/>
+          </p:cNvSpPr>
+          <p:nvPr>
+            <p:ph type="dt" sz="half" idx="10"/>
+          </p:nvPr>
+        </p:nvSpPr>
+        <p:spPr/>
+        <p:txBody>
+          <a:bodyPr/>
+          <a:lstStyle/>
+          <a:p>
+            <a:r>
+              <a:rPr lang="en-US" dirty="0" smtClean="0"/>
+              <a:t>SENG696 </a:t>
+            </a:r>
+            <a:r>
+              <a:rPr lang="en-US" dirty="0"/>
+              <a:t>(Fall </a:t>
+            </a:r>
+            <a:r>
+              <a:rPr lang="en-US" dirty="0" smtClean="0"/>
+              <a:t>2021)</a:t>
+            </a:r>
+            <a:endParaRPr lang="en-US" altLang="ja-JP" dirty="0"/>
+          </a:p>
+        </p:txBody>
+      </p:sp>
+      <p:sp>
+        <p:nvSpPr>
+          <p:cNvPr id="6" name="Slide Number Placeholder 5">
+            <a:extLst>
+              <a:ext uri="{FF2B5EF4-FFF2-40B4-BE49-F238E27FC236}">
+                <a16:creationId xmlns:a16="http://schemas.microsoft.com/office/drawing/2014/main" id="{F36303D7-60BC-434B-A3A9-DD9D89830AC1}"/>
+              </a:ext>
+            </a:extLst>
+          </p:cNvPr>
+          <p:cNvSpPr>
+            <a:spLocks noGrp="1"/>
+          </p:cNvSpPr>
+          <p:nvPr>
+            <p:ph type="sldNum" sz="quarter" idx="12"/>
+          </p:nvPr>
+        </p:nvSpPr>
+        <p:spPr/>
+        <p:txBody>
+          <a:bodyPr/>
+          <a:lstStyle/>
+          <a:p>
+            <a:fld id="{A4BAB868-1E00-44C6-B1AB-DFCC5F9865BA}" type="slidenum">
+              <a:rPr lang="ja-JP" altLang="en-US" smtClean="0"/>
+              <a:pPr/>
+              <a:t>12</a:t>
+            </a:fld>
+            <a:endParaRPr lang="en-US" altLang="ja-JP" dirty="0"/>
+          </a:p>
+        </p:txBody>
+      </p:sp>
+    </p:spTree>
+    <p:extLst>
+      <p:ext uri="{BB962C8B-B14F-4D97-AF65-F5344CB8AC3E}">
+        <p14:creationId xmlns:p14="http://schemas.microsoft.com/office/powerpoint/2010/main" val="395311522"/>
+      </p:ext>
+    </p:extLst>
+  </p:cSld>
+  <p:clrMapOvr>
+    <a:masterClrMapping/>
+  </p:clrMapOvr>
+  <p:transition>
+    <p:dissolve/>
+  </p:transition>
+</p:sld>
+</file>
+
+<file path=ppt/slides/slide13.xml><?xml version="1.0" encoding="utf-8"?>
+<p:sld xmlns:a="http://schemas.openxmlformats.org/drawingml/2006/main" xmlns:r="http://schemas.openxmlformats.org/officeDocument/2006/relationships" xmlns:p="http://schemas.openxmlformats.org/presentationml/2006/main">
+  <p:cSld>
+    <p:spTree>
+      <p:nvGrpSpPr>
+        <p:cNvPr id="1" name=""/>
+        <p:cNvGrpSpPr/>
+        <p:nvPr/>
+      </p:nvGrpSpPr>
+      <p:grpSpPr>
+        <a:xfrm>
+          <a:off x="0" y="0"/>
+          <a:ext cx="0" cy="0"/>
+          <a:chOff x="0" y="0"/>
+          <a:chExt cx="0" cy="0"/>
+        </a:xfrm>
+      </p:grpSpPr>
+      <p:sp>
+        <p:nvSpPr>
+          <p:cNvPr id="2" name="Title 1">
+            <a:extLst>
+              <a:ext uri="{FF2B5EF4-FFF2-40B4-BE49-F238E27FC236}">
                 <a16:creationId xmlns:a16="http://schemas.microsoft.com/office/drawing/2014/main" id="{D6B34C92-3919-48E4-9245-580696DFB2E4}"/>
               </a:ext>
             </a:extLst>
@@ -4671,39 +4897,18 @@
           <a:lstStyle/>
           <a:p>
             <a:r>
-              <a:rPr lang="en-US"/>
-              <a:t>SENG697 (Fall 2007)</a:t>
-            </a:r>
-            <a:endParaRPr lang="en-US" altLang="ja-JP"/>
-          </a:p>
-        </p:txBody>
-      </p:sp>
-      <p:sp>
-        <p:nvSpPr>
-          <p:cNvPr id="5" name="Footer Placeholder 4">
-            <a:extLst>
-              <a:ext uri="{FF2B5EF4-FFF2-40B4-BE49-F238E27FC236}">
-                <a16:creationId xmlns:a16="http://schemas.microsoft.com/office/drawing/2014/main" id="{83D5D197-11C8-4973-8F6B-D7AF01BED68D}"/>
-              </a:ext>
-            </a:extLst>
-          </p:cNvPr>
-          <p:cNvSpPr>
-            <a:spLocks noGrp="1"/>
-          </p:cNvSpPr>
-          <p:nvPr>
-            <p:ph type="ftr" sz="quarter" idx="11"/>
-          </p:nvPr>
-        </p:nvSpPr>
-        <p:spPr/>
-        <p:txBody>
-          <a:bodyPr/>
-          <a:lstStyle/>
-          <a:p>
-            <a:r>
-              <a:rPr lang="ja-JP" altLang="en-US"/>
-              <a:t>far@ucalgary.ca</a:t>
-            </a:r>
-            <a:endParaRPr lang="en-US" altLang="ja-JP"/>
+              <a:rPr lang="en-US" dirty="0" smtClean="0"/>
+              <a:t>SENG696 </a:t>
+            </a:r>
+            <a:r>
+              <a:rPr lang="en-US" dirty="0"/>
+              <a:t>(Fall </a:t>
+            </a:r>
+            <a:r>
+              <a:rPr lang="en-US" dirty="0" smtClean="0"/>
+              <a:t>2021)</a:t>
+            </a:r>
+            <a:endParaRPr lang="en-US" altLang="ja-JP" dirty="0"/>
           </a:p>
         </p:txBody>
       </p:sp>
@@ -4731,7 +4936,7 @@
             <a:fld id="{A4BAB868-1E00-44C6-B1AB-DFCC5F9865BA}" type="slidenum">
               <a:rPr lang="ja-JP" altLang="en-US" smtClean="0"/>
               <a:pPr/>
-              <a:t>12</a:t>
+              <a:t>13</a:t>
             </a:fld>
             <a:endParaRPr lang="en-US" altLang="ja-JP"/>
           </a:p>
@@ -4783,7 +4988,7 @@
 </p:sld>
 </file>
 
-<file path=ppt/slides/slide13.xml><?xml version="1.0" encoding="utf-8"?>
+<file path=ppt/slides/slide14.xml><?xml version="1.0" encoding="utf-8"?>
 <p:sld xmlns:a="http://schemas.openxmlformats.org/drawingml/2006/main" xmlns:r="http://schemas.openxmlformats.org/officeDocument/2006/relationships" xmlns:p="http://schemas.openxmlformats.org/presentationml/2006/main">
   <p:cSld>
     <p:spTree>
@@ -5530,39 +5735,18 @@
           <a:lstStyle/>
           <a:p>
             <a:r>
-              <a:rPr lang="en-US"/>
-              <a:t>SENG697 (Fall 2007)</a:t>
-            </a:r>
-            <a:endParaRPr lang="en-US" altLang="ja-JP"/>
-          </a:p>
-        </p:txBody>
-      </p:sp>
-      <p:sp>
-        <p:nvSpPr>
-          <p:cNvPr id="5" name="Footer Placeholder 4">
-            <a:extLst>
-              <a:ext uri="{FF2B5EF4-FFF2-40B4-BE49-F238E27FC236}">
-                <a16:creationId xmlns:a16="http://schemas.microsoft.com/office/drawing/2014/main" id="{6F6B95EF-279E-4E16-A76F-649CC08B08CB}"/>
-              </a:ext>
-            </a:extLst>
-          </p:cNvPr>
-          <p:cNvSpPr>
-            <a:spLocks noGrp="1"/>
-          </p:cNvSpPr>
-          <p:nvPr>
-            <p:ph type="ftr" sz="quarter" idx="11"/>
-          </p:nvPr>
-        </p:nvSpPr>
-        <p:spPr/>
-        <p:txBody>
-          <a:bodyPr/>
-          <a:lstStyle/>
-          <a:p>
-            <a:r>
-              <a:rPr lang="ja-JP" altLang="en-US"/>
-              <a:t>far@ucalgary.ca</a:t>
-            </a:r>
-            <a:endParaRPr lang="en-US" altLang="ja-JP"/>
+              <a:rPr lang="en-US" dirty="0" smtClean="0"/>
+              <a:t>SENG696 </a:t>
+            </a:r>
+            <a:r>
+              <a:rPr lang="en-US" dirty="0"/>
+              <a:t>(Fall </a:t>
+            </a:r>
+            <a:r>
+              <a:rPr lang="en-US" dirty="0" smtClean="0"/>
+              <a:t>2021)</a:t>
+            </a:r>
+            <a:endParaRPr lang="en-US" altLang="ja-JP" dirty="0"/>
           </a:p>
         </p:txBody>
       </p:sp>
@@ -5590,7 +5774,7 @@
             <a:fld id="{A4BAB868-1E00-44C6-B1AB-DFCC5F9865BA}" type="slidenum">
               <a:rPr lang="ja-JP" altLang="en-US" smtClean="0"/>
               <a:pPr/>
-              <a:t>13</a:t>
+              <a:t>14</a:t>
             </a:fld>
             <a:endParaRPr lang="en-US" altLang="ja-JP"/>
           </a:p>
@@ -5681,7 +5865,7 @@
 </p:sld>
 </file>
 
-<file path=ppt/slides/slide14.xml><?xml version="1.0" encoding="utf-8"?>
+<file path=ppt/slides/slide15.xml><?xml version="1.0" encoding="utf-8"?>
 <p:sld xmlns:a="http://schemas.openxmlformats.org/drawingml/2006/main" xmlns:r="http://schemas.openxmlformats.org/officeDocument/2006/relationships" xmlns:p="http://schemas.openxmlformats.org/presentationml/2006/main">
   <p:cSld>
     <p:spTree>
@@ -5748,39 +5932,18 @@
           <a:lstStyle/>
           <a:p>
             <a:r>
-              <a:rPr lang="en-US"/>
-              <a:t>SENG697 (Fall 2007)</a:t>
-            </a:r>
-            <a:endParaRPr lang="en-US" altLang="ja-JP"/>
-          </a:p>
-        </p:txBody>
-      </p:sp>
-      <p:sp>
-        <p:nvSpPr>
-          <p:cNvPr id="5" name="Footer Placeholder 4">
-            <a:extLst>
-              <a:ext uri="{FF2B5EF4-FFF2-40B4-BE49-F238E27FC236}">
-                <a16:creationId xmlns:a16="http://schemas.microsoft.com/office/drawing/2014/main" id="{12DBA186-B9C1-4890-8088-91889D328408}"/>
-              </a:ext>
-            </a:extLst>
-          </p:cNvPr>
-          <p:cNvSpPr>
-            <a:spLocks noGrp="1"/>
-          </p:cNvSpPr>
-          <p:nvPr>
-            <p:ph type="ftr" sz="quarter" idx="11"/>
-          </p:nvPr>
-        </p:nvSpPr>
-        <p:spPr/>
-        <p:txBody>
-          <a:bodyPr/>
-          <a:lstStyle/>
-          <a:p>
-            <a:r>
-              <a:rPr lang="ja-JP" altLang="en-US"/>
-              <a:t>far@ucalgary.ca</a:t>
-            </a:r>
-            <a:endParaRPr lang="en-US" altLang="ja-JP"/>
+              <a:rPr lang="en-US" dirty="0" smtClean="0"/>
+              <a:t>SENG696 </a:t>
+            </a:r>
+            <a:r>
+              <a:rPr lang="en-US" dirty="0"/>
+              <a:t>(Fall </a:t>
+            </a:r>
+            <a:r>
+              <a:rPr lang="en-US" dirty="0" smtClean="0"/>
+              <a:t>2021)</a:t>
+            </a:r>
+            <a:endParaRPr lang="en-US" altLang="ja-JP" dirty="0"/>
           </a:p>
         </p:txBody>
       </p:sp>
@@ -5808,7 +5971,7 @@
             <a:fld id="{A4BAB868-1E00-44C6-B1AB-DFCC5F9865BA}" type="slidenum">
               <a:rPr lang="ja-JP" altLang="en-US" smtClean="0"/>
               <a:pPr/>
-              <a:t>14</a:t>
+              <a:t>15</a:t>
             </a:fld>
             <a:endParaRPr lang="en-US" altLang="ja-JP"/>
           </a:p>
@@ -6145,7 +6308,12 @@
             <p:ph type="dt" sz="half" idx="10"/>
           </p:nvPr>
         </p:nvSpPr>
-        <p:spPr/>
+        <p:spPr>
+          <a:xfrm>
+            <a:off x="888275" y="6457950"/>
+            <a:ext cx="2540000" cy="400050"/>
+          </a:xfrm>
+        </p:spPr>
         <p:txBody>
           <a:bodyPr/>
           <a:lstStyle/>
@@ -6465,39 +6633,18 @@
           <a:lstStyle/>
           <a:p>
             <a:r>
-              <a:rPr lang="en-US"/>
-              <a:t>SENG697 (Fall 2007)</a:t>
-            </a:r>
-            <a:endParaRPr lang="en-US" altLang="ja-JP"/>
-          </a:p>
-        </p:txBody>
-      </p:sp>
-      <p:sp>
-        <p:nvSpPr>
-          <p:cNvPr id="5" name="Footer Placeholder 4">
-            <a:extLst>
-              <a:ext uri="{FF2B5EF4-FFF2-40B4-BE49-F238E27FC236}">
-                <a16:creationId xmlns:a16="http://schemas.microsoft.com/office/drawing/2014/main" id="{A682DE8B-2FA9-4A99-82E8-43115EDFE4C3}"/>
-              </a:ext>
-            </a:extLst>
-          </p:cNvPr>
-          <p:cNvSpPr>
-            <a:spLocks noGrp="1"/>
-          </p:cNvSpPr>
-          <p:nvPr>
-            <p:ph type="ftr" sz="quarter" idx="11"/>
-          </p:nvPr>
-        </p:nvSpPr>
-        <p:spPr/>
-        <p:txBody>
-          <a:bodyPr/>
-          <a:lstStyle/>
-          <a:p>
-            <a:r>
-              <a:rPr lang="ja-JP" altLang="en-US"/>
-              <a:t>far@ucalgary.ca</a:t>
-            </a:r>
-            <a:endParaRPr lang="en-US" altLang="ja-JP"/>
+              <a:rPr lang="en-US" dirty="0" smtClean="0"/>
+              <a:t>SENG696 </a:t>
+            </a:r>
+            <a:r>
+              <a:rPr lang="en-US" dirty="0"/>
+              <a:t>(Fall </a:t>
+            </a:r>
+            <a:r>
+              <a:rPr lang="en-US" dirty="0" smtClean="0"/>
+              <a:t>2021)</a:t>
+            </a:r>
+            <a:endParaRPr lang="en-US" altLang="ja-JP" dirty="0"/>
           </a:p>
         </p:txBody>
       </p:sp>
@@ -6689,39 +6836,18 @@
           <a:lstStyle/>
           <a:p>
             <a:r>
-              <a:rPr lang="en-US"/>
-              <a:t>SENG697 (Fall 2007)</a:t>
-            </a:r>
-            <a:endParaRPr lang="en-US" altLang="ja-JP"/>
-          </a:p>
-        </p:txBody>
-      </p:sp>
-      <p:sp>
-        <p:nvSpPr>
-          <p:cNvPr id="5" name="Footer Placeholder 4">
-            <a:extLst>
-              <a:ext uri="{FF2B5EF4-FFF2-40B4-BE49-F238E27FC236}">
-                <a16:creationId xmlns:a16="http://schemas.microsoft.com/office/drawing/2014/main" id="{2A1626FC-42F2-45F3-9435-6BF913541F40}"/>
-              </a:ext>
-            </a:extLst>
-          </p:cNvPr>
-          <p:cNvSpPr>
-            <a:spLocks noGrp="1"/>
-          </p:cNvSpPr>
-          <p:nvPr>
-            <p:ph type="ftr" sz="quarter" idx="11"/>
-          </p:nvPr>
-        </p:nvSpPr>
-        <p:spPr/>
-        <p:txBody>
-          <a:bodyPr/>
-          <a:lstStyle/>
-          <a:p>
-            <a:r>
-              <a:rPr lang="ja-JP" altLang="en-US"/>
-              <a:t>far@ucalgary.ca</a:t>
-            </a:r>
-            <a:endParaRPr lang="en-US" altLang="ja-JP"/>
+              <a:rPr lang="en-US" dirty="0" smtClean="0"/>
+              <a:t>SENG696 </a:t>
+            </a:r>
+            <a:r>
+              <a:rPr lang="en-US" dirty="0"/>
+              <a:t>(Fall </a:t>
+            </a:r>
+            <a:r>
+              <a:rPr lang="en-US" dirty="0" smtClean="0"/>
+              <a:t>2021)</a:t>
+            </a:r>
+            <a:endParaRPr lang="en-US" altLang="ja-JP" dirty="0"/>
           </a:p>
         </p:txBody>
       </p:sp>
@@ -6977,39 +7103,18 @@
           <a:lstStyle/>
           <a:p>
             <a:r>
-              <a:rPr lang="en-US"/>
-              <a:t>SENG697 (Fall 2007)</a:t>
-            </a:r>
-            <a:endParaRPr lang="en-US" altLang="ja-JP"/>
-          </a:p>
-        </p:txBody>
-      </p:sp>
-      <p:sp>
-        <p:nvSpPr>
-          <p:cNvPr id="5" name="Footer Placeholder 4">
-            <a:extLst>
-              <a:ext uri="{FF2B5EF4-FFF2-40B4-BE49-F238E27FC236}">
-                <a16:creationId xmlns:a16="http://schemas.microsoft.com/office/drawing/2014/main" id="{32DE061E-FF76-45A3-9443-976C82D5186F}"/>
-              </a:ext>
-            </a:extLst>
-          </p:cNvPr>
-          <p:cNvSpPr>
-            <a:spLocks noGrp="1"/>
-          </p:cNvSpPr>
-          <p:nvPr>
-            <p:ph type="ftr" sz="quarter" idx="11"/>
-          </p:nvPr>
-        </p:nvSpPr>
-        <p:spPr/>
-        <p:txBody>
-          <a:bodyPr/>
-          <a:lstStyle/>
-          <a:p>
-            <a:r>
-              <a:rPr lang="ja-JP" altLang="en-US"/>
-              <a:t>far@ucalgary.ca</a:t>
-            </a:r>
-            <a:endParaRPr lang="en-US" altLang="ja-JP"/>
+              <a:rPr lang="en-US" dirty="0" smtClean="0"/>
+              <a:t>SENG696 </a:t>
+            </a:r>
+            <a:r>
+              <a:rPr lang="en-US" dirty="0"/>
+              <a:t>(Fall </a:t>
+            </a:r>
+            <a:r>
+              <a:rPr lang="en-US" dirty="0" smtClean="0"/>
+              <a:t>2021)</a:t>
+            </a:r>
+            <a:endParaRPr lang="en-US" altLang="ja-JP" dirty="0"/>
           </a:p>
         </p:txBody>
       </p:sp>
@@ -7366,39 +7471,18 @@
           <a:lstStyle/>
           <a:p>
             <a:r>
-              <a:rPr lang="en-US"/>
-              <a:t>SENG697 (Fall 2007)</a:t>
-            </a:r>
-            <a:endParaRPr lang="en-US" altLang="ja-JP"/>
-          </a:p>
-        </p:txBody>
-      </p:sp>
-      <p:sp>
-        <p:nvSpPr>
-          <p:cNvPr id="5" name="Footer Placeholder 4">
-            <a:extLst>
-              <a:ext uri="{FF2B5EF4-FFF2-40B4-BE49-F238E27FC236}">
-                <a16:creationId xmlns:a16="http://schemas.microsoft.com/office/drawing/2014/main" id="{1C26CB11-AD2B-494F-AE28-0EB843999953}"/>
-              </a:ext>
-            </a:extLst>
-          </p:cNvPr>
-          <p:cNvSpPr>
-            <a:spLocks noGrp="1"/>
-          </p:cNvSpPr>
-          <p:nvPr>
-            <p:ph type="ftr" sz="quarter" idx="11"/>
-          </p:nvPr>
-        </p:nvSpPr>
-        <p:spPr/>
-        <p:txBody>
-          <a:bodyPr/>
-          <a:lstStyle/>
-          <a:p>
-            <a:r>
-              <a:rPr lang="ja-JP" altLang="en-US"/>
-              <a:t>far@ucalgary.ca</a:t>
-            </a:r>
-            <a:endParaRPr lang="en-US" altLang="ja-JP"/>
+              <a:rPr lang="en-US" dirty="0" smtClean="0"/>
+              <a:t>SENG696 </a:t>
+            </a:r>
+            <a:r>
+              <a:rPr lang="en-US" dirty="0"/>
+              <a:t>(Fall </a:t>
+            </a:r>
+            <a:r>
+              <a:rPr lang="en-US" dirty="0" smtClean="0"/>
+              <a:t>2021)</a:t>
+            </a:r>
+            <a:endParaRPr lang="en-US" altLang="ja-JP" dirty="0"/>
           </a:p>
         </p:txBody>
       </p:sp>
@@ -7724,39 +7808,18 @@
           <a:lstStyle/>
           <a:p>
             <a:r>
-              <a:rPr lang="en-US"/>
-              <a:t>SENG697 (Fall 2007)</a:t>
-            </a:r>
-            <a:endParaRPr lang="en-US" altLang="ja-JP"/>
-          </a:p>
-        </p:txBody>
-      </p:sp>
-      <p:sp>
-        <p:nvSpPr>
-          <p:cNvPr id="5" name="Footer Placeholder 4">
-            <a:extLst>
-              <a:ext uri="{FF2B5EF4-FFF2-40B4-BE49-F238E27FC236}">
-                <a16:creationId xmlns:a16="http://schemas.microsoft.com/office/drawing/2014/main" id="{70072A60-0CEC-467D-951D-75AA39403701}"/>
-              </a:ext>
-            </a:extLst>
-          </p:cNvPr>
-          <p:cNvSpPr>
-            <a:spLocks noGrp="1"/>
-          </p:cNvSpPr>
-          <p:nvPr>
-            <p:ph type="ftr" sz="quarter" idx="11"/>
-          </p:nvPr>
-        </p:nvSpPr>
-        <p:spPr/>
-        <p:txBody>
-          <a:bodyPr/>
-          <a:lstStyle/>
-          <a:p>
-            <a:r>
-              <a:rPr lang="ja-JP" altLang="en-US"/>
-              <a:t>far@ucalgary.ca</a:t>
-            </a:r>
-            <a:endParaRPr lang="en-US" altLang="ja-JP"/>
+              <a:rPr lang="en-US" dirty="0" smtClean="0"/>
+              <a:t>SENG696 </a:t>
+            </a:r>
+            <a:r>
+              <a:rPr lang="en-US" dirty="0"/>
+              <a:t>(Fall </a:t>
+            </a:r>
+            <a:r>
+              <a:rPr lang="en-US" dirty="0" smtClean="0"/>
+              <a:t>2021)</a:t>
+            </a:r>
+            <a:endParaRPr lang="en-US" altLang="ja-JP" dirty="0"/>
           </a:p>
         </p:txBody>
       </p:sp>
@@ -8025,39 +8088,18 @@
           <a:lstStyle/>
           <a:p>
             <a:r>
-              <a:rPr lang="en-US"/>
-              <a:t>SENG697 (Fall 2007)</a:t>
-            </a:r>
-            <a:endParaRPr lang="en-US" altLang="ja-JP"/>
-          </a:p>
-        </p:txBody>
-      </p:sp>
-      <p:sp>
-        <p:nvSpPr>
-          <p:cNvPr id="5" name="Footer Placeholder 4">
-            <a:extLst>
-              <a:ext uri="{FF2B5EF4-FFF2-40B4-BE49-F238E27FC236}">
-                <a16:creationId xmlns:a16="http://schemas.microsoft.com/office/drawing/2014/main" id="{78CB4FAA-360F-4618-BB8B-D5C2C3464190}"/>
-              </a:ext>
-            </a:extLst>
-          </p:cNvPr>
-          <p:cNvSpPr>
-            <a:spLocks noGrp="1"/>
-          </p:cNvSpPr>
-          <p:nvPr>
-            <p:ph type="ftr" sz="quarter" idx="11"/>
-          </p:nvPr>
-        </p:nvSpPr>
-        <p:spPr/>
-        <p:txBody>
-          <a:bodyPr/>
-          <a:lstStyle/>
-          <a:p>
-            <a:r>
-              <a:rPr lang="ja-JP" altLang="en-US"/>
-              <a:t>far@ucalgary.ca</a:t>
-            </a:r>
-            <a:endParaRPr lang="en-US" altLang="ja-JP"/>
+              <a:rPr lang="en-US" dirty="0" smtClean="0"/>
+              <a:t>SENG696 </a:t>
+            </a:r>
+            <a:r>
+              <a:rPr lang="en-US" dirty="0"/>
+              <a:t>(Fall </a:t>
+            </a:r>
+            <a:r>
+              <a:rPr lang="en-US" dirty="0" smtClean="0"/>
+              <a:t>2021)</a:t>
+            </a:r>
+            <a:endParaRPr lang="en-US" altLang="ja-JP" dirty="0"/>
           </a:p>
         </p:txBody>
       </p:sp>
@@ -8977,18 +9019,18 @@
 </file>
 
 <file path=customXml/item2.xml><?xml version="1.0" encoding="utf-8"?>
+<p:properties xmlns:p="http://schemas.microsoft.com/office/2006/metadata/properties" xmlns:xsi="http://www.w3.org/2001/XMLSchema-instance" xmlns:pc="http://schemas.microsoft.com/office/infopath/2007/PartnerControls">
+  <documentManagement/>
+</p:properties>
+</file>
+
+<file path=customXml/item3.xml><?xml version="1.0" encoding="utf-8"?>
 <?mso-contentType ?>
 <FormTemplates xmlns="http://schemas.microsoft.com/sharepoint/v3/contenttype/forms">
   <Display>DocumentLibraryForm</Display>
   <Edit>DocumentLibraryForm</Edit>
   <New>DocumentLibraryForm</New>
 </FormTemplates>
-</file>
-
-<file path=customXml/item3.xml><?xml version="1.0" encoding="utf-8"?>
-<p:properties xmlns:p="http://schemas.microsoft.com/office/2006/metadata/properties" xmlns:xsi="http://www.w3.org/2001/XMLSchema-instance" xmlns:pc="http://schemas.microsoft.com/office/infopath/2007/PartnerControls">
-  <documentManagement/>
-</p:properties>
 </file>
 
 <file path=customXml/itemProps1.xml><?xml version="1.0" encoding="utf-8"?>
@@ -9011,14 +9053,6 @@
 </file>
 
 <file path=customXml/itemProps2.xml><?xml version="1.0" encoding="utf-8"?>
-<ds:datastoreItem xmlns:ds="http://schemas.openxmlformats.org/officeDocument/2006/customXml" ds:itemID="{66358C42-DD22-4F23-85C0-029A1B03C7F8}">
-  <ds:schemaRefs>
-    <ds:schemaRef ds:uri="http://schemas.microsoft.com/sharepoint/v3/contenttype/forms"/>
-  </ds:schemaRefs>
-</ds:datastoreItem>
-</file>
-
-<file path=customXml/itemProps3.xml><?xml version="1.0" encoding="utf-8"?>
 <ds:datastoreItem xmlns:ds="http://schemas.openxmlformats.org/officeDocument/2006/customXml" ds:itemID="{B84EF1B3-7571-4E02-A7DC-7272CEC15FB7}">
   <ds:schemaRefs>
     <ds:schemaRef ds:uri="http://schemas.microsoft.com/office/infopath/2007/PartnerControls"/>
@@ -9033,4 +9067,12 @@
     <ds:schemaRef ds:uri="http://www.w3.org/XML/1998/namespace"/>
   </ds:schemaRefs>
 </ds:datastoreItem>
+</file>
+
+<file path=customXml/itemProps3.xml><?xml version="1.0" encoding="utf-8"?>
+<ds:datastoreItem xmlns:ds="http://schemas.openxmlformats.org/officeDocument/2006/customXml" ds:itemID="{66358C42-DD22-4F23-85C0-029A1B03C7F8}">
+  <ds:schemaRefs>
+    <ds:schemaRef ds:uri="http://schemas.microsoft.com/sharepoint/v3/contenttype/forms"/>
+  </ds:schemaRefs>
+</ds:datastoreItem>
 </file>
</xml_diff>

<commit_message>
modified the ppt and the video link agent
</commit_message>
<xml_diff>
--- a/GroupD_ProjectPresentation.pptx
+++ b/GroupD_ProjectPresentation.pptx
@@ -1,25 +1,25 @@
 
 <file path=ppt/presentation.xml><?xml version="1.0" encoding="utf-8"?>
-<p:presentation xmlns:a="http://schemas.openxmlformats.org/drawingml/2006/main" xmlns:r="http://schemas.openxmlformats.org/officeDocument/2006/relationships" xmlns:p="http://schemas.openxmlformats.org/presentationml/2006/main" saveSubsetFonts="1">
+<p:presentation xmlns:a="http://schemas.openxmlformats.org/drawingml/2006/main" xmlns:r="http://schemas.openxmlformats.org/officeDocument/2006/relationships" xmlns:p="http://schemas.openxmlformats.org/presentationml/2006/main">
   <p:sldMasterIdLst>
-    <p:sldMasterId id="2147483660" r:id="rId4"/>
+    <p:sldMasterId id="2147483648" r:id="rId1"/>
   </p:sldMasterIdLst>
   <p:sldIdLst>
-    <p:sldId id="257" r:id="rId5"/>
-    <p:sldId id="258" r:id="rId6"/>
-    <p:sldId id="259" r:id="rId7"/>
-    <p:sldId id="261" r:id="rId8"/>
-    <p:sldId id="262" r:id="rId9"/>
-    <p:sldId id="264" r:id="rId10"/>
-    <p:sldId id="265" r:id="rId11"/>
-    <p:sldId id="269" r:id="rId12"/>
-    <p:sldId id="270" r:id="rId13"/>
-    <p:sldId id="260" r:id="rId14"/>
-    <p:sldId id="263" r:id="rId15"/>
-    <p:sldId id="271" r:id="rId16"/>
-    <p:sldId id="266" r:id="rId17"/>
-    <p:sldId id="267" r:id="rId18"/>
-    <p:sldId id="268" r:id="rId19"/>
+    <p:sldId id="257" r:id="rId3"/>
+    <p:sldId id="258" r:id="rId4"/>
+    <p:sldId id="259" r:id="rId5"/>
+    <p:sldId id="261" r:id="rId6"/>
+    <p:sldId id="262" r:id="rId7"/>
+    <p:sldId id="264" r:id="rId8"/>
+    <p:sldId id="265" r:id="rId9"/>
+    <p:sldId id="269" r:id="rId10"/>
+    <p:sldId id="270" r:id="rId11"/>
+    <p:sldId id="260" r:id="rId12"/>
+    <p:sldId id="263" r:id="rId13"/>
+    <p:sldId id="271" r:id="rId14"/>
+    <p:sldId id="266" r:id="rId15"/>
+    <p:sldId id="267" r:id="rId16"/>
+    <p:sldId id="268" r:id="rId17"/>
   </p:sldIdLst>
   <p:sldSz cx="12192000" cy="6858000"/>
   <p:notesSz cx="6858000" cy="9144000"/>
@@ -118,76 +118,11 @@
       </a:defRPr>
     </a:lvl9pPr>
   </p:defaultTextStyle>
-  <p:extLst>
-    <p:ext uri="{EFAFB233-063F-42B5-8137-9DF3F51BA10A}">
-      <p15:sldGuideLst xmlns:p15="http://schemas.microsoft.com/office/powerpoint/2012/main"/>
-    </p:ext>
-  </p:extLst>
 </p:presentation>
 </file>
 
-<file path=ppt/changesInfos/changesInfo1.xml><?xml version="1.0" encoding="utf-8"?>
-<pc:chgInfo xmlns:a="http://schemas.openxmlformats.org/drawingml/2006/main" xmlns:r="http://schemas.openxmlformats.org/officeDocument/2006/relationships" xmlns:ac="http://schemas.microsoft.com/office/drawing/2013/main/command" xmlns:pc="http://schemas.microsoft.com/office/powerpoint/2013/main/command">
-  <pc:docChgLst>
-    <pc:chgData name="Sampreet Vaidya" userId="8006a4da2089a8b4" providerId="LiveId" clId="{4D2302AB-89EE-424C-B325-F40F5C494C8E}"/>
-    <pc:docChg chg="undo custSel addSld modSld">
-      <pc:chgData name="Sampreet Vaidya" userId="8006a4da2089a8b4" providerId="LiveId" clId="{4D2302AB-89EE-424C-B325-F40F5C494C8E}" dt="2021-10-23T04:13:52.787" v="89" actId="12"/>
-      <pc:docMkLst>
-        <pc:docMk/>
-      </pc:docMkLst>
-      <pc:sldChg chg="modSp new mod">
-        <pc:chgData name="Sampreet Vaidya" userId="8006a4da2089a8b4" providerId="LiveId" clId="{4D2302AB-89EE-424C-B325-F40F5C494C8E}" dt="2021-10-23T04:11:31.734" v="53" actId="20577"/>
-        <pc:sldMkLst>
-          <pc:docMk/>
-          <pc:sldMk cId="89349740" sldId="269"/>
-        </pc:sldMkLst>
-        <pc:spChg chg="mod">
-          <ac:chgData name="Sampreet Vaidya" userId="8006a4da2089a8b4" providerId="LiveId" clId="{4D2302AB-89EE-424C-B325-F40F5C494C8E}" dt="2021-10-23T04:09:29.615" v="22" actId="20577"/>
-          <ac:spMkLst>
-            <pc:docMk/>
-            <pc:sldMk cId="89349740" sldId="269"/>
-            <ac:spMk id="2" creationId="{634D368D-2965-437B-96BF-B4396F3F5A09}"/>
-          </ac:spMkLst>
-        </pc:spChg>
-        <pc:spChg chg="mod">
-          <ac:chgData name="Sampreet Vaidya" userId="8006a4da2089a8b4" providerId="LiveId" clId="{4D2302AB-89EE-424C-B325-F40F5C494C8E}" dt="2021-10-23T04:11:31.734" v="53" actId="20577"/>
-          <ac:spMkLst>
-            <pc:docMk/>
-            <pc:sldMk cId="89349740" sldId="269"/>
-            <ac:spMk id="3" creationId="{61675DF3-05BC-424C-B391-CB7B68B04456}"/>
-          </ac:spMkLst>
-        </pc:spChg>
-      </pc:sldChg>
-      <pc:sldChg chg="modSp new mod">
-        <pc:chgData name="Sampreet Vaidya" userId="8006a4da2089a8b4" providerId="LiveId" clId="{4D2302AB-89EE-424C-B325-F40F5C494C8E}" dt="2021-10-23T04:13:52.787" v="89" actId="12"/>
-        <pc:sldMkLst>
-          <pc:docMk/>
-          <pc:sldMk cId="1590150963" sldId="270"/>
-        </pc:sldMkLst>
-        <pc:spChg chg="mod">
-          <ac:chgData name="Sampreet Vaidya" userId="8006a4da2089a8b4" providerId="LiveId" clId="{4D2302AB-89EE-424C-B325-F40F5C494C8E}" dt="2021-10-23T04:10:48.453" v="26"/>
-          <ac:spMkLst>
-            <pc:docMk/>
-            <pc:sldMk cId="1590150963" sldId="270"/>
-            <ac:spMk id="2" creationId="{BC19915F-4B57-4C66-B739-FC877E4166FA}"/>
-          </ac:spMkLst>
-        </pc:spChg>
-        <pc:spChg chg="mod">
-          <ac:chgData name="Sampreet Vaidya" userId="8006a4da2089a8b4" providerId="LiveId" clId="{4D2302AB-89EE-424C-B325-F40F5C494C8E}" dt="2021-10-23T04:13:52.787" v="89" actId="12"/>
-          <ac:spMkLst>
-            <pc:docMk/>
-            <pc:sldMk cId="1590150963" sldId="270"/>
-            <ac:spMk id="3" creationId="{BC5C524F-0E47-4B10-830C-F3106CA3E329}"/>
-          </ac:spMkLst>
-        </pc:spChg>
-      </pc:sldChg>
-    </pc:docChg>
-  </pc:docChgLst>
-</pc:chgInfo>
-</file>
-
 <file path=ppt/slideLayouts/slideLayout1.xml><?xml version="1.0" encoding="utf-8"?>
-<p:sldLayout xmlns:a="http://schemas.openxmlformats.org/drawingml/2006/main" xmlns:r="http://schemas.openxmlformats.org/officeDocument/2006/relationships" xmlns:p="http://schemas.openxmlformats.org/presentationml/2006/main" showMasterSp="0" type="title" preserve="1">
+<p:sldLayout xmlns:a="http://schemas.openxmlformats.org/drawingml/2006/main" xmlns:r="http://schemas.openxmlformats.org/officeDocument/2006/relationships" xmlns:p="http://schemas.openxmlformats.org/presentationml/2006/main" type="title" preserve="1" showMasterSp="0">
   <p:cSld name="Title Slide">
     <p:spTree>
       <p:nvGrpSpPr>
@@ -392,8 +327,6 @@
           <a:p>
             <a:fld id="{95232F20-8D4C-4FF7-ADC1-A97AC17BD314}" type="slidenum">
               <a:rPr lang="ja-JP" altLang="en-US"/>
-              <a:pPr/>
-              <a:t>‹#›</a:t>
             </a:fld>
             <a:endParaRPr lang="en-US" altLang="ja-JP"/>
           </a:p>
@@ -419,7 +352,7 @@
           <a:bodyPr/>
           <a:lstStyle>
             <a:lvl1pPr marL="0" indent="0" algn="ctr">
-              <a:buFont typeface="Wingdings" pitchFamily="2" charset="2"/>
+              <a:buFont typeface="Wingdings" panose="05000000000000000000" pitchFamily="2" charset="2"/>
               <a:buNone/>
               <a:defRPr/>
             </a:lvl1pPr>
@@ -429,6 +362,7 @@
               <a:rPr lang="en-US" altLang="ja-JP"/>
               <a:t>Click to edit Master subtitle style</a:t>
             </a:r>
+            <a:endParaRPr lang="en-US" altLang="ja-JP"/>
           </a:p>
         </p:txBody>
       </p:sp>
@@ -453,8 +387,8 @@
           <a:lstStyle>
             <a:lvl1pPr>
               <a:defRPr>
-                <a:ea typeface="Arial Unicode MS" pitchFamily="50" charset="-128"/>
-                <a:cs typeface="Arial Unicode MS" pitchFamily="50" charset="-128"/>
+                <a:ea typeface="Arial Unicode MS" panose="020B0604020202020204" pitchFamily="50" charset="-128"/>
+                <a:cs typeface="Arial Unicode MS" panose="020B0604020202020204" pitchFamily="50" charset="-128"/>
               </a:defRPr>
             </a:lvl1pPr>
           </a:lstStyle>
@@ -463,15 +397,11 @@
               <a:rPr lang="en-US" altLang="ja-JP"/>
               <a:t>Click to edit Master title style</a:t>
             </a:r>
+            <a:endParaRPr lang="en-US" altLang="ja-JP"/>
           </a:p>
         </p:txBody>
       </p:sp>
     </p:spTree>
-    <p:extLst>
-      <p:ext uri="{BB962C8B-B14F-4D97-AF65-F5344CB8AC3E}">
-        <p14:creationId xmlns:p14="http://schemas.microsoft.com/office/powerpoint/2010/main" val="773648019"/>
-      </p:ext>
-    </p:extLst>
   </p:cSld>
   <p:clrMapOvr>
     <a:masterClrMapping/>
@@ -542,6 +472,7 @@
               <a:rPr lang="en-US"/>
               <a:t>Click to edit Master text styles</a:t>
             </a:r>
+            <a:endParaRPr lang="en-US"/>
           </a:p>
           <a:p>
             <a:pPr lvl="1"/>
@@ -549,6 +480,7 @@
               <a:rPr lang="en-US"/>
               <a:t>Second level</a:t>
             </a:r>
+            <a:endParaRPr lang="en-US"/>
           </a:p>
           <a:p>
             <a:pPr lvl="2"/>
@@ -556,6 +488,7 @@
               <a:rPr lang="en-US"/>
               <a:t>Third level</a:t>
             </a:r>
+            <a:endParaRPr lang="en-US"/>
           </a:p>
           <a:p>
             <a:pPr lvl="3"/>
@@ -563,6 +496,7 @@
               <a:rPr lang="en-US"/>
               <a:t>Fourth level</a:t>
             </a:r>
+            <a:endParaRPr lang="en-US"/>
           </a:p>
           <a:p>
             <a:pPr lvl="4"/>
@@ -649,19 +583,12 @@
           <a:p>
             <a:fld id="{E6B1DEAD-7992-420D-B87A-30322BA01843}" type="slidenum">
               <a:rPr lang="ja-JP" altLang="en-US"/>
-              <a:pPr/>
-              <a:t>‹#›</a:t>
             </a:fld>
             <a:endParaRPr lang="en-US" altLang="ja-JP"/>
           </a:p>
         </p:txBody>
       </p:sp>
     </p:spTree>
-    <p:extLst>
-      <p:ext uri="{BB962C8B-B14F-4D97-AF65-F5344CB8AC3E}">
-        <p14:creationId xmlns:p14="http://schemas.microsoft.com/office/powerpoint/2010/main" val="456613616"/>
-      </p:ext>
-    </p:extLst>
   </p:cSld>
   <p:clrMapOvr>
     <a:masterClrMapping/>
@@ -742,6 +669,7 @@
               <a:rPr lang="en-US"/>
               <a:t>Click to edit Master text styles</a:t>
             </a:r>
+            <a:endParaRPr lang="en-US"/>
           </a:p>
           <a:p>
             <a:pPr lvl="1"/>
@@ -749,6 +677,7 @@
               <a:rPr lang="en-US"/>
               <a:t>Second level</a:t>
             </a:r>
+            <a:endParaRPr lang="en-US"/>
           </a:p>
           <a:p>
             <a:pPr lvl="2"/>
@@ -756,6 +685,7 @@
               <a:rPr lang="en-US"/>
               <a:t>Third level</a:t>
             </a:r>
+            <a:endParaRPr lang="en-US"/>
           </a:p>
           <a:p>
             <a:pPr lvl="3"/>
@@ -763,6 +693,7 @@
               <a:rPr lang="en-US"/>
               <a:t>Fourth level</a:t>
             </a:r>
+            <a:endParaRPr lang="en-US"/>
           </a:p>
           <a:p>
             <a:pPr lvl="4"/>
@@ -849,19 +780,12 @@
           <a:p>
             <a:fld id="{04D34B5C-7F3E-425E-ADF3-038868261E82}" type="slidenum">
               <a:rPr lang="ja-JP" altLang="en-US"/>
-              <a:pPr/>
-              <a:t>‹#›</a:t>
             </a:fld>
             <a:endParaRPr lang="en-US" altLang="ja-JP"/>
           </a:p>
         </p:txBody>
       </p:sp>
     </p:spTree>
-    <p:extLst>
-      <p:ext uri="{BB962C8B-B14F-4D97-AF65-F5344CB8AC3E}">
-        <p14:creationId xmlns:p14="http://schemas.microsoft.com/office/powerpoint/2010/main" val="1316373918"/>
-      </p:ext>
-    </p:extLst>
   </p:cSld>
   <p:clrMapOvr>
     <a:masterClrMapping/>
@@ -932,6 +856,7 @@
               <a:rPr lang="en-US"/>
               <a:t>Click to edit Master text styles</a:t>
             </a:r>
+            <a:endParaRPr lang="en-US"/>
           </a:p>
           <a:p>
             <a:pPr lvl="1"/>
@@ -939,6 +864,7 @@
               <a:rPr lang="en-US"/>
               <a:t>Second level</a:t>
             </a:r>
+            <a:endParaRPr lang="en-US"/>
           </a:p>
           <a:p>
             <a:pPr lvl="2"/>
@@ -946,6 +872,7 @@
               <a:rPr lang="en-US"/>
               <a:t>Third level</a:t>
             </a:r>
+            <a:endParaRPr lang="en-US"/>
           </a:p>
           <a:p>
             <a:pPr lvl="3"/>
@@ -953,6 +880,7 @@
               <a:rPr lang="en-US"/>
               <a:t>Fourth level</a:t>
             </a:r>
+            <a:endParaRPr lang="en-US"/>
           </a:p>
           <a:p>
             <a:pPr lvl="4"/>
@@ -1039,19 +967,12 @@
           <a:p>
             <a:fld id="{A4BAB868-1E00-44C6-B1AB-DFCC5F9865BA}" type="slidenum">
               <a:rPr lang="ja-JP" altLang="en-US"/>
-              <a:pPr/>
-              <a:t>‹#›</a:t>
             </a:fld>
             <a:endParaRPr lang="en-US" altLang="ja-JP"/>
           </a:p>
         </p:txBody>
       </p:sp>
     </p:spTree>
-    <p:extLst>
-      <p:ext uri="{BB962C8B-B14F-4D97-AF65-F5344CB8AC3E}">
-        <p14:creationId xmlns:p14="http://schemas.microsoft.com/office/powerpoint/2010/main" val="1985648313"/>
-      </p:ext>
-    </p:extLst>
   </p:cSld>
   <p:clrMapOvr>
     <a:masterClrMapping/>
@@ -1173,6 +1094,7 @@
               <a:rPr lang="en-US"/>
               <a:t>Click to edit Master text styles</a:t>
             </a:r>
+            <a:endParaRPr lang="en-US"/>
           </a:p>
         </p:txBody>
       </p:sp>
@@ -1251,19 +1173,12 @@
           <a:p>
             <a:fld id="{55A9038B-FC62-430B-ABCA-52AB400C562E}" type="slidenum">
               <a:rPr lang="ja-JP" altLang="en-US"/>
-              <a:pPr/>
-              <a:t>‹#›</a:t>
             </a:fld>
             <a:endParaRPr lang="en-US" altLang="ja-JP"/>
           </a:p>
         </p:txBody>
       </p:sp>
     </p:spTree>
-    <p:extLst>
-      <p:ext uri="{BB962C8B-B14F-4D97-AF65-F5344CB8AC3E}">
-        <p14:creationId xmlns:p14="http://schemas.microsoft.com/office/powerpoint/2010/main" val="866648856"/>
-      </p:ext>
-    </p:extLst>
   </p:cSld>
   <p:clrMapOvr>
     <a:masterClrMapping/>
@@ -1367,6 +1282,7 @@
               <a:rPr lang="en-US"/>
               <a:t>Click to edit Master text styles</a:t>
             </a:r>
+            <a:endParaRPr lang="en-US"/>
           </a:p>
           <a:p>
             <a:pPr lvl="1"/>
@@ -1374,6 +1290,7 @@
               <a:rPr lang="en-US"/>
               <a:t>Second level</a:t>
             </a:r>
+            <a:endParaRPr lang="en-US"/>
           </a:p>
           <a:p>
             <a:pPr lvl="2"/>
@@ -1381,6 +1298,7 @@
               <a:rPr lang="en-US"/>
               <a:t>Third level</a:t>
             </a:r>
+            <a:endParaRPr lang="en-US"/>
           </a:p>
           <a:p>
             <a:pPr lvl="3"/>
@@ -1388,6 +1306,7 @@
               <a:rPr lang="en-US"/>
               <a:t>Fourth level</a:t>
             </a:r>
+            <a:endParaRPr lang="en-US"/>
           </a:p>
           <a:p>
             <a:pPr lvl="4"/>
@@ -1452,6 +1371,7 @@
               <a:rPr lang="en-US"/>
               <a:t>Click to edit Master text styles</a:t>
             </a:r>
+            <a:endParaRPr lang="en-US"/>
           </a:p>
           <a:p>
             <a:pPr lvl="1"/>
@@ -1459,6 +1379,7 @@
               <a:rPr lang="en-US"/>
               <a:t>Second level</a:t>
             </a:r>
+            <a:endParaRPr lang="en-US"/>
           </a:p>
           <a:p>
             <a:pPr lvl="2"/>
@@ -1466,6 +1387,7 @@
               <a:rPr lang="en-US"/>
               <a:t>Third level</a:t>
             </a:r>
+            <a:endParaRPr lang="en-US"/>
           </a:p>
           <a:p>
             <a:pPr lvl="3"/>
@@ -1473,6 +1395,7 @@
               <a:rPr lang="en-US"/>
               <a:t>Fourth level</a:t>
             </a:r>
+            <a:endParaRPr lang="en-US"/>
           </a:p>
           <a:p>
             <a:pPr lvl="4"/>
@@ -1559,19 +1482,12 @@
           <a:p>
             <a:fld id="{C6195CBF-EE0B-4DF9-B750-9D88F27AD928}" type="slidenum">
               <a:rPr lang="ja-JP" altLang="en-US"/>
-              <a:pPr/>
-              <a:t>‹#›</a:t>
             </a:fld>
             <a:endParaRPr lang="en-US" altLang="ja-JP"/>
           </a:p>
         </p:txBody>
       </p:sp>
     </p:spTree>
-    <p:extLst>
-      <p:ext uri="{BB962C8B-B14F-4D97-AF65-F5344CB8AC3E}">
-        <p14:creationId xmlns:p14="http://schemas.microsoft.com/office/powerpoint/2010/main" val="1013721742"/>
-      </p:ext>
-    </p:extLst>
   </p:cSld>
   <p:clrMapOvr>
     <a:masterClrMapping/>
@@ -1693,6 +1609,7 @@
               <a:rPr lang="en-US"/>
               <a:t>Click to edit Master text styles</a:t>
             </a:r>
+            <a:endParaRPr lang="en-US"/>
           </a:p>
         </p:txBody>
       </p:sp>
@@ -1749,6 +1666,7 @@
               <a:rPr lang="en-US"/>
               <a:t>Click to edit Master text styles</a:t>
             </a:r>
+            <a:endParaRPr lang="en-US"/>
           </a:p>
           <a:p>
             <a:pPr lvl="1"/>
@@ -1756,6 +1674,7 @@
               <a:rPr lang="en-US"/>
               <a:t>Second level</a:t>
             </a:r>
+            <a:endParaRPr lang="en-US"/>
           </a:p>
           <a:p>
             <a:pPr lvl="2"/>
@@ -1763,6 +1682,7 @@
               <a:rPr lang="en-US"/>
               <a:t>Third level</a:t>
             </a:r>
+            <a:endParaRPr lang="en-US"/>
           </a:p>
           <a:p>
             <a:pPr lvl="3"/>
@@ -1770,6 +1690,7 @@
               <a:rPr lang="en-US"/>
               <a:t>Fourth level</a:t>
             </a:r>
+            <a:endParaRPr lang="en-US"/>
           </a:p>
           <a:p>
             <a:pPr lvl="4"/>
@@ -1843,6 +1764,7 @@
               <a:rPr lang="en-US"/>
               <a:t>Click to edit Master text styles</a:t>
             </a:r>
+            <a:endParaRPr lang="en-US"/>
           </a:p>
         </p:txBody>
       </p:sp>
@@ -1899,6 +1821,7 @@
               <a:rPr lang="en-US"/>
               <a:t>Click to edit Master text styles</a:t>
             </a:r>
+            <a:endParaRPr lang="en-US"/>
           </a:p>
           <a:p>
             <a:pPr lvl="1"/>
@@ -1906,6 +1829,7 @@
               <a:rPr lang="en-US"/>
               <a:t>Second level</a:t>
             </a:r>
+            <a:endParaRPr lang="en-US"/>
           </a:p>
           <a:p>
             <a:pPr lvl="2"/>
@@ -1913,6 +1837,7 @@
               <a:rPr lang="en-US"/>
               <a:t>Third level</a:t>
             </a:r>
+            <a:endParaRPr lang="en-US"/>
           </a:p>
           <a:p>
             <a:pPr lvl="3"/>
@@ -1920,6 +1845,7 @@
               <a:rPr lang="en-US"/>
               <a:t>Fourth level</a:t>
             </a:r>
+            <a:endParaRPr lang="en-US"/>
           </a:p>
           <a:p>
             <a:pPr lvl="4"/>
@@ -2006,19 +1932,12 @@
           <a:p>
             <a:fld id="{52BBF39D-ED5C-4FEE-8FC6-1B1A39BD3660}" type="slidenum">
               <a:rPr lang="ja-JP" altLang="en-US"/>
-              <a:pPr/>
-              <a:t>‹#›</a:t>
             </a:fld>
             <a:endParaRPr lang="en-US" altLang="ja-JP"/>
           </a:p>
         </p:txBody>
       </p:sp>
     </p:spTree>
-    <p:extLst>
-      <p:ext uri="{BB962C8B-B14F-4D97-AF65-F5344CB8AC3E}">
-        <p14:creationId xmlns:p14="http://schemas.microsoft.com/office/powerpoint/2010/main" val="2818216697"/>
-      </p:ext>
-    </p:extLst>
   </p:cSld>
   <p:clrMapOvr>
     <a:masterClrMapping/>
@@ -2144,19 +2063,12 @@
           <a:p>
             <a:fld id="{37FD599C-677F-4B2D-863C-EFEC37F35933}" type="slidenum">
               <a:rPr lang="ja-JP" altLang="en-US"/>
-              <a:pPr/>
-              <a:t>‹#›</a:t>
             </a:fld>
             <a:endParaRPr lang="en-US" altLang="ja-JP"/>
           </a:p>
         </p:txBody>
       </p:sp>
     </p:spTree>
-    <p:extLst>
-      <p:ext uri="{BB962C8B-B14F-4D97-AF65-F5344CB8AC3E}">
-        <p14:creationId xmlns:p14="http://schemas.microsoft.com/office/powerpoint/2010/main" val="1412027907"/>
-      </p:ext>
-    </p:extLst>
   </p:cSld>
   <p:clrMapOvr>
     <a:masterClrMapping/>
@@ -2259,19 +2171,12 @@
           <a:p>
             <a:fld id="{672F6B94-B843-496F-BFD6-5ED1A58B620C}" type="slidenum">
               <a:rPr lang="ja-JP" altLang="en-US"/>
-              <a:pPr/>
-              <a:t>‹#›</a:t>
             </a:fld>
             <a:endParaRPr lang="en-US" altLang="ja-JP"/>
           </a:p>
         </p:txBody>
       </p:sp>
     </p:spTree>
-    <p:extLst>
-      <p:ext uri="{BB962C8B-B14F-4D97-AF65-F5344CB8AC3E}">
-        <p14:creationId xmlns:p14="http://schemas.microsoft.com/office/powerpoint/2010/main" val="157570665"/>
-      </p:ext>
-    </p:extLst>
   </p:cSld>
   <p:clrMapOvr>
     <a:masterClrMapping/>
@@ -2384,6 +2289,7 @@
               <a:rPr lang="en-US"/>
               <a:t>Click to edit Master text styles</a:t>
             </a:r>
+            <a:endParaRPr lang="en-US"/>
           </a:p>
           <a:p>
             <a:pPr lvl="1"/>
@@ -2391,6 +2297,7 @@
               <a:rPr lang="en-US"/>
               <a:t>Second level</a:t>
             </a:r>
+            <a:endParaRPr lang="en-US"/>
           </a:p>
           <a:p>
             <a:pPr lvl="2"/>
@@ -2398,6 +2305,7 @@
               <a:rPr lang="en-US"/>
               <a:t>Third level</a:t>
             </a:r>
+            <a:endParaRPr lang="en-US"/>
           </a:p>
           <a:p>
             <a:pPr lvl="3"/>
@@ -2405,6 +2313,7 @@
               <a:rPr lang="en-US"/>
               <a:t>Fourth level</a:t>
             </a:r>
+            <a:endParaRPr lang="en-US"/>
           </a:p>
           <a:p>
             <a:pPr lvl="4"/>
@@ -2478,6 +2387,7 @@
               <a:rPr lang="en-US"/>
               <a:t>Click to edit Master text styles</a:t>
             </a:r>
+            <a:endParaRPr lang="en-US"/>
           </a:p>
         </p:txBody>
       </p:sp>
@@ -2556,19 +2466,12 @@
           <a:p>
             <a:fld id="{FCB87EBA-444C-4109-96D4-2F266CF6C88F}" type="slidenum">
               <a:rPr lang="ja-JP" altLang="en-US"/>
-              <a:pPr/>
-              <a:t>‹#›</a:t>
             </a:fld>
             <a:endParaRPr lang="en-US" altLang="ja-JP"/>
           </a:p>
         </p:txBody>
       </p:sp>
     </p:spTree>
-    <p:extLst>
-      <p:ext uri="{BB962C8B-B14F-4D97-AF65-F5344CB8AC3E}">
-        <p14:creationId xmlns:p14="http://schemas.microsoft.com/office/powerpoint/2010/main" val="3756687145"/>
-      </p:ext>
-    </p:extLst>
   </p:cSld>
   <p:clrMapOvr>
     <a:masterClrMapping/>
@@ -2751,6 +2654,7 @@
               <a:rPr lang="en-US"/>
               <a:t>Click to edit Master text styles</a:t>
             </a:r>
+            <a:endParaRPr lang="en-US"/>
           </a:p>
         </p:txBody>
       </p:sp>
@@ -2829,19 +2733,12 @@
           <a:p>
             <a:fld id="{98DAC2A1-4CF9-4B24-A3D3-7DE7BAC9C17A}" type="slidenum">
               <a:rPr lang="ja-JP" altLang="en-US"/>
-              <a:pPr/>
-              <a:t>‹#›</a:t>
             </a:fld>
             <a:endParaRPr lang="en-US" altLang="ja-JP"/>
           </a:p>
         </p:txBody>
       </p:sp>
     </p:spTree>
-    <p:extLst>
-      <p:ext uri="{BB962C8B-B14F-4D97-AF65-F5344CB8AC3E}">
-        <p14:creationId xmlns:p14="http://schemas.microsoft.com/office/powerpoint/2010/main" val="1548058411"/>
-      </p:ext>
-    </p:extLst>
   </p:cSld>
   <p:clrMapOvr>
     <a:masterClrMapping/>
@@ -2886,7 +2783,7 @@
           <p:nvPr userDrawn="1"/>
         </p:nvPicPr>
         <p:blipFill>
-          <a:blip r:embed="rId13"/>
+          <a:blip r:embed="rId12"/>
           <a:srcRect/>
           <a:stretch>
             <a:fillRect/>
@@ -2912,7 +2809,7 @@
           <p:nvPr/>
         </p:nvPicPr>
         <p:blipFill>
-          <a:blip r:embed="rId14"/>
+          <a:blip r:embed="rId13"/>
           <a:srcRect/>
           <a:stretch>
             <a:fillRect/>
@@ -2986,17 +2883,11 @@
           <a:ln w="9525">
             <a:noFill/>
             <a:miter lim="800000"/>
-            <a:headEnd/>
-            <a:tailEnd/>
           </a:ln>
           <a:effectLst/>
         </p:spPr>
         <p:txBody>
-          <a:bodyPr vert="horz" wrap="square" lIns="91440" tIns="45720" rIns="91440" bIns="45720" numCol="1" anchor="t" anchorCtr="0" compatLnSpc="1">
-            <a:prstTxWarp prst="textNoShape">
-              <a:avLst/>
-            </a:prstTxWarp>
-          </a:bodyPr>
+          <a:bodyPr vert="horz" wrap="square" lIns="91440" tIns="45720" rIns="91440" bIns="45720" numCol="1" anchor="t" anchorCtr="0" compatLnSpc="1"/>
           <a:lstStyle/>
           <a:p>
             <a:pPr lvl="0"/>
@@ -3004,6 +2895,7 @@
               <a:rPr lang="en-US" altLang="ja-JP"/>
               <a:t>Click to edit Master text styles</a:t>
             </a:r>
+            <a:endParaRPr lang="en-US" altLang="ja-JP"/>
           </a:p>
           <a:p>
             <a:pPr lvl="1"/>
@@ -3011,6 +2903,7 @@
               <a:rPr lang="en-US" altLang="ja-JP"/>
               <a:t>Second level</a:t>
             </a:r>
+            <a:endParaRPr lang="en-US" altLang="ja-JP"/>
           </a:p>
           <a:p>
             <a:pPr lvl="2"/>
@@ -3018,6 +2911,7 @@
               <a:rPr lang="en-US" altLang="ja-JP"/>
               <a:t>Third level</a:t>
             </a:r>
+            <a:endParaRPr lang="en-US" altLang="ja-JP"/>
           </a:p>
           <a:p>
             <a:pPr lvl="3"/>
@@ -3025,6 +2919,7 @@
               <a:rPr lang="en-US" altLang="ja-JP"/>
               <a:t>Fourth level</a:t>
             </a:r>
+            <a:endParaRPr lang="en-US" altLang="ja-JP"/>
           </a:p>
           <a:p>
             <a:pPr lvl="4"/>
@@ -3032,6 +2927,7 @@
               <a:rPr lang="en-US" altLang="ja-JP"/>
               <a:t>Fifth level</a:t>
             </a:r>
+            <a:endParaRPr lang="en-US" altLang="ja-JP"/>
           </a:p>
         </p:txBody>
       </p:sp>
@@ -3057,17 +2953,11 @@
           <a:ln w="9525">
             <a:noFill/>
             <a:miter lim="800000"/>
-            <a:headEnd/>
-            <a:tailEnd/>
           </a:ln>
           <a:effectLst/>
         </p:spPr>
         <p:txBody>
-          <a:bodyPr vert="horz" wrap="square" lIns="91440" tIns="45720" rIns="91440" bIns="45720" numCol="1" anchor="b" anchorCtr="0" compatLnSpc="1">
-            <a:prstTxWarp prst="textNoShape">
-              <a:avLst/>
-            </a:prstTxWarp>
-          </a:bodyPr>
+          <a:bodyPr vert="horz" wrap="square" lIns="91440" tIns="45720" rIns="91440" bIns="45720" numCol="1" anchor="b" anchorCtr="0" compatLnSpc="1"/>
           <a:lstStyle>
             <a:lvl1pPr>
               <a:defRPr kumimoji="0" sz="1200" b="0"/>
@@ -3104,17 +2994,11 @@
           <a:ln w="9525">
             <a:noFill/>
             <a:miter lim="800000"/>
-            <a:headEnd/>
-            <a:tailEnd/>
           </a:ln>
           <a:effectLst/>
         </p:spPr>
         <p:txBody>
-          <a:bodyPr vert="horz" wrap="square" lIns="91440" tIns="45720" rIns="91440" bIns="45720" numCol="1" anchor="b" anchorCtr="0" compatLnSpc="1">
-            <a:prstTxWarp prst="textNoShape">
-              <a:avLst/>
-            </a:prstTxWarp>
-          </a:bodyPr>
+          <a:bodyPr vert="horz" wrap="square" lIns="91440" tIns="45720" rIns="91440" bIns="45720" numCol="1" anchor="b" anchorCtr="0" compatLnSpc="1"/>
           <a:lstStyle>
             <a:lvl1pPr algn="ctr">
               <a:defRPr kumimoji="0" sz="1200" b="0"/>
@@ -3151,17 +3035,11 @@
           <a:ln w="9525">
             <a:noFill/>
             <a:miter lim="800000"/>
-            <a:headEnd/>
-            <a:tailEnd/>
           </a:ln>
           <a:effectLst/>
         </p:spPr>
         <p:txBody>
-          <a:bodyPr vert="horz" wrap="square" lIns="91440" tIns="45720" rIns="91440" bIns="45720" numCol="1" anchor="b" anchorCtr="0" compatLnSpc="1">
-            <a:prstTxWarp prst="textNoShape">
-              <a:avLst/>
-            </a:prstTxWarp>
-          </a:bodyPr>
+          <a:bodyPr vert="horz" wrap="square" lIns="91440" tIns="45720" rIns="91440" bIns="45720" numCol="1" anchor="b" anchorCtr="0" compatLnSpc="1"/>
           <a:lstStyle>
             <a:lvl1pPr algn="r">
               <a:defRPr kumimoji="0" sz="1200" b="0"/>
@@ -3170,8 +3048,6 @@
           <a:p>
             <a:fld id="{B11B43A2-5F84-46DB-BF79-78890F90E6E9}" type="slidenum">
               <a:rPr lang="ja-JP" altLang="en-US"/>
-              <a:pPr/>
-              <a:t>‹#›</a:t>
             </a:fld>
             <a:endParaRPr lang="en-US" altLang="ja-JP"/>
           </a:p>
@@ -3234,17 +3110,11 @@
           <a:ln w="9525">
             <a:noFill/>
             <a:miter lim="800000"/>
-            <a:headEnd/>
-            <a:tailEnd/>
           </a:ln>
           <a:effectLst/>
         </p:spPr>
         <p:txBody>
-          <a:bodyPr vert="horz" wrap="square" lIns="91440" tIns="45720" rIns="91440" bIns="45720" numCol="1" anchor="b" anchorCtr="0" compatLnSpc="1">
-            <a:prstTxWarp prst="textNoShape">
-              <a:avLst/>
-            </a:prstTxWarp>
-          </a:bodyPr>
+          <a:bodyPr vert="horz" wrap="square" lIns="91440" tIns="45720" rIns="91440" bIns="45720" numCol="1" anchor="b" anchorCtr="0" compatLnSpc="1"/>
           <a:lstStyle/>
           <a:p>
             <a:pPr lvl="0"/>
@@ -3252,6 +3122,7 @@
               <a:rPr lang="en-US" altLang="ja-JP"/>
               <a:t>Click to edit Master title style</a:t>
             </a:r>
+            <a:endParaRPr lang="en-US" altLang="ja-JP"/>
           </a:p>
         </p:txBody>
       </p:sp>
@@ -3264,7 +3135,7 @@
           <p:nvPr userDrawn="1"/>
         </p:nvPicPr>
         <p:blipFill>
-          <a:blip r:embed="rId15">
+          <a:blip r:embed="rId14">
             <a:clrChange>
               <a:clrFrom>
                 <a:srgbClr val="FFFFFF"/>
@@ -3300,25 +3171,20 @@
         </p:spPr>
       </p:pic>
     </p:spTree>
-    <p:extLst>
-      <p:ext uri="{BB962C8B-B14F-4D97-AF65-F5344CB8AC3E}">
-        <p14:creationId xmlns:p14="http://schemas.microsoft.com/office/powerpoint/2010/main" val="2160859403"/>
-      </p:ext>
-    </p:extLst>
   </p:cSld>
   <p:clrMap bg1="lt1" tx1="dk1" bg2="lt2" tx2="dk2" accent1="accent1" accent2="accent2" accent3="accent3" accent4="accent4" accent5="accent5" accent6="accent6" hlink="hlink" folHlink="folHlink"/>
   <p:sldLayoutIdLst>
-    <p:sldLayoutId id="2147483661" r:id="rId1"/>
-    <p:sldLayoutId id="2147483662" r:id="rId2"/>
-    <p:sldLayoutId id="2147483663" r:id="rId3"/>
-    <p:sldLayoutId id="2147483664" r:id="rId4"/>
-    <p:sldLayoutId id="2147483665" r:id="rId5"/>
-    <p:sldLayoutId id="2147483666" r:id="rId6"/>
-    <p:sldLayoutId id="2147483667" r:id="rId7"/>
-    <p:sldLayoutId id="2147483668" r:id="rId8"/>
-    <p:sldLayoutId id="2147483669" r:id="rId9"/>
-    <p:sldLayoutId id="2147483670" r:id="rId10"/>
-    <p:sldLayoutId id="2147483671" r:id="rId11"/>
+    <p:sldLayoutId id="2147483649" r:id="rId1"/>
+    <p:sldLayoutId id="2147483650" r:id="rId2"/>
+    <p:sldLayoutId id="2147483651" r:id="rId3"/>
+    <p:sldLayoutId id="2147483652" r:id="rId4"/>
+    <p:sldLayoutId id="2147483653" r:id="rId5"/>
+    <p:sldLayoutId id="2147483654" r:id="rId6"/>
+    <p:sldLayoutId id="2147483655" r:id="rId7"/>
+    <p:sldLayoutId id="2147483656" r:id="rId8"/>
+    <p:sldLayoutId id="2147483657" r:id="rId9"/>
+    <p:sldLayoutId id="2147483658" r:id="rId10"/>
+    <p:sldLayoutId id="2147483659" r:id="rId11"/>
   </p:sldLayoutIdLst>
   <p:transition>
     <p:dissolve/>
@@ -3363,7 +3229,7 @@
               <a:srgbClr val="C0C0C0"/>
             </a:outerShdw>
           </a:effectLst>
-          <a:latin typeface="Arial Rounded MT Bold" pitchFamily="34" charset="0"/>
+          <a:latin typeface="Arial Rounded MT Bold" panose="020F0704030504030204" pitchFamily="34" charset="0"/>
           <a:ea typeface="HGあかね平成丸ｺﾞｼｯｸ体W8-S" pitchFamily="49" charset="-128"/>
         </a:defRPr>
       </a:lvl2pPr>
@@ -3383,7 +3249,7 @@
               <a:srgbClr val="C0C0C0"/>
             </a:outerShdw>
           </a:effectLst>
-          <a:latin typeface="Arial Rounded MT Bold" pitchFamily="34" charset="0"/>
+          <a:latin typeface="Arial Rounded MT Bold" panose="020F0704030504030204" pitchFamily="34" charset="0"/>
           <a:ea typeface="HGあかね平成丸ｺﾞｼｯｸ体W8-S" pitchFamily="49" charset="-128"/>
         </a:defRPr>
       </a:lvl3pPr>
@@ -3403,7 +3269,7 @@
               <a:srgbClr val="C0C0C0"/>
             </a:outerShdw>
           </a:effectLst>
-          <a:latin typeface="Arial Rounded MT Bold" pitchFamily="34" charset="0"/>
+          <a:latin typeface="Arial Rounded MT Bold" panose="020F0704030504030204" pitchFamily="34" charset="0"/>
           <a:ea typeface="HGあかね平成丸ｺﾞｼｯｸ体W8-S" pitchFamily="49" charset="-128"/>
         </a:defRPr>
       </a:lvl4pPr>
@@ -3423,7 +3289,7 @@
               <a:srgbClr val="C0C0C0"/>
             </a:outerShdw>
           </a:effectLst>
-          <a:latin typeface="Arial Rounded MT Bold" pitchFamily="34" charset="0"/>
+          <a:latin typeface="Arial Rounded MT Bold" panose="020F0704030504030204" pitchFamily="34" charset="0"/>
           <a:ea typeface="HGあかね平成丸ｺﾞｼｯｸ体W8-S" pitchFamily="49" charset="-128"/>
         </a:defRPr>
       </a:lvl5pPr>
@@ -3443,7 +3309,7 @@
               <a:srgbClr val="C0C0C0"/>
             </a:outerShdw>
           </a:effectLst>
-          <a:latin typeface="Arial Rounded MT Bold" pitchFamily="34" charset="0"/>
+          <a:latin typeface="Arial Rounded MT Bold" panose="020F0704030504030204" pitchFamily="34" charset="0"/>
           <a:ea typeface="HGあかね平成丸ｺﾞｼｯｸ体W8-S" pitchFamily="49" charset="-128"/>
         </a:defRPr>
       </a:lvl6pPr>
@@ -3463,7 +3329,7 @@
               <a:srgbClr val="C0C0C0"/>
             </a:outerShdw>
           </a:effectLst>
-          <a:latin typeface="Arial Rounded MT Bold" pitchFamily="34" charset="0"/>
+          <a:latin typeface="Arial Rounded MT Bold" panose="020F0704030504030204" pitchFamily="34" charset="0"/>
           <a:ea typeface="HGあかね平成丸ｺﾞｼｯｸ体W8-S" pitchFamily="49" charset="-128"/>
         </a:defRPr>
       </a:lvl7pPr>
@@ -3483,7 +3349,7 @@
               <a:srgbClr val="C0C0C0"/>
             </a:outerShdw>
           </a:effectLst>
-          <a:latin typeface="Arial Rounded MT Bold" pitchFamily="34" charset="0"/>
+          <a:latin typeface="Arial Rounded MT Bold" panose="020F0704030504030204" pitchFamily="34" charset="0"/>
           <a:ea typeface="HGあかね平成丸ｺﾞｼｯｸ体W8-S" pitchFamily="49" charset="-128"/>
         </a:defRPr>
       </a:lvl8pPr>
@@ -3503,7 +3369,7 @@
               <a:srgbClr val="C0C0C0"/>
             </a:outerShdw>
           </a:effectLst>
-          <a:latin typeface="Arial Rounded MT Bold" pitchFamily="34" charset="0"/>
+          <a:latin typeface="Arial Rounded MT Bold" panose="020F0704030504030204" pitchFamily="34" charset="0"/>
           <a:ea typeface="HGあかね平成丸ｺﾞｼｯｸ体W8-S" pitchFamily="49" charset="-128"/>
         </a:defRPr>
       </a:lvl9pPr>
@@ -3520,7 +3386,7 @@
           <a:schemeClr val="folHlink"/>
         </a:buClr>
         <a:buSzPct val="60000"/>
-        <a:buFont typeface="Wingdings" pitchFamily="2" charset="2"/>
+        <a:buFont typeface="Wingdings" panose="05000000000000000000" pitchFamily="2" charset="2"/>
         <a:buChar char="n"/>
         <a:defRPr kumimoji="1" sz="3200">
           <a:solidFill>
@@ -3542,7 +3408,7 @@
           <a:schemeClr val="hlink"/>
         </a:buClr>
         <a:buSzPct val="55000"/>
-        <a:buFont typeface="Wingdings" pitchFamily="2" charset="2"/>
+        <a:buFont typeface="Wingdings" panose="05000000000000000000" pitchFamily="2" charset="2"/>
         <a:buChar char="n"/>
         <a:defRPr kumimoji="1" sz="2800">
           <a:solidFill>
@@ -3562,7 +3428,7 @@
           <a:schemeClr val="folHlink"/>
         </a:buClr>
         <a:buSzPct val="50000"/>
-        <a:buFont typeface="Wingdings" pitchFamily="2" charset="2"/>
+        <a:buFont typeface="Wingdings" panose="05000000000000000000" pitchFamily="2" charset="2"/>
         <a:buChar char="n"/>
         <a:defRPr kumimoji="1" sz="2400">
           <a:solidFill>
@@ -3582,7 +3448,7 @@
           <a:schemeClr val="accent2"/>
         </a:buClr>
         <a:buSzPct val="55000"/>
-        <a:buFont typeface="Wingdings" pitchFamily="2" charset="2"/>
+        <a:buFont typeface="Wingdings" panose="05000000000000000000" pitchFamily="2" charset="2"/>
         <a:buChar char="n"/>
         <a:defRPr kumimoji="1" sz="2000">
           <a:solidFill>
@@ -3602,7 +3468,7 @@
           <a:schemeClr val="accent1"/>
         </a:buClr>
         <a:buSzPct val="50000"/>
-        <a:buFont typeface="Wingdings" pitchFamily="2" charset="2"/>
+        <a:buFont typeface="Wingdings" panose="05000000000000000000" pitchFamily="2" charset="2"/>
         <a:buChar char="n"/>
         <a:defRPr kumimoji="1" sz="2000">
           <a:solidFill>
@@ -3622,7 +3488,7 @@
           <a:schemeClr val="accent1"/>
         </a:buClr>
         <a:buSzPct val="50000"/>
-        <a:buFont typeface="Wingdings" pitchFamily="2" charset="2"/>
+        <a:buFont typeface="Wingdings" panose="05000000000000000000" pitchFamily="2" charset="2"/>
         <a:buChar char="n"/>
         <a:defRPr kumimoji="1" sz="2000">
           <a:solidFill>
@@ -3642,7 +3508,7 @@
           <a:schemeClr val="accent1"/>
         </a:buClr>
         <a:buSzPct val="50000"/>
-        <a:buFont typeface="Wingdings" pitchFamily="2" charset="2"/>
+        <a:buFont typeface="Wingdings" panose="05000000000000000000" pitchFamily="2" charset="2"/>
         <a:buChar char="n"/>
         <a:defRPr kumimoji="1" sz="2000">
           <a:solidFill>
@@ -3662,7 +3528,7 @@
           <a:schemeClr val="accent1"/>
         </a:buClr>
         <a:buSzPct val="50000"/>
-        <a:buFont typeface="Wingdings" pitchFamily="2" charset="2"/>
+        <a:buFont typeface="Wingdings" panose="05000000000000000000" pitchFamily="2" charset="2"/>
         <a:buChar char="n"/>
         <a:defRPr kumimoji="1" sz="2000">
           <a:solidFill>
@@ -3682,7 +3548,7 @@
           <a:schemeClr val="accent1"/>
         </a:buClr>
         <a:buSzPct val="50000"/>
-        <a:buFont typeface="Wingdings" pitchFamily="2" charset="2"/>
+        <a:buFont typeface="Wingdings" panose="05000000000000000000" pitchFamily="2" charset="2"/>
         <a:buChar char="n"/>
         <a:defRPr kumimoji="1" sz="2000">
           <a:solidFill>
@@ -3841,8 +3707,8 @@
                 <a:solidFill>
                   <a:srgbClr val="000000"/>
                 </a:solidFill>
-                <a:latin typeface="Tahoma" pitchFamily="34" charset="0"/>
-                <a:ea typeface="ＭＳ Ｐゴシック" pitchFamily="50" charset="-128"/>
+                <a:latin typeface="Tahoma" panose="020B0604030504040204" pitchFamily="34" charset="0"/>
+                <a:ea typeface="MS PGothic" pitchFamily="50" charset="-128"/>
               </a:rPr>
               <a:t>SENG696 (Fall 2021)</a:t>
             </a:r>
@@ -3850,8 +3716,8 @@
               <a:solidFill>
                 <a:srgbClr val="000000"/>
               </a:solidFill>
-              <a:latin typeface="Tahoma" pitchFamily="34" charset="0"/>
-              <a:ea typeface="ＭＳ Ｐゴシック" pitchFamily="50" charset="-128"/>
+              <a:latin typeface="Tahoma" panose="020B0604030504040204" pitchFamily="34" charset="0"/>
+              <a:ea typeface="MS PGothic" pitchFamily="50" charset="-128"/>
             </a:endParaRPr>
           </a:p>
         </p:txBody>
@@ -3889,25 +3755,16 @@
                 <a:solidFill>
                   <a:srgbClr val="000000"/>
                 </a:solidFill>
-                <a:latin typeface="Tahoma" pitchFamily="34" charset="0"/>
-                <a:ea typeface="ＭＳ Ｐゴシック" pitchFamily="50" charset="-128"/>
+                <a:latin typeface="Tahoma" panose="020B0604030504040204" pitchFamily="34" charset="0"/>
+                <a:ea typeface="MS PGothic" pitchFamily="50" charset="-128"/>
               </a:rPr>
-              <a:pPr fontAlgn="base">
-                <a:spcBef>
-                  <a:spcPct val="0"/>
-                </a:spcBef>
-                <a:spcAft>
-                  <a:spcPct val="0"/>
-                </a:spcAft>
-              </a:pPr>
-              <a:t>1</a:t>
             </a:fld>
             <a:endParaRPr lang="en-US" altLang="ja-JP" dirty="0">
               <a:solidFill>
                 <a:srgbClr val="000000"/>
               </a:solidFill>
-              <a:latin typeface="Tahoma" pitchFamily="34" charset="0"/>
-              <a:ea typeface="ＭＳ Ｐゴシック" pitchFamily="50" charset="-128"/>
+              <a:latin typeface="Tahoma" panose="020B0604030504040204" pitchFamily="34" charset="0"/>
+              <a:ea typeface="MS PGothic" pitchFamily="50" charset="-128"/>
             </a:endParaRPr>
           </a:p>
         </p:txBody>
@@ -3931,6 +3788,7 @@
               <a:rPr lang="en-CA" dirty="0"/>
               <a:t>1. Business Case</a:t>
             </a:r>
+            <a:endParaRPr lang="en-CA" dirty="0"/>
           </a:p>
         </p:txBody>
       </p:sp>
@@ -3963,25 +3821,29 @@
             </a:pPr>
             <a:r>
               <a:rPr lang="en-US" sz="2400" dirty="0">
-                <a:latin typeface="Times New Roman" panose="02020603050405020304" pitchFamily="18" charset="0"/>
-                <a:cs typeface="Times New Roman" panose="02020603050405020304" pitchFamily="18" charset="0"/>
+                <a:latin typeface="Times New Roman" panose="02020503050405090304" pitchFamily="18" charset="0"/>
+                <a:cs typeface="Times New Roman" panose="02020503050405090304" pitchFamily="18" charset="0"/>
               </a:rPr>
               <a:t>In Canada, around 58% of households report that they own at least a cat or a dog, and they are in a constant need to visit the </a:t>
             </a:r>
             <a:r>
               <a:rPr lang="en-US" sz="2400">
-                <a:latin typeface="Times New Roman" panose="02020603050405020304" pitchFamily="18" charset="0"/>
-                <a:cs typeface="Times New Roman" panose="02020603050405020304" pitchFamily="18" charset="0"/>
+                <a:latin typeface="Times New Roman" panose="02020503050405090304" pitchFamily="18" charset="0"/>
+                <a:cs typeface="Times New Roman" panose="02020503050405090304" pitchFamily="18" charset="0"/>
               </a:rPr>
               <a:t>Pet clinic </a:t>
             </a:r>
             <a:r>
               <a:rPr lang="en-US" sz="2400" dirty="0">
-                <a:latin typeface="Times New Roman" panose="02020603050405020304" pitchFamily="18" charset="0"/>
-                <a:cs typeface="Times New Roman" panose="02020603050405020304" pitchFamily="18" charset="0"/>
+                <a:latin typeface="Times New Roman" panose="02020503050405090304" pitchFamily="18" charset="0"/>
+                <a:cs typeface="Times New Roman" panose="02020503050405090304" pitchFamily="18" charset="0"/>
               </a:rPr>
               <a:t>for their pet’s health-checkup. Pet-owners, amidst their busy schedule, await a website that can assist them in addressing their pet’s well-being requirements.</a:t>
             </a:r>
+            <a:endParaRPr lang="en-US" sz="2400" dirty="0">
+              <a:latin typeface="Times New Roman" panose="02020503050405090304" pitchFamily="18" charset="0"/>
+              <a:cs typeface="Times New Roman" panose="02020503050405090304" pitchFamily="18" charset="0"/>
+            </a:endParaRPr>
           </a:p>
           <a:p>
             <a:pPr marL="285750" indent="-285750">
@@ -3993,11 +3855,15 @@
             </a:pPr>
             <a:r>
               <a:rPr lang="en-US" sz="2400" dirty="0">
-                <a:latin typeface="Times New Roman" panose="02020603050405020304" pitchFamily="18" charset="0"/>
-                <a:cs typeface="Times New Roman" panose="02020603050405020304" pitchFamily="18" charset="0"/>
+                <a:latin typeface="Times New Roman" panose="02020503050405090304" pitchFamily="18" charset="0"/>
+                <a:cs typeface="Times New Roman" panose="02020503050405090304" pitchFamily="18" charset="0"/>
               </a:rPr>
               <a:t>Currently, pet-owners do not have any centralized repository to store their pet’s health statistics. Maintenance of these records would open a plethora of opportunities for business as we can automate certain processes that expedite an animal’s treatment.</a:t>
             </a:r>
+            <a:endParaRPr lang="en-US" sz="2400" dirty="0">
+              <a:latin typeface="Times New Roman" panose="02020503050405090304" pitchFamily="18" charset="0"/>
+              <a:cs typeface="Times New Roman" panose="02020503050405090304" pitchFamily="18" charset="0"/>
+            </a:endParaRPr>
           </a:p>
           <a:p>
             <a:pPr marL="285750" indent="-285750">
@@ -4009,20 +3875,19 @@
             </a:pPr>
             <a:r>
               <a:rPr lang="en-US" sz="2400" dirty="0">
-                <a:latin typeface="Times New Roman" panose="02020603050405020304" pitchFamily="18" charset="0"/>
-                <a:cs typeface="Times New Roman" panose="02020603050405020304" pitchFamily="18" charset="0"/>
+                <a:latin typeface="Times New Roman" panose="02020503050405090304" pitchFamily="18" charset="0"/>
+                <a:cs typeface="Times New Roman" panose="02020503050405090304" pitchFamily="18" charset="0"/>
               </a:rPr>
               <a:t>These records can be shared globally, helping veterinarians around the world to diagnose diseases based on the similarity of symptoms found in the same breeds in another part of the world.</a:t>
             </a:r>
+            <a:endParaRPr lang="en-US" sz="2400" dirty="0">
+              <a:latin typeface="Times New Roman" panose="02020503050405090304" pitchFamily="18" charset="0"/>
+              <a:cs typeface="Times New Roman" panose="02020503050405090304" pitchFamily="18" charset="0"/>
+            </a:endParaRPr>
           </a:p>
         </p:txBody>
       </p:sp>
     </p:spTree>
-    <p:extLst>
-      <p:ext uri="{BB962C8B-B14F-4D97-AF65-F5344CB8AC3E}">
-        <p14:creationId xmlns:p14="http://schemas.microsoft.com/office/powerpoint/2010/main" val="3678948777"/>
-      </p:ext>
-    </p:extLst>
   </p:cSld>
   <p:clrMapOvr>
     <a:masterClrMapping/>
@@ -4078,8 +3943,8 @@
                 <a:solidFill>
                   <a:srgbClr val="000000"/>
                 </a:solidFill>
-                <a:latin typeface="Tahoma" pitchFamily="34" charset="0"/>
-                <a:ea typeface="ＭＳ Ｐゴシック" pitchFamily="50" charset="-128"/>
+                <a:latin typeface="Tahoma" panose="020B0604030504040204" pitchFamily="34" charset="0"/>
+                <a:ea typeface="MS PGothic" pitchFamily="50" charset="-128"/>
               </a:rPr>
               <a:t>SENG696 </a:t>
             </a:r>
@@ -4088,8 +3953,8 @@
                 <a:solidFill>
                   <a:srgbClr val="000000"/>
                 </a:solidFill>
-                <a:latin typeface="Tahoma" pitchFamily="34" charset="0"/>
-                <a:ea typeface="ＭＳ Ｐゴシック" pitchFamily="50" charset="-128"/>
+                <a:latin typeface="Tahoma" panose="020B0604030504040204" pitchFamily="34" charset="0"/>
+                <a:ea typeface="MS PGothic" pitchFamily="50" charset="-128"/>
               </a:rPr>
               <a:t>(Fall </a:t>
             </a:r>
@@ -4098,8 +3963,8 @@
                 <a:solidFill>
                   <a:srgbClr val="000000"/>
                 </a:solidFill>
-                <a:latin typeface="Tahoma" pitchFamily="34" charset="0"/>
-                <a:ea typeface="ＭＳ Ｐゴシック" pitchFamily="50" charset="-128"/>
+                <a:latin typeface="Tahoma" panose="020B0604030504040204" pitchFamily="34" charset="0"/>
+                <a:ea typeface="MS PGothic" pitchFamily="50" charset="-128"/>
               </a:rPr>
               <a:t>2021)</a:t>
             </a:r>
@@ -4107,8 +3972,8 @@
               <a:solidFill>
                 <a:srgbClr val="000000"/>
               </a:solidFill>
-              <a:latin typeface="Tahoma" pitchFamily="34" charset="0"/>
-              <a:ea typeface="ＭＳ Ｐゴシック" pitchFamily="50" charset="-128"/>
+              <a:latin typeface="Tahoma" panose="020B0604030504040204" pitchFamily="34" charset="0"/>
+              <a:ea typeface="MS PGothic" pitchFamily="50" charset="-128"/>
             </a:endParaRPr>
           </a:p>
         </p:txBody>
@@ -4141,25 +4006,16 @@
                 <a:solidFill>
                   <a:srgbClr val="000000"/>
                 </a:solidFill>
-                <a:latin typeface="Tahoma" pitchFamily="34" charset="0"/>
-                <a:ea typeface="ＭＳ Ｐゴシック" pitchFamily="50" charset="-128"/>
+                <a:latin typeface="Tahoma" panose="020B0604030504040204" pitchFamily="34" charset="0"/>
+                <a:ea typeface="MS PGothic" pitchFamily="50" charset="-128"/>
               </a:rPr>
-              <a:pPr fontAlgn="base">
-                <a:spcBef>
-                  <a:spcPct val="0"/>
-                </a:spcBef>
-                <a:spcAft>
-                  <a:spcPct val="0"/>
-                </a:spcAft>
-              </a:pPr>
-              <a:t>10</a:t>
             </a:fld>
             <a:endParaRPr lang="en-US" altLang="ja-JP">
               <a:solidFill>
                 <a:srgbClr val="000000"/>
               </a:solidFill>
-              <a:latin typeface="Tahoma" pitchFamily="34" charset="0"/>
-              <a:ea typeface="ＭＳ Ｐゴシック" pitchFamily="50" charset="-128"/>
+              <a:latin typeface="Tahoma" panose="020B0604030504040204" pitchFamily="34" charset="0"/>
+              <a:ea typeface="MS PGothic" pitchFamily="50" charset="-128"/>
             </a:endParaRPr>
           </a:p>
         </p:txBody>
@@ -4183,6 +4039,7 @@
               <a:rPr lang="en-CA" dirty="0"/>
               <a:t>Agent Description (cont’d)</a:t>
             </a:r>
+            <a:endParaRPr lang="en-CA" dirty="0"/>
           </a:p>
         </p:txBody>
       </p:sp>
@@ -4210,7 +4067,7 @@
               <a:lnSpc>
                 <a:spcPct val="80000"/>
               </a:lnSpc>
-              <a:buFont typeface="Wingdings" pitchFamily="2" charset="2"/>
+              <a:buFont typeface="Wingdings" panose="05000000000000000000" pitchFamily="2" charset="2"/>
               <a:buNone/>
             </a:pPr>
             <a:r>
@@ -4226,6 +4083,16 @@
               </a:rPr>
               <a:t>Reminder Agent</a:t>
             </a:r>
+            <a:endParaRPr lang="en-US" sz="2000" b="1" i="1" dirty="0">
+              <a:solidFill>
+                <a:srgbClr val="D60093"/>
+              </a:solidFill>
+              <a:effectLst>
+                <a:outerShdw blurRad="38100" dist="38100" dir="2700000" algn="tl">
+                  <a:srgbClr val="C0C0C0"/>
+                </a:outerShdw>
+              </a:effectLst>
+            </a:endParaRPr>
           </a:p>
           <a:p>
             <a:pPr>
@@ -4258,6 +4125,7 @@
               <a:rPr lang="en-CA" sz="1600" dirty="0"/>
               <a:t>The Reminder Agent communicates with the Clinic Agent, by waiting for its signals after an appointment is booked. If the user has activated reminders at the time of booking an appointment, the Reminder Agent would be sending automated SMS messages and e-mail notifications to the user on his/her registered e-mail account and mobile number. </a:t>
             </a:r>
+            <a:endParaRPr lang="en-CA" sz="1600" dirty="0"/>
           </a:p>
           <a:p>
             <a:pPr>
@@ -4271,6 +4139,7 @@
               <a:rPr lang="en-CA" sz="1600" dirty="0"/>
               <a:t>Instead of a receptionist logging in every time to trigger a reminder, the Agent by itself sends the message at regular intervals(hours/days) as chosen by the user.</a:t>
             </a:r>
+            <a:endParaRPr lang="en-CA" sz="1600" dirty="0"/>
           </a:p>
           <a:p>
             <a:pPr>
@@ -4284,6 +4153,7 @@
               <a:rPr lang="en-CA" sz="1600" dirty="0"/>
               <a:t>In case the appointment is cancelled or updated, the Reminder Agent also intelligently updates the text message and sends an updated notification to the user. </a:t>
             </a:r>
+            <a:endParaRPr lang="en-CA" sz="1600" dirty="0"/>
           </a:p>
           <a:p>
             <a:pPr>
@@ -4297,6 +4167,7 @@
               <a:rPr lang="en-CA" sz="1600" dirty="0"/>
               <a:t>Once the appointment is complete, the Reminder Agent directly accesses the database to disable the alerting mechanism for that particular appointment. </a:t>
             </a:r>
+            <a:endParaRPr lang="en-CA" sz="1600" dirty="0"/>
           </a:p>
           <a:p>
             <a:pPr>
@@ -4310,6 +4181,7 @@
               <a:rPr lang="en-CA" sz="1600" dirty="0"/>
               <a:t>In order to check if the registered email/phone number is valid, the Reminder Agent will trigger an acknowledgement  message at the time of booking the appointment. Subsequently, the other reminder messages will be forwarded in due course.</a:t>
             </a:r>
+            <a:endParaRPr lang="en-CA" sz="1600" dirty="0"/>
           </a:p>
           <a:p>
             <a:pPr>
@@ -4323,6 +4195,7 @@
               <a:rPr lang="en-CA" sz="1600" dirty="0"/>
               <a:t>The Reminder Agent also triggers a notification once the report has been generated, based upon the feedback from the veterinarian. In this case, it will await signal from the Template Agent.</a:t>
             </a:r>
+            <a:endParaRPr lang="en-CA" sz="1600" dirty="0"/>
           </a:p>
           <a:p>
             <a:pPr>
@@ -4336,6 +4209,7 @@
               <a:rPr lang="en-CA" sz="1600" dirty="0"/>
               <a:t>The Agent will keep a track of all the reminders sent to a particular number in the database for tracking purposes.</a:t>
             </a:r>
+            <a:endParaRPr lang="en-CA" sz="1600" dirty="0"/>
           </a:p>
           <a:p>
             <a:pPr>
@@ -4348,11 +4222,6 @@
         </p:txBody>
       </p:sp>
     </p:spTree>
-    <p:extLst>
-      <p:ext uri="{BB962C8B-B14F-4D97-AF65-F5344CB8AC3E}">
-        <p14:creationId xmlns:p14="http://schemas.microsoft.com/office/powerpoint/2010/main" val="1716397028"/>
-      </p:ext>
-    </p:extLst>
   </p:cSld>
   <p:clrMapOvr>
     <a:masterClrMapping/>
@@ -4382,13 +4251,7 @@
       </p:grpSpPr>
       <p:sp>
         <p:nvSpPr>
-          <p:cNvPr id="2" name="Title 1">
-            <a:extLst>
-              <a:ext uri="{FF2B5EF4-FFF2-40B4-BE49-F238E27FC236}">
-                <a16:creationId xmlns:a16="http://schemas.microsoft.com/office/drawing/2014/main" id="{E1A18D8D-D50E-48B9-A318-86EA2B96F6B7}"/>
-              </a:ext>
-            </a:extLst>
-          </p:cNvPr>
+          <p:cNvPr id="2" name="Title 1"/>
           <p:cNvSpPr>
             <a:spLocks noGrp="1"/>
           </p:cNvSpPr>
@@ -4405,18 +4268,13 @@
               <a:rPr lang="en-CA" dirty="0"/>
               <a:t>Agent Description (cont’d)</a:t>
             </a:r>
-          </a:p>
-        </p:txBody>
-      </p:sp>
-      <p:sp>
-        <p:nvSpPr>
-          <p:cNvPr id="3" name="Content Placeholder 2">
-            <a:extLst>
-              <a:ext uri="{FF2B5EF4-FFF2-40B4-BE49-F238E27FC236}">
-                <a16:creationId xmlns:a16="http://schemas.microsoft.com/office/drawing/2014/main" id="{CE8243DA-4F7C-4C3A-B874-DF6CE800B16E}"/>
-              </a:ext>
-            </a:extLst>
-          </p:cNvPr>
+            <a:endParaRPr lang="en-CA" dirty="0"/>
+          </a:p>
+        </p:txBody>
+      </p:sp>
+      <p:sp>
+        <p:nvSpPr>
+          <p:cNvPr id="3" name="Content Placeholder 2"/>
           <p:cNvSpPr>
             <a:spLocks noGrp="1"/>
           </p:cNvSpPr>
@@ -4450,24 +4308,37 @@
               </a:rPr>
               <a:t>Template Agent</a:t>
             </a:r>
+            <a:endParaRPr lang="en-US" sz="2400" b="1" i="1" dirty="0">
+              <a:solidFill>
+                <a:srgbClr val="D60093"/>
+              </a:solidFill>
+              <a:effectLst>
+                <a:outerShdw blurRad="38100" dist="38100" dir="2700000" algn="tl">
+                  <a:srgbClr val="C0C0C0"/>
+                </a:outerShdw>
+              </a:effectLst>
+            </a:endParaRPr>
           </a:p>
           <a:p>
             <a:r>
               <a:rPr lang="en-US" sz="2400" dirty="0"/>
               <a:t>The Template Agent provides the doctor with different letter templates. Depending upon the video interaction between the doctor and the patient, the doctor can select and use the in-built template to report their diagnosis.</a:t>
             </a:r>
+            <a:endParaRPr lang="en-US" sz="2400" dirty="0"/>
           </a:p>
           <a:p>
             <a:r>
               <a:rPr lang="en-US" sz="2400" dirty="0"/>
               <a:t>The Template Agent communicates with the Clinic System Agent after the video interaction between the client and doctor is complete. </a:t>
             </a:r>
+            <a:endParaRPr lang="en-US" sz="2400" dirty="0"/>
           </a:p>
           <a:p>
             <a:r>
               <a:rPr lang="en-US" sz="2400" dirty="0"/>
               <a:t>If the Template Agent receives a request from the Clinic System Agent, the doctor is requested to input their feedback. </a:t>
             </a:r>
+            <a:endParaRPr lang="en-US" sz="2400" dirty="0"/>
           </a:p>
           <a:p>
             <a:r>
@@ -4480,13 +4351,7 @@
       </p:sp>
       <p:sp>
         <p:nvSpPr>
-          <p:cNvPr id="4" name="Date Placeholder 3">
-            <a:extLst>
-              <a:ext uri="{FF2B5EF4-FFF2-40B4-BE49-F238E27FC236}">
-                <a16:creationId xmlns:a16="http://schemas.microsoft.com/office/drawing/2014/main" id="{2FAB1A17-C298-4F53-B04A-C760E48BF7B7}"/>
-              </a:ext>
-            </a:extLst>
-          </p:cNvPr>
+          <p:cNvPr id="4" name="Date Placeholder 3"/>
           <p:cNvSpPr>
             <a:spLocks noGrp="1"/>
           </p:cNvSpPr>
@@ -4517,13 +4382,7 @@
       </p:sp>
       <p:sp>
         <p:nvSpPr>
-          <p:cNvPr id="6" name="Slide Number Placeholder 5">
-            <a:extLst>
-              <a:ext uri="{FF2B5EF4-FFF2-40B4-BE49-F238E27FC236}">
-                <a16:creationId xmlns:a16="http://schemas.microsoft.com/office/drawing/2014/main" id="{F36303D7-60BC-434B-A3A9-DD9D89830AC1}"/>
-              </a:ext>
-            </a:extLst>
-          </p:cNvPr>
+          <p:cNvPr id="6" name="Slide Number Placeholder 5"/>
           <p:cNvSpPr>
             <a:spLocks noGrp="1"/>
           </p:cNvSpPr>
@@ -4538,19 +4397,12 @@
           <a:p>
             <a:fld id="{A4BAB868-1E00-44C6-B1AB-DFCC5F9865BA}" type="slidenum">
               <a:rPr lang="ja-JP" altLang="en-US" smtClean="0"/>
-              <a:pPr/>
-              <a:t>11</a:t>
             </a:fld>
             <a:endParaRPr lang="en-US" altLang="ja-JP" dirty="0"/>
           </a:p>
         </p:txBody>
       </p:sp>
     </p:spTree>
-    <p:extLst>
-      <p:ext uri="{BB962C8B-B14F-4D97-AF65-F5344CB8AC3E}">
-        <p14:creationId xmlns:p14="http://schemas.microsoft.com/office/powerpoint/2010/main" val="1814967249"/>
-      </p:ext>
-    </p:extLst>
   </p:cSld>
   <p:clrMapOvr>
     <a:masterClrMapping/>
@@ -4580,13 +4432,7 @@
       </p:grpSpPr>
       <p:sp>
         <p:nvSpPr>
-          <p:cNvPr id="2" name="Title 1">
-            <a:extLst>
-              <a:ext uri="{FF2B5EF4-FFF2-40B4-BE49-F238E27FC236}">
-                <a16:creationId xmlns:a16="http://schemas.microsoft.com/office/drawing/2014/main" id="{E1A18D8D-D50E-48B9-A318-86EA2B96F6B7}"/>
-              </a:ext>
-            </a:extLst>
-          </p:cNvPr>
+          <p:cNvPr id="2" name="Title 1"/>
           <p:cNvSpPr>
             <a:spLocks noGrp="1"/>
           </p:cNvSpPr>
@@ -4603,18 +4449,13 @@
               <a:rPr lang="en-CA" dirty="0"/>
               <a:t>Agent Description (cont’d)</a:t>
             </a:r>
-          </a:p>
-        </p:txBody>
-      </p:sp>
-      <p:sp>
-        <p:nvSpPr>
-          <p:cNvPr id="3" name="Content Placeholder 2">
-            <a:extLst>
-              <a:ext uri="{FF2B5EF4-FFF2-40B4-BE49-F238E27FC236}">
-                <a16:creationId xmlns:a16="http://schemas.microsoft.com/office/drawing/2014/main" id="{CE8243DA-4F7C-4C3A-B874-DF6CE800B16E}"/>
-              </a:ext>
-            </a:extLst>
-          </p:cNvPr>
+            <a:endParaRPr lang="en-CA" dirty="0"/>
+          </a:p>
+        </p:txBody>
+      </p:sp>
+      <p:sp>
+        <p:nvSpPr>
+          <p:cNvPr id="3" name="Content Placeholder 2"/>
           <p:cNvSpPr>
             <a:spLocks noGrp="1"/>
           </p:cNvSpPr>
@@ -4661,6 +4502,16 @@
               </a:rPr>
               <a:t>Agent</a:t>
             </a:r>
+            <a:endParaRPr lang="en-US" sz="2400" b="1" i="1" dirty="0">
+              <a:solidFill>
+                <a:srgbClr val="D60093"/>
+              </a:solidFill>
+              <a:effectLst>
+                <a:outerShdw blurRad="38100" dist="38100" dir="2700000" algn="tl">
+                  <a:srgbClr val="C0C0C0"/>
+                </a:outerShdw>
+              </a:effectLst>
+            </a:endParaRPr>
           </a:p>
           <a:p>
             <a:pPr>
@@ -4675,6 +4526,7 @@
               <a:rPr lang="en-US" sz="2200" dirty="0" smtClean="0"/>
               <a:t>.</a:t>
             </a:r>
+            <a:endParaRPr lang="en-US" sz="2200" dirty="0" smtClean="0"/>
           </a:p>
           <a:p>
             <a:pPr>
@@ -4693,6 +4545,7 @@
               <a:rPr lang="en-US" sz="2200" dirty="0" smtClean="0"/>
               <a:t>.</a:t>
             </a:r>
+            <a:endParaRPr lang="en-US" sz="2200" dirty="0" smtClean="0"/>
           </a:p>
           <a:p>
             <a:pPr>
@@ -4705,12 +4558,13 @@
             </a:r>
             <a:r>
               <a:rPr lang="en-US" sz="2200" dirty="0"/>
-              <a:t>facilitate video-based interaction between the doctor and patient, the system will use existing video conferencing platforms (ZOOM, Google Meet, etc</a:t>
+              <a:t>facilitate the video-based interaction between the doctor and patient, the system will use existing video conferencing platforms (ZOOM, Google Meet, etc</a:t>
             </a:r>
             <a:r>
               <a:rPr lang="en-US" sz="2200" dirty="0" smtClean="0"/>
               <a:t>.)</a:t>
             </a:r>
+            <a:endParaRPr lang="en-US" sz="2200" dirty="0" smtClean="0"/>
           </a:p>
           <a:p>
             <a:pPr>
@@ -4729,6 +4583,7 @@
               <a:rPr lang="en-US" sz="2200" dirty="0" smtClean="0"/>
               <a:t>.</a:t>
             </a:r>
+            <a:endParaRPr lang="en-US" sz="2200" dirty="0" smtClean="0"/>
           </a:p>
           <a:p>
             <a:pPr>
@@ -4749,13 +4604,7 @@
       </p:sp>
       <p:sp>
         <p:nvSpPr>
-          <p:cNvPr id="4" name="Date Placeholder 3">
-            <a:extLst>
-              <a:ext uri="{FF2B5EF4-FFF2-40B4-BE49-F238E27FC236}">
-                <a16:creationId xmlns:a16="http://schemas.microsoft.com/office/drawing/2014/main" id="{2FAB1A17-C298-4F53-B04A-C760E48BF7B7}"/>
-              </a:ext>
-            </a:extLst>
-          </p:cNvPr>
+          <p:cNvPr id="4" name="Date Placeholder 3"/>
           <p:cNvSpPr>
             <a:spLocks noGrp="1"/>
           </p:cNvSpPr>
@@ -4786,13 +4635,7 @@
       </p:sp>
       <p:sp>
         <p:nvSpPr>
-          <p:cNvPr id="6" name="Slide Number Placeholder 5">
-            <a:extLst>
-              <a:ext uri="{FF2B5EF4-FFF2-40B4-BE49-F238E27FC236}">
-                <a16:creationId xmlns:a16="http://schemas.microsoft.com/office/drawing/2014/main" id="{F36303D7-60BC-434B-A3A9-DD9D89830AC1}"/>
-              </a:ext>
-            </a:extLst>
-          </p:cNvPr>
+          <p:cNvPr id="6" name="Slide Number Placeholder 5"/>
           <p:cNvSpPr>
             <a:spLocks noGrp="1"/>
           </p:cNvSpPr>
@@ -4807,19 +4650,12 @@
           <a:p>
             <a:fld id="{A4BAB868-1E00-44C6-B1AB-DFCC5F9865BA}" type="slidenum">
               <a:rPr lang="ja-JP" altLang="en-US" smtClean="0"/>
-              <a:pPr/>
-              <a:t>12</a:t>
             </a:fld>
             <a:endParaRPr lang="en-US" altLang="ja-JP" dirty="0"/>
           </a:p>
         </p:txBody>
       </p:sp>
     </p:spTree>
-    <p:extLst>
-      <p:ext uri="{BB962C8B-B14F-4D97-AF65-F5344CB8AC3E}">
-        <p14:creationId xmlns:p14="http://schemas.microsoft.com/office/powerpoint/2010/main" val="395311522"/>
-      </p:ext>
-    </p:extLst>
   </p:cSld>
   <p:clrMapOvr>
     <a:masterClrMapping/>
@@ -4849,13 +4685,7 @@
       </p:grpSpPr>
       <p:sp>
         <p:nvSpPr>
-          <p:cNvPr id="2" name="Title 1">
-            <a:extLst>
-              <a:ext uri="{FF2B5EF4-FFF2-40B4-BE49-F238E27FC236}">
-                <a16:creationId xmlns:a16="http://schemas.microsoft.com/office/drawing/2014/main" id="{D6B34C92-3919-48E4-9245-580696DFB2E4}"/>
-              </a:ext>
-            </a:extLst>
-          </p:cNvPr>
+          <p:cNvPr id="2" name="Title 1"/>
           <p:cNvSpPr>
             <a:spLocks noGrp="1"/>
           </p:cNvSpPr>
@@ -4872,18 +4702,13 @@
               <a:rPr lang="en-CA" dirty="0"/>
               <a:t>6. Design: Agent Model</a:t>
             </a:r>
-          </a:p>
-        </p:txBody>
-      </p:sp>
-      <p:sp>
-        <p:nvSpPr>
-          <p:cNvPr id="4" name="Date Placeholder 3">
-            <a:extLst>
-              <a:ext uri="{FF2B5EF4-FFF2-40B4-BE49-F238E27FC236}">
-                <a16:creationId xmlns:a16="http://schemas.microsoft.com/office/drawing/2014/main" id="{B070015F-E0D1-41B1-A468-1A0BA6DB7630}"/>
-              </a:ext>
-            </a:extLst>
-          </p:cNvPr>
+            <a:endParaRPr lang="en-CA" dirty="0"/>
+          </a:p>
+        </p:txBody>
+      </p:sp>
+      <p:sp>
+        <p:nvSpPr>
+          <p:cNvPr id="4" name="Date Placeholder 3"/>
           <p:cNvSpPr>
             <a:spLocks noGrp="1"/>
           </p:cNvSpPr>
@@ -4914,13 +4739,7 @@
       </p:sp>
       <p:sp>
         <p:nvSpPr>
-          <p:cNvPr id="6" name="Slide Number Placeholder 5">
-            <a:extLst>
-              <a:ext uri="{FF2B5EF4-FFF2-40B4-BE49-F238E27FC236}">
-                <a16:creationId xmlns:a16="http://schemas.microsoft.com/office/drawing/2014/main" id="{AE609BDF-7C75-4440-8723-8A99DD2DD05D}"/>
-              </a:ext>
-            </a:extLst>
-          </p:cNvPr>
+          <p:cNvPr id="6" name="Slide Number Placeholder 5"/>
           <p:cNvSpPr>
             <a:spLocks noGrp="1"/>
           </p:cNvSpPr>
@@ -4935,8 +4754,6 @@
           <a:p>
             <a:fld id="{A4BAB868-1E00-44C6-B1AB-DFCC5F9865BA}" type="slidenum">
               <a:rPr lang="ja-JP" altLang="en-US" smtClean="0"/>
-              <a:pPr/>
-              <a:t>13</a:t>
             </a:fld>
             <a:endParaRPr lang="en-US" altLang="ja-JP"/>
           </a:p>
@@ -4944,20 +4761,14 @@
       </p:sp>
       <p:pic>
         <p:nvPicPr>
-          <p:cNvPr id="12" name="Picture 11">
-            <a:extLst>
-              <a:ext uri="{FF2B5EF4-FFF2-40B4-BE49-F238E27FC236}">
-                <a16:creationId xmlns:a16="http://schemas.microsoft.com/office/drawing/2014/main" id="{2DA05C07-7FF6-4B38-B836-CBA63805377B}"/>
-              </a:ext>
-            </a:extLst>
-          </p:cNvPr>
+          <p:cNvPr id="12" name="Picture 11"/>
           <p:cNvPicPr>
             <a:picLocks noChangeAspect="1"/>
           </p:cNvPicPr>
           <p:nvPr/>
         </p:nvPicPr>
         <p:blipFill>
-          <a:blip r:embed="rId2"/>
+          <a:blip r:embed="rId1"/>
           <a:stretch>
             <a:fillRect/>
           </a:stretch>
@@ -4973,11 +4784,6 @@
         </p:spPr>
       </p:pic>
     </p:spTree>
-    <p:extLst>
-      <p:ext uri="{BB962C8B-B14F-4D97-AF65-F5344CB8AC3E}">
-        <p14:creationId xmlns:p14="http://schemas.microsoft.com/office/powerpoint/2010/main" val="4077683043"/>
-      </p:ext>
-    </p:extLst>
   </p:cSld>
   <p:clrMapOvr>
     <a:masterClrMapping/>
@@ -5007,13 +4813,7 @@
       </p:grpSpPr>
       <p:sp>
         <p:nvSpPr>
-          <p:cNvPr id="2" name="Title 1">
-            <a:extLst>
-              <a:ext uri="{FF2B5EF4-FFF2-40B4-BE49-F238E27FC236}">
-                <a16:creationId xmlns:a16="http://schemas.microsoft.com/office/drawing/2014/main" id="{6E98BFB5-DE3F-4793-966B-7D7CF7DC2465}"/>
-              </a:ext>
-            </a:extLst>
-          </p:cNvPr>
+          <p:cNvPr id="2" name="Title 1"/>
           <p:cNvSpPr>
             <a:spLocks noGrp="1"/>
           </p:cNvSpPr>
@@ -5030,28 +4830,18 @@
               <a:rPr lang="en-CA" dirty="0"/>
               <a:t>7. Design: Service Model</a:t>
             </a:r>
+            <a:endParaRPr lang="en-CA" dirty="0"/>
           </a:p>
         </p:txBody>
       </p:sp>
       <p:graphicFrame>
         <p:nvGraphicFramePr>
-          <p:cNvPr id="7" name="Content Placeholder 6">
-            <a:extLst>
-              <a:ext uri="{FF2B5EF4-FFF2-40B4-BE49-F238E27FC236}">
-                <a16:creationId xmlns:a16="http://schemas.microsoft.com/office/drawing/2014/main" id="{4A9D8EBD-C665-44F7-8C37-7580611C4BB2}"/>
-              </a:ext>
-            </a:extLst>
-          </p:cNvPr>
+          <p:cNvPr id="7" name="Content Placeholder 6"/>
           <p:cNvGraphicFramePr>
             <a:graphicFrameLocks noGrp="1"/>
           </p:cNvGraphicFramePr>
           <p:nvPr>
             <p:ph idx="1"/>
-            <p:extLst>
-              <p:ext uri="{D42A27DB-BD31-4B8C-83A1-F6EECF244321}">
-                <p14:modId xmlns:p14="http://schemas.microsoft.com/office/powerpoint/2010/main" val="445344895"/>
-              </p:ext>
-            </p:extLst>
           </p:nvPr>
         </p:nvGraphicFramePr>
         <p:xfrm>
@@ -5065,41 +4855,11 @@
                 <a:tableStyleId>{5C22544A-7EE6-4342-B048-85BDC9FD1C3A}</a:tableStyleId>
               </a:tblPr>
               <a:tblGrid>
-                <a:gridCol w="1484209">
-                  <a:extLst>
-                    <a:ext uri="{9D8B030D-6E8A-4147-A177-3AD203B41FA5}">
-                      <a16:colId xmlns:a16="http://schemas.microsoft.com/office/drawing/2014/main" val="1214902364"/>
-                    </a:ext>
-                  </a:extLst>
-                </a:gridCol>
-                <a:gridCol w="1365164">
-                  <a:extLst>
-                    <a:ext uri="{9D8B030D-6E8A-4147-A177-3AD203B41FA5}">
-                      <a16:colId xmlns:a16="http://schemas.microsoft.com/office/drawing/2014/main" val="229060225"/>
-                    </a:ext>
-                  </a:extLst>
-                </a:gridCol>
-                <a:gridCol w="2204475">
-                  <a:extLst>
-                    <a:ext uri="{9D8B030D-6E8A-4147-A177-3AD203B41FA5}">
-                      <a16:colId xmlns:a16="http://schemas.microsoft.com/office/drawing/2014/main" val="2494628635"/>
-                    </a:ext>
-                  </a:extLst>
-                </a:gridCol>
-                <a:gridCol w="1888449">
-                  <a:extLst>
-                    <a:ext uri="{9D8B030D-6E8A-4147-A177-3AD203B41FA5}">
-                      <a16:colId xmlns:a16="http://schemas.microsoft.com/office/drawing/2014/main" val="377801537"/>
-                    </a:ext>
-                  </a:extLst>
-                </a:gridCol>
-                <a:gridCol w="1861043">
-                  <a:extLst>
-                    <a:ext uri="{9D8B030D-6E8A-4147-A177-3AD203B41FA5}">
-                      <a16:colId xmlns:a16="http://schemas.microsoft.com/office/drawing/2014/main" val="28876286"/>
-                    </a:ext>
-                  </a:extLst>
-                </a:gridCol>
+                <a:gridCol w="1484209"/>
+                <a:gridCol w="1365164"/>
+                <a:gridCol w="2204475"/>
+                <a:gridCol w="1888449"/>
+                <a:gridCol w="1861043"/>
               </a:tblGrid>
               <a:tr h="542910">
                 <a:tc>
@@ -5125,7 +4885,7 @@
                         <a:effectLst/>
                         <a:latin typeface="Calibri" panose="020F0502020204030204" pitchFamily="34" charset="0"/>
                         <a:ea typeface="Calibri" panose="020F0502020204030204" pitchFamily="34" charset="0"/>
-                        <a:cs typeface="Times New Roman" panose="02020603050405020304" pitchFamily="18" charset="0"/>
+                        <a:cs typeface="Times New Roman" panose="02020503050405090304" pitchFamily="18" charset="0"/>
                       </a:endParaRPr>
                     </a:p>
                   </a:txBody>
@@ -5154,7 +4914,7 @@
                         <a:effectLst/>
                         <a:latin typeface="Calibri" panose="020F0502020204030204" pitchFamily="34" charset="0"/>
                         <a:ea typeface="Calibri" panose="020F0502020204030204" pitchFamily="34" charset="0"/>
-                        <a:cs typeface="Times New Roman" panose="02020603050405020304" pitchFamily="18" charset="0"/>
+                        <a:cs typeface="Times New Roman" panose="02020503050405090304" pitchFamily="18" charset="0"/>
                       </a:endParaRPr>
                     </a:p>
                   </a:txBody>
@@ -5183,7 +4943,7 @@
                         <a:effectLst/>
                         <a:latin typeface="Calibri" panose="020F0502020204030204" pitchFamily="34" charset="0"/>
                         <a:ea typeface="Calibri" panose="020F0502020204030204" pitchFamily="34" charset="0"/>
-                        <a:cs typeface="Times New Roman" panose="02020603050405020304" pitchFamily="18" charset="0"/>
+                        <a:cs typeface="Times New Roman" panose="02020503050405090304" pitchFamily="18" charset="0"/>
                       </a:endParaRPr>
                     </a:p>
                   </a:txBody>
@@ -5212,7 +4972,7 @@
                         <a:effectLst/>
                         <a:latin typeface="Calibri" panose="020F0502020204030204" pitchFamily="34" charset="0"/>
                         <a:ea typeface="Calibri" panose="020F0502020204030204" pitchFamily="34" charset="0"/>
-                        <a:cs typeface="Times New Roman" panose="02020603050405020304" pitchFamily="18" charset="0"/>
+                        <a:cs typeface="Times New Roman" panose="02020503050405090304" pitchFamily="18" charset="0"/>
                       </a:endParaRPr>
                     </a:p>
                   </a:txBody>
@@ -5241,17 +5001,12 @@
                         <a:effectLst/>
                         <a:latin typeface="Calibri" panose="020F0502020204030204" pitchFamily="34" charset="0"/>
                         <a:ea typeface="Calibri" panose="020F0502020204030204" pitchFamily="34" charset="0"/>
-                        <a:cs typeface="Times New Roman" panose="02020603050405020304" pitchFamily="18" charset="0"/>
+                        <a:cs typeface="Times New Roman" panose="02020503050405090304" pitchFamily="18" charset="0"/>
                       </a:endParaRPr>
                     </a:p>
                   </a:txBody>
                   <a:tcPr marL="68580" marR="68580" marT="0" marB="0"/>
                 </a:tc>
-                <a:extLst>
-                  <a:ext uri="{0D108BD9-81ED-4DB2-BD59-A6C34878D82A}">
-                    <a16:rowId xmlns:a16="http://schemas.microsoft.com/office/drawing/2014/main" val="638127521"/>
-                  </a:ext>
-                </a:extLst>
               </a:tr>
               <a:tr h="942854">
                 <a:tc>
@@ -5277,7 +5032,7 @@
                         <a:effectLst/>
                         <a:latin typeface="Calibri" panose="020F0502020204030204" pitchFamily="34" charset="0"/>
                         <a:ea typeface="Calibri" panose="020F0502020204030204" pitchFamily="34" charset="0"/>
-                        <a:cs typeface="Times New Roman" panose="02020603050405020304" pitchFamily="18" charset="0"/>
+                        <a:cs typeface="Times New Roman" panose="02020503050405090304" pitchFamily="18" charset="0"/>
                       </a:endParaRPr>
                     </a:p>
                   </a:txBody>
@@ -5306,7 +5061,7 @@
                         <a:effectLst/>
                         <a:latin typeface="Calibri" panose="020F0502020204030204" pitchFamily="34" charset="0"/>
                         <a:ea typeface="Calibri" panose="020F0502020204030204" pitchFamily="34" charset="0"/>
-                        <a:cs typeface="Times New Roman" panose="02020603050405020304" pitchFamily="18" charset="0"/>
+                        <a:cs typeface="Times New Roman" panose="02020503050405090304" pitchFamily="18" charset="0"/>
                       </a:endParaRPr>
                     </a:p>
                   </a:txBody>
@@ -5335,7 +5090,7 @@
                         <a:effectLst/>
                         <a:latin typeface="Calibri" panose="020F0502020204030204" pitchFamily="34" charset="0"/>
                         <a:ea typeface="Calibri" panose="020F0502020204030204" pitchFamily="34" charset="0"/>
-                        <a:cs typeface="Times New Roman" panose="02020603050405020304" pitchFamily="18" charset="0"/>
+                        <a:cs typeface="Times New Roman" panose="02020503050405090304" pitchFamily="18" charset="0"/>
                       </a:endParaRPr>
                     </a:p>
                   </a:txBody>
@@ -5364,7 +5119,7 @@
                         <a:effectLst/>
                         <a:latin typeface="Calibri" panose="020F0502020204030204" pitchFamily="34" charset="0"/>
                         <a:ea typeface="Calibri" panose="020F0502020204030204" pitchFamily="34" charset="0"/>
-                        <a:cs typeface="Times New Roman" panose="02020603050405020304" pitchFamily="18" charset="0"/>
+                        <a:cs typeface="Times New Roman" panose="02020503050405090304" pitchFamily="18" charset="0"/>
                       </a:endParaRPr>
                     </a:p>
                   </a:txBody>
@@ -5393,17 +5148,12 @@
                         <a:effectLst/>
                         <a:latin typeface="Calibri" panose="020F0502020204030204" pitchFamily="34" charset="0"/>
                         <a:ea typeface="Calibri" panose="020F0502020204030204" pitchFamily="34" charset="0"/>
-                        <a:cs typeface="Times New Roman" panose="02020603050405020304" pitchFamily="18" charset="0"/>
+                        <a:cs typeface="Times New Roman" panose="02020503050405090304" pitchFamily="18" charset="0"/>
                       </a:endParaRPr>
                     </a:p>
                   </a:txBody>
                   <a:tcPr marL="68580" marR="68580" marT="0" marB="0"/>
                 </a:tc>
-                <a:extLst>
-                  <a:ext uri="{0D108BD9-81ED-4DB2-BD59-A6C34878D82A}">
-                    <a16:rowId xmlns:a16="http://schemas.microsoft.com/office/drawing/2014/main" val="1400990090"/>
-                  </a:ext>
-                </a:extLst>
               </a:tr>
               <a:tr h="1063199">
                 <a:tc>
@@ -5429,7 +5179,7 @@
                         <a:effectLst/>
                         <a:latin typeface="Calibri" panose="020F0502020204030204" pitchFamily="34" charset="0"/>
                         <a:ea typeface="Calibri" panose="020F0502020204030204" pitchFamily="34" charset="0"/>
-                        <a:cs typeface="Times New Roman" panose="02020603050405020304" pitchFamily="18" charset="0"/>
+                        <a:cs typeface="Times New Roman" panose="02020503050405090304" pitchFamily="18" charset="0"/>
                       </a:endParaRPr>
                     </a:p>
                   </a:txBody>
@@ -5458,7 +5208,7 @@
                         <a:effectLst/>
                         <a:latin typeface="Calibri" panose="020F0502020204030204" pitchFamily="34" charset="0"/>
                         <a:ea typeface="Calibri" panose="020F0502020204030204" pitchFamily="34" charset="0"/>
-                        <a:cs typeface="Times New Roman" panose="02020603050405020304" pitchFamily="18" charset="0"/>
+                        <a:cs typeface="Times New Roman" panose="02020503050405090304" pitchFamily="18" charset="0"/>
                       </a:endParaRPr>
                     </a:p>
                   </a:txBody>
@@ -5487,7 +5237,7 @@
                         <a:effectLst/>
                         <a:latin typeface="Calibri" panose="020F0502020204030204" pitchFamily="34" charset="0"/>
                         <a:ea typeface="Calibri" panose="020F0502020204030204" pitchFamily="34" charset="0"/>
-                        <a:cs typeface="Times New Roman" panose="02020603050405020304" pitchFamily="18" charset="0"/>
+                        <a:cs typeface="Times New Roman" panose="02020503050405090304" pitchFamily="18" charset="0"/>
                       </a:endParaRPr>
                     </a:p>
                   </a:txBody>
@@ -5516,7 +5266,7 @@
                         <a:effectLst/>
                         <a:latin typeface="Calibri" panose="020F0502020204030204" pitchFamily="34" charset="0"/>
                         <a:ea typeface="Calibri" panose="020F0502020204030204" pitchFamily="34" charset="0"/>
-                        <a:cs typeface="Times New Roman" panose="02020603050405020304" pitchFamily="18" charset="0"/>
+                        <a:cs typeface="Times New Roman" panose="02020503050405090304" pitchFamily="18" charset="0"/>
                       </a:endParaRPr>
                     </a:p>
                   </a:txBody>
@@ -5545,17 +5295,12 @@
                         <a:effectLst/>
                         <a:latin typeface="Calibri" panose="020F0502020204030204" pitchFamily="34" charset="0"/>
                         <a:ea typeface="Calibri" panose="020F0502020204030204" pitchFamily="34" charset="0"/>
-                        <a:cs typeface="Times New Roman" panose="02020603050405020304" pitchFamily="18" charset="0"/>
+                        <a:cs typeface="Times New Roman" panose="02020503050405090304" pitchFamily="18" charset="0"/>
                       </a:endParaRPr>
                     </a:p>
                   </a:txBody>
                   <a:tcPr marL="68580" marR="68580" marT="0" marB="0"/>
                 </a:tc>
-                <a:extLst>
-                  <a:ext uri="{0D108BD9-81ED-4DB2-BD59-A6C34878D82A}">
-                    <a16:rowId xmlns:a16="http://schemas.microsoft.com/office/drawing/2014/main" val="377500767"/>
-                  </a:ext>
-                </a:extLst>
               </a:tr>
               <a:tr h="968189">
                 <a:tc>
@@ -5581,7 +5326,7 @@
                         <a:effectLst/>
                         <a:latin typeface="Calibri" panose="020F0502020204030204" pitchFamily="34" charset="0"/>
                         <a:ea typeface="Calibri" panose="020F0502020204030204" pitchFamily="34" charset="0"/>
-                        <a:cs typeface="Times New Roman" panose="02020603050405020304" pitchFamily="18" charset="0"/>
+                        <a:cs typeface="Times New Roman" panose="02020503050405090304" pitchFamily="18" charset="0"/>
                       </a:endParaRPr>
                     </a:p>
                   </a:txBody>
@@ -5610,7 +5355,7 @@
                         <a:effectLst/>
                         <a:latin typeface="Calibri" panose="020F0502020204030204" pitchFamily="34" charset="0"/>
                         <a:ea typeface="Calibri" panose="020F0502020204030204" pitchFamily="34" charset="0"/>
-                        <a:cs typeface="Times New Roman" panose="02020603050405020304" pitchFamily="18" charset="0"/>
+                        <a:cs typeface="Times New Roman" panose="02020503050405090304" pitchFamily="18" charset="0"/>
                       </a:endParaRPr>
                     </a:p>
                   </a:txBody>
@@ -5639,7 +5384,7 @@
                         <a:effectLst/>
                         <a:latin typeface="Calibri" panose="020F0502020204030204" pitchFamily="34" charset="0"/>
                         <a:ea typeface="Calibri" panose="020F0502020204030204" pitchFamily="34" charset="0"/>
-                        <a:cs typeface="Times New Roman" panose="02020603050405020304" pitchFamily="18" charset="0"/>
+                        <a:cs typeface="Times New Roman" panose="02020503050405090304" pitchFamily="18" charset="0"/>
                       </a:endParaRPr>
                     </a:p>
                   </a:txBody>
@@ -5668,7 +5413,7 @@
                         <a:effectLst/>
                         <a:latin typeface="Calibri" panose="020F0502020204030204" pitchFamily="34" charset="0"/>
                         <a:ea typeface="Calibri" panose="020F0502020204030204" pitchFamily="34" charset="0"/>
-                        <a:cs typeface="Times New Roman" panose="02020603050405020304" pitchFamily="18" charset="0"/>
+                        <a:cs typeface="Times New Roman" panose="02020503050405090304" pitchFamily="18" charset="0"/>
                       </a:endParaRPr>
                     </a:p>
                   </a:txBody>
@@ -5697,17 +5442,12 @@
                         <a:effectLst/>
                         <a:latin typeface="Calibri" panose="020F0502020204030204" pitchFamily="34" charset="0"/>
                         <a:ea typeface="Calibri" panose="020F0502020204030204" pitchFamily="34" charset="0"/>
-                        <a:cs typeface="Times New Roman" panose="02020603050405020304" pitchFamily="18" charset="0"/>
+                        <a:cs typeface="Times New Roman" panose="02020503050405090304" pitchFamily="18" charset="0"/>
                       </a:endParaRPr>
                     </a:p>
                   </a:txBody>
                   <a:tcPr marL="68580" marR="68580" marT="0" marB="0"/>
                 </a:tc>
-                <a:extLst>
-                  <a:ext uri="{0D108BD9-81ED-4DB2-BD59-A6C34878D82A}">
-                    <a16:rowId xmlns:a16="http://schemas.microsoft.com/office/drawing/2014/main" val="4260327335"/>
-                  </a:ext>
-                </a:extLst>
               </a:tr>
             </a:tbl>
           </a:graphicData>
@@ -5715,13 +5455,7 @@
       </p:graphicFrame>
       <p:sp>
         <p:nvSpPr>
-          <p:cNvPr id="4" name="Date Placeholder 3">
-            <a:extLst>
-              <a:ext uri="{FF2B5EF4-FFF2-40B4-BE49-F238E27FC236}">
-                <a16:creationId xmlns:a16="http://schemas.microsoft.com/office/drawing/2014/main" id="{5D1446D8-069E-47E7-AAB0-EACF0F8398F8}"/>
-              </a:ext>
-            </a:extLst>
-          </p:cNvPr>
+          <p:cNvPr id="4" name="Date Placeholder 3"/>
           <p:cNvSpPr>
             <a:spLocks noGrp="1"/>
           </p:cNvSpPr>
@@ -5752,13 +5486,7 @@
       </p:sp>
       <p:sp>
         <p:nvSpPr>
-          <p:cNvPr id="6" name="Slide Number Placeholder 5">
-            <a:extLst>
-              <a:ext uri="{FF2B5EF4-FFF2-40B4-BE49-F238E27FC236}">
-                <a16:creationId xmlns:a16="http://schemas.microsoft.com/office/drawing/2014/main" id="{E5EE28F2-3E99-4270-877A-C49BD8039D32}"/>
-              </a:ext>
-            </a:extLst>
-          </p:cNvPr>
+          <p:cNvPr id="6" name="Slide Number Placeholder 5"/>
           <p:cNvSpPr>
             <a:spLocks noGrp="1"/>
           </p:cNvSpPr>
@@ -5773,8 +5501,6 @@
           <a:p>
             <a:fld id="{A4BAB868-1E00-44C6-B1AB-DFCC5F9865BA}" type="slidenum">
               <a:rPr lang="ja-JP" altLang="en-US" smtClean="0"/>
-              <a:pPr/>
-              <a:t>14</a:t>
             </a:fld>
             <a:endParaRPr lang="en-US" altLang="ja-JP"/>
           </a:p>
@@ -5782,13 +5508,7 @@
       </p:sp>
       <p:sp>
         <p:nvSpPr>
-          <p:cNvPr id="8" name="Rectangle 1">
-            <a:extLst>
-              <a:ext uri="{FF2B5EF4-FFF2-40B4-BE49-F238E27FC236}">
-                <a16:creationId xmlns:a16="http://schemas.microsoft.com/office/drawing/2014/main" id="{46DB4099-764C-4CD1-9AD6-4911B9EC44FE}"/>
-              </a:ext>
-            </a:extLst>
-          </p:cNvPr>
+          <p:cNvPr id="8" name="Rectangle 1"/>
           <p:cNvSpPr>
             <a:spLocks noChangeArrowheads="1"/>
           </p:cNvSpPr>
@@ -5838,9 +5558,6 @@
         </p:spPr>
         <p:txBody>
           <a:bodyPr vert="horz" wrap="none" lIns="91440" tIns="45720" rIns="91440" bIns="45720" numCol="1" anchor="ctr" anchorCtr="0" compatLnSpc="1">
-            <a:prstTxWarp prst="textNoShape">
-              <a:avLst/>
-            </a:prstTxWarp>
             <a:spAutoFit/>
           </a:bodyPr>
           <a:lstStyle/>
@@ -5850,11 +5567,6 @@
         </p:txBody>
       </p:sp>
     </p:spTree>
-    <p:extLst>
-      <p:ext uri="{BB962C8B-B14F-4D97-AF65-F5344CB8AC3E}">
-        <p14:creationId xmlns:p14="http://schemas.microsoft.com/office/powerpoint/2010/main" val="502792391"/>
-      </p:ext>
-    </p:extLst>
   </p:cSld>
   <p:clrMapOvr>
     <a:masterClrMapping/>
@@ -5884,13 +5596,7 @@
       </p:grpSpPr>
       <p:sp>
         <p:nvSpPr>
-          <p:cNvPr id="2" name="Title 1">
-            <a:extLst>
-              <a:ext uri="{FF2B5EF4-FFF2-40B4-BE49-F238E27FC236}">
-                <a16:creationId xmlns:a16="http://schemas.microsoft.com/office/drawing/2014/main" id="{368323DE-B14C-4317-AD02-07F45A5F21DE}"/>
-              </a:ext>
-            </a:extLst>
-          </p:cNvPr>
+          <p:cNvPr id="2" name="Title 1"/>
           <p:cNvSpPr>
             <a:spLocks noGrp="1"/>
           </p:cNvSpPr>
@@ -5907,18 +5613,13 @@
               <a:rPr lang="en-CA" dirty="0"/>
               <a:t>8. Design: Acquaintance Model</a:t>
             </a:r>
-          </a:p>
-        </p:txBody>
-      </p:sp>
-      <p:sp>
-        <p:nvSpPr>
-          <p:cNvPr id="4" name="Date Placeholder 3">
-            <a:extLst>
-              <a:ext uri="{FF2B5EF4-FFF2-40B4-BE49-F238E27FC236}">
-                <a16:creationId xmlns:a16="http://schemas.microsoft.com/office/drawing/2014/main" id="{D6734280-F370-40C7-964C-AD71EE1EED72}"/>
-              </a:ext>
-            </a:extLst>
-          </p:cNvPr>
+            <a:endParaRPr lang="en-CA" dirty="0"/>
+          </a:p>
+        </p:txBody>
+      </p:sp>
+      <p:sp>
+        <p:nvSpPr>
+          <p:cNvPr id="4" name="Date Placeholder 3"/>
           <p:cNvSpPr>
             <a:spLocks noGrp="1"/>
           </p:cNvSpPr>
@@ -5949,13 +5650,7 @@
       </p:sp>
       <p:sp>
         <p:nvSpPr>
-          <p:cNvPr id="6" name="Slide Number Placeholder 5">
-            <a:extLst>
-              <a:ext uri="{FF2B5EF4-FFF2-40B4-BE49-F238E27FC236}">
-                <a16:creationId xmlns:a16="http://schemas.microsoft.com/office/drawing/2014/main" id="{778E3DC4-4281-44F4-9D4C-E7DAB213D0EE}"/>
-              </a:ext>
-            </a:extLst>
-          </p:cNvPr>
+          <p:cNvPr id="6" name="Slide Number Placeholder 5"/>
           <p:cNvSpPr>
             <a:spLocks noGrp="1"/>
           </p:cNvSpPr>
@@ -5970,8 +5665,6 @@
           <a:p>
             <a:fld id="{A4BAB868-1E00-44C6-B1AB-DFCC5F9865BA}" type="slidenum">
               <a:rPr lang="ja-JP" altLang="en-US" smtClean="0"/>
-              <a:pPr/>
-              <a:t>15</a:t>
             </a:fld>
             <a:endParaRPr lang="en-US" altLang="ja-JP"/>
           </a:p>
@@ -5979,20 +5672,14 @@
       </p:sp>
       <p:pic>
         <p:nvPicPr>
-          <p:cNvPr id="10" name="Picture 9">
-            <a:extLst>
-              <a:ext uri="{FF2B5EF4-FFF2-40B4-BE49-F238E27FC236}">
-                <a16:creationId xmlns:a16="http://schemas.microsoft.com/office/drawing/2014/main" id="{BEE8B78B-2092-4A87-B0E9-F1171148EF02}"/>
-              </a:ext>
-            </a:extLst>
-          </p:cNvPr>
+          <p:cNvPr id="10" name="Picture 9"/>
           <p:cNvPicPr>
             <a:picLocks noChangeAspect="1"/>
           </p:cNvPicPr>
           <p:nvPr/>
         </p:nvPicPr>
         <p:blipFill>
-          <a:blip r:embed="rId2"/>
+          <a:blip r:embed="rId1"/>
           <a:stretch>
             <a:fillRect/>
           </a:stretch>
@@ -6008,11 +5695,6 @@
         </p:spPr>
       </p:pic>
     </p:spTree>
-    <p:extLst>
-      <p:ext uri="{BB962C8B-B14F-4D97-AF65-F5344CB8AC3E}">
-        <p14:creationId xmlns:p14="http://schemas.microsoft.com/office/powerpoint/2010/main" val="358017946"/>
-      </p:ext>
-    </p:extLst>
   </p:cSld>
   <p:clrMapOvr>
     <a:masterClrMapping/>
@@ -6073,8 +5755,8 @@
                 <a:solidFill>
                   <a:srgbClr val="000000"/>
                 </a:solidFill>
-                <a:latin typeface="Tahoma" pitchFamily="34" charset="0"/>
-                <a:ea typeface="ＭＳ Ｐゴシック" pitchFamily="50" charset="-128"/>
+                <a:latin typeface="Tahoma" panose="020B0604030504040204" pitchFamily="34" charset="0"/>
+                <a:ea typeface="MS PGothic" pitchFamily="50" charset="-128"/>
               </a:rPr>
               <a:t>SENG696 (Fall 2021)</a:t>
             </a:r>
@@ -6082,8 +5764,8 @@
               <a:solidFill>
                 <a:srgbClr val="000000"/>
               </a:solidFill>
-              <a:latin typeface="Tahoma" pitchFamily="34" charset="0"/>
-              <a:ea typeface="ＭＳ Ｐゴシック" pitchFamily="50" charset="-128"/>
+              <a:latin typeface="Tahoma" panose="020B0604030504040204" pitchFamily="34" charset="0"/>
+              <a:ea typeface="MS PGothic" pitchFamily="50" charset="-128"/>
             </a:endParaRPr>
           </a:p>
         </p:txBody>
@@ -6121,25 +5803,16 @@
                 <a:solidFill>
                   <a:srgbClr val="000000"/>
                 </a:solidFill>
-                <a:latin typeface="Tahoma" pitchFamily="34" charset="0"/>
-                <a:ea typeface="ＭＳ Ｐゴシック" pitchFamily="50" charset="-128"/>
+                <a:latin typeface="Tahoma" panose="020B0604030504040204" pitchFamily="34" charset="0"/>
+                <a:ea typeface="MS PGothic" pitchFamily="50" charset="-128"/>
               </a:rPr>
-              <a:pPr fontAlgn="base">
-                <a:spcBef>
-                  <a:spcPct val="0"/>
-                </a:spcBef>
-                <a:spcAft>
-                  <a:spcPct val="0"/>
-                </a:spcAft>
-              </a:pPr>
-              <a:t>2</a:t>
             </a:fld>
             <a:endParaRPr lang="en-US" altLang="ja-JP" dirty="0">
               <a:solidFill>
                 <a:srgbClr val="000000"/>
               </a:solidFill>
-              <a:latin typeface="Tahoma" pitchFamily="34" charset="0"/>
-              <a:ea typeface="ＭＳ Ｐゴシック" pitchFamily="50" charset="-128"/>
+              <a:latin typeface="Tahoma" panose="020B0604030504040204" pitchFamily="34" charset="0"/>
+              <a:ea typeface="MS PGothic" pitchFamily="50" charset="-128"/>
             </a:endParaRPr>
           </a:p>
         </p:txBody>
@@ -6163,6 +5836,7 @@
               <a:rPr lang="en-CA" dirty="0"/>
               <a:t>1. Business Case (cont’d)</a:t>
             </a:r>
+            <a:endParaRPr lang="en-CA" dirty="0"/>
           </a:p>
         </p:txBody>
       </p:sp>
@@ -6195,11 +5869,15 @@
             </a:pPr>
             <a:r>
               <a:rPr lang="en-US" sz="2400" dirty="0">
-                <a:latin typeface="Times New Roman" panose="02020603050405020304" pitchFamily="18" charset="0"/>
-                <a:cs typeface="Times New Roman" panose="02020603050405020304" pitchFamily="18" charset="0"/>
+                <a:latin typeface="Times New Roman" panose="02020503050405090304" pitchFamily="18" charset="0"/>
+                <a:cs typeface="Times New Roman" panose="02020503050405090304" pitchFamily="18" charset="0"/>
               </a:rPr>
               <a:t>Pet-owners are dependent on calls from the veterinary clinic to schedule timely appointments that match their routine and visit in person to get their pets examined. There is no provision to avail these services from home.</a:t>
             </a:r>
+            <a:endParaRPr lang="en-US" sz="2400" dirty="0">
+              <a:latin typeface="Times New Roman" panose="02020503050405090304" pitchFamily="18" charset="0"/>
+              <a:cs typeface="Times New Roman" panose="02020503050405090304" pitchFamily="18" charset="0"/>
+            </a:endParaRPr>
           </a:p>
           <a:p>
             <a:pPr marL="285750" indent="-285750">
@@ -6211,11 +5889,15 @@
             </a:pPr>
             <a:r>
               <a:rPr lang="en-US" sz="2400" dirty="0">
-                <a:latin typeface="Times New Roman" panose="02020603050405020304" pitchFamily="18" charset="0"/>
-                <a:cs typeface="Times New Roman" panose="02020603050405020304" pitchFamily="18" charset="0"/>
+                <a:latin typeface="Times New Roman" panose="02020503050405090304" pitchFamily="18" charset="0"/>
+                <a:cs typeface="Times New Roman" panose="02020503050405090304" pitchFamily="18" charset="0"/>
               </a:rPr>
               <a:t>Even after scheduling an appointment, owners might forget to update their schedule and visit the clinic on time. This could play a big role in ensuring timely treatment for the animals.</a:t>
             </a:r>
+            <a:endParaRPr lang="en-US" sz="2400" dirty="0">
+              <a:latin typeface="Times New Roman" panose="02020503050405090304" pitchFamily="18" charset="0"/>
+              <a:cs typeface="Times New Roman" panose="02020503050405090304" pitchFamily="18" charset="0"/>
+            </a:endParaRPr>
           </a:p>
           <a:p>
             <a:pPr marL="285750" indent="-285750">
@@ -6227,11 +5909,15 @@
             </a:pPr>
             <a:r>
               <a:rPr lang="en-US" sz="2400" dirty="0">
-                <a:latin typeface="Times New Roman" panose="02020603050405020304" pitchFamily="18" charset="0"/>
-                <a:cs typeface="Times New Roman" panose="02020603050405020304" pitchFamily="18" charset="0"/>
+                <a:latin typeface="Times New Roman" panose="02020503050405090304" pitchFamily="18" charset="0"/>
+                <a:cs typeface="Times New Roman" panose="02020503050405090304" pitchFamily="18" charset="0"/>
               </a:rPr>
               <a:t>Vets currently have to spend a lot of time submitting reports for the animals they examine. Automating the process with a built-in template will maximize the time-utilization and efficiency of the clinic.</a:t>
             </a:r>
+            <a:endParaRPr lang="en-US" sz="2400" dirty="0">
+              <a:latin typeface="Times New Roman" panose="02020503050405090304" pitchFamily="18" charset="0"/>
+              <a:cs typeface="Times New Roman" panose="02020503050405090304" pitchFamily="18" charset="0"/>
+            </a:endParaRPr>
           </a:p>
           <a:p>
             <a:pPr marL="285750" indent="-285750">
@@ -6246,8 +5932,8 @@
               <a:t>In this situation, intelligent agents have a great potential in helping the owners get timely appointments and prevent deprivation of proper care and diagnosis for their pets.</a:t>
             </a:r>
             <a:endParaRPr lang="en-US" sz="2400" dirty="0">
-              <a:latin typeface="Times New Roman" panose="02020603050405020304" pitchFamily="18" charset="0"/>
-              <a:cs typeface="Times New Roman" panose="02020603050405020304" pitchFamily="18" charset="0"/>
+              <a:latin typeface="Times New Roman" panose="02020503050405090304" pitchFamily="18" charset="0"/>
+              <a:cs typeface="Times New Roman" panose="02020503050405090304" pitchFamily="18" charset="0"/>
             </a:endParaRPr>
           </a:p>
           <a:p>
@@ -6259,18 +5945,13 @@
               <a:buChar char="§"/>
             </a:pPr>
             <a:endParaRPr lang="en-US" sz="2400" dirty="0">
-              <a:latin typeface="Times New Roman" panose="02020603050405020304" pitchFamily="18" charset="0"/>
-              <a:cs typeface="Times New Roman" panose="02020603050405020304" pitchFamily="18" charset="0"/>
+              <a:latin typeface="Times New Roman" panose="02020503050405090304" pitchFamily="18" charset="0"/>
+              <a:cs typeface="Times New Roman" panose="02020503050405090304" pitchFamily="18" charset="0"/>
             </a:endParaRPr>
           </a:p>
         </p:txBody>
       </p:sp>
     </p:spTree>
-    <p:extLst>
-      <p:ext uri="{BB962C8B-B14F-4D97-AF65-F5344CB8AC3E}">
-        <p14:creationId xmlns:p14="http://schemas.microsoft.com/office/powerpoint/2010/main" val="2103329546"/>
-      </p:ext>
-    </p:extLst>
   </p:cSld>
   <p:clrMapOvr>
     <a:masterClrMapping/>
@@ -6331,8 +6012,8 @@
                 <a:solidFill>
                   <a:srgbClr val="000000"/>
                 </a:solidFill>
-                <a:latin typeface="Tahoma" pitchFamily="34" charset="0"/>
-                <a:ea typeface="ＭＳ Ｐゴシック" pitchFamily="50" charset="-128"/>
+                <a:latin typeface="Tahoma" panose="020B0604030504040204" pitchFamily="34" charset="0"/>
+                <a:ea typeface="MS PGothic" pitchFamily="50" charset="-128"/>
               </a:rPr>
               <a:t>SENG696 (Fall 2021)</a:t>
             </a:r>
@@ -6340,8 +6021,8 @@
               <a:solidFill>
                 <a:srgbClr val="000000"/>
               </a:solidFill>
-              <a:latin typeface="Tahoma" pitchFamily="34" charset="0"/>
-              <a:ea typeface="ＭＳ Ｐゴシック" pitchFamily="50" charset="-128"/>
+              <a:latin typeface="Tahoma" panose="020B0604030504040204" pitchFamily="34" charset="0"/>
+              <a:ea typeface="MS PGothic" pitchFamily="50" charset="-128"/>
             </a:endParaRPr>
           </a:p>
         </p:txBody>
@@ -6379,25 +6060,16 @@
                 <a:solidFill>
                   <a:srgbClr val="000000"/>
                 </a:solidFill>
-                <a:latin typeface="Tahoma" pitchFamily="34" charset="0"/>
-                <a:ea typeface="ＭＳ Ｐゴシック" pitchFamily="50" charset="-128"/>
+                <a:latin typeface="Tahoma" panose="020B0604030504040204" pitchFamily="34" charset="0"/>
+                <a:ea typeface="MS PGothic" pitchFamily="50" charset="-128"/>
               </a:rPr>
-              <a:pPr fontAlgn="base">
-                <a:spcBef>
-                  <a:spcPct val="0"/>
-                </a:spcBef>
-                <a:spcAft>
-                  <a:spcPct val="0"/>
-                </a:spcAft>
-              </a:pPr>
-              <a:t>3</a:t>
             </a:fld>
             <a:endParaRPr lang="en-US" altLang="ja-JP" dirty="0">
               <a:solidFill>
                 <a:srgbClr val="000000"/>
               </a:solidFill>
-              <a:latin typeface="Tahoma" pitchFamily="34" charset="0"/>
-              <a:ea typeface="ＭＳ Ｐゴシック" pitchFamily="50" charset="-128"/>
+              <a:latin typeface="Tahoma" panose="020B0604030504040204" pitchFamily="34" charset="0"/>
+              <a:ea typeface="MS PGothic" pitchFamily="50" charset="-128"/>
             </a:endParaRPr>
           </a:p>
         </p:txBody>
@@ -6421,6 +6093,7 @@
               <a:rPr lang="en-CA"/>
               <a:t>2. System Description</a:t>
             </a:r>
+            <a:endParaRPr lang="en-CA"/>
           </a:p>
         </p:txBody>
       </p:sp>
@@ -6467,6 +6140,7 @@
               <a:rPr lang="en-CA" sz="2600" dirty="0"/>
               <a:t> is a multi-agent system designed to render multiple functionalities to simplify the appointment booking process to the pet-owner(user) based on the owner’s preferences. </a:t>
             </a:r>
+            <a:endParaRPr lang="en-CA" sz="2600" dirty="0"/>
           </a:p>
           <a:p>
             <a:pPr>
@@ -6480,6 +6154,7 @@
               <a:rPr lang="en-CA" sz="2600" dirty="0"/>
               <a:t>The clinic package is composed of a Video Interaction system, a Reminder generator, and a utility to generate medical reports.</a:t>
             </a:r>
+            <a:endParaRPr lang="en-CA" sz="2600" dirty="0"/>
           </a:p>
           <a:p>
             <a:pPr>
@@ -6505,6 +6180,7 @@
               <a:rPr lang="en-CA" sz="2600" dirty="0"/>
               <a:t>application deals with a doctor’s multiple available schedules to find the optimum appointment window for the pet-owner, taking into consideration the related fees and severity of the symptoms. </a:t>
             </a:r>
+            <a:endParaRPr lang="en-CA" sz="2600" dirty="0"/>
           </a:p>
           <a:p>
             <a:pPr>
@@ -6518,15 +6194,11 @@
               <a:rPr lang="en-CA" sz="2600" dirty="0"/>
               <a:t>The application has to schedule the appointment and send regular reminders for the appointment dates to the pet-owner. It also generates a medical report based upon the doctor’s feedback and stores it for future references.</a:t>
             </a:r>
+            <a:endParaRPr lang="en-CA" sz="2600" dirty="0"/>
           </a:p>
         </p:txBody>
       </p:sp>
     </p:spTree>
-    <p:extLst>
-      <p:ext uri="{BB962C8B-B14F-4D97-AF65-F5344CB8AC3E}">
-        <p14:creationId xmlns:p14="http://schemas.microsoft.com/office/powerpoint/2010/main" val="2276971620"/>
-      </p:ext>
-    </p:extLst>
   </p:cSld>
   <p:clrMapOvr>
     <a:masterClrMapping/>
@@ -6556,13 +6228,7 @@
       </p:grpSpPr>
       <p:sp>
         <p:nvSpPr>
-          <p:cNvPr id="2" name="Title 1">
-            <a:extLst>
-              <a:ext uri="{FF2B5EF4-FFF2-40B4-BE49-F238E27FC236}">
-                <a16:creationId xmlns:a16="http://schemas.microsoft.com/office/drawing/2014/main" id="{73DFDF9A-39FF-430D-AA90-98C73FA65194}"/>
-              </a:ext>
-            </a:extLst>
-          </p:cNvPr>
+          <p:cNvPr id="2" name="Title 1"/>
           <p:cNvSpPr>
             <a:spLocks noGrp="1"/>
           </p:cNvSpPr>
@@ -6579,18 +6245,13 @@
               <a:rPr lang="en-CA" dirty="0"/>
               <a:t>System Description (cont’d)</a:t>
             </a:r>
+            <a:endParaRPr lang="en-CA" dirty="0"/>
           </a:p>
         </p:txBody>
       </p:sp>
       <p:pic>
         <p:nvPicPr>
-          <p:cNvPr id="8" name="Content Placeholder 7">
-            <a:extLst>
-              <a:ext uri="{FF2B5EF4-FFF2-40B4-BE49-F238E27FC236}">
-                <a16:creationId xmlns:a16="http://schemas.microsoft.com/office/drawing/2014/main" id="{8396EF12-6BB4-4419-9359-C4A6DEE170B5}"/>
-              </a:ext>
-            </a:extLst>
-          </p:cNvPr>
+          <p:cNvPr id="8" name="Content Placeholder 7"/>
           <p:cNvPicPr>
             <a:picLocks noGrp="1" noChangeAspect="1"/>
           </p:cNvPicPr>
@@ -6599,7 +6260,7 @@
           </p:nvPr>
         </p:nvPicPr>
         <p:blipFill>
-          <a:blip r:embed="rId2"/>
+          <a:blip r:embed="rId1"/>
           <a:stretch>
             <a:fillRect/>
           </a:stretch>
@@ -6613,13 +6274,7 @@
       </p:pic>
       <p:sp>
         <p:nvSpPr>
-          <p:cNvPr id="4" name="Date Placeholder 3">
-            <a:extLst>
-              <a:ext uri="{FF2B5EF4-FFF2-40B4-BE49-F238E27FC236}">
-                <a16:creationId xmlns:a16="http://schemas.microsoft.com/office/drawing/2014/main" id="{498642DC-E69F-4259-982E-D88A957ACE32}"/>
-              </a:ext>
-            </a:extLst>
-          </p:cNvPr>
+          <p:cNvPr id="4" name="Date Placeholder 3"/>
           <p:cNvSpPr>
             <a:spLocks noGrp="1"/>
           </p:cNvSpPr>
@@ -6650,13 +6305,7 @@
       </p:sp>
       <p:sp>
         <p:nvSpPr>
-          <p:cNvPr id="6" name="Slide Number Placeholder 5">
-            <a:extLst>
-              <a:ext uri="{FF2B5EF4-FFF2-40B4-BE49-F238E27FC236}">
-                <a16:creationId xmlns:a16="http://schemas.microsoft.com/office/drawing/2014/main" id="{1A19D266-15FF-4116-BD0D-F82DFC0D1A7A}"/>
-              </a:ext>
-            </a:extLst>
-          </p:cNvPr>
+          <p:cNvPr id="6" name="Slide Number Placeholder 5"/>
           <p:cNvSpPr>
             <a:spLocks noGrp="1"/>
           </p:cNvSpPr>
@@ -6671,19 +6320,12 @@
           <a:p>
             <a:fld id="{A4BAB868-1E00-44C6-B1AB-DFCC5F9865BA}" type="slidenum">
               <a:rPr lang="ja-JP" altLang="en-US" smtClean="0"/>
-              <a:pPr/>
-              <a:t>4</a:t>
             </a:fld>
             <a:endParaRPr lang="en-US" altLang="ja-JP"/>
           </a:p>
         </p:txBody>
       </p:sp>
     </p:spTree>
-    <p:extLst>
-      <p:ext uri="{BB962C8B-B14F-4D97-AF65-F5344CB8AC3E}">
-        <p14:creationId xmlns:p14="http://schemas.microsoft.com/office/powerpoint/2010/main" val="864621906"/>
-      </p:ext>
-    </p:extLst>
   </p:cSld>
   <p:clrMapOvr>
     <a:masterClrMapping/>
@@ -6713,13 +6355,7 @@
       </p:grpSpPr>
       <p:sp>
         <p:nvSpPr>
-          <p:cNvPr id="2" name="Title 1">
-            <a:extLst>
-              <a:ext uri="{FF2B5EF4-FFF2-40B4-BE49-F238E27FC236}">
-                <a16:creationId xmlns:a16="http://schemas.microsoft.com/office/drawing/2014/main" id="{32FFF423-63D7-42A4-A812-BA4E971840A2}"/>
-              </a:ext>
-            </a:extLst>
-          </p:cNvPr>
+          <p:cNvPr id="2" name="Title 1"/>
           <p:cNvSpPr>
             <a:spLocks noGrp="1"/>
           </p:cNvSpPr>
@@ -6736,18 +6372,13 @@
               <a:rPr lang="en-CA" dirty="0"/>
               <a:t>3. Assumptions</a:t>
             </a:r>
-          </a:p>
-        </p:txBody>
-      </p:sp>
-      <p:sp>
-        <p:nvSpPr>
-          <p:cNvPr id="3" name="Content Placeholder 2">
-            <a:extLst>
-              <a:ext uri="{FF2B5EF4-FFF2-40B4-BE49-F238E27FC236}">
-                <a16:creationId xmlns:a16="http://schemas.microsoft.com/office/drawing/2014/main" id="{9289CBD4-8B82-4598-8DFA-C98950A290A8}"/>
-              </a:ext>
-            </a:extLst>
-          </p:cNvPr>
+            <a:endParaRPr lang="en-CA" dirty="0"/>
+          </a:p>
+        </p:txBody>
+      </p:sp>
+      <p:sp>
+        <p:nvSpPr>
+          <p:cNvPr id="3" name="Content Placeholder 2"/>
           <p:cNvSpPr>
             <a:spLocks noGrp="1"/>
           </p:cNvSpPr>
@@ -6773,7 +6404,7 @@
                 <a:effectLst/>
                 <a:latin typeface="Calibri" panose="020F0502020204030204" pitchFamily="34" charset="0"/>
                 <a:ea typeface="Calibri" panose="020F0502020204030204" pitchFamily="34" charset="0"/>
-                <a:cs typeface="Times New Roman" panose="02020603050405020304" pitchFamily="18" charset="0"/>
+                <a:cs typeface="Times New Roman" panose="02020503050405090304" pitchFamily="18" charset="0"/>
               </a:rPr>
               <a:t>To enable video interaction between the doctor and the patient, the system will use existing video conferencing platforms (ZOOM/ Google Meet, etc.)</a:t>
             </a:r>
@@ -6781,7 +6412,7 @@
               <a:effectLst/>
               <a:latin typeface="Calibri" panose="020F0502020204030204" pitchFamily="34" charset="0"/>
               <a:ea typeface="Calibri" panose="020F0502020204030204" pitchFamily="34" charset="0"/>
-              <a:cs typeface="Times New Roman" panose="02020603050405020304" pitchFamily="18" charset="0"/>
+              <a:cs typeface="Times New Roman" panose="02020503050405090304" pitchFamily="18" charset="0"/>
             </a:endParaRPr>
           </a:p>
           <a:p>
@@ -6798,7 +6429,7 @@
                 <a:effectLst/>
                 <a:latin typeface="Calibri" panose="020F0502020204030204" pitchFamily="34" charset="0"/>
                 <a:ea typeface="Calibri" panose="020F0502020204030204" pitchFamily="34" charset="0"/>
-                <a:cs typeface="Times New Roman" panose="02020603050405020304" pitchFamily="18" charset="0"/>
+                <a:cs typeface="Times New Roman" panose="02020503050405090304" pitchFamily="18" charset="0"/>
               </a:rPr>
               <a:t>The user schedules their appointment using a web interface. The interface captures the user preferences and updates the available time slots in real time. </a:t>
             </a:r>
@@ -6806,7 +6437,7 @@
               <a:effectLst/>
               <a:latin typeface="Calibri" panose="020F0502020204030204" pitchFamily="34" charset="0"/>
               <a:ea typeface="Calibri" panose="020F0502020204030204" pitchFamily="34" charset="0"/>
-              <a:cs typeface="Times New Roman" panose="02020603050405020304" pitchFamily="18" charset="0"/>
+              <a:cs typeface="Times New Roman" panose="02020503050405090304" pitchFamily="18" charset="0"/>
             </a:endParaRPr>
           </a:p>
           <a:p>
@@ -6816,13 +6447,7 @@
       </p:sp>
       <p:sp>
         <p:nvSpPr>
-          <p:cNvPr id="4" name="Date Placeholder 3">
-            <a:extLst>
-              <a:ext uri="{FF2B5EF4-FFF2-40B4-BE49-F238E27FC236}">
-                <a16:creationId xmlns:a16="http://schemas.microsoft.com/office/drawing/2014/main" id="{86A4CBD5-3533-4D86-A639-ECFD24CDB124}"/>
-              </a:ext>
-            </a:extLst>
-          </p:cNvPr>
+          <p:cNvPr id="4" name="Date Placeholder 3"/>
           <p:cNvSpPr>
             <a:spLocks noGrp="1"/>
           </p:cNvSpPr>
@@ -6853,13 +6478,7 @@
       </p:sp>
       <p:sp>
         <p:nvSpPr>
-          <p:cNvPr id="6" name="Slide Number Placeholder 5">
-            <a:extLst>
-              <a:ext uri="{FF2B5EF4-FFF2-40B4-BE49-F238E27FC236}">
-                <a16:creationId xmlns:a16="http://schemas.microsoft.com/office/drawing/2014/main" id="{F7548F90-2286-44AF-8464-EFD8AFFCA42B}"/>
-              </a:ext>
-            </a:extLst>
-          </p:cNvPr>
+          <p:cNvPr id="6" name="Slide Number Placeholder 5"/>
           <p:cNvSpPr>
             <a:spLocks noGrp="1"/>
           </p:cNvSpPr>
@@ -6874,19 +6493,12 @@
           <a:p>
             <a:fld id="{A4BAB868-1E00-44C6-B1AB-DFCC5F9865BA}" type="slidenum">
               <a:rPr lang="ja-JP" altLang="en-US" smtClean="0"/>
-              <a:pPr/>
-              <a:t>5</a:t>
             </a:fld>
             <a:endParaRPr lang="en-US" altLang="ja-JP"/>
           </a:p>
         </p:txBody>
       </p:sp>
     </p:spTree>
-    <p:extLst>
-      <p:ext uri="{BB962C8B-B14F-4D97-AF65-F5344CB8AC3E}">
-        <p14:creationId xmlns:p14="http://schemas.microsoft.com/office/powerpoint/2010/main" val="4014871096"/>
-      </p:ext>
-    </p:extLst>
   </p:cSld>
   <p:clrMapOvr>
     <a:masterClrMapping/>
@@ -6916,13 +6528,7 @@
       </p:grpSpPr>
       <p:sp>
         <p:nvSpPr>
-          <p:cNvPr id="2" name="Title 1">
-            <a:extLst>
-              <a:ext uri="{FF2B5EF4-FFF2-40B4-BE49-F238E27FC236}">
-                <a16:creationId xmlns:a16="http://schemas.microsoft.com/office/drawing/2014/main" id="{1BF1EC54-958A-4175-AA58-D1E21C455378}"/>
-              </a:ext>
-            </a:extLst>
-          </p:cNvPr>
+          <p:cNvPr id="2" name="Title 1"/>
           <p:cNvSpPr>
             <a:spLocks noGrp="1"/>
           </p:cNvSpPr>
@@ -6939,18 +6545,13 @@
               <a:rPr lang="en-CA" dirty="0"/>
               <a:t>4. Requirements</a:t>
             </a:r>
-          </a:p>
-        </p:txBody>
-      </p:sp>
-      <p:sp>
-        <p:nvSpPr>
-          <p:cNvPr id="3" name="Content Placeholder 2">
-            <a:extLst>
-              <a:ext uri="{FF2B5EF4-FFF2-40B4-BE49-F238E27FC236}">
-                <a16:creationId xmlns:a16="http://schemas.microsoft.com/office/drawing/2014/main" id="{6516E77E-81FF-4DBD-B925-6D12C53DCBCE}"/>
-              </a:ext>
-            </a:extLst>
-          </p:cNvPr>
+            <a:endParaRPr lang="en-CA" dirty="0"/>
+          </a:p>
+        </p:txBody>
+      </p:sp>
+      <p:sp>
+        <p:nvSpPr>
+          <p:cNvPr id="3" name="Content Placeholder 2"/>
           <p:cNvSpPr>
             <a:spLocks noGrp="1"/>
           </p:cNvSpPr>
@@ -6976,10 +6577,16 @@
                 <a:effectLst/>
                 <a:latin typeface="Calibri" panose="020F0502020204030204" pitchFamily="34" charset="0"/>
                 <a:ea typeface="Calibri" panose="020F0502020204030204" pitchFamily="34" charset="0"/>
-                <a:cs typeface="Times New Roman" panose="02020603050405020304" pitchFamily="18" charset="0"/>
+                <a:cs typeface="Times New Roman" panose="02020503050405090304" pitchFamily="18" charset="0"/>
               </a:rPr>
               <a:t>The Video Enabled e-Vet System shall provide a web interface allowing the clients to login and register themselves.</a:t>
             </a:r>
+            <a:endParaRPr lang="en-CA" sz="2400" dirty="0">
+              <a:effectLst/>
+              <a:latin typeface="Calibri" panose="020F0502020204030204" pitchFamily="34" charset="0"/>
+              <a:ea typeface="Calibri" panose="020F0502020204030204" pitchFamily="34" charset="0"/>
+              <a:cs typeface="Times New Roman" panose="02020503050405090304" pitchFamily="18" charset="0"/>
+            </a:endParaRPr>
           </a:p>
           <a:p>
             <a:pPr>
@@ -6995,10 +6602,16 @@
                 <a:effectLst/>
                 <a:latin typeface="Calibri" panose="020F0502020204030204" pitchFamily="34" charset="0"/>
                 <a:ea typeface="Calibri" panose="020F0502020204030204" pitchFamily="34" charset="0"/>
-                <a:cs typeface="Times New Roman" panose="02020603050405020304" pitchFamily="18" charset="0"/>
+                <a:cs typeface="Times New Roman" panose="02020503050405090304" pitchFamily="18" charset="0"/>
               </a:rPr>
               <a:t>It shall allow patients to schedule their appointments.</a:t>
             </a:r>
+            <a:endParaRPr lang="en-CA" sz="2400" dirty="0">
+              <a:effectLst/>
+              <a:latin typeface="Calibri" panose="020F0502020204030204" pitchFamily="34" charset="0"/>
+              <a:ea typeface="Calibri" panose="020F0502020204030204" pitchFamily="34" charset="0"/>
+              <a:cs typeface="Times New Roman" panose="02020503050405090304" pitchFamily="18" charset="0"/>
+            </a:endParaRPr>
           </a:p>
           <a:p>
             <a:pPr>
@@ -7014,10 +6627,16 @@
                 <a:effectLst/>
                 <a:latin typeface="Calibri" panose="020F0502020204030204" pitchFamily="34" charset="0"/>
                 <a:ea typeface="Calibri" panose="020F0502020204030204" pitchFamily="34" charset="0"/>
-                <a:cs typeface="Times New Roman" panose="02020603050405020304" pitchFamily="18" charset="0"/>
+                <a:cs typeface="Times New Roman" panose="02020503050405090304" pitchFamily="18" charset="0"/>
               </a:rPr>
               <a:t>It shall record patient’s profile in a database and display it based on their name/id.</a:t>
             </a:r>
+            <a:endParaRPr lang="en-CA" sz="2400" dirty="0">
+              <a:effectLst/>
+              <a:latin typeface="Calibri" panose="020F0502020204030204" pitchFamily="34" charset="0"/>
+              <a:ea typeface="Calibri" panose="020F0502020204030204" pitchFamily="34" charset="0"/>
+              <a:cs typeface="Times New Roman" panose="02020503050405090304" pitchFamily="18" charset="0"/>
+            </a:endParaRPr>
           </a:p>
           <a:p>
             <a:pPr>
@@ -7033,10 +6652,16 @@
                 <a:effectLst/>
                 <a:latin typeface="Calibri" panose="020F0502020204030204" pitchFamily="34" charset="0"/>
                 <a:ea typeface="Calibri" panose="020F0502020204030204" pitchFamily="34" charset="0"/>
-                <a:cs typeface="Times New Roman" panose="02020603050405020304" pitchFamily="18" charset="0"/>
+                <a:cs typeface="Times New Roman" panose="02020503050405090304" pitchFamily="18" charset="0"/>
               </a:rPr>
               <a:t>It shall remind patients of their appointments.</a:t>
             </a:r>
+            <a:endParaRPr lang="en-CA" sz="2400" dirty="0">
+              <a:effectLst/>
+              <a:latin typeface="Calibri" panose="020F0502020204030204" pitchFamily="34" charset="0"/>
+              <a:ea typeface="Calibri" panose="020F0502020204030204" pitchFamily="34" charset="0"/>
+              <a:cs typeface="Times New Roman" panose="02020503050405090304" pitchFamily="18" charset="0"/>
+            </a:endParaRPr>
           </a:p>
           <a:p>
             <a:pPr>
@@ -7052,10 +6677,16 @@
                 <a:effectLst/>
                 <a:latin typeface="Calibri" panose="020F0502020204030204" pitchFamily="34" charset="0"/>
                 <a:ea typeface="Calibri" panose="020F0502020204030204" pitchFamily="34" charset="0"/>
-                <a:cs typeface="Times New Roman" panose="02020603050405020304" pitchFamily="18" charset="0"/>
+                <a:cs typeface="Times New Roman" panose="02020503050405090304" pitchFamily="18" charset="0"/>
               </a:rPr>
               <a:t>It shall send an appointment confirmation to the patient, including an invitation to the scheduled video enabled meeting</a:t>
             </a:r>
+            <a:endParaRPr lang="en-CA" sz="2400" dirty="0">
+              <a:effectLst/>
+              <a:latin typeface="Calibri" panose="020F0502020204030204" pitchFamily="34" charset="0"/>
+              <a:ea typeface="Calibri" panose="020F0502020204030204" pitchFamily="34" charset="0"/>
+              <a:cs typeface="Times New Roman" panose="02020503050405090304" pitchFamily="18" charset="0"/>
+            </a:endParaRPr>
           </a:p>
           <a:p>
             <a:pPr>
@@ -7071,10 +6702,16 @@
                 <a:effectLst/>
                 <a:latin typeface="Calibri" panose="020F0502020204030204" pitchFamily="34" charset="0"/>
                 <a:ea typeface="Calibri" panose="020F0502020204030204" pitchFamily="34" charset="0"/>
-                <a:cs typeface="Times New Roman" panose="02020603050405020304" pitchFamily="18" charset="0"/>
+                <a:cs typeface="Times New Roman" panose="02020503050405090304" pitchFamily="18" charset="0"/>
               </a:rPr>
               <a:t>It shall provide multiple printable letter templates to doctors</a:t>
             </a:r>
+            <a:endParaRPr lang="en-CA" sz="2400" dirty="0">
+              <a:effectLst/>
+              <a:latin typeface="Calibri" panose="020F0502020204030204" pitchFamily="34" charset="0"/>
+              <a:ea typeface="Calibri" panose="020F0502020204030204" pitchFamily="34" charset="0"/>
+              <a:cs typeface="Times New Roman" panose="02020503050405090304" pitchFamily="18" charset="0"/>
+            </a:endParaRPr>
           </a:p>
           <a:p>
             <a:endParaRPr lang="en-CA" dirty="0"/>
@@ -7083,13 +6720,7 @@
       </p:sp>
       <p:sp>
         <p:nvSpPr>
-          <p:cNvPr id="4" name="Date Placeholder 3">
-            <a:extLst>
-              <a:ext uri="{FF2B5EF4-FFF2-40B4-BE49-F238E27FC236}">
-                <a16:creationId xmlns:a16="http://schemas.microsoft.com/office/drawing/2014/main" id="{A4BCE89F-4A52-4ED6-B41A-7DED88BD455E}"/>
-              </a:ext>
-            </a:extLst>
-          </p:cNvPr>
+          <p:cNvPr id="4" name="Date Placeholder 3"/>
           <p:cNvSpPr>
             <a:spLocks noGrp="1"/>
           </p:cNvSpPr>
@@ -7120,13 +6751,7 @@
       </p:sp>
       <p:sp>
         <p:nvSpPr>
-          <p:cNvPr id="6" name="Slide Number Placeholder 5">
-            <a:extLst>
-              <a:ext uri="{FF2B5EF4-FFF2-40B4-BE49-F238E27FC236}">
-                <a16:creationId xmlns:a16="http://schemas.microsoft.com/office/drawing/2014/main" id="{C41DE093-F6E5-43CD-9D59-A0A41ACF3575}"/>
-              </a:ext>
-            </a:extLst>
-          </p:cNvPr>
+          <p:cNvPr id="6" name="Slide Number Placeholder 5"/>
           <p:cNvSpPr>
             <a:spLocks noGrp="1"/>
           </p:cNvSpPr>
@@ -7141,19 +6766,12 @@
           <a:p>
             <a:fld id="{A4BAB868-1E00-44C6-B1AB-DFCC5F9865BA}" type="slidenum">
               <a:rPr lang="ja-JP" altLang="en-US" smtClean="0"/>
-              <a:pPr/>
-              <a:t>6</a:t>
             </a:fld>
             <a:endParaRPr lang="en-US" altLang="ja-JP"/>
           </a:p>
         </p:txBody>
       </p:sp>
     </p:spTree>
-    <p:extLst>
-      <p:ext uri="{BB962C8B-B14F-4D97-AF65-F5344CB8AC3E}">
-        <p14:creationId xmlns:p14="http://schemas.microsoft.com/office/powerpoint/2010/main" val="3411063368"/>
-      </p:ext>
-    </p:extLst>
   </p:cSld>
   <p:clrMapOvr>
     <a:masterClrMapping/>
@@ -7183,13 +6801,7 @@
       </p:grpSpPr>
       <p:sp>
         <p:nvSpPr>
-          <p:cNvPr id="2" name="Title 1">
-            <a:extLst>
-              <a:ext uri="{FF2B5EF4-FFF2-40B4-BE49-F238E27FC236}">
-                <a16:creationId xmlns:a16="http://schemas.microsoft.com/office/drawing/2014/main" id="{4E4485ED-C838-4CE7-8CF1-C057477BC67B}"/>
-              </a:ext>
-            </a:extLst>
-          </p:cNvPr>
+          <p:cNvPr id="2" name="Title 1"/>
           <p:cNvSpPr>
             <a:spLocks noGrp="1"/>
           </p:cNvSpPr>
@@ -7212,13 +6824,7 @@
       </p:sp>
       <p:sp>
         <p:nvSpPr>
-          <p:cNvPr id="3" name="Content Placeholder 2">
-            <a:extLst>
-              <a:ext uri="{FF2B5EF4-FFF2-40B4-BE49-F238E27FC236}">
-                <a16:creationId xmlns:a16="http://schemas.microsoft.com/office/drawing/2014/main" id="{25C1EB07-E637-4A15-80A8-5ACC9A52E17F}"/>
-              </a:ext>
-            </a:extLst>
-          </p:cNvPr>
+          <p:cNvPr id="3" name="Content Placeholder 2"/>
           <p:cNvSpPr>
             <a:spLocks noGrp="1"/>
           </p:cNvSpPr>
@@ -7244,10 +6850,16 @@
                 <a:effectLst/>
                 <a:latin typeface="Calibri" panose="020F0502020204030204" pitchFamily="34" charset="0"/>
                 <a:ea typeface="Calibri" panose="020F0502020204030204" pitchFamily="34" charset="0"/>
-                <a:cs typeface="Times New Roman" panose="02020603050405020304" pitchFamily="18" charset="0"/>
+                <a:cs typeface="Times New Roman" panose="02020503050405090304" pitchFamily="18" charset="0"/>
               </a:rPr>
               <a:t>The e-vet system can send a recommendation letter to specialists on behalf of doctors.</a:t>
             </a:r>
+            <a:endParaRPr lang="en-CA" sz="1600" dirty="0">
+              <a:effectLst/>
+              <a:latin typeface="Calibri" panose="020F0502020204030204" pitchFamily="34" charset="0"/>
+              <a:ea typeface="Calibri" panose="020F0502020204030204" pitchFamily="34" charset="0"/>
+              <a:cs typeface="Times New Roman" panose="02020503050405090304" pitchFamily="18" charset="0"/>
+            </a:endParaRPr>
           </a:p>
           <a:p>
             <a:pPr>
@@ -7262,7 +6874,7 @@
               <a:rPr lang="en-CA" sz="1600" dirty="0">
                 <a:latin typeface="Calibri" panose="020F0502020204030204" pitchFamily="34" charset="0"/>
                 <a:ea typeface="Calibri" panose="020F0502020204030204" pitchFamily="34" charset="0"/>
-                <a:cs typeface="Times New Roman" panose="02020603050405020304" pitchFamily="18" charset="0"/>
+                <a:cs typeface="Times New Roman" panose="02020503050405090304" pitchFamily="18" charset="0"/>
               </a:rPr>
               <a:t>The system</a:t>
             </a:r>
@@ -7271,10 +6883,16 @@
                 <a:effectLst/>
                 <a:latin typeface="Calibri" panose="020F0502020204030204" pitchFamily="34" charset="0"/>
                 <a:ea typeface="Calibri" panose="020F0502020204030204" pitchFamily="34" charset="0"/>
-                <a:cs typeface="Times New Roman" panose="02020603050405020304" pitchFamily="18" charset="0"/>
+                <a:cs typeface="Times New Roman" panose="02020503050405090304" pitchFamily="18" charset="0"/>
               </a:rPr>
               <a:t> should offer multiple payment options.</a:t>
             </a:r>
+            <a:endParaRPr lang="en-CA" sz="1600" dirty="0">
+              <a:effectLst/>
+              <a:latin typeface="Calibri" panose="020F0502020204030204" pitchFamily="34" charset="0"/>
+              <a:ea typeface="Calibri" panose="020F0502020204030204" pitchFamily="34" charset="0"/>
+              <a:cs typeface="Times New Roman" panose="02020503050405090304" pitchFamily="18" charset="0"/>
+            </a:endParaRPr>
           </a:p>
           <a:p>
             <a:pPr>
@@ -7289,7 +6907,7 @@
               <a:rPr lang="en-CA" sz="1600" dirty="0">
                 <a:latin typeface="Calibri" panose="020F0502020204030204" pitchFamily="34" charset="0"/>
                 <a:ea typeface="Calibri" panose="020F0502020204030204" pitchFamily="34" charset="0"/>
-                <a:cs typeface="Times New Roman" panose="02020603050405020304" pitchFamily="18" charset="0"/>
+                <a:cs typeface="Times New Roman" panose="02020503050405090304" pitchFamily="18" charset="0"/>
               </a:rPr>
               <a:t>The system</a:t>
             </a:r>
@@ -7298,10 +6916,16 @@
                 <a:effectLst/>
                 <a:latin typeface="Calibri" panose="020F0502020204030204" pitchFamily="34" charset="0"/>
                 <a:ea typeface="Calibri" panose="020F0502020204030204" pitchFamily="34" charset="0"/>
-                <a:cs typeface="Times New Roman" panose="02020603050405020304" pitchFamily="18" charset="0"/>
+                <a:cs typeface="Times New Roman" panose="02020503050405090304" pitchFamily="18" charset="0"/>
               </a:rPr>
               <a:t> should have a mechanism to reply to instant scientific questions to physicians (similar to an encyclopedia).</a:t>
             </a:r>
+            <a:endParaRPr lang="en-CA" sz="1600" dirty="0">
+              <a:effectLst/>
+              <a:latin typeface="Calibri" panose="020F0502020204030204" pitchFamily="34" charset="0"/>
+              <a:ea typeface="Calibri" panose="020F0502020204030204" pitchFamily="34" charset="0"/>
+              <a:cs typeface="Times New Roman" panose="02020503050405090304" pitchFamily="18" charset="0"/>
+            </a:endParaRPr>
           </a:p>
           <a:p>
             <a:pPr>
@@ -7316,7 +6940,7 @@
               <a:rPr lang="en-CA" sz="1600" dirty="0">
                 <a:latin typeface="Calibri" panose="020F0502020204030204" pitchFamily="34" charset="0"/>
                 <a:ea typeface="Calibri" panose="020F0502020204030204" pitchFamily="34" charset="0"/>
-                <a:cs typeface="Times New Roman" panose="02020603050405020304" pitchFamily="18" charset="0"/>
+                <a:cs typeface="Times New Roman" panose="02020503050405090304" pitchFamily="18" charset="0"/>
               </a:rPr>
               <a:t>The system</a:t>
             </a:r>
@@ -7325,10 +6949,16 @@
                 <a:effectLst/>
                 <a:latin typeface="Calibri" panose="020F0502020204030204" pitchFamily="34" charset="0"/>
                 <a:ea typeface="Calibri" panose="020F0502020204030204" pitchFamily="34" charset="0"/>
-                <a:cs typeface="Times New Roman" panose="02020603050405020304" pitchFamily="18" charset="0"/>
+                <a:cs typeface="Times New Roman" panose="02020503050405090304" pitchFamily="18" charset="0"/>
               </a:rPr>
               <a:t> can search in the ontology for relevant documents. </a:t>
             </a:r>
+            <a:endParaRPr lang="en-CA" sz="1600" dirty="0">
+              <a:effectLst/>
+              <a:latin typeface="Calibri" panose="020F0502020204030204" pitchFamily="34" charset="0"/>
+              <a:ea typeface="Calibri" panose="020F0502020204030204" pitchFamily="34" charset="0"/>
+              <a:cs typeface="Times New Roman" panose="02020503050405090304" pitchFamily="18" charset="0"/>
+            </a:endParaRPr>
           </a:p>
           <a:p>
             <a:pPr>
@@ -7344,10 +6974,16 @@
                 <a:effectLst/>
                 <a:latin typeface="Calibri" panose="020F0502020204030204" pitchFamily="34" charset="0"/>
                 <a:ea typeface="Calibri" panose="020F0502020204030204" pitchFamily="34" charset="0"/>
-                <a:cs typeface="Times New Roman" panose="02020603050405020304" pitchFamily="18" charset="0"/>
+                <a:cs typeface="Times New Roman" panose="02020503050405090304" pitchFamily="18" charset="0"/>
               </a:rPr>
               <a:t>Doctors can also register themselves on the portal, giving the client freedom to choose their doctor(s).</a:t>
             </a:r>
+            <a:endParaRPr lang="en-CA" sz="1600" dirty="0">
+              <a:effectLst/>
+              <a:latin typeface="Calibri" panose="020F0502020204030204" pitchFamily="34" charset="0"/>
+              <a:ea typeface="Calibri" panose="020F0502020204030204" pitchFamily="34" charset="0"/>
+              <a:cs typeface="Times New Roman" panose="02020503050405090304" pitchFamily="18" charset="0"/>
+            </a:endParaRPr>
           </a:p>
           <a:p>
             <a:pPr>
@@ -7363,10 +6999,16 @@
                 <a:effectLst/>
                 <a:latin typeface="Calibri" panose="020F0502020204030204" pitchFamily="34" charset="0"/>
                 <a:ea typeface="Calibri" panose="020F0502020204030204" pitchFamily="34" charset="0"/>
-                <a:cs typeface="Times New Roman" panose="02020603050405020304" pitchFamily="18" charset="0"/>
+                <a:cs typeface="Times New Roman" panose="02020503050405090304" pitchFamily="18" charset="0"/>
               </a:rPr>
               <a:t>Recording patient feedback on the doctor and doctor feedback on the patient.</a:t>
             </a:r>
+            <a:endParaRPr lang="en-CA" sz="1600" dirty="0">
+              <a:effectLst/>
+              <a:latin typeface="Calibri" panose="020F0502020204030204" pitchFamily="34" charset="0"/>
+              <a:ea typeface="Calibri" panose="020F0502020204030204" pitchFamily="34" charset="0"/>
+              <a:cs typeface="Times New Roman" panose="02020503050405090304" pitchFamily="18" charset="0"/>
+            </a:endParaRPr>
           </a:p>
           <a:p>
             <a:pPr>
@@ -7382,10 +7024,16 @@
                 <a:effectLst/>
                 <a:latin typeface="Calibri" panose="020F0502020204030204" pitchFamily="34" charset="0"/>
                 <a:ea typeface="Calibri" panose="020F0502020204030204" pitchFamily="34" charset="0"/>
-                <a:cs typeface="Times New Roman" panose="02020603050405020304" pitchFamily="18" charset="0"/>
+                <a:cs typeface="Times New Roman" panose="02020503050405090304" pitchFamily="18" charset="0"/>
               </a:rPr>
               <a:t>E-pharmacy: customers can purchase medicines and other essentials through the portal and get them delivered to their homes. </a:t>
             </a:r>
+            <a:endParaRPr lang="en-CA" sz="1600" dirty="0">
+              <a:effectLst/>
+              <a:latin typeface="Calibri" panose="020F0502020204030204" pitchFamily="34" charset="0"/>
+              <a:ea typeface="Calibri" panose="020F0502020204030204" pitchFamily="34" charset="0"/>
+              <a:cs typeface="Times New Roman" panose="02020503050405090304" pitchFamily="18" charset="0"/>
+            </a:endParaRPr>
           </a:p>
           <a:p>
             <a:pPr>
@@ -7401,10 +7049,16 @@
                 <a:effectLst/>
                 <a:latin typeface="Calibri" panose="020F0502020204030204" pitchFamily="34" charset="0"/>
                 <a:ea typeface="Calibri" panose="020F0502020204030204" pitchFamily="34" charset="0"/>
-                <a:cs typeface="Times New Roman" panose="02020603050405020304" pitchFamily="18" charset="0"/>
+                <a:cs typeface="Times New Roman" panose="02020503050405090304" pitchFamily="18" charset="0"/>
               </a:rPr>
               <a:t>Patients can complete a lab requisition through the portal.</a:t>
             </a:r>
+            <a:endParaRPr lang="en-CA" sz="1600" dirty="0">
+              <a:effectLst/>
+              <a:latin typeface="Calibri" panose="020F0502020204030204" pitchFamily="34" charset="0"/>
+              <a:ea typeface="Calibri" panose="020F0502020204030204" pitchFamily="34" charset="0"/>
+              <a:cs typeface="Times New Roman" panose="02020503050405090304" pitchFamily="18" charset="0"/>
+            </a:endParaRPr>
           </a:p>
           <a:p>
             <a:pPr>
@@ -7420,10 +7074,16 @@
                 <a:effectLst/>
                 <a:latin typeface="Calibri" panose="020F0502020204030204" pitchFamily="34" charset="0"/>
                 <a:ea typeface="Calibri" panose="020F0502020204030204" pitchFamily="34" charset="0"/>
-                <a:cs typeface="Times New Roman" panose="02020603050405020304" pitchFamily="18" charset="0"/>
+                <a:cs typeface="Times New Roman" panose="02020503050405090304" pitchFamily="18" charset="0"/>
               </a:rPr>
               <a:t>Patients can communicate with the doctor via text messaging.</a:t>
             </a:r>
+            <a:endParaRPr lang="en-CA" sz="1600" dirty="0">
+              <a:effectLst/>
+              <a:latin typeface="Calibri" panose="020F0502020204030204" pitchFamily="34" charset="0"/>
+              <a:ea typeface="Calibri" panose="020F0502020204030204" pitchFamily="34" charset="0"/>
+              <a:cs typeface="Times New Roman" panose="02020503050405090304" pitchFamily="18" charset="0"/>
+            </a:endParaRPr>
           </a:p>
           <a:p>
             <a:pPr>
@@ -7439,10 +7099,16 @@
                 <a:effectLst/>
                 <a:latin typeface="Calibri" panose="020F0502020204030204" pitchFamily="34" charset="0"/>
                 <a:ea typeface="Calibri" panose="020F0502020204030204" pitchFamily="34" charset="0"/>
-                <a:cs typeface="Times New Roman" panose="02020603050405020304" pitchFamily="18" charset="0"/>
+                <a:cs typeface="Times New Roman" panose="02020503050405090304" pitchFamily="18" charset="0"/>
               </a:rPr>
               <a:t>The system should display desired graphs and statistics based on a patient’s profile.</a:t>
             </a:r>
+            <a:endParaRPr lang="en-CA" sz="1600" dirty="0">
+              <a:effectLst/>
+              <a:latin typeface="Calibri" panose="020F0502020204030204" pitchFamily="34" charset="0"/>
+              <a:ea typeface="Calibri" panose="020F0502020204030204" pitchFamily="34" charset="0"/>
+              <a:cs typeface="Times New Roman" panose="02020503050405090304" pitchFamily="18" charset="0"/>
+            </a:endParaRPr>
           </a:p>
           <a:p>
             <a:endParaRPr lang="en-CA" sz="1600" dirty="0"/>
@@ -7451,13 +7117,7 @@
       </p:sp>
       <p:sp>
         <p:nvSpPr>
-          <p:cNvPr id="4" name="Date Placeholder 3">
-            <a:extLst>
-              <a:ext uri="{FF2B5EF4-FFF2-40B4-BE49-F238E27FC236}">
-                <a16:creationId xmlns:a16="http://schemas.microsoft.com/office/drawing/2014/main" id="{238C31FC-A43B-4549-90CD-30DDC16EF8B2}"/>
-              </a:ext>
-            </a:extLst>
-          </p:cNvPr>
+          <p:cNvPr id="4" name="Date Placeholder 3"/>
           <p:cNvSpPr>
             <a:spLocks noGrp="1"/>
           </p:cNvSpPr>
@@ -7488,13 +7148,7 @@
       </p:sp>
       <p:sp>
         <p:nvSpPr>
-          <p:cNvPr id="6" name="Slide Number Placeholder 5">
-            <a:extLst>
-              <a:ext uri="{FF2B5EF4-FFF2-40B4-BE49-F238E27FC236}">
-                <a16:creationId xmlns:a16="http://schemas.microsoft.com/office/drawing/2014/main" id="{C7F525BB-50AA-400B-8264-41DBA2FFC0D1}"/>
-              </a:ext>
-            </a:extLst>
-          </p:cNvPr>
+          <p:cNvPr id="6" name="Slide Number Placeholder 5"/>
           <p:cNvSpPr>
             <a:spLocks noGrp="1"/>
           </p:cNvSpPr>
@@ -7509,19 +7163,12 @@
           <a:p>
             <a:fld id="{A4BAB868-1E00-44C6-B1AB-DFCC5F9865BA}" type="slidenum">
               <a:rPr lang="ja-JP" altLang="en-US" smtClean="0"/>
-              <a:pPr/>
-              <a:t>7</a:t>
             </a:fld>
             <a:endParaRPr lang="en-US" altLang="ja-JP" dirty="0"/>
           </a:p>
         </p:txBody>
       </p:sp>
     </p:spTree>
-    <p:extLst>
-      <p:ext uri="{BB962C8B-B14F-4D97-AF65-F5344CB8AC3E}">
-        <p14:creationId xmlns:p14="http://schemas.microsoft.com/office/powerpoint/2010/main" val="2641871472"/>
-      </p:ext>
-    </p:extLst>
   </p:cSld>
   <p:clrMapOvr>
     <a:masterClrMapping/>
@@ -7551,13 +7198,7 @@
       </p:grpSpPr>
       <p:sp>
         <p:nvSpPr>
-          <p:cNvPr id="2" name="Title 1">
-            <a:extLst>
-              <a:ext uri="{FF2B5EF4-FFF2-40B4-BE49-F238E27FC236}">
-                <a16:creationId xmlns:a16="http://schemas.microsoft.com/office/drawing/2014/main" id="{634D368D-2965-437B-96BF-B4396F3F5A09}"/>
-              </a:ext>
-            </a:extLst>
-          </p:cNvPr>
+          <p:cNvPr id="2" name="Title 1"/>
           <p:cNvSpPr>
             <a:spLocks noGrp="1"/>
           </p:cNvSpPr>
@@ -7580,13 +7221,7 @@
       </p:sp>
       <p:sp>
         <p:nvSpPr>
-          <p:cNvPr id="3" name="Content Placeholder 2">
-            <a:extLst>
-              <a:ext uri="{FF2B5EF4-FFF2-40B4-BE49-F238E27FC236}">
-                <a16:creationId xmlns:a16="http://schemas.microsoft.com/office/drawing/2014/main" id="{61675DF3-05BC-424C-B391-CB7B68B04456}"/>
-              </a:ext>
-            </a:extLst>
-          </p:cNvPr>
+          <p:cNvPr id="3" name="Content Placeholder 2"/>
           <p:cNvSpPr>
             <a:spLocks noGrp="1"/>
           </p:cNvSpPr>
@@ -7627,7 +7262,7 @@
               <a:effectLst/>
               <a:latin typeface="Calibri" panose="020F0502020204030204" pitchFamily="34" charset="0"/>
               <a:ea typeface="Calibri" panose="020F0502020204030204" pitchFamily="34" charset="0"/>
-              <a:cs typeface="Times New Roman" panose="02020603050405020304" pitchFamily="18" charset="0"/>
+              <a:cs typeface="Times New Roman" panose="02020503050405090304" pitchFamily="18" charset="0"/>
             </a:endParaRPr>
           </a:p>
           <a:p>
@@ -7643,7 +7278,7 @@
                 <a:effectLst/>
                 <a:latin typeface="Calibri" panose="020F0502020204030204" pitchFamily="34" charset="0"/>
                 <a:ea typeface="Calibri" panose="020F0502020204030204" pitchFamily="34" charset="0"/>
-                <a:cs typeface="Times New Roman" panose="02020603050405020304" pitchFamily="18" charset="0"/>
+                <a:cs typeface="Times New Roman" panose="02020503050405090304" pitchFamily="18" charset="0"/>
               </a:rPr>
               <a:t>The clinic system agent accesses the request sent by the patient(user) through the web interface. In our Architecture the clinic system agent handles the correspondence with all the other agents and in this way, which acts as a central hub.</a:t>
             </a:r>
@@ -7651,7 +7286,7 @@
               <a:effectLst/>
               <a:latin typeface="Calibri" panose="020F0502020204030204" pitchFamily="34" charset="0"/>
               <a:ea typeface="Calibri" panose="020F0502020204030204" pitchFamily="34" charset="0"/>
-              <a:cs typeface="Times New Roman" panose="02020603050405020304" pitchFamily="18" charset="0"/>
+              <a:cs typeface="Times New Roman" panose="02020503050405090304" pitchFamily="18" charset="0"/>
             </a:endParaRPr>
           </a:p>
           <a:p>
@@ -7667,7 +7302,7 @@
                 <a:effectLst/>
                 <a:latin typeface="Calibri" panose="020F0502020204030204" pitchFamily="34" charset="0"/>
                 <a:ea typeface="Calibri" panose="020F0502020204030204" pitchFamily="34" charset="0"/>
-                <a:cs typeface="Times New Roman" panose="02020603050405020304" pitchFamily="18" charset="0"/>
+                <a:cs typeface="Times New Roman" panose="02020503050405090304" pitchFamily="18" charset="0"/>
               </a:rPr>
               <a:t>The clinic system agent is the main agent which has access to the database of our system.</a:t>
             </a:r>
@@ -7675,7 +7310,7 @@
               <a:effectLst/>
               <a:latin typeface="Calibri" panose="020F0502020204030204" pitchFamily="34" charset="0"/>
               <a:ea typeface="Calibri" panose="020F0502020204030204" pitchFamily="34" charset="0"/>
-              <a:cs typeface="Times New Roman" panose="02020603050405020304" pitchFamily="18" charset="0"/>
+              <a:cs typeface="Times New Roman" panose="02020503050405090304" pitchFamily="18" charset="0"/>
             </a:endParaRPr>
           </a:p>
           <a:p>
@@ -7691,7 +7326,7 @@
                 <a:effectLst/>
                 <a:latin typeface="Calibri" panose="020F0502020204030204" pitchFamily="34" charset="0"/>
                 <a:ea typeface="Calibri" panose="020F0502020204030204" pitchFamily="34" charset="0"/>
-                <a:cs typeface="Times New Roman" panose="02020603050405020304" pitchFamily="18" charset="0"/>
+                <a:cs typeface="Times New Roman" panose="02020503050405090304" pitchFamily="18" charset="0"/>
               </a:rPr>
               <a:t>The clinic system agent requests appointments for the patients, search for the patient’s profile in database, shows the profile of patients to the doctor (if available!). Moreover, the clinic system agent also shows the profile of the doctor to the patients. </a:t>
             </a:r>
@@ -7699,7 +7334,7 @@
               <a:effectLst/>
               <a:latin typeface="Calibri" panose="020F0502020204030204" pitchFamily="34" charset="0"/>
               <a:ea typeface="Calibri" panose="020F0502020204030204" pitchFamily="34" charset="0"/>
-              <a:cs typeface="Times New Roman" panose="02020603050405020304" pitchFamily="18" charset="0"/>
+              <a:cs typeface="Times New Roman" panose="02020503050405090304" pitchFamily="18" charset="0"/>
             </a:endParaRPr>
           </a:p>
           <a:p>
@@ -7715,7 +7350,7 @@
                 <a:effectLst/>
                 <a:latin typeface="Calibri" panose="020F0502020204030204" pitchFamily="34" charset="0"/>
                 <a:ea typeface="Calibri" panose="020F0502020204030204" pitchFamily="34" charset="0"/>
-                <a:cs typeface="Times New Roman" panose="02020603050405020304" pitchFamily="18" charset="0"/>
+                <a:cs typeface="Times New Roman" panose="02020503050405090304" pitchFamily="18" charset="0"/>
               </a:rPr>
               <a:t>The clinic system agent also generates a request for the appointment agent to book an appointment whether it’s a first or a consecutive appointment.</a:t>
             </a:r>
@@ -7723,7 +7358,7 @@
               <a:effectLst/>
               <a:latin typeface="Calibri" panose="020F0502020204030204" pitchFamily="34" charset="0"/>
               <a:ea typeface="Calibri" panose="020F0502020204030204" pitchFamily="34" charset="0"/>
-              <a:cs typeface="Times New Roman" panose="02020603050405020304" pitchFamily="18" charset="0"/>
+              <a:cs typeface="Times New Roman" panose="02020503050405090304" pitchFamily="18" charset="0"/>
             </a:endParaRPr>
           </a:p>
           <a:p>
@@ -7739,7 +7374,7 @@
                 <a:effectLst/>
                 <a:latin typeface="Calibri" panose="020F0502020204030204" pitchFamily="34" charset="0"/>
                 <a:ea typeface="Calibri" panose="020F0502020204030204" pitchFamily="34" charset="0"/>
-                <a:cs typeface="Times New Roman" panose="02020603050405020304" pitchFamily="18" charset="0"/>
+                <a:cs typeface="Times New Roman" panose="02020503050405090304" pitchFamily="18" charset="0"/>
               </a:rPr>
               <a:t>The clinic system agent also triggers the reminder agent to remind the patient about the appointments at some given times.</a:t>
             </a:r>
@@ -7747,7 +7382,7 @@
               <a:effectLst/>
               <a:latin typeface="Calibri" panose="020F0502020204030204" pitchFamily="34" charset="0"/>
               <a:ea typeface="Calibri" panose="020F0502020204030204" pitchFamily="34" charset="0"/>
-              <a:cs typeface="Times New Roman" panose="02020603050405020304" pitchFamily="18" charset="0"/>
+              <a:cs typeface="Times New Roman" panose="02020503050405090304" pitchFamily="18" charset="0"/>
             </a:endParaRPr>
           </a:p>
           <a:p>
@@ -7766,7 +7401,7 @@
                 <a:effectLst/>
                 <a:latin typeface="Calibri" panose="020F0502020204030204" pitchFamily="34" charset="0"/>
                 <a:ea typeface="Calibri" panose="020F0502020204030204" pitchFamily="34" charset="0"/>
-                <a:cs typeface="Times New Roman" panose="02020603050405020304" pitchFamily="18" charset="0"/>
+                <a:cs typeface="Times New Roman" panose="02020503050405090304" pitchFamily="18" charset="0"/>
               </a:rPr>
               <a:t>The clinic system agent also requests template agent to generate the required template once the physician had completed the session with the patient.</a:t>
             </a:r>
@@ -7774,7 +7409,7 @@
               <a:effectLst/>
               <a:latin typeface="Calibri" panose="020F0502020204030204" pitchFamily="34" charset="0"/>
               <a:ea typeface="Calibri" panose="020F0502020204030204" pitchFamily="34" charset="0"/>
-              <a:cs typeface="Times New Roman" panose="02020603050405020304" pitchFamily="18" charset="0"/>
+              <a:cs typeface="Times New Roman" panose="02020503050405090304" pitchFamily="18" charset="0"/>
             </a:endParaRPr>
           </a:p>
           <a:p>
@@ -7788,13 +7423,7 @@
       </p:sp>
       <p:sp>
         <p:nvSpPr>
-          <p:cNvPr id="4" name="Date Placeholder 3">
-            <a:extLst>
-              <a:ext uri="{FF2B5EF4-FFF2-40B4-BE49-F238E27FC236}">
-                <a16:creationId xmlns:a16="http://schemas.microsoft.com/office/drawing/2014/main" id="{AC1FD27A-80D7-42DE-BE24-2CD842F6BDDF}"/>
-              </a:ext>
-            </a:extLst>
-          </p:cNvPr>
+          <p:cNvPr id="4" name="Date Placeholder 3"/>
           <p:cNvSpPr>
             <a:spLocks noGrp="1"/>
           </p:cNvSpPr>
@@ -7825,13 +7454,7 @@
       </p:sp>
       <p:sp>
         <p:nvSpPr>
-          <p:cNvPr id="6" name="Slide Number Placeholder 5">
-            <a:extLst>
-              <a:ext uri="{FF2B5EF4-FFF2-40B4-BE49-F238E27FC236}">
-                <a16:creationId xmlns:a16="http://schemas.microsoft.com/office/drawing/2014/main" id="{8E8B0CB0-0C6B-4982-B9C7-521CB9F200DA}"/>
-              </a:ext>
-            </a:extLst>
-          </p:cNvPr>
+          <p:cNvPr id="6" name="Slide Number Placeholder 5"/>
           <p:cNvSpPr>
             <a:spLocks noGrp="1"/>
           </p:cNvSpPr>
@@ -7846,19 +7469,12 @@
           <a:p>
             <a:fld id="{A4BAB868-1E00-44C6-B1AB-DFCC5F9865BA}" type="slidenum">
               <a:rPr lang="ja-JP" altLang="en-US" smtClean="0"/>
-              <a:pPr/>
-              <a:t>8</a:t>
             </a:fld>
             <a:endParaRPr lang="en-US" altLang="ja-JP"/>
           </a:p>
         </p:txBody>
       </p:sp>
     </p:spTree>
-    <p:extLst>
-      <p:ext uri="{BB962C8B-B14F-4D97-AF65-F5344CB8AC3E}">
-        <p14:creationId xmlns:p14="http://schemas.microsoft.com/office/powerpoint/2010/main" val="89349740"/>
-      </p:ext>
-    </p:extLst>
   </p:cSld>
   <p:clrMapOvr>
     <a:masterClrMapping/>
@@ -7888,13 +7504,7 @@
       </p:grpSpPr>
       <p:sp>
         <p:nvSpPr>
-          <p:cNvPr id="2" name="Title 1">
-            <a:extLst>
-              <a:ext uri="{FF2B5EF4-FFF2-40B4-BE49-F238E27FC236}">
-                <a16:creationId xmlns:a16="http://schemas.microsoft.com/office/drawing/2014/main" id="{BC19915F-4B57-4C66-B739-FC877E4166FA}"/>
-              </a:ext>
-            </a:extLst>
-          </p:cNvPr>
+          <p:cNvPr id="2" name="Title 1"/>
           <p:cNvSpPr>
             <a:spLocks noGrp="1"/>
           </p:cNvSpPr>
@@ -7917,13 +7527,7 @@
       </p:sp>
       <p:sp>
         <p:nvSpPr>
-          <p:cNvPr id="3" name="Content Placeholder 2">
-            <a:extLst>
-              <a:ext uri="{FF2B5EF4-FFF2-40B4-BE49-F238E27FC236}">
-                <a16:creationId xmlns:a16="http://schemas.microsoft.com/office/drawing/2014/main" id="{BC5C524F-0E47-4B10-830C-F3106CA3E329}"/>
-              </a:ext>
-            </a:extLst>
-          </p:cNvPr>
+          <p:cNvPr id="3" name="Content Placeholder 2"/>
           <p:cNvSpPr>
             <a:spLocks noGrp="1"/>
           </p:cNvSpPr>
@@ -7955,6 +7559,16 @@
               </a:rPr>
               <a:t>Appointment Agent</a:t>
             </a:r>
+            <a:endParaRPr lang="en-US" sz="1800" b="1" i="1" dirty="0">
+              <a:solidFill>
+                <a:srgbClr val="D60093"/>
+              </a:solidFill>
+              <a:effectLst>
+                <a:outerShdw blurRad="38100" dist="38100" dir="2700000" algn="tl">
+                  <a:srgbClr val="C0C0C0"/>
+                </a:outerShdw>
+              </a:effectLst>
+            </a:endParaRPr>
           </a:p>
           <a:p>
             <a:pPr marL="0" lvl="0" indent="0">
@@ -7967,7 +7581,7 @@
               <a:effectLst/>
               <a:latin typeface="Calibri" panose="020F0502020204030204" pitchFamily="34" charset="0"/>
               <a:ea typeface="Calibri" panose="020F0502020204030204" pitchFamily="34" charset="0"/>
-              <a:cs typeface="Times New Roman" panose="02020603050405020304" pitchFamily="18" charset="0"/>
+              <a:cs typeface="Times New Roman" panose="02020503050405090304" pitchFamily="18" charset="0"/>
             </a:endParaRPr>
           </a:p>
           <a:p>
@@ -7981,7 +7595,7 @@
                 <a:effectLst/>
                 <a:latin typeface="Calibri" panose="020F0502020204030204" pitchFamily="34" charset="0"/>
                 <a:ea typeface="Calibri" panose="020F0502020204030204" pitchFamily="34" charset="0"/>
-                <a:cs typeface="Times New Roman" panose="02020603050405020304" pitchFamily="18" charset="0"/>
+                <a:cs typeface="Times New Roman" panose="02020503050405090304" pitchFamily="18" charset="0"/>
               </a:rPr>
               <a:t>The appointment agent communicates with the clinic system agent to book an appointment for the patient. The clinic agent system searches the database and give the required details regarding the available slots to the appointment agent.</a:t>
             </a:r>
@@ -7989,7 +7603,7 @@
               <a:effectLst/>
               <a:latin typeface="Calibri" panose="020F0502020204030204" pitchFamily="34" charset="0"/>
               <a:ea typeface="Calibri" panose="020F0502020204030204" pitchFamily="34" charset="0"/>
-              <a:cs typeface="Times New Roman" panose="02020603050405020304" pitchFamily="18" charset="0"/>
+              <a:cs typeface="Times New Roman" panose="02020503050405090304" pitchFamily="18" charset="0"/>
             </a:endParaRPr>
           </a:p>
           <a:p>
@@ -8003,7 +7617,7 @@
                 <a:effectLst/>
                 <a:latin typeface="Calibri" panose="020F0502020204030204" pitchFamily="34" charset="0"/>
                 <a:ea typeface="Calibri" panose="020F0502020204030204" pitchFamily="34" charset="0"/>
-                <a:cs typeface="Times New Roman" panose="02020603050405020304" pitchFamily="18" charset="0"/>
+                <a:cs typeface="Times New Roman" panose="02020503050405090304" pitchFamily="18" charset="0"/>
               </a:rPr>
               <a:t>The appointment agent can be a new appointment for those patients who registers for the first time. </a:t>
             </a:r>
@@ -8011,7 +7625,7 @@
               <a:effectLst/>
               <a:latin typeface="Calibri" panose="020F0502020204030204" pitchFamily="34" charset="0"/>
               <a:ea typeface="Calibri" panose="020F0502020204030204" pitchFamily="34" charset="0"/>
-              <a:cs typeface="Times New Roman" panose="02020603050405020304" pitchFamily="18" charset="0"/>
+              <a:cs typeface="Times New Roman" panose="02020503050405090304" pitchFamily="18" charset="0"/>
             </a:endParaRPr>
           </a:p>
           <a:p>
@@ -8025,7 +7639,7 @@
                 <a:effectLst/>
                 <a:latin typeface="Calibri" panose="020F0502020204030204" pitchFamily="34" charset="0"/>
                 <a:ea typeface="Calibri" panose="020F0502020204030204" pitchFamily="34" charset="0"/>
-                <a:cs typeface="Times New Roman" panose="02020603050405020304" pitchFamily="18" charset="0"/>
+                <a:cs typeface="Times New Roman" panose="02020503050405090304" pitchFamily="18" charset="0"/>
               </a:rPr>
               <a:t>Not only for the first time, but the appointment agent will also book appointments for the patients who visits again.</a:t>
             </a:r>
@@ -8033,7 +7647,7 @@
               <a:effectLst/>
               <a:latin typeface="Calibri" panose="020F0502020204030204" pitchFamily="34" charset="0"/>
               <a:ea typeface="Calibri" panose="020F0502020204030204" pitchFamily="34" charset="0"/>
-              <a:cs typeface="Times New Roman" panose="02020603050405020304" pitchFamily="18" charset="0"/>
+              <a:cs typeface="Times New Roman" panose="02020503050405090304" pitchFamily="18" charset="0"/>
             </a:endParaRPr>
           </a:p>
           <a:p>
@@ -8050,7 +7664,7 @@
                 <a:effectLst/>
                 <a:latin typeface="Calibri" panose="020F0502020204030204" pitchFamily="34" charset="0"/>
                 <a:ea typeface="Calibri" panose="020F0502020204030204" pitchFamily="34" charset="0"/>
-                <a:cs typeface="Times New Roman" panose="02020603050405020304" pitchFamily="18" charset="0"/>
+                <a:cs typeface="Times New Roman" panose="02020503050405090304" pitchFamily="18" charset="0"/>
               </a:rPr>
               <a:t>The appointment agent will also interact with the clinic system agent to activate the signal regarding the reminder. The Reminder agent then will remind the patient when the appointment is due.</a:t>
             </a:r>
@@ -8058,7 +7672,7 @@
               <a:effectLst/>
               <a:latin typeface="Calibri" panose="020F0502020204030204" pitchFamily="34" charset="0"/>
               <a:ea typeface="Calibri" panose="020F0502020204030204" pitchFamily="34" charset="0"/>
-              <a:cs typeface="Times New Roman" panose="02020603050405020304" pitchFamily="18" charset="0"/>
+              <a:cs typeface="Times New Roman" panose="02020503050405090304" pitchFamily="18" charset="0"/>
             </a:endParaRPr>
           </a:p>
           <a:p>
@@ -8068,13 +7682,7 @@
       </p:sp>
       <p:sp>
         <p:nvSpPr>
-          <p:cNvPr id="4" name="Date Placeholder 3">
-            <a:extLst>
-              <a:ext uri="{FF2B5EF4-FFF2-40B4-BE49-F238E27FC236}">
-                <a16:creationId xmlns:a16="http://schemas.microsoft.com/office/drawing/2014/main" id="{27ABC16C-7B60-476B-8EC1-CA6FD2886746}"/>
-              </a:ext>
-            </a:extLst>
-          </p:cNvPr>
+          <p:cNvPr id="4" name="Date Placeholder 3"/>
           <p:cNvSpPr>
             <a:spLocks noGrp="1"/>
           </p:cNvSpPr>
@@ -8105,13 +7713,7 @@
       </p:sp>
       <p:sp>
         <p:nvSpPr>
-          <p:cNvPr id="6" name="Slide Number Placeholder 5">
-            <a:extLst>
-              <a:ext uri="{FF2B5EF4-FFF2-40B4-BE49-F238E27FC236}">
-                <a16:creationId xmlns:a16="http://schemas.microsoft.com/office/drawing/2014/main" id="{EEAC3FDF-3328-4A44-BFBD-A22E795BBA3B}"/>
-              </a:ext>
-            </a:extLst>
-          </p:cNvPr>
+          <p:cNvPr id="6" name="Slide Number Placeholder 5"/>
           <p:cNvSpPr>
             <a:spLocks noGrp="1"/>
           </p:cNvSpPr>
@@ -8126,19 +7728,12 @@
           <a:p>
             <a:fld id="{A4BAB868-1E00-44C6-B1AB-DFCC5F9865BA}" type="slidenum">
               <a:rPr lang="ja-JP" altLang="en-US" smtClean="0"/>
-              <a:pPr/>
-              <a:t>9</a:t>
             </a:fld>
             <a:endParaRPr lang="en-US" altLang="ja-JP"/>
           </a:p>
         </p:txBody>
       </p:sp>
     </p:spTree>
-    <p:extLst>
-      <p:ext uri="{BB962C8B-B14F-4D97-AF65-F5344CB8AC3E}">
-        <p14:creationId xmlns:p14="http://schemas.microsoft.com/office/powerpoint/2010/main" val="1590150963"/>
-      </p:ext>
-    </p:extLst>
   </p:cSld>
   <p:clrMapOvr>
     <a:masterClrMapping/>
@@ -8396,13 +7991,8 @@
           <a:headEnd type="none" w="med" len="med"/>
           <a:tailEnd type="none" w="med" len="med"/>
         </a:ln>
-        <a:effectLst/>
       </a:spPr>
-      <a:bodyPr vert="horz" wrap="none" lIns="91440" tIns="45720" rIns="91440" bIns="45720" numCol="1" anchor="t" anchorCtr="0" compatLnSpc="1">
-        <a:prstTxWarp prst="textNoShape">
-          <a:avLst/>
-        </a:prstTxWarp>
-      </a:bodyPr>
+      <a:bodyPr vert="horz" wrap="none" lIns="91440" tIns="45720" rIns="91440" bIns="45720" numCol="1" anchor="t" anchorCtr="0" compatLnSpc="1"/>
       <a:lstStyle>
         <a:defPPr marL="0" marR="0" indent="0" algn="l" defTabSz="914400" rtl="0" eaLnBrk="1" fontAlgn="base" latinLnBrk="0" hangingPunct="1">
           <a:lnSpc>
@@ -8418,7 +8008,6 @@
           <a:buSzTx/>
           <a:buFontTx/>
           <a:buNone/>
-          <a:tabLst/>
           <a:defRPr kumimoji="1" lang="en-US" sz="2400" b="1" i="0" u="none" strike="noStrike" cap="none" normalizeH="0" baseline="0" smtClean="0">
             <a:ln>
               <a:noFill/>
@@ -8427,8 +8016,8 @@
               <a:schemeClr val="tx1"/>
             </a:solidFill>
             <a:effectLst/>
-            <a:latin typeface="Tahoma" pitchFamily="34" charset="0"/>
-            <a:ea typeface="ＭＳ Ｐゴシック" pitchFamily="50" charset="-128"/>
+            <a:latin typeface="Tahoma" panose="020B0604030504040204" pitchFamily="34" charset="0"/>
+            <a:ea typeface="MS PGothic" pitchFamily="50" charset="-128"/>
           </a:defRPr>
         </a:defPPr>
       </a:lstStyle>
@@ -8459,13 +8048,8 @@
           <a:headEnd type="none" w="med" len="med"/>
           <a:tailEnd type="none" w="med" len="med"/>
         </a:ln>
-        <a:effectLst/>
       </a:spPr>
-      <a:bodyPr vert="horz" wrap="none" lIns="91440" tIns="45720" rIns="91440" bIns="45720" numCol="1" anchor="t" anchorCtr="0" compatLnSpc="1">
-        <a:prstTxWarp prst="textNoShape">
-          <a:avLst/>
-        </a:prstTxWarp>
-      </a:bodyPr>
+      <a:bodyPr vert="horz" wrap="none" lIns="91440" tIns="45720" rIns="91440" bIns="45720" numCol="1" anchor="t" anchorCtr="0" compatLnSpc="1"/>
       <a:lstStyle>
         <a:defPPr marL="0" marR="0" indent="0" algn="l" defTabSz="914400" rtl="0" eaLnBrk="1" fontAlgn="base" latinLnBrk="0" hangingPunct="1">
           <a:lnSpc>
@@ -8481,7 +8065,6 @@
           <a:buSzTx/>
           <a:buFontTx/>
           <a:buNone/>
-          <a:tabLst/>
           <a:defRPr kumimoji="1" lang="en-US" sz="2400" b="1" i="0" u="none" strike="noStrike" cap="none" normalizeH="0" baseline="0" smtClean="0">
             <a:ln>
               <a:noFill/>
@@ -8490,8 +8073,8 @@
               <a:schemeClr val="tx1"/>
             </a:solidFill>
             <a:effectLst/>
-            <a:latin typeface="Tahoma" pitchFamily="34" charset="0"/>
-            <a:ea typeface="ＭＳ Ｐゴシック" pitchFamily="50" charset="-128"/>
+            <a:latin typeface="Tahoma" panose="020B0604030504040204" pitchFamily="34" charset="0"/>
+            <a:ea typeface="MS PGothic" pitchFamily="50" charset="-128"/>
           </a:defRPr>
         </a:defPPr>
       </a:lstStyle>
@@ -8786,293 +8369,10 @@
       <a:clrMap bg1="lt1" tx1="dk1" bg2="lt2" tx2="dk2" accent1="accent1" accent2="accent2" accent3="accent3" accent4="accent4" accent5="accent5" accent6="accent6" hlink="hlink" folHlink="folHlink"/>
     </a:extraClrScheme>
   </a:extraClrSchemeLst>
+  <a:extLst>
+    <a:ext uri="{05A4C25C-085E-4340-85A3-A5531E510DB2}">
+      <thm15:themeFamily xmlns:thm15="http://schemas.microsoft.com/office/thememl/2012/main" name="Office Theme" id="{62F939B6-93AF-4DB8-9C6B-D6C7DFDC589F}" vid="{4A3C46E8-61CC-4603-A589-7422A47A8E4A}"/>
+    </a:ext>
+  </a:extLst>
 </a:theme>
-</file>
-
-<file path=customXml/item1.xml><?xml version="1.0" encoding="utf-8"?>
-<ct:contentTypeSchema xmlns:ct="http://schemas.microsoft.com/office/2006/metadata/contentType" xmlns:ma="http://schemas.microsoft.com/office/2006/metadata/properties/metaAttributes" ct:_="" ma:_="" ma:contentTypeName="Document" ma:contentTypeID="0x010100167A42814A0A7A429FBAAD58A3662C43" ma:contentTypeVersion="14" ma:contentTypeDescription="Create a new document." ma:contentTypeScope="" ma:versionID="2e0f0b35447dfaef00fa2716150d7de8">
-  <xsd:schema xmlns:xsd="http://www.w3.org/2001/XMLSchema" xmlns:xs="http://www.w3.org/2001/XMLSchema" xmlns:p="http://schemas.microsoft.com/office/2006/metadata/properties" xmlns:ns3="d8a3f0a0-49e1-415f-8d7d-9b51d0eb93e8" xmlns:ns4="ce8d2f3a-208b-4f58-bb79-4192d7cf8650" targetNamespace="http://schemas.microsoft.com/office/2006/metadata/properties" ma:root="true" ma:fieldsID="d9b4fe6bd1d6509f7a3dbc01590a646f" ns3:_="" ns4:_="">
-    <xsd:import namespace="d8a3f0a0-49e1-415f-8d7d-9b51d0eb93e8"/>
-    <xsd:import namespace="ce8d2f3a-208b-4f58-bb79-4192d7cf8650"/>
-    <xsd:element name="properties">
-      <xsd:complexType>
-        <xsd:sequence>
-          <xsd:element name="documentManagement">
-            <xsd:complexType>
-              <xsd:all>
-                <xsd:element ref="ns3:MediaServiceMetadata" minOccurs="0"/>
-                <xsd:element ref="ns3:MediaServiceFastMetadata" minOccurs="0"/>
-                <xsd:element ref="ns3:MediaServiceDateTaken" minOccurs="0"/>
-                <xsd:element ref="ns3:MediaServiceAutoTags" minOccurs="0"/>
-                <xsd:element ref="ns3:MediaServiceOCR" minOccurs="0"/>
-                <xsd:element ref="ns3:MediaServiceGenerationTime" minOccurs="0"/>
-                <xsd:element ref="ns3:MediaServiceEventHashCode" minOccurs="0"/>
-                <xsd:element ref="ns3:MediaServiceAutoKeyPoints" minOccurs="0"/>
-                <xsd:element ref="ns3:MediaServiceKeyPoints" minOccurs="0"/>
-                <xsd:element ref="ns3:MediaServiceLocation" minOccurs="0"/>
-                <xsd:element ref="ns4:SharedWithUsers" minOccurs="0"/>
-                <xsd:element ref="ns4:SharedWithDetails" minOccurs="0"/>
-                <xsd:element ref="ns4:SharingHintHash" minOccurs="0"/>
-                <xsd:element ref="ns3:MediaLengthInSeconds" minOccurs="0"/>
-              </xsd:all>
-            </xsd:complexType>
-          </xsd:element>
-        </xsd:sequence>
-      </xsd:complexType>
-    </xsd:element>
-  </xsd:schema>
-  <xsd:schema xmlns:xsd="http://www.w3.org/2001/XMLSchema" xmlns:xs="http://www.w3.org/2001/XMLSchema" xmlns:dms="http://schemas.microsoft.com/office/2006/documentManagement/types" xmlns:pc="http://schemas.microsoft.com/office/infopath/2007/PartnerControls" targetNamespace="d8a3f0a0-49e1-415f-8d7d-9b51d0eb93e8" elementFormDefault="qualified">
-    <xsd:import namespace="http://schemas.microsoft.com/office/2006/documentManagement/types"/>
-    <xsd:import namespace="http://schemas.microsoft.com/office/infopath/2007/PartnerControls"/>
-    <xsd:element name="MediaServiceMetadata" ma:index="8" nillable="true" ma:displayName="MediaServiceMetadata" ma:hidden="true" ma:internalName="MediaServiceMetadata" ma:readOnly="true">
-      <xsd:simpleType>
-        <xsd:restriction base="dms:Note"/>
-      </xsd:simpleType>
-    </xsd:element>
-    <xsd:element name="MediaServiceFastMetadata" ma:index="9" nillable="true" ma:displayName="MediaServiceFastMetadata" ma:hidden="true" ma:internalName="MediaServiceFastMetadata" ma:readOnly="true">
-      <xsd:simpleType>
-        <xsd:restriction base="dms:Note"/>
-      </xsd:simpleType>
-    </xsd:element>
-    <xsd:element name="MediaServiceDateTaken" ma:index="10" nillable="true" ma:displayName="MediaServiceDateTaken" ma:hidden="true" ma:internalName="MediaServiceDateTaken" ma:readOnly="true">
-      <xsd:simpleType>
-        <xsd:restriction base="dms:Text"/>
-      </xsd:simpleType>
-    </xsd:element>
-    <xsd:element name="MediaServiceAutoTags" ma:index="11" nillable="true" ma:displayName="Tags" ma:internalName="MediaServiceAutoTags" ma:readOnly="true">
-      <xsd:simpleType>
-        <xsd:restriction base="dms:Text"/>
-      </xsd:simpleType>
-    </xsd:element>
-    <xsd:element name="MediaServiceOCR" ma:index="12" nillable="true" ma:displayName="Extracted Text" ma:internalName="MediaServiceOCR" ma:readOnly="true">
-      <xsd:simpleType>
-        <xsd:restriction base="dms:Note">
-          <xsd:maxLength value="255"/>
-        </xsd:restriction>
-      </xsd:simpleType>
-    </xsd:element>
-    <xsd:element name="MediaServiceGenerationTime" ma:index="13" nillable="true" ma:displayName="MediaServiceGenerationTime" ma:hidden="true" ma:internalName="MediaServiceGenerationTime" ma:readOnly="true">
-      <xsd:simpleType>
-        <xsd:restriction base="dms:Text"/>
-      </xsd:simpleType>
-    </xsd:element>
-    <xsd:element name="MediaServiceEventHashCode" ma:index="14" nillable="true" ma:displayName="MediaServiceEventHashCode" ma:hidden="true" ma:internalName="MediaServiceEventHashCode" ma:readOnly="true">
-      <xsd:simpleType>
-        <xsd:restriction base="dms:Text"/>
-      </xsd:simpleType>
-    </xsd:element>
-    <xsd:element name="MediaServiceAutoKeyPoints" ma:index="15" nillable="true" ma:displayName="MediaServiceAutoKeyPoints" ma:hidden="true" ma:internalName="MediaServiceAutoKeyPoints" ma:readOnly="true">
-      <xsd:simpleType>
-        <xsd:restriction base="dms:Note"/>
-      </xsd:simpleType>
-    </xsd:element>
-    <xsd:element name="MediaServiceKeyPoints" ma:index="16" nillable="true" ma:displayName="KeyPoints" ma:internalName="MediaServiceKeyPoints" ma:readOnly="true">
-      <xsd:simpleType>
-        <xsd:restriction base="dms:Note">
-          <xsd:maxLength value="255"/>
-        </xsd:restriction>
-      </xsd:simpleType>
-    </xsd:element>
-    <xsd:element name="MediaServiceLocation" ma:index="17" nillable="true" ma:displayName="Location" ma:internalName="MediaServiceLocation" ma:readOnly="true">
-      <xsd:simpleType>
-        <xsd:restriction base="dms:Text"/>
-      </xsd:simpleType>
-    </xsd:element>
-    <xsd:element name="MediaLengthInSeconds" ma:index="21" nillable="true" ma:displayName="MediaLengthInSeconds" ma:hidden="true" ma:internalName="MediaLengthInSeconds" ma:readOnly="true">
-      <xsd:simpleType>
-        <xsd:restriction base="dms:Unknown"/>
-      </xsd:simpleType>
-    </xsd:element>
-  </xsd:schema>
-  <xsd:schema xmlns:xsd="http://www.w3.org/2001/XMLSchema" xmlns:xs="http://www.w3.org/2001/XMLSchema" xmlns:dms="http://schemas.microsoft.com/office/2006/documentManagement/types" xmlns:pc="http://schemas.microsoft.com/office/infopath/2007/PartnerControls" targetNamespace="ce8d2f3a-208b-4f58-bb79-4192d7cf8650" elementFormDefault="qualified">
-    <xsd:import namespace="http://schemas.microsoft.com/office/2006/documentManagement/types"/>
-    <xsd:import namespace="http://schemas.microsoft.com/office/infopath/2007/PartnerControls"/>
-    <xsd:element name="SharedWithUsers" ma:index="18" nillable="true" ma:displayName="Shared With" ma:internalName="SharedWithUsers" ma:readOnly="true">
-      <xsd:complexType>
-        <xsd:complexContent>
-          <xsd:extension base="dms:UserMulti">
-            <xsd:sequence>
-              <xsd:element name="UserInfo" minOccurs="0" maxOccurs="unbounded">
-                <xsd:complexType>
-                  <xsd:sequence>
-                    <xsd:element name="DisplayName" type="xsd:string" minOccurs="0"/>
-                    <xsd:element name="AccountId" type="dms:UserId" minOccurs="0" nillable="true"/>
-                    <xsd:element name="AccountType" type="xsd:string" minOccurs="0"/>
-                  </xsd:sequence>
-                </xsd:complexType>
-              </xsd:element>
-            </xsd:sequence>
-          </xsd:extension>
-        </xsd:complexContent>
-      </xsd:complexType>
-    </xsd:element>
-    <xsd:element name="SharedWithDetails" ma:index="19" nillable="true" ma:displayName="Shared With Details" ma:internalName="SharedWithDetails" ma:readOnly="true">
-      <xsd:simpleType>
-        <xsd:restriction base="dms:Note">
-          <xsd:maxLength value="255"/>
-        </xsd:restriction>
-      </xsd:simpleType>
-    </xsd:element>
-    <xsd:element name="SharingHintHash" ma:index="20" nillable="true" ma:displayName="Sharing Hint Hash" ma:hidden="true" ma:internalName="SharingHintHash" ma:readOnly="true">
-      <xsd:simpleType>
-        <xsd:restriction base="dms:Text"/>
-      </xsd:simpleType>
-    </xsd:element>
-  </xsd:schema>
-  <xsd:schema xmlns="http://schemas.openxmlformats.org/package/2006/metadata/core-properties" xmlns:xsd="http://www.w3.org/2001/XMLSchema" xmlns:xsi="http://www.w3.org/2001/XMLSchema-instance" xmlns:dc="http://purl.org/dc/elements/1.1/" xmlns:dcterms="http://purl.org/dc/terms/" xmlns:odoc="http://schemas.microsoft.com/internal/obd" targetNamespace="http://schemas.openxmlformats.org/package/2006/metadata/core-properties" elementFormDefault="qualified" attributeFormDefault="unqualified" blockDefault="#all">
-    <xsd:import namespace="http://purl.org/dc/elements/1.1/" schemaLocation="http://dublincore.org/schemas/xmls/qdc/2003/04/02/dc.xsd"/>
-    <xsd:import namespace="http://purl.org/dc/terms/" schemaLocation="http://dublincore.org/schemas/xmls/qdc/2003/04/02/dcterms.xsd"/>
-    <xsd:element name="coreProperties" type="CT_coreProperties"/>
-    <xsd:complexType name="CT_coreProperties">
-      <xsd:all>
-        <xsd:element ref="dc:creator" minOccurs="0" maxOccurs="1"/>
-        <xsd:element ref="dcterms:created" minOccurs="0" maxOccurs="1"/>
-        <xsd:element ref="dc:identifier" minOccurs="0" maxOccurs="1"/>
-        <xsd:element name="contentType" minOccurs="0" maxOccurs="1" type="xsd:string" ma:index="0" ma:displayName="Content Type"/>
-        <xsd:element ref="dc:title" minOccurs="0" maxOccurs="1" ma:index="4" ma:displayName="Title"/>
-        <xsd:element ref="dc:subject" minOccurs="0" maxOccurs="1"/>
-        <xsd:element ref="dc:description" minOccurs="0" maxOccurs="1"/>
-        <xsd:element name="keywords" minOccurs="0" maxOccurs="1" type="xsd:string"/>
-        <xsd:element ref="dc:language" minOccurs="0" maxOccurs="1"/>
-        <xsd:element name="category" minOccurs="0" maxOccurs="1" type="xsd:string"/>
-        <xsd:element name="version" minOccurs="0" maxOccurs="1" type="xsd:string"/>
-        <xsd:element name="revision" minOccurs="0" maxOccurs="1" type="xsd:string">
-          <xsd:annotation>
-            <xsd:documentation>
-                        This value indicates the number of saves or revisions. The application is responsible for updating this value after each revision.
-                    </xsd:documentation>
-          </xsd:annotation>
-        </xsd:element>
-        <xsd:element name="lastModifiedBy" minOccurs="0" maxOccurs="1" type="xsd:string"/>
-        <xsd:element ref="dcterms:modified" minOccurs="0" maxOccurs="1"/>
-        <xsd:element name="contentStatus" minOccurs="0" maxOccurs="1" type="xsd:string"/>
-      </xsd:all>
-    </xsd:complexType>
-  </xsd:schema>
-  <xs:schema xmlns:pc="http://schemas.microsoft.com/office/infopath/2007/PartnerControls" xmlns:xs="http://www.w3.org/2001/XMLSchema" targetNamespace="http://schemas.microsoft.com/office/infopath/2007/PartnerControls" elementFormDefault="qualified" attributeFormDefault="unqualified">
-    <xs:element name="Person">
-      <xs:complexType>
-        <xs:sequence>
-          <xs:element ref="pc:DisplayName" minOccurs="0"/>
-          <xs:element ref="pc:AccountId" minOccurs="0"/>
-          <xs:element ref="pc:AccountType" minOccurs="0"/>
-        </xs:sequence>
-      </xs:complexType>
-    </xs:element>
-    <xs:element name="DisplayName" type="xs:string"/>
-    <xs:element name="AccountId" type="xs:string"/>
-    <xs:element name="AccountType" type="xs:string"/>
-    <xs:element name="BDCAssociatedEntity">
-      <xs:complexType>
-        <xs:sequence>
-          <xs:element ref="pc:BDCEntity" minOccurs="0" maxOccurs="unbounded"/>
-        </xs:sequence>
-        <xs:attribute ref="pc:EntityNamespace"/>
-        <xs:attribute ref="pc:EntityName"/>
-        <xs:attribute ref="pc:SystemInstanceName"/>
-        <xs:attribute ref="pc:AssociationName"/>
-      </xs:complexType>
-    </xs:element>
-    <xs:attribute name="EntityNamespace" type="xs:string"/>
-    <xs:attribute name="EntityName" type="xs:string"/>
-    <xs:attribute name="SystemInstanceName" type="xs:string"/>
-    <xs:attribute name="AssociationName" type="xs:string"/>
-    <xs:element name="BDCEntity">
-      <xs:complexType>
-        <xs:sequence>
-          <xs:element ref="pc:EntityDisplayName" minOccurs="0"/>
-          <xs:element ref="pc:EntityInstanceReference" minOccurs="0"/>
-          <xs:element ref="pc:EntityId1" minOccurs="0"/>
-          <xs:element ref="pc:EntityId2" minOccurs="0"/>
-          <xs:element ref="pc:EntityId3" minOccurs="0"/>
-          <xs:element ref="pc:EntityId4" minOccurs="0"/>
-          <xs:element ref="pc:EntityId5" minOccurs="0"/>
-        </xs:sequence>
-      </xs:complexType>
-    </xs:element>
-    <xs:element name="EntityDisplayName" type="xs:string"/>
-    <xs:element name="EntityInstanceReference" type="xs:string"/>
-    <xs:element name="EntityId1" type="xs:string"/>
-    <xs:element name="EntityId2" type="xs:string"/>
-    <xs:element name="EntityId3" type="xs:string"/>
-    <xs:element name="EntityId4" type="xs:string"/>
-    <xs:element name="EntityId5" type="xs:string"/>
-    <xs:element name="Terms">
-      <xs:complexType>
-        <xs:sequence>
-          <xs:element ref="pc:TermInfo" minOccurs="0" maxOccurs="unbounded"/>
-        </xs:sequence>
-      </xs:complexType>
-    </xs:element>
-    <xs:element name="TermInfo">
-      <xs:complexType>
-        <xs:sequence>
-          <xs:element ref="pc:TermName" minOccurs="0"/>
-          <xs:element ref="pc:TermId" minOccurs="0"/>
-        </xs:sequence>
-      </xs:complexType>
-    </xs:element>
-    <xs:element name="TermName" type="xs:string"/>
-    <xs:element name="TermId" type="xs:string"/>
-  </xs:schema>
-</ct:contentTypeSchema>
-</file>
-
-<file path=customXml/item2.xml><?xml version="1.0" encoding="utf-8"?>
-<p:properties xmlns:p="http://schemas.microsoft.com/office/2006/metadata/properties" xmlns:xsi="http://www.w3.org/2001/XMLSchema-instance" xmlns:pc="http://schemas.microsoft.com/office/infopath/2007/PartnerControls">
-  <documentManagement/>
-</p:properties>
-</file>
-
-<file path=customXml/item3.xml><?xml version="1.0" encoding="utf-8"?>
-<?mso-contentType ?>
-<FormTemplates xmlns="http://schemas.microsoft.com/sharepoint/v3/contenttype/forms">
-  <Display>DocumentLibraryForm</Display>
-  <Edit>DocumentLibraryForm</Edit>
-  <New>DocumentLibraryForm</New>
-</FormTemplates>
-</file>
-
-<file path=customXml/itemProps1.xml><?xml version="1.0" encoding="utf-8"?>
-<ds:datastoreItem xmlns:ds="http://schemas.openxmlformats.org/officeDocument/2006/customXml" ds:itemID="{25CCB28B-163E-40CA-8CCE-69A7F4A1A4B7}">
-  <ds:schemaRefs>
-    <ds:schemaRef ds:uri="http://schemas.microsoft.com/office/2006/metadata/contentType"/>
-    <ds:schemaRef ds:uri="http://schemas.microsoft.com/office/2006/metadata/properties/metaAttributes"/>
-    <ds:schemaRef ds:uri="http://www.w3.org/2001/XMLSchema"/>
-    <ds:schemaRef ds:uri="http://schemas.microsoft.com/office/2006/metadata/properties"/>
-    <ds:schemaRef ds:uri="d8a3f0a0-49e1-415f-8d7d-9b51d0eb93e8"/>
-    <ds:schemaRef ds:uri="ce8d2f3a-208b-4f58-bb79-4192d7cf8650"/>
-    <ds:schemaRef ds:uri="http://schemas.microsoft.com/office/2006/documentManagement/types"/>
-    <ds:schemaRef ds:uri="http://schemas.microsoft.com/office/infopath/2007/PartnerControls"/>
-    <ds:schemaRef ds:uri="http://schemas.openxmlformats.org/package/2006/metadata/core-properties"/>
-    <ds:schemaRef ds:uri="http://purl.org/dc/elements/1.1/"/>
-    <ds:schemaRef ds:uri="http://purl.org/dc/terms/"/>
-    <ds:schemaRef ds:uri="http://schemas.microsoft.com/internal/obd"/>
-  </ds:schemaRefs>
-</ds:datastoreItem>
-</file>
-
-<file path=customXml/itemProps2.xml><?xml version="1.0" encoding="utf-8"?>
-<ds:datastoreItem xmlns:ds="http://schemas.openxmlformats.org/officeDocument/2006/customXml" ds:itemID="{B84EF1B3-7571-4E02-A7DC-7272CEC15FB7}">
-  <ds:schemaRefs>
-    <ds:schemaRef ds:uri="http://schemas.microsoft.com/office/infopath/2007/PartnerControls"/>
-    <ds:schemaRef ds:uri="http://purl.org/dc/elements/1.1/"/>
-    <ds:schemaRef ds:uri="http://schemas.microsoft.com/office/2006/documentManagement/types"/>
-    <ds:schemaRef ds:uri="http://schemas.microsoft.com/office/2006/metadata/properties"/>
-    <ds:schemaRef ds:uri="http://purl.org/dc/terms/"/>
-    <ds:schemaRef ds:uri="http://purl.org/dc/dcmitype/"/>
-    <ds:schemaRef ds:uri="ce8d2f3a-208b-4f58-bb79-4192d7cf8650"/>
-    <ds:schemaRef ds:uri="http://schemas.openxmlformats.org/package/2006/metadata/core-properties"/>
-    <ds:schemaRef ds:uri="d8a3f0a0-49e1-415f-8d7d-9b51d0eb93e8"/>
-    <ds:schemaRef ds:uri="http://www.w3.org/XML/1998/namespace"/>
-  </ds:schemaRefs>
-</ds:datastoreItem>
-</file>
-
-<file path=customXml/itemProps3.xml><?xml version="1.0" encoding="utf-8"?>
-<ds:datastoreItem xmlns:ds="http://schemas.openxmlformats.org/officeDocument/2006/customXml" ds:itemID="{66358C42-DD22-4F23-85C0-029A1B03C7F8}">
-  <ds:schemaRefs>
-    <ds:schemaRef ds:uri="http://schemas.microsoft.com/sharepoint/v3/contenttype/forms"/>
-  </ds:schemaRefs>
-</ds:datastoreItem>
 </file>
</xml_diff>

<commit_message>
Added Changes for Assignment #2 Signed-off-by: anish30145784 <anish.mukherjee1@ucalgary.ca>
</commit_message>
<xml_diff>
--- a/GroupD_ProjectPresentation.pptx
+++ b/GroupD_ProjectPresentation.pptx
@@ -5,21 +5,28 @@
     <p:sldMasterId id="2147483648" r:id="rId1"/>
   </p:sldMasterIdLst>
   <p:sldIdLst>
-    <p:sldId id="257" r:id="rId3"/>
-    <p:sldId id="258" r:id="rId4"/>
-    <p:sldId id="259" r:id="rId5"/>
-    <p:sldId id="261" r:id="rId6"/>
-    <p:sldId id="262" r:id="rId7"/>
-    <p:sldId id="264" r:id="rId8"/>
-    <p:sldId id="265" r:id="rId9"/>
-    <p:sldId id="269" r:id="rId10"/>
-    <p:sldId id="270" r:id="rId11"/>
-    <p:sldId id="260" r:id="rId12"/>
-    <p:sldId id="263" r:id="rId13"/>
-    <p:sldId id="271" r:id="rId14"/>
-    <p:sldId id="266" r:id="rId15"/>
-    <p:sldId id="267" r:id="rId16"/>
-    <p:sldId id="268" r:id="rId17"/>
+    <p:sldId id="257" r:id="rId2"/>
+    <p:sldId id="258" r:id="rId3"/>
+    <p:sldId id="259" r:id="rId4"/>
+    <p:sldId id="261" r:id="rId5"/>
+    <p:sldId id="262" r:id="rId6"/>
+    <p:sldId id="264" r:id="rId7"/>
+    <p:sldId id="265" r:id="rId8"/>
+    <p:sldId id="269" r:id="rId9"/>
+    <p:sldId id="270" r:id="rId10"/>
+    <p:sldId id="260" r:id="rId11"/>
+    <p:sldId id="263" r:id="rId12"/>
+    <p:sldId id="271" r:id="rId13"/>
+    <p:sldId id="266" r:id="rId14"/>
+    <p:sldId id="267" r:id="rId15"/>
+    <p:sldId id="268" r:id="rId16"/>
+    <p:sldId id="272" r:id="rId17"/>
+    <p:sldId id="277" r:id="rId18"/>
+    <p:sldId id="278" r:id="rId19"/>
+    <p:sldId id="273" r:id="rId20"/>
+    <p:sldId id="274" r:id="rId21"/>
+    <p:sldId id="275" r:id="rId22"/>
+    <p:sldId id="276" r:id="rId23"/>
   </p:sldIdLst>
   <p:sldSz cx="12192000" cy="6858000"/>
   <p:notesSz cx="6858000" cy="9144000"/>
@@ -118,11 +125,16 @@
       </a:defRPr>
     </a:lvl9pPr>
   </p:defaultTextStyle>
+  <p:extLst>
+    <p:ext uri="{EFAFB233-063F-42B5-8137-9DF3F51BA10A}">
+      <p15:sldGuideLst xmlns:p15="http://schemas.microsoft.com/office/powerpoint/2012/main"/>
+    </p:ext>
+  </p:extLst>
 </p:presentation>
 </file>
 
 <file path=ppt/slideLayouts/slideLayout1.xml><?xml version="1.0" encoding="utf-8"?>
-<p:sldLayout xmlns:a="http://schemas.openxmlformats.org/drawingml/2006/main" xmlns:r="http://schemas.openxmlformats.org/officeDocument/2006/relationships" xmlns:p="http://schemas.openxmlformats.org/presentationml/2006/main" type="title" preserve="1" showMasterSp="0">
+<p:sldLayout xmlns:a="http://schemas.openxmlformats.org/drawingml/2006/main" xmlns:r="http://schemas.openxmlformats.org/officeDocument/2006/relationships" xmlns:p="http://schemas.openxmlformats.org/presentationml/2006/main" showMasterSp="0" type="title" preserve="1">
   <p:cSld name="Title Slide">
     <p:spTree>
       <p:nvGrpSpPr>
@@ -327,6 +339,7 @@
           <a:p>
             <a:fld id="{95232F20-8D4C-4FF7-ADC1-A97AC17BD314}" type="slidenum">
               <a:rPr lang="ja-JP" altLang="en-US"/>
+              <a:t>‹#›</a:t>
             </a:fld>
             <a:endParaRPr lang="en-US" altLang="ja-JP"/>
           </a:p>
@@ -362,7 +375,6 @@
               <a:rPr lang="en-US" altLang="ja-JP"/>
               <a:t>Click to edit Master subtitle style</a:t>
             </a:r>
-            <a:endParaRPr lang="en-US" altLang="ja-JP"/>
           </a:p>
         </p:txBody>
       </p:sp>
@@ -397,7 +409,6 @@
               <a:rPr lang="en-US" altLang="ja-JP"/>
               <a:t>Click to edit Master title style</a:t>
             </a:r>
-            <a:endParaRPr lang="en-US" altLang="ja-JP"/>
           </a:p>
         </p:txBody>
       </p:sp>
@@ -472,7 +483,6 @@
               <a:rPr lang="en-US"/>
               <a:t>Click to edit Master text styles</a:t>
             </a:r>
-            <a:endParaRPr lang="en-US"/>
           </a:p>
           <a:p>
             <a:pPr lvl="1"/>
@@ -480,7 +490,6 @@
               <a:rPr lang="en-US"/>
               <a:t>Second level</a:t>
             </a:r>
-            <a:endParaRPr lang="en-US"/>
           </a:p>
           <a:p>
             <a:pPr lvl="2"/>
@@ -488,7 +497,6 @@
               <a:rPr lang="en-US"/>
               <a:t>Third level</a:t>
             </a:r>
-            <a:endParaRPr lang="en-US"/>
           </a:p>
           <a:p>
             <a:pPr lvl="3"/>
@@ -496,7 +504,6 @@
               <a:rPr lang="en-US"/>
               <a:t>Fourth level</a:t>
             </a:r>
-            <a:endParaRPr lang="en-US"/>
           </a:p>
           <a:p>
             <a:pPr lvl="4"/>
@@ -583,6 +590,7 @@
           <a:p>
             <a:fld id="{E6B1DEAD-7992-420D-B87A-30322BA01843}" type="slidenum">
               <a:rPr lang="ja-JP" altLang="en-US"/>
+              <a:t>‹#›</a:t>
             </a:fld>
             <a:endParaRPr lang="en-US" altLang="ja-JP"/>
           </a:p>
@@ -669,7 +677,6 @@
               <a:rPr lang="en-US"/>
               <a:t>Click to edit Master text styles</a:t>
             </a:r>
-            <a:endParaRPr lang="en-US"/>
           </a:p>
           <a:p>
             <a:pPr lvl="1"/>
@@ -677,7 +684,6 @@
               <a:rPr lang="en-US"/>
               <a:t>Second level</a:t>
             </a:r>
-            <a:endParaRPr lang="en-US"/>
           </a:p>
           <a:p>
             <a:pPr lvl="2"/>
@@ -685,7 +691,6 @@
               <a:rPr lang="en-US"/>
               <a:t>Third level</a:t>
             </a:r>
-            <a:endParaRPr lang="en-US"/>
           </a:p>
           <a:p>
             <a:pPr lvl="3"/>
@@ -693,7 +698,6 @@
               <a:rPr lang="en-US"/>
               <a:t>Fourth level</a:t>
             </a:r>
-            <a:endParaRPr lang="en-US"/>
           </a:p>
           <a:p>
             <a:pPr lvl="4"/>
@@ -780,6 +784,7 @@
           <a:p>
             <a:fld id="{04D34B5C-7F3E-425E-ADF3-038868261E82}" type="slidenum">
               <a:rPr lang="ja-JP" altLang="en-US"/>
+              <a:t>‹#›</a:t>
             </a:fld>
             <a:endParaRPr lang="en-US" altLang="ja-JP"/>
           </a:p>
@@ -856,7 +861,6 @@
               <a:rPr lang="en-US"/>
               <a:t>Click to edit Master text styles</a:t>
             </a:r>
-            <a:endParaRPr lang="en-US"/>
           </a:p>
           <a:p>
             <a:pPr lvl="1"/>
@@ -864,7 +868,6 @@
               <a:rPr lang="en-US"/>
               <a:t>Second level</a:t>
             </a:r>
-            <a:endParaRPr lang="en-US"/>
           </a:p>
           <a:p>
             <a:pPr lvl="2"/>
@@ -872,7 +875,6 @@
               <a:rPr lang="en-US"/>
               <a:t>Third level</a:t>
             </a:r>
-            <a:endParaRPr lang="en-US"/>
           </a:p>
           <a:p>
             <a:pPr lvl="3"/>
@@ -880,7 +882,6 @@
               <a:rPr lang="en-US"/>
               <a:t>Fourth level</a:t>
             </a:r>
-            <a:endParaRPr lang="en-US"/>
           </a:p>
           <a:p>
             <a:pPr lvl="4"/>
@@ -967,6 +968,7 @@
           <a:p>
             <a:fld id="{A4BAB868-1E00-44C6-B1AB-DFCC5F9865BA}" type="slidenum">
               <a:rPr lang="ja-JP" altLang="en-US"/>
+              <a:t>‹#›</a:t>
             </a:fld>
             <a:endParaRPr lang="en-US" altLang="ja-JP"/>
           </a:p>
@@ -1094,7 +1096,6 @@
               <a:rPr lang="en-US"/>
               <a:t>Click to edit Master text styles</a:t>
             </a:r>
-            <a:endParaRPr lang="en-US"/>
           </a:p>
         </p:txBody>
       </p:sp>
@@ -1173,6 +1174,7 @@
           <a:p>
             <a:fld id="{55A9038B-FC62-430B-ABCA-52AB400C562E}" type="slidenum">
               <a:rPr lang="ja-JP" altLang="en-US"/>
+              <a:t>‹#›</a:t>
             </a:fld>
             <a:endParaRPr lang="en-US" altLang="ja-JP"/>
           </a:p>
@@ -1282,7 +1284,6 @@
               <a:rPr lang="en-US"/>
               <a:t>Click to edit Master text styles</a:t>
             </a:r>
-            <a:endParaRPr lang="en-US"/>
           </a:p>
           <a:p>
             <a:pPr lvl="1"/>
@@ -1290,7 +1291,6 @@
               <a:rPr lang="en-US"/>
               <a:t>Second level</a:t>
             </a:r>
-            <a:endParaRPr lang="en-US"/>
           </a:p>
           <a:p>
             <a:pPr lvl="2"/>
@@ -1298,7 +1298,6 @@
               <a:rPr lang="en-US"/>
               <a:t>Third level</a:t>
             </a:r>
-            <a:endParaRPr lang="en-US"/>
           </a:p>
           <a:p>
             <a:pPr lvl="3"/>
@@ -1306,7 +1305,6 @@
               <a:rPr lang="en-US"/>
               <a:t>Fourth level</a:t>
             </a:r>
-            <a:endParaRPr lang="en-US"/>
           </a:p>
           <a:p>
             <a:pPr lvl="4"/>
@@ -1371,7 +1369,6 @@
               <a:rPr lang="en-US"/>
               <a:t>Click to edit Master text styles</a:t>
             </a:r>
-            <a:endParaRPr lang="en-US"/>
           </a:p>
           <a:p>
             <a:pPr lvl="1"/>
@@ -1379,7 +1376,6 @@
               <a:rPr lang="en-US"/>
               <a:t>Second level</a:t>
             </a:r>
-            <a:endParaRPr lang="en-US"/>
           </a:p>
           <a:p>
             <a:pPr lvl="2"/>
@@ -1387,7 +1383,6 @@
               <a:rPr lang="en-US"/>
               <a:t>Third level</a:t>
             </a:r>
-            <a:endParaRPr lang="en-US"/>
           </a:p>
           <a:p>
             <a:pPr lvl="3"/>
@@ -1395,7 +1390,6 @@
               <a:rPr lang="en-US"/>
               <a:t>Fourth level</a:t>
             </a:r>
-            <a:endParaRPr lang="en-US"/>
           </a:p>
           <a:p>
             <a:pPr lvl="4"/>
@@ -1482,6 +1476,7 @@
           <a:p>
             <a:fld id="{C6195CBF-EE0B-4DF9-B750-9D88F27AD928}" type="slidenum">
               <a:rPr lang="ja-JP" altLang="en-US"/>
+              <a:t>‹#›</a:t>
             </a:fld>
             <a:endParaRPr lang="en-US" altLang="ja-JP"/>
           </a:p>
@@ -1609,7 +1604,6 @@
               <a:rPr lang="en-US"/>
               <a:t>Click to edit Master text styles</a:t>
             </a:r>
-            <a:endParaRPr lang="en-US"/>
           </a:p>
         </p:txBody>
       </p:sp>
@@ -1666,7 +1660,6 @@
               <a:rPr lang="en-US"/>
               <a:t>Click to edit Master text styles</a:t>
             </a:r>
-            <a:endParaRPr lang="en-US"/>
           </a:p>
           <a:p>
             <a:pPr lvl="1"/>
@@ -1674,7 +1667,6 @@
               <a:rPr lang="en-US"/>
               <a:t>Second level</a:t>
             </a:r>
-            <a:endParaRPr lang="en-US"/>
           </a:p>
           <a:p>
             <a:pPr lvl="2"/>
@@ -1682,7 +1674,6 @@
               <a:rPr lang="en-US"/>
               <a:t>Third level</a:t>
             </a:r>
-            <a:endParaRPr lang="en-US"/>
           </a:p>
           <a:p>
             <a:pPr lvl="3"/>
@@ -1690,7 +1681,6 @@
               <a:rPr lang="en-US"/>
               <a:t>Fourth level</a:t>
             </a:r>
-            <a:endParaRPr lang="en-US"/>
           </a:p>
           <a:p>
             <a:pPr lvl="4"/>
@@ -1764,7 +1754,6 @@
               <a:rPr lang="en-US"/>
               <a:t>Click to edit Master text styles</a:t>
             </a:r>
-            <a:endParaRPr lang="en-US"/>
           </a:p>
         </p:txBody>
       </p:sp>
@@ -1821,7 +1810,6 @@
               <a:rPr lang="en-US"/>
               <a:t>Click to edit Master text styles</a:t>
             </a:r>
-            <a:endParaRPr lang="en-US"/>
           </a:p>
           <a:p>
             <a:pPr lvl="1"/>
@@ -1829,7 +1817,6 @@
               <a:rPr lang="en-US"/>
               <a:t>Second level</a:t>
             </a:r>
-            <a:endParaRPr lang="en-US"/>
           </a:p>
           <a:p>
             <a:pPr lvl="2"/>
@@ -1837,7 +1824,6 @@
               <a:rPr lang="en-US"/>
               <a:t>Third level</a:t>
             </a:r>
-            <a:endParaRPr lang="en-US"/>
           </a:p>
           <a:p>
             <a:pPr lvl="3"/>
@@ -1845,7 +1831,6 @@
               <a:rPr lang="en-US"/>
               <a:t>Fourth level</a:t>
             </a:r>
-            <a:endParaRPr lang="en-US"/>
           </a:p>
           <a:p>
             <a:pPr lvl="4"/>
@@ -1932,6 +1917,7 @@
           <a:p>
             <a:fld id="{52BBF39D-ED5C-4FEE-8FC6-1B1A39BD3660}" type="slidenum">
               <a:rPr lang="ja-JP" altLang="en-US"/>
+              <a:t>‹#›</a:t>
             </a:fld>
             <a:endParaRPr lang="en-US" altLang="ja-JP"/>
           </a:p>
@@ -2063,6 +2049,7 @@
           <a:p>
             <a:fld id="{37FD599C-677F-4B2D-863C-EFEC37F35933}" type="slidenum">
               <a:rPr lang="ja-JP" altLang="en-US"/>
+              <a:t>‹#›</a:t>
             </a:fld>
             <a:endParaRPr lang="en-US" altLang="ja-JP"/>
           </a:p>
@@ -2171,6 +2158,7 @@
           <a:p>
             <a:fld id="{672F6B94-B843-496F-BFD6-5ED1A58B620C}" type="slidenum">
               <a:rPr lang="ja-JP" altLang="en-US"/>
+              <a:t>‹#›</a:t>
             </a:fld>
             <a:endParaRPr lang="en-US" altLang="ja-JP"/>
           </a:p>
@@ -2289,7 +2277,6 @@
               <a:rPr lang="en-US"/>
               <a:t>Click to edit Master text styles</a:t>
             </a:r>
-            <a:endParaRPr lang="en-US"/>
           </a:p>
           <a:p>
             <a:pPr lvl="1"/>
@@ -2297,7 +2284,6 @@
               <a:rPr lang="en-US"/>
               <a:t>Second level</a:t>
             </a:r>
-            <a:endParaRPr lang="en-US"/>
           </a:p>
           <a:p>
             <a:pPr lvl="2"/>
@@ -2305,7 +2291,6 @@
               <a:rPr lang="en-US"/>
               <a:t>Third level</a:t>
             </a:r>
-            <a:endParaRPr lang="en-US"/>
           </a:p>
           <a:p>
             <a:pPr lvl="3"/>
@@ -2313,7 +2298,6 @@
               <a:rPr lang="en-US"/>
               <a:t>Fourth level</a:t>
             </a:r>
-            <a:endParaRPr lang="en-US"/>
           </a:p>
           <a:p>
             <a:pPr lvl="4"/>
@@ -2387,7 +2371,6 @@
               <a:rPr lang="en-US"/>
               <a:t>Click to edit Master text styles</a:t>
             </a:r>
-            <a:endParaRPr lang="en-US"/>
           </a:p>
         </p:txBody>
       </p:sp>
@@ -2466,6 +2449,7 @@
           <a:p>
             <a:fld id="{FCB87EBA-444C-4109-96D4-2F266CF6C88F}" type="slidenum">
               <a:rPr lang="ja-JP" altLang="en-US"/>
+              <a:t>‹#›</a:t>
             </a:fld>
             <a:endParaRPr lang="en-US" altLang="ja-JP"/>
           </a:p>
@@ -2654,7 +2638,6 @@
               <a:rPr lang="en-US"/>
               <a:t>Click to edit Master text styles</a:t>
             </a:r>
-            <a:endParaRPr lang="en-US"/>
           </a:p>
         </p:txBody>
       </p:sp>
@@ -2733,6 +2716,7 @@
           <a:p>
             <a:fld id="{98DAC2A1-4CF9-4B24-A3D3-7DE7BAC9C17A}" type="slidenum">
               <a:rPr lang="ja-JP" altLang="en-US"/>
+              <a:t>‹#›</a:t>
             </a:fld>
             <a:endParaRPr lang="en-US" altLang="ja-JP"/>
           </a:p>
@@ -2783,7 +2767,7 @@
           <p:nvPr userDrawn="1"/>
         </p:nvPicPr>
         <p:blipFill>
-          <a:blip r:embed="rId12"/>
+          <a:blip r:embed="rId13"/>
           <a:srcRect/>
           <a:stretch>
             <a:fillRect/>
@@ -2809,7 +2793,7 @@
           <p:nvPr/>
         </p:nvPicPr>
         <p:blipFill>
-          <a:blip r:embed="rId13"/>
+          <a:blip r:embed="rId14"/>
           <a:srcRect/>
           <a:stretch>
             <a:fillRect/>
@@ -2895,7 +2879,6 @@
               <a:rPr lang="en-US" altLang="ja-JP"/>
               <a:t>Click to edit Master text styles</a:t>
             </a:r>
-            <a:endParaRPr lang="en-US" altLang="ja-JP"/>
           </a:p>
           <a:p>
             <a:pPr lvl="1"/>
@@ -2903,7 +2886,6 @@
               <a:rPr lang="en-US" altLang="ja-JP"/>
               <a:t>Second level</a:t>
             </a:r>
-            <a:endParaRPr lang="en-US" altLang="ja-JP"/>
           </a:p>
           <a:p>
             <a:pPr lvl="2"/>
@@ -2911,7 +2893,6 @@
               <a:rPr lang="en-US" altLang="ja-JP"/>
               <a:t>Third level</a:t>
             </a:r>
-            <a:endParaRPr lang="en-US" altLang="ja-JP"/>
           </a:p>
           <a:p>
             <a:pPr lvl="3"/>
@@ -2919,7 +2900,6 @@
               <a:rPr lang="en-US" altLang="ja-JP"/>
               <a:t>Fourth level</a:t>
             </a:r>
-            <a:endParaRPr lang="en-US" altLang="ja-JP"/>
           </a:p>
           <a:p>
             <a:pPr lvl="4"/>
@@ -2927,7 +2907,6 @@
               <a:rPr lang="en-US" altLang="ja-JP"/>
               <a:t>Fifth level</a:t>
             </a:r>
-            <a:endParaRPr lang="en-US" altLang="ja-JP"/>
           </a:p>
         </p:txBody>
       </p:sp>
@@ -3048,6 +3027,7 @@
           <a:p>
             <a:fld id="{B11B43A2-5F84-46DB-BF79-78890F90E6E9}" type="slidenum">
               <a:rPr lang="ja-JP" altLang="en-US"/>
+              <a:t>‹#›</a:t>
             </a:fld>
             <a:endParaRPr lang="en-US" altLang="ja-JP"/>
           </a:p>
@@ -3122,7 +3102,6 @@
               <a:rPr lang="en-US" altLang="ja-JP"/>
               <a:t>Click to edit Master title style</a:t>
             </a:r>
-            <a:endParaRPr lang="en-US" altLang="ja-JP"/>
           </a:p>
         </p:txBody>
       </p:sp>
@@ -3135,7 +3114,7 @@
           <p:nvPr userDrawn="1"/>
         </p:nvPicPr>
         <p:blipFill>
-          <a:blip r:embed="rId14">
+          <a:blip r:embed="rId15">
             <a:clrChange>
               <a:clrFrom>
                 <a:srgbClr val="FFFFFF"/>
@@ -3758,6 +3737,7 @@
                 <a:latin typeface="Tahoma" panose="020B0604030504040204" pitchFamily="34" charset="0"/>
                 <a:ea typeface="MS PGothic" pitchFamily="50" charset="-128"/>
               </a:rPr>
+              <a:t>1</a:t>
             </a:fld>
             <a:endParaRPr lang="en-US" altLang="ja-JP" dirty="0">
               <a:solidFill>
@@ -3788,7 +3768,6 @@
               <a:rPr lang="en-CA" dirty="0"/>
               <a:t>1. Business Case</a:t>
             </a:r>
-            <a:endParaRPr lang="en-CA" dirty="0"/>
           </a:p>
         </p:txBody>
       </p:sp>
@@ -3840,10 +3819,6 @@
               </a:rPr>
               <a:t>for their pet’s health-checkup. Pet-owners, amidst their busy schedule, await a website that can assist them in addressing their pet’s well-being requirements.</a:t>
             </a:r>
-            <a:endParaRPr lang="en-US" sz="2400" dirty="0">
-              <a:latin typeface="Times New Roman" panose="02020503050405090304" pitchFamily="18" charset="0"/>
-              <a:cs typeface="Times New Roman" panose="02020503050405090304" pitchFamily="18" charset="0"/>
-            </a:endParaRPr>
           </a:p>
           <a:p>
             <a:pPr marL="285750" indent="-285750">
@@ -3860,10 +3835,6 @@
               </a:rPr>
               <a:t>Currently, pet-owners do not have any centralized repository to store their pet’s health statistics. Maintenance of these records would open a plethora of opportunities for business as we can automate certain processes that expedite an animal’s treatment.</a:t>
             </a:r>
-            <a:endParaRPr lang="en-US" sz="2400" dirty="0">
-              <a:latin typeface="Times New Roman" panose="02020503050405090304" pitchFamily="18" charset="0"/>
-              <a:cs typeface="Times New Roman" panose="02020503050405090304" pitchFamily="18" charset="0"/>
-            </a:endParaRPr>
           </a:p>
           <a:p>
             <a:pPr marL="285750" indent="-285750">
@@ -3880,10 +3851,6 @@
               </a:rPr>
               <a:t>These records can be shared globally, helping veterinarians around the world to diagnose diseases based on the similarity of symptoms found in the same breeds in another part of the world.</a:t>
             </a:r>
-            <a:endParaRPr lang="en-US" sz="2400" dirty="0">
-              <a:latin typeface="Times New Roman" panose="02020503050405090304" pitchFamily="18" charset="0"/>
-              <a:cs typeface="Times New Roman" panose="02020503050405090304" pitchFamily="18" charset="0"/>
-            </a:endParaRPr>
           </a:p>
         </p:txBody>
       </p:sp>
@@ -4009,6 +3976,7 @@
                 <a:latin typeface="Tahoma" panose="020B0604030504040204" pitchFamily="34" charset="0"/>
                 <a:ea typeface="MS PGothic" pitchFamily="50" charset="-128"/>
               </a:rPr>
+              <a:t>10</a:t>
             </a:fld>
             <a:endParaRPr lang="en-US" altLang="ja-JP">
               <a:solidFill>
@@ -4039,7 +4007,6 @@
               <a:rPr lang="en-CA" dirty="0"/>
               <a:t>Agent Description (cont’d)</a:t>
             </a:r>
-            <a:endParaRPr lang="en-CA" dirty="0"/>
           </a:p>
         </p:txBody>
       </p:sp>
@@ -4083,16 +4050,6 @@
               </a:rPr>
               <a:t>Reminder Agent</a:t>
             </a:r>
-            <a:endParaRPr lang="en-US" sz="2000" b="1" i="1" dirty="0">
-              <a:solidFill>
-                <a:srgbClr val="D60093"/>
-              </a:solidFill>
-              <a:effectLst>
-                <a:outerShdw blurRad="38100" dist="38100" dir="2700000" algn="tl">
-                  <a:srgbClr val="C0C0C0"/>
-                </a:outerShdw>
-              </a:effectLst>
-            </a:endParaRPr>
           </a:p>
           <a:p>
             <a:pPr>
@@ -4125,7 +4082,6 @@
               <a:rPr lang="en-CA" sz="1600" dirty="0"/>
               <a:t>The Reminder Agent communicates with the Clinic Agent, by waiting for its signals after an appointment is booked. If the user has activated reminders at the time of booking an appointment, the Reminder Agent would be sending automated SMS messages and e-mail notifications to the user on his/her registered e-mail account and mobile number. </a:t>
             </a:r>
-            <a:endParaRPr lang="en-CA" sz="1600" dirty="0"/>
           </a:p>
           <a:p>
             <a:pPr>
@@ -4139,7 +4095,6 @@
               <a:rPr lang="en-CA" sz="1600" dirty="0"/>
               <a:t>Instead of a receptionist logging in every time to trigger a reminder, the Agent by itself sends the message at regular intervals(hours/days) as chosen by the user.</a:t>
             </a:r>
-            <a:endParaRPr lang="en-CA" sz="1600" dirty="0"/>
           </a:p>
           <a:p>
             <a:pPr>
@@ -4153,7 +4108,6 @@
               <a:rPr lang="en-CA" sz="1600" dirty="0"/>
               <a:t>In case the appointment is cancelled or updated, the Reminder Agent also intelligently updates the text message and sends an updated notification to the user. </a:t>
             </a:r>
-            <a:endParaRPr lang="en-CA" sz="1600" dirty="0"/>
           </a:p>
           <a:p>
             <a:pPr>
@@ -4167,7 +4121,6 @@
               <a:rPr lang="en-CA" sz="1600" dirty="0"/>
               <a:t>Once the appointment is complete, the Reminder Agent directly accesses the database to disable the alerting mechanism for that particular appointment. </a:t>
             </a:r>
-            <a:endParaRPr lang="en-CA" sz="1600" dirty="0"/>
           </a:p>
           <a:p>
             <a:pPr>
@@ -4181,7 +4134,6 @@
               <a:rPr lang="en-CA" sz="1600" dirty="0"/>
               <a:t>In order to check if the registered email/phone number is valid, the Reminder Agent will trigger an acknowledgement  message at the time of booking the appointment. Subsequently, the other reminder messages will be forwarded in due course.</a:t>
             </a:r>
-            <a:endParaRPr lang="en-CA" sz="1600" dirty="0"/>
           </a:p>
           <a:p>
             <a:pPr>
@@ -4195,7 +4147,6 @@
               <a:rPr lang="en-CA" sz="1600" dirty="0"/>
               <a:t>The Reminder Agent also triggers a notification once the report has been generated, based upon the feedback from the veterinarian. In this case, it will await signal from the Template Agent.</a:t>
             </a:r>
-            <a:endParaRPr lang="en-CA" sz="1600" dirty="0"/>
           </a:p>
           <a:p>
             <a:pPr>
@@ -4209,7 +4160,6 @@
               <a:rPr lang="en-CA" sz="1600" dirty="0"/>
               <a:t>The Agent will keep a track of all the reminders sent to a particular number in the database for tracking purposes.</a:t>
             </a:r>
-            <a:endParaRPr lang="en-CA" sz="1600" dirty="0"/>
           </a:p>
           <a:p>
             <a:pPr>
@@ -4268,7 +4218,6 @@
               <a:rPr lang="en-CA" dirty="0"/>
               <a:t>Agent Description (cont’d)</a:t>
             </a:r>
-            <a:endParaRPr lang="en-CA" dirty="0"/>
           </a:p>
         </p:txBody>
       </p:sp>
@@ -4308,37 +4257,24 @@
               </a:rPr>
               <a:t>Template Agent</a:t>
             </a:r>
-            <a:endParaRPr lang="en-US" sz="2400" b="1" i="1" dirty="0">
-              <a:solidFill>
-                <a:srgbClr val="D60093"/>
-              </a:solidFill>
-              <a:effectLst>
-                <a:outerShdw blurRad="38100" dist="38100" dir="2700000" algn="tl">
-                  <a:srgbClr val="C0C0C0"/>
-                </a:outerShdw>
-              </a:effectLst>
-            </a:endParaRPr>
           </a:p>
           <a:p>
             <a:r>
               <a:rPr lang="en-US" sz="2400" dirty="0"/>
               <a:t>The Template Agent provides the doctor with different letter templates. Depending upon the video interaction between the doctor and the patient, the doctor can select and use the in-built template to report their diagnosis.</a:t>
             </a:r>
-            <a:endParaRPr lang="en-US" sz="2400" dirty="0"/>
           </a:p>
           <a:p>
             <a:r>
               <a:rPr lang="en-US" sz="2400" dirty="0"/>
               <a:t>The Template Agent communicates with the Clinic System Agent after the video interaction between the client and doctor is complete. </a:t>
             </a:r>
-            <a:endParaRPr lang="en-US" sz="2400" dirty="0"/>
           </a:p>
           <a:p>
             <a:r>
               <a:rPr lang="en-US" sz="2400" dirty="0"/>
               <a:t>If the Template Agent receives a request from the Clinic System Agent, the doctor is requested to input their feedback. </a:t>
             </a:r>
-            <a:endParaRPr lang="en-US" sz="2400" dirty="0"/>
           </a:p>
           <a:p>
             <a:r>
@@ -4397,6 +4333,7 @@
           <a:p>
             <a:fld id="{A4BAB868-1E00-44C6-B1AB-DFCC5F9865BA}" type="slidenum">
               <a:rPr lang="ja-JP" altLang="en-US" smtClean="0"/>
+              <a:t>11</a:t>
             </a:fld>
             <a:endParaRPr lang="en-US" altLang="ja-JP" dirty="0"/>
           </a:p>
@@ -4449,7 +4386,6 @@
               <a:rPr lang="en-CA" dirty="0"/>
               <a:t>Agent Description (cont’d)</a:t>
             </a:r>
-            <a:endParaRPr lang="en-CA" dirty="0"/>
           </a:p>
         </p:txBody>
       </p:sp>
@@ -4502,16 +4438,6 @@
               </a:rPr>
               <a:t>Agent</a:t>
             </a:r>
-            <a:endParaRPr lang="en-US" sz="2400" b="1" i="1" dirty="0">
-              <a:solidFill>
-                <a:srgbClr val="D60093"/>
-              </a:solidFill>
-              <a:effectLst>
-                <a:outerShdw blurRad="38100" dist="38100" dir="2700000" algn="tl">
-                  <a:srgbClr val="C0C0C0"/>
-                </a:outerShdw>
-              </a:effectLst>
-            </a:endParaRPr>
           </a:p>
           <a:p>
             <a:pPr>
@@ -4526,7 +4452,6 @@
               <a:rPr lang="en-US" sz="2200" dirty="0" smtClean="0"/>
               <a:t>.</a:t>
             </a:r>
-            <a:endParaRPr lang="en-US" sz="2200" dirty="0" smtClean="0"/>
           </a:p>
           <a:p>
             <a:pPr>
@@ -4545,7 +4470,6 @@
               <a:rPr lang="en-US" sz="2200" dirty="0" smtClean="0"/>
               <a:t>.</a:t>
             </a:r>
-            <a:endParaRPr lang="en-US" sz="2200" dirty="0" smtClean="0"/>
           </a:p>
           <a:p>
             <a:pPr>
@@ -4564,7 +4488,6 @@
               <a:rPr lang="en-US" sz="2200" dirty="0" smtClean="0"/>
               <a:t>.)</a:t>
             </a:r>
-            <a:endParaRPr lang="en-US" sz="2200" dirty="0" smtClean="0"/>
           </a:p>
           <a:p>
             <a:pPr>
@@ -4583,7 +4506,6 @@
               <a:rPr lang="en-US" sz="2200" dirty="0" smtClean="0"/>
               <a:t>.</a:t>
             </a:r>
-            <a:endParaRPr lang="en-US" sz="2200" dirty="0" smtClean="0"/>
           </a:p>
           <a:p>
             <a:pPr>
@@ -4650,6 +4572,7 @@
           <a:p>
             <a:fld id="{A4BAB868-1E00-44C6-B1AB-DFCC5F9865BA}" type="slidenum">
               <a:rPr lang="ja-JP" altLang="en-US" smtClean="0"/>
+              <a:t>12</a:t>
             </a:fld>
             <a:endParaRPr lang="en-US" altLang="ja-JP" dirty="0"/>
           </a:p>
@@ -4702,7 +4625,6 @@
               <a:rPr lang="en-CA" dirty="0"/>
               <a:t>6. Design: Agent Model</a:t>
             </a:r>
-            <a:endParaRPr lang="en-CA" dirty="0"/>
           </a:p>
         </p:txBody>
       </p:sp>
@@ -4754,6 +4676,7 @@
           <a:p>
             <a:fld id="{A4BAB868-1E00-44C6-B1AB-DFCC5F9865BA}" type="slidenum">
               <a:rPr lang="ja-JP" altLang="en-US" smtClean="0"/>
+              <a:t>13</a:t>
             </a:fld>
             <a:endParaRPr lang="en-US" altLang="ja-JP"/>
           </a:p>
@@ -4768,7 +4691,7 @@
           <p:nvPr/>
         </p:nvPicPr>
         <p:blipFill>
-          <a:blip r:embed="rId1"/>
+          <a:blip r:embed="rId2"/>
           <a:stretch>
             <a:fillRect/>
           </a:stretch>
@@ -4830,7 +4753,6 @@
               <a:rPr lang="en-CA" dirty="0"/>
               <a:t>7. Design: Service Model</a:t>
             </a:r>
-            <a:endParaRPr lang="en-CA" dirty="0"/>
           </a:p>
         </p:txBody>
       </p:sp>
@@ -4855,11 +4777,41 @@
                 <a:tableStyleId>{5C22544A-7EE6-4342-B048-85BDC9FD1C3A}</a:tableStyleId>
               </a:tblPr>
               <a:tblGrid>
-                <a:gridCol w="1484209"/>
-                <a:gridCol w="1365164"/>
-                <a:gridCol w="2204475"/>
-                <a:gridCol w="1888449"/>
-                <a:gridCol w="1861043"/>
+                <a:gridCol w="1484209">
+                  <a:extLst>
+                    <a:ext uri="{9D8B030D-6E8A-4147-A177-3AD203B41FA5}">
+                      <a16:colId xmlns:a16="http://schemas.microsoft.com/office/drawing/2014/main" val="20000"/>
+                    </a:ext>
+                  </a:extLst>
+                </a:gridCol>
+                <a:gridCol w="1365164">
+                  <a:extLst>
+                    <a:ext uri="{9D8B030D-6E8A-4147-A177-3AD203B41FA5}">
+                      <a16:colId xmlns:a16="http://schemas.microsoft.com/office/drawing/2014/main" val="20001"/>
+                    </a:ext>
+                  </a:extLst>
+                </a:gridCol>
+                <a:gridCol w="2204475">
+                  <a:extLst>
+                    <a:ext uri="{9D8B030D-6E8A-4147-A177-3AD203B41FA5}">
+                      <a16:colId xmlns:a16="http://schemas.microsoft.com/office/drawing/2014/main" val="20002"/>
+                    </a:ext>
+                  </a:extLst>
+                </a:gridCol>
+                <a:gridCol w="1888449">
+                  <a:extLst>
+                    <a:ext uri="{9D8B030D-6E8A-4147-A177-3AD203B41FA5}">
+                      <a16:colId xmlns:a16="http://schemas.microsoft.com/office/drawing/2014/main" val="20003"/>
+                    </a:ext>
+                  </a:extLst>
+                </a:gridCol>
+                <a:gridCol w="1861043">
+                  <a:extLst>
+                    <a:ext uri="{9D8B030D-6E8A-4147-A177-3AD203B41FA5}">
+                      <a16:colId xmlns:a16="http://schemas.microsoft.com/office/drawing/2014/main" val="20004"/>
+                    </a:ext>
+                  </a:extLst>
+                </a:gridCol>
               </a:tblGrid>
               <a:tr h="542910">
                 <a:tc>
@@ -5007,6 +4959,11 @@
                   </a:txBody>
                   <a:tcPr marL="68580" marR="68580" marT="0" marB="0"/>
                 </a:tc>
+                <a:extLst>
+                  <a:ext uri="{0D108BD9-81ED-4DB2-BD59-A6C34878D82A}">
+                    <a16:rowId xmlns:a16="http://schemas.microsoft.com/office/drawing/2014/main" val="10000"/>
+                  </a:ext>
+                </a:extLst>
               </a:tr>
               <a:tr h="942854">
                 <a:tc>
@@ -5154,6 +5111,11 @@
                   </a:txBody>
                   <a:tcPr marL="68580" marR="68580" marT="0" marB="0"/>
                 </a:tc>
+                <a:extLst>
+                  <a:ext uri="{0D108BD9-81ED-4DB2-BD59-A6C34878D82A}">
+                    <a16:rowId xmlns:a16="http://schemas.microsoft.com/office/drawing/2014/main" val="10001"/>
+                  </a:ext>
+                </a:extLst>
               </a:tr>
               <a:tr h="1063199">
                 <a:tc>
@@ -5301,6 +5263,11 @@
                   </a:txBody>
                   <a:tcPr marL="68580" marR="68580" marT="0" marB="0"/>
                 </a:tc>
+                <a:extLst>
+                  <a:ext uri="{0D108BD9-81ED-4DB2-BD59-A6C34878D82A}">
+                    <a16:rowId xmlns:a16="http://schemas.microsoft.com/office/drawing/2014/main" val="10002"/>
+                  </a:ext>
+                </a:extLst>
               </a:tr>
               <a:tr h="968189">
                 <a:tc>
@@ -5448,6 +5415,11 @@
                   </a:txBody>
                   <a:tcPr marL="68580" marR="68580" marT="0" marB="0"/>
                 </a:tc>
+                <a:extLst>
+                  <a:ext uri="{0D108BD9-81ED-4DB2-BD59-A6C34878D82A}">
+                    <a16:rowId xmlns:a16="http://schemas.microsoft.com/office/drawing/2014/main" val="10003"/>
+                  </a:ext>
+                </a:extLst>
               </a:tr>
             </a:tbl>
           </a:graphicData>
@@ -5501,6 +5473,7 @@
           <a:p>
             <a:fld id="{A4BAB868-1E00-44C6-B1AB-DFCC5F9865BA}" type="slidenum">
               <a:rPr lang="ja-JP" altLang="en-US" smtClean="0"/>
+              <a:t>14</a:t>
             </a:fld>
             <a:endParaRPr lang="en-US" altLang="ja-JP"/>
           </a:p>
@@ -5613,7 +5586,6 @@
               <a:rPr lang="en-CA" dirty="0"/>
               <a:t>8. Design: Acquaintance Model</a:t>
             </a:r>
-            <a:endParaRPr lang="en-CA" dirty="0"/>
           </a:p>
         </p:txBody>
       </p:sp>
@@ -5665,6 +5637,7 @@
           <a:p>
             <a:fld id="{A4BAB868-1E00-44C6-B1AB-DFCC5F9865BA}" type="slidenum">
               <a:rPr lang="ja-JP" altLang="en-US" smtClean="0"/>
+              <a:t>15</a:t>
             </a:fld>
             <a:endParaRPr lang="en-US" altLang="ja-JP"/>
           </a:p>
@@ -5679,7 +5652,7 @@
           <p:nvPr/>
         </p:nvPicPr>
         <p:blipFill>
-          <a:blip r:embed="rId1"/>
+          <a:blip r:embed="rId2"/>
           <a:stretch>
             <a:fillRect/>
           </a:stretch>
@@ -5695,6 +5668,594 @@
         </p:spPr>
       </p:pic>
     </p:spTree>
+  </p:cSld>
+  <p:clrMapOvr>
+    <a:masterClrMapping/>
+  </p:clrMapOvr>
+  <p:transition>
+    <p:dissolve/>
+  </p:transition>
+  <p:timing>
+    <p:tnLst>
+      <p:par>
+        <p:cTn id="1" dur="indefinite" restart="never" nodeType="tmRoot"/>
+      </p:par>
+    </p:tnLst>
+  </p:timing>
+</p:sld>
+</file>
+
+<file path=ppt/slides/slide16.xml><?xml version="1.0" encoding="utf-8"?>
+<p:sld xmlns:a="http://schemas.openxmlformats.org/drawingml/2006/main" xmlns:r="http://schemas.openxmlformats.org/officeDocument/2006/relationships" xmlns:p="http://schemas.openxmlformats.org/presentationml/2006/main">
+  <p:cSld>
+    <p:spTree>
+      <p:nvGrpSpPr>
+        <p:cNvPr id="1" name=""/>
+        <p:cNvGrpSpPr/>
+        <p:nvPr/>
+      </p:nvGrpSpPr>
+      <p:grpSpPr>
+        <a:xfrm>
+          <a:off x="0" y="0"/>
+          <a:ext cx="0" cy="0"/>
+          <a:chOff x="0" y="0"/>
+          <a:chExt cx="0" cy="0"/>
+        </a:xfrm>
+      </p:grpSpPr>
+      <p:sp>
+        <p:nvSpPr>
+          <p:cNvPr id="2" name="Title 1"/>
+          <p:cNvSpPr>
+            <a:spLocks noGrp="1"/>
+          </p:cNvSpPr>
+          <p:nvPr>
+            <p:ph type="title"/>
+          </p:nvPr>
+        </p:nvSpPr>
+        <p:spPr/>
+        <p:txBody>
+          <a:bodyPr/>
+          <a:lstStyle/>
+          <a:p>
+            <a:r>
+              <a:rPr lang="en-CA" dirty="0"/>
+              <a:t>9</a:t>
+            </a:r>
+            <a:r>
+              <a:rPr lang="en-CA" dirty="0" smtClean="0"/>
+              <a:t>. Use Cases : Clinic Agent</a:t>
+            </a:r>
+            <a:endParaRPr lang="en-CA" dirty="0"/>
+          </a:p>
+        </p:txBody>
+      </p:sp>
+      <p:sp>
+        <p:nvSpPr>
+          <p:cNvPr id="4" name="Date Placeholder 3"/>
+          <p:cNvSpPr>
+            <a:spLocks noGrp="1"/>
+          </p:cNvSpPr>
+          <p:nvPr>
+            <p:ph type="dt" sz="half" idx="10"/>
+          </p:nvPr>
+        </p:nvSpPr>
+        <p:spPr/>
+        <p:txBody>
+          <a:bodyPr/>
+          <a:lstStyle/>
+          <a:p>
+            <a:r>
+              <a:rPr lang="en-US" dirty="0" smtClean="0"/>
+              <a:t>SENG696 </a:t>
+            </a:r>
+            <a:r>
+              <a:rPr lang="en-US" dirty="0"/>
+              <a:t>(Fall </a:t>
+            </a:r>
+            <a:r>
+              <a:rPr lang="en-US" dirty="0" smtClean="0"/>
+              <a:t>2021)</a:t>
+            </a:r>
+            <a:endParaRPr lang="en-US" altLang="ja-JP" dirty="0"/>
+          </a:p>
+        </p:txBody>
+      </p:sp>
+      <p:sp>
+        <p:nvSpPr>
+          <p:cNvPr id="6" name="Slide Number Placeholder 5"/>
+          <p:cNvSpPr>
+            <a:spLocks noGrp="1"/>
+          </p:cNvSpPr>
+          <p:nvPr>
+            <p:ph type="sldNum" sz="quarter" idx="12"/>
+          </p:nvPr>
+        </p:nvSpPr>
+        <p:spPr/>
+        <p:txBody>
+          <a:bodyPr/>
+          <a:lstStyle/>
+          <a:p>
+            <a:fld id="{A4BAB868-1E00-44C6-B1AB-DFCC5F9865BA}" type="slidenum">
+              <a:rPr lang="ja-JP" altLang="en-US" smtClean="0"/>
+              <a:t>16</a:t>
+            </a:fld>
+            <a:endParaRPr lang="en-US" altLang="ja-JP"/>
+          </a:p>
+        </p:txBody>
+      </p:sp>
+      <p:pic>
+        <p:nvPicPr>
+          <p:cNvPr id="8" name="Picture 7"/>
+          <p:cNvPicPr>
+            <a:picLocks noChangeAspect="1"/>
+          </p:cNvPicPr>
+          <p:nvPr/>
+        </p:nvPicPr>
+        <p:blipFill>
+          <a:blip r:embed="rId2"/>
+          <a:stretch>
+            <a:fillRect/>
+          </a:stretch>
+        </p:blipFill>
+        <p:spPr>
+          <a:xfrm>
+            <a:off x="1552983" y="1584959"/>
+            <a:ext cx="8052572" cy="4241075"/>
+          </a:xfrm>
+          <a:prstGeom prst="rect">
+            <a:avLst/>
+          </a:prstGeom>
+        </p:spPr>
+      </p:pic>
+    </p:spTree>
+    <p:extLst>
+      <p:ext uri="{BB962C8B-B14F-4D97-AF65-F5344CB8AC3E}">
+        <p14:creationId xmlns:p14="http://schemas.microsoft.com/office/powerpoint/2010/main" val="2555605272"/>
+      </p:ext>
+    </p:extLst>
+  </p:cSld>
+  <p:clrMapOvr>
+    <a:masterClrMapping/>
+  </p:clrMapOvr>
+  <p:transition>
+    <p:dissolve/>
+  </p:transition>
+  <p:timing>
+    <p:tnLst>
+      <p:par>
+        <p:cTn id="1" dur="indefinite" restart="never" nodeType="tmRoot"/>
+      </p:par>
+    </p:tnLst>
+  </p:timing>
+</p:sld>
+</file>
+
+<file path=ppt/slides/slide17.xml><?xml version="1.0" encoding="utf-8"?>
+<p:sld xmlns:a="http://schemas.openxmlformats.org/drawingml/2006/main" xmlns:r="http://schemas.openxmlformats.org/officeDocument/2006/relationships" xmlns:p="http://schemas.openxmlformats.org/presentationml/2006/main">
+  <p:cSld>
+    <p:spTree>
+      <p:nvGrpSpPr>
+        <p:cNvPr id="1" name=""/>
+        <p:cNvGrpSpPr/>
+        <p:nvPr/>
+      </p:nvGrpSpPr>
+      <p:grpSpPr>
+        <a:xfrm>
+          <a:off x="0" y="0"/>
+          <a:ext cx="0" cy="0"/>
+          <a:chOff x="0" y="0"/>
+          <a:chExt cx="0" cy="0"/>
+        </a:xfrm>
+      </p:grpSpPr>
+      <p:sp>
+        <p:nvSpPr>
+          <p:cNvPr id="2" name="Title 1"/>
+          <p:cNvSpPr>
+            <a:spLocks noGrp="1"/>
+          </p:cNvSpPr>
+          <p:nvPr>
+            <p:ph type="title"/>
+          </p:nvPr>
+        </p:nvSpPr>
+        <p:spPr/>
+        <p:txBody>
+          <a:bodyPr/>
+          <a:lstStyle/>
+          <a:p>
+            <a:r>
+              <a:rPr lang="en-US" dirty="0" smtClean="0"/>
+              <a:t>Use Case Definition : Clinic Agent</a:t>
+            </a:r>
+            <a:endParaRPr lang="en-IN" dirty="0"/>
+          </a:p>
+        </p:txBody>
+      </p:sp>
+      <p:sp>
+        <p:nvSpPr>
+          <p:cNvPr id="4" name="Date Placeholder 3"/>
+          <p:cNvSpPr>
+            <a:spLocks noGrp="1"/>
+          </p:cNvSpPr>
+          <p:nvPr>
+            <p:ph type="dt" sz="half" idx="10"/>
+          </p:nvPr>
+        </p:nvSpPr>
+        <p:spPr/>
+        <p:txBody>
+          <a:bodyPr/>
+          <a:lstStyle/>
+          <a:p>
+            <a:r>
+              <a:rPr lang="en-US" smtClean="0"/>
+              <a:t>SENG697 (Fall 2007)</a:t>
+            </a:r>
+            <a:endParaRPr lang="en-US" altLang="ja-JP"/>
+          </a:p>
+        </p:txBody>
+      </p:sp>
+      <p:sp>
+        <p:nvSpPr>
+          <p:cNvPr id="5" name="Footer Placeholder 4"/>
+          <p:cNvSpPr>
+            <a:spLocks noGrp="1"/>
+          </p:cNvSpPr>
+          <p:nvPr>
+            <p:ph type="ftr" sz="quarter" idx="11"/>
+          </p:nvPr>
+        </p:nvSpPr>
+        <p:spPr/>
+        <p:txBody>
+          <a:bodyPr/>
+          <a:lstStyle/>
+          <a:p>
+            <a:r>
+              <a:rPr lang="ja-JP" altLang="en-US" smtClean="0"/>
+              <a:t>far@ucalgary.ca</a:t>
+            </a:r>
+            <a:endParaRPr lang="en-US" altLang="ja-JP"/>
+          </a:p>
+        </p:txBody>
+      </p:sp>
+      <p:sp>
+        <p:nvSpPr>
+          <p:cNvPr id="6" name="Slide Number Placeholder 5"/>
+          <p:cNvSpPr>
+            <a:spLocks noGrp="1"/>
+          </p:cNvSpPr>
+          <p:nvPr>
+            <p:ph type="sldNum" sz="quarter" idx="12"/>
+          </p:nvPr>
+        </p:nvSpPr>
+        <p:spPr/>
+        <p:txBody>
+          <a:bodyPr/>
+          <a:lstStyle/>
+          <a:p>
+            <a:fld id="{A4BAB868-1E00-44C6-B1AB-DFCC5F9865BA}" type="slidenum">
+              <a:rPr lang="ja-JP" altLang="en-US" smtClean="0"/>
+              <a:t>17</a:t>
+            </a:fld>
+            <a:endParaRPr lang="en-US" altLang="ja-JP"/>
+          </a:p>
+        </p:txBody>
+      </p:sp>
+      <p:pic>
+        <p:nvPicPr>
+          <p:cNvPr id="9" name="Picture 8"/>
+          <p:cNvPicPr>
+            <a:picLocks noChangeAspect="1"/>
+          </p:cNvPicPr>
+          <p:nvPr/>
+        </p:nvPicPr>
+        <p:blipFill>
+          <a:blip r:embed="rId2"/>
+          <a:stretch>
+            <a:fillRect/>
+          </a:stretch>
+        </p:blipFill>
+        <p:spPr>
+          <a:xfrm>
+            <a:off x="1673225" y="1504950"/>
+            <a:ext cx="9047026" cy="4599759"/>
+          </a:xfrm>
+          <a:prstGeom prst="rect">
+            <a:avLst/>
+          </a:prstGeom>
+        </p:spPr>
+      </p:pic>
+    </p:spTree>
+    <p:extLst>
+      <p:ext uri="{BB962C8B-B14F-4D97-AF65-F5344CB8AC3E}">
+        <p14:creationId xmlns:p14="http://schemas.microsoft.com/office/powerpoint/2010/main" val="2849661493"/>
+      </p:ext>
+    </p:extLst>
+  </p:cSld>
+  <p:clrMapOvr>
+    <a:masterClrMapping/>
+  </p:clrMapOvr>
+  <p:transition>
+    <p:dissolve/>
+  </p:transition>
+</p:sld>
+</file>
+
+<file path=ppt/slides/slide18.xml><?xml version="1.0" encoding="utf-8"?>
+<p:sld xmlns:a="http://schemas.openxmlformats.org/drawingml/2006/main" xmlns:r="http://schemas.openxmlformats.org/officeDocument/2006/relationships" xmlns:p="http://schemas.openxmlformats.org/presentationml/2006/main">
+  <p:cSld>
+    <p:spTree>
+      <p:nvGrpSpPr>
+        <p:cNvPr id="1" name=""/>
+        <p:cNvGrpSpPr/>
+        <p:nvPr/>
+      </p:nvGrpSpPr>
+      <p:grpSpPr>
+        <a:xfrm>
+          <a:off x="0" y="0"/>
+          <a:ext cx="0" cy="0"/>
+          <a:chOff x="0" y="0"/>
+          <a:chExt cx="0" cy="0"/>
+        </a:xfrm>
+      </p:grpSpPr>
+      <p:sp>
+        <p:nvSpPr>
+          <p:cNvPr id="2" name="Title 1"/>
+          <p:cNvSpPr>
+            <a:spLocks noGrp="1"/>
+          </p:cNvSpPr>
+          <p:nvPr>
+            <p:ph type="title"/>
+          </p:nvPr>
+        </p:nvSpPr>
+        <p:spPr/>
+        <p:txBody>
+          <a:bodyPr/>
+          <a:lstStyle/>
+          <a:p>
+            <a:r>
+              <a:rPr lang="en-US" dirty="0" smtClean="0"/>
+              <a:t>Use Case Definition : Clinic Agent</a:t>
+            </a:r>
+            <a:endParaRPr lang="en-IN" dirty="0"/>
+          </a:p>
+        </p:txBody>
+      </p:sp>
+      <p:sp>
+        <p:nvSpPr>
+          <p:cNvPr id="4" name="Date Placeholder 3"/>
+          <p:cNvSpPr>
+            <a:spLocks noGrp="1"/>
+          </p:cNvSpPr>
+          <p:nvPr>
+            <p:ph type="dt" sz="half" idx="10"/>
+          </p:nvPr>
+        </p:nvSpPr>
+        <p:spPr/>
+        <p:txBody>
+          <a:bodyPr/>
+          <a:lstStyle/>
+          <a:p>
+            <a:r>
+              <a:rPr lang="en-US" smtClean="0"/>
+              <a:t>SENG697 (Fall 2007)</a:t>
+            </a:r>
+            <a:endParaRPr lang="en-US" altLang="ja-JP"/>
+          </a:p>
+        </p:txBody>
+      </p:sp>
+      <p:sp>
+        <p:nvSpPr>
+          <p:cNvPr id="5" name="Footer Placeholder 4"/>
+          <p:cNvSpPr>
+            <a:spLocks noGrp="1"/>
+          </p:cNvSpPr>
+          <p:nvPr>
+            <p:ph type="ftr" sz="quarter" idx="11"/>
+          </p:nvPr>
+        </p:nvSpPr>
+        <p:spPr/>
+        <p:txBody>
+          <a:bodyPr/>
+          <a:lstStyle/>
+          <a:p>
+            <a:r>
+              <a:rPr lang="ja-JP" altLang="en-US" smtClean="0"/>
+              <a:t>far@ucalgary.ca</a:t>
+            </a:r>
+            <a:endParaRPr lang="en-US" altLang="ja-JP"/>
+          </a:p>
+        </p:txBody>
+      </p:sp>
+      <p:sp>
+        <p:nvSpPr>
+          <p:cNvPr id="6" name="Slide Number Placeholder 5"/>
+          <p:cNvSpPr>
+            <a:spLocks noGrp="1"/>
+          </p:cNvSpPr>
+          <p:nvPr>
+            <p:ph type="sldNum" sz="quarter" idx="12"/>
+          </p:nvPr>
+        </p:nvSpPr>
+        <p:spPr/>
+        <p:txBody>
+          <a:bodyPr/>
+          <a:lstStyle/>
+          <a:p>
+            <a:fld id="{A4BAB868-1E00-44C6-B1AB-DFCC5F9865BA}" type="slidenum">
+              <a:rPr lang="ja-JP" altLang="en-US" smtClean="0"/>
+              <a:t>18</a:t>
+            </a:fld>
+            <a:endParaRPr lang="en-US" altLang="ja-JP"/>
+          </a:p>
+        </p:txBody>
+      </p:sp>
+      <p:pic>
+        <p:nvPicPr>
+          <p:cNvPr id="3" name="Picture 2"/>
+          <p:cNvPicPr>
+            <a:picLocks noChangeAspect="1"/>
+          </p:cNvPicPr>
+          <p:nvPr/>
+        </p:nvPicPr>
+        <p:blipFill>
+          <a:blip r:embed="rId2"/>
+          <a:stretch>
+            <a:fillRect/>
+          </a:stretch>
+        </p:blipFill>
+        <p:spPr>
+          <a:xfrm>
+            <a:off x="1768848" y="1766887"/>
+            <a:ext cx="7482728" cy="3786748"/>
+          </a:xfrm>
+          <a:prstGeom prst="rect">
+            <a:avLst/>
+          </a:prstGeom>
+        </p:spPr>
+      </p:pic>
+    </p:spTree>
+    <p:extLst>
+      <p:ext uri="{BB962C8B-B14F-4D97-AF65-F5344CB8AC3E}">
+        <p14:creationId xmlns:p14="http://schemas.microsoft.com/office/powerpoint/2010/main" val="1216634805"/>
+      </p:ext>
+    </p:extLst>
+  </p:cSld>
+  <p:clrMapOvr>
+    <a:masterClrMapping/>
+  </p:clrMapOvr>
+  <p:transition>
+    <p:dissolve/>
+  </p:transition>
+</p:sld>
+</file>
+
+<file path=ppt/slides/slide19.xml><?xml version="1.0" encoding="utf-8"?>
+<p:sld xmlns:a="http://schemas.openxmlformats.org/drawingml/2006/main" xmlns:r="http://schemas.openxmlformats.org/officeDocument/2006/relationships" xmlns:p="http://schemas.openxmlformats.org/presentationml/2006/main">
+  <p:cSld>
+    <p:spTree>
+      <p:nvGrpSpPr>
+        <p:cNvPr id="1" name=""/>
+        <p:cNvGrpSpPr/>
+        <p:nvPr/>
+      </p:nvGrpSpPr>
+      <p:grpSpPr>
+        <a:xfrm>
+          <a:off x="0" y="0"/>
+          <a:ext cx="0" cy="0"/>
+          <a:chOff x="0" y="0"/>
+          <a:chExt cx="0" cy="0"/>
+        </a:xfrm>
+      </p:grpSpPr>
+      <p:sp>
+        <p:nvSpPr>
+          <p:cNvPr id="2" name="Title 1"/>
+          <p:cNvSpPr>
+            <a:spLocks noGrp="1"/>
+          </p:cNvSpPr>
+          <p:nvPr>
+            <p:ph type="title"/>
+          </p:nvPr>
+        </p:nvSpPr>
+        <p:spPr/>
+        <p:txBody>
+          <a:bodyPr/>
+          <a:lstStyle/>
+          <a:p>
+            <a:r>
+              <a:rPr lang="en-CA" dirty="0"/>
+              <a:t>9</a:t>
+            </a:r>
+            <a:r>
+              <a:rPr lang="en-CA" dirty="0" smtClean="0"/>
+              <a:t>. Use Cases : Appointment Agent</a:t>
+            </a:r>
+            <a:endParaRPr lang="en-CA" dirty="0"/>
+          </a:p>
+        </p:txBody>
+      </p:sp>
+      <p:sp>
+        <p:nvSpPr>
+          <p:cNvPr id="4" name="Date Placeholder 3"/>
+          <p:cNvSpPr>
+            <a:spLocks noGrp="1"/>
+          </p:cNvSpPr>
+          <p:nvPr>
+            <p:ph type="dt" sz="half" idx="10"/>
+          </p:nvPr>
+        </p:nvSpPr>
+        <p:spPr/>
+        <p:txBody>
+          <a:bodyPr/>
+          <a:lstStyle/>
+          <a:p>
+            <a:r>
+              <a:rPr lang="en-US" dirty="0" smtClean="0"/>
+              <a:t>SENG696 </a:t>
+            </a:r>
+            <a:r>
+              <a:rPr lang="en-US" dirty="0"/>
+              <a:t>(Fall </a:t>
+            </a:r>
+            <a:r>
+              <a:rPr lang="en-US" dirty="0" smtClean="0"/>
+              <a:t>2021)</a:t>
+            </a:r>
+            <a:endParaRPr lang="en-US" altLang="ja-JP" dirty="0"/>
+          </a:p>
+        </p:txBody>
+      </p:sp>
+      <p:sp>
+        <p:nvSpPr>
+          <p:cNvPr id="6" name="Slide Number Placeholder 5"/>
+          <p:cNvSpPr>
+            <a:spLocks noGrp="1"/>
+          </p:cNvSpPr>
+          <p:nvPr>
+            <p:ph type="sldNum" sz="quarter" idx="12"/>
+          </p:nvPr>
+        </p:nvSpPr>
+        <p:spPr/>
+        <p:txBody>
+          <a:bodyPr/>
+          <a:lstStyle/>
+          <a:p>
+            <a:fld id="{A4BAB868-1E00-44C6-B1AB-DFCC5F9865BA}" type="slidenum">
+              <a:rPr lang="ja-JP" altLang="en-US" smtClean="0"/>
+              <a:t>19</a:t>
+            </a:fld>
+            <a:endParaRPr lang="en-US" altLang="ja-JP"/>
+          </a:p>
+        </p:txBody>
+      </p:sp>
+      <p:pic>
+        <p:nvPicPr>
+          <p:cNvPr id="3" name="Picture 2"/>
+          <p:cNvPicPr>
+            <a:picLocks noChangeAspect="1"/>
+          </p:cNvPicPr>
+          <p:nvPr/>
+        </p:nvPicPr>
+        <p:blipFill>
+          <a:blip r:embed="rId2"/>
+          <a:stretch>
+            <a:fillRect/>
+          </a:stretch>
+        </p:blipFill>
+        <p:spPr>
+          <a:xfrm>
+            <a:off x="1377950" y="1515290"/>
+            <a:ext cx="8934450" cy="4368437"/>
+          </a:xfrm>
+          <a:prstGeom prst="rect">
+            <a:avLst/>
+          </a:prstGeom>
+        </p:spPr>
+      </p:pic>
+    </p:spTree>
+    <p:extLst>
+      <p:ext uri="{BB962C8B-B14F-4D97-AF65-F5344CB8AC3E}">
+        <p14:creationId xmlns:p14="http://schemas.microsoft.com/office/powerpoint/2010/main" val="3101799758"/>
+      </p:ext>
+    </p:extLst>
   </p:cSld>
   <p:clrMapOvr>
     <a:masterClrMapping/>
@@ -5806,6 +6367,7 @@
                 <a:latin typeface="Tahoma" panose="020B0604030504040204" pitchFamily="34" charset="0"/>
                 <a:ea typeface="MS PGothic" pitchFamily="50" charset="-128"/>
               </a:rPr>
+              <a:t>2</a:t>
             </a:fld>
             <a:endParaRPr lang="en-US" altLang="ja-JP" dirty="0">
               <a:solidFill>
@@ -5836,7 +6398,6 @@
               <a:rPr lang="en-CA" dirty="0"/>
               <a:t>1. Business Case (cont’d)</a:t>
             </a:r>
-            <a:endParaRPr lang="en-CA" dirty="0"/>
           </a:p>
         </p:txBody>
       </p:sp>
@@ -5874,10 +6435,6 @@
               </a:rPr>
               <a:t>Pet-owners are dependent on calls from the veterinary clinic to schedule timely appointments that match their routine and visit in person to get their pets examined. There is no provision to avail these services from home.</a:t>
             </a:r>
-            <a:endParaRPr lang="en-US" sz="2400" dirty="0">
-              <a:latin typeface="Times New Roman" panose="02020503050405090304" pitchFamily="18" charset="0"/>
-              <a:cs typeface="Times New Roman" panose="02020503050405090304" pitchFamily="18" charset="0"/>
-            </a:endParaRPr>
           </a:p>
           <a:p>
             <a:pPr marL="285750" indent="-285750">
@@ -5894,10 +6451,6 @@
               </a:rPr>
               <a:t>Even after scheduling an appointment, owners might forget to update their schedule and visit the clinic on time. This could play a big role in ensuring timely treatment for the animals.</a:t>
             </a:r>
-            <a:endParaRPr lang="en-US" sz="2400" dirty="0">
-              <a:latin typeface="Times New Roman" panose="02020503050405090304" pitchFamily="18" charset="0"/>
-              <a:cs typeface="Times New Roman" panose="02020503050405090304" pitchFamily="18" charset="0"/>
-            </a:endParaRPr>
           </a:p>
           <a:p>
             <a:pPr marL="285750" indent="-285750">
@@ -5914,10 +6467,6 @@
               </a:rPr>
               <a:t>Vets currently have to spend a lot of time submitting reports for the animals they examine. Automating the process with a built-in template will maximize the time-utilization and efficiency of the clinic.</a:t>
             </a:r>
-            <a:endParaRPr lang="en-US" sz="2400" dirty="0">
-              <a:latin typeface="Times New Roman" panose="02020503050405090304" pitchFamily="18" charset="0"/>
-              <a:cs typeface="Times New Roman" panose="02020503050405090304" pitchFamily="18" charset="0"/>
-            </a:endParaRPr>
           </a:p>
           <a:p>
             <a:pPr marL="285750" indent="-285750">
@@ -5952,6 +6501,422 @@
         </p:txBody>
       </p:sp>
     </p:spTree>
+  </p:cSld>
+  <p:clrMapOvr>
+    <a:masterClrMapping/>
+  </p:clrMapOvr>
+  <p:transition>
+    <p:dissolve/>
+  </p:transition>
+</p:sld>
+</file>
+
+<file path=ppt/slides/slide20.xml><?xml version="1.0" encoding="utf-8"?>
+<p:sld xmlns:a="http://schemas.openxmlformats.org/drawingml/2006/main" xmlns:r="http://schemas.openxmlformats.org/officeDocument/2006/relationships" xmlns:p="http://schemas.openxmlformats.org/presentationml/2006/main">
+  <p:cSld>
+    <p:spTree>
+      <p:nvGrpSpPr>
+        <p:cNvPr id="1" name=""/>
+        <p:cNvGrpSpPr/>
+        <p:nvPr/>
+      </p:nvGrpSpPr>
+      <p:grpSpPr>
+        <a:xfrm>
+          <a:off x="0" y="0"/>
+          <a:ext cx="0" cy="0"/>
+          <a:chOff x="0" y="0"/>
+          <a:chExt cx="0" cy="0"/>
+        </a:xfrm>
+      </p:grpSpPr>
+      <p:sp>
+        <p:nvSpPr>
+          <p:cNvPr id="2" name="Title 1"/>
+          <p:cNvSpPr>
+            <a:spLocks noGrp="1"/>
+          </p:cNvSpPr>
+          <p:nvPr>
+            <p:ph type="title"/>
+          </p:nvPr>
+        </p:nvSpPr>
+        <p:spPr/>
+        <p:txBody>
+          <a:bodyPr/>
+          <a:lstStyle/>
+          <a:p>
+            <a:r>
+              <a:rPr lang="en-CA" dirty="0" smtClean="0"/>
+              <a:t>10. Use Cases : Video Link Agent</a:t>
+            </a:r>
+            <a:endParaRPr lang="en-CA" dirty="0"/>
+          </a:p>
+        </p:txBody>
+      </p:sp>
+      <p:sp>
+        <p:nvSpPr>
+          <p:cNvPr id="4" name="Date Placeholder 3"/>
+          <p:cNvSpPr>
+            <a:spLocks noGrp="1"/>
+          </p:cNvSpPr>
+          <p:nvPr>
+            <p:ph type="dt" sz="half" idx="10"/>
+          </p:nvPr>
+        </p:nvSpPr>
+        <p:spPr/>
+        <p:txBody>
+          <a:bodyPr/>
+          <a:lstStyle/>
+          <a:p>
+            <a:r>
+              <a:rPr lang="en-US" dirty="0" smtClean="0"/>
+              <a:t>SENG696 </a:t>
+            </a:r>
+            <a:r>
+              <a:rPr lang="en-US" dirty="0"/>
+              <a:t>(Fall </a:t>
+            </a:r>
+            <a:r>
+              <a:rPr lang="en-US" dirty="0" smtClean="0"/>
+              <a:t>2021)</a:t>
+            </a:r>
+            <a:endParaRPr lang="en-US" altLang="ja-JP" dirty="0"/>
+          </a:p>
+        </p:txBody>
+      </p:sp>
+      <p:sp>
+        <p:nvSpPr>
+          <p:cNvPr id="6" name="Slide Number Placeholder 5"/>
+          <p:cNvSpPr>
+            <a:spLocks noGrp="1"/>
+          </p:cNvSpPr>
+          <p:nvPr>
+            <p:ph type="sldNum" sz="quarter" idx="12"/>
+          </p:nvPr>
+        </p:nvSpPr>
+        <p:spPr/>
+        <p:txBody>
+          <a:bodyPr/>
+          <a:lstStyle/>
+          <a:p>
+            <a:fld id="{A4BAB868-1E00-44C6-B1AB-DFCC5F9865BA}" type="slidenum">
+              <a:rPr lang="ja-JP" altLang="en-US" smtClean="0"/>
+              <a:t>20</a:t>
+            </a:fld>
+            <a:endParaRPr lang="en-US" altLang="ja-JP"/>
+          </a:p>
+        </p:txBody>
+      </p:sp>
+      <p:pic>
+        <p:nvPicPr>
+          <p:cNvPr id="7" name="Picture 6"/>
+          <p:cNvPicPr>
+            <a:picLocks noChangeAspect="1"/>
+          </p:cNvPicPr>
+          <p:nvPr/>
+        </p:nvPicPr>
+        <p:blipFill>
+          <a:blip r:embed="rId2"/>
+          <a:stretch>
+            <a:fillRect/>
+          </a:stretch>
+        </p:blipFill>
+        <p:spPr>
+          <a:xfrm>
+            <a:off x="1613943" y="1890984"/>
+            <a:ext cx="8772525" cy="2257425"/>
+          </a:xfrm>
+          <a:prstGeom prst="rect">
+            <a:avLst/>
+          </a:prstGeom>
+        </p:spPr>
+      </p:pic>
+    </p:spTree>
+    <p:extLst>
+      <p:ext uri="{BB962C8B-B14F-4D97-AF65-F5344CB8AC3E}">
+        <p14:creationId xmlns:p14="http://schemas.microsoft.com/office/powerpoint/2010/main" val="1653168954"/>
+      </p:ext>
+    </p:extLst>
+  </p:cSld>
+  <p:clrMapOvr>
+    <a:masterClrMapping/>
+  </p:clrMapOvr>
+  <p:transition>
+    <p:dissolve/>
+  </p:transition>
+  <p:timing>
+    <p:tnLst>
+      <p:par>
+        <p:cTn id="1" dur="indefinite" restart="never" nodeType="tmRoot"/>
+      </p:par>
+    </p:tnLst>
+  </p:timing>
+</p:sld>
+</file>
+
+<file path=ppt/slides/slide21.xml><?xml version="1.0" encoding="utf-8"?>
+<p:sld xmlns:a="http://schemas.openxmlformats.org/drawingml/2006/main" xmlns:r="http://schemas.openxmlformats.org/officeDocument/2006/relationships" xmlns:p="http://schemas.openxmlformats.org/presentationml/2006/main">
+  <p:cSld>
+    <p:spTree>
+      <p:nvGrpSpPr>
+        <p:cNvPr id="1" name=""/>
+        <p:cNvGrpSpPr/>
+        <p:nvPr/>
+      </p:nvGrpSpPr>
+      <p:grpSpPr>
+        <a:xfrm>
+          <a:off x="0" y="0"/>
+          <a:ext cx="0" cy="0"/>
+          <a:chOff x="0" y="0"/>
+          <a:chExt cx="0" cy="0"/>
+        </a:xfrm>
+      </p:grpSpPr>
+      <p:sp>
+        <p:nvSpPr>
+          <p:cNvPr id="2" name="Title 1"/>
+          <p:cNvSpPr>
+            <a:spLocks noGrp="1"/>
+          </p:cNvSpPr>
+          <p:nvPr>
+            <p:ph type="title"/>
+          </p:nvPr>
+        </p:nvSpPr>
+        <p:spPr/>
+        <p:txBody>
+          <a:bodyPr/>
+          <a:lstStyle/>
+          <a:p>
+            <a:r>
+              <a:rPr lang="en-CA" dirty="0" smtClean="0"/>
+              <a:t>11. Use Cases : PDF(Template) Agent</a:t>
+            </a:r>
+            <a:endParaRPr lang="en-CA" dirty="0"/>
+          </a:p>
+        </p:txBody>
+      </p:sp>
+      <p:sp>
+        <p:nvSpPr>
+          <p:cNvPr id="4" name="Date Placeholder 3"/>
+          <p:cNvSpPr>
+            <a:spLocks noGrp="1"/>
+          </p:cNvSpPr>
+          <p:nvPr>
+            <p:ph type="dt" sz="half" idx="10"/>
+          </p:nvPr>
+        </p:nvSpPr>
+        <p:spPr/>
+        <p:txBody>
+          <a:bodyPr/>
+          <a:lstStyle/>
+          <a:p>
+            <a:r>
+              <a:rPr lang="en-US" dirty="0" smtClean="0"/>
+              <a:t>SENG696 </a:t>
+            </a:r>
+            <a:r>
+              <a:rPr lang="en-US" dirty="0"/>
+              <a:t>(Fall </a:t>
+            </a:r>
+            <a:r>
+              <a:rPr lang="en-US" dirty="0" smtClean="0"/>
+              <a:t>2021)</a:t>
+            </a:r>
+            <a:endParaRPr lang="en-US" altLang="ja-JP" dirty="0"/>
+          </a:p>
+        </p:txBody>
+      </p:sp>
+      <p:sp>
+        <p:nvSpPr>
+          <p:cNvPr id="6" name="Slide Number Placeholder 5"/>
+          <p:cNvSpPr>
+            <a:spLocks noGrp="1"/>
+          </p:cNvSpPr>
+          <p:nvPr>
+            <p:ph type="sldNum" sz="quarter" idx="12"/>
+          </p:nvPr>
+        </p:nvSpPr>
+        <p:spPr/>
+        <p:txBody>
+          <a:bodyPr/>
+          <a:lstStyle/>
+          <a:p>
+            <a:fld id="{A4BAB868-1E00-44C6-B1AB-DFCC5F9865BA}" type="slidenum">
+              <a:rPr lang="ja-JP" altLang="en-US" smtClean="0"/>
+              <a:t>21</a:t>
+            </a:fld>
+            <a:endParaRPr lang="en-US" altLang="ja-JP"/>
+          </a:p>
+        </p:txBody>
+      </p:sp>
+      <p:pic>
+        <p:nvPicPr>
+          <p:cNvPr id="3" name="Picture 2"/>
+          <p:cNvPicPr>
+            <a:picLocks noChangeAspect="1"/>
+          </p:cNvPicPr>
+          <p:nvPr/>
+        </p:nvPicPr>
+        <p:blipFill>
+          <a:blip r:embed="rId2"/>
+          <a:stretch>
+            <a:fillRect/>
+          </a:stretch>
+        </p:blipFill>
+        <p:spPr>
+          <a:xfrm>
+            <a:off x="2145575" y="1788251"/>
+            <a:ext cx="7239000" cy="3333750"/>
+          </a:xfrm>
+          <a:prstGeom prst="rect">
+            <a:avLst/>
+          </a:prstGeom>
+        </p:spPr>
+      </p:pic>
+    </p:spTree>
+    <p:extLst>
+      <p:ext uri="{BB962C8B-B14F-4D97-AF65-F5344CB8AC3E}">
+        <p14:creationId xmlns:p14="http://schemas.microsoft.com/office/powerpoint/2010/main" val="1407538385"/>
+      </p:ext>
+    </p:extLst>
+  </p:cSld>
+  <p:clrMapOvr>
+    <a:masterClrMapping/>
+  </p:clrMapOvr>
+  <p:transition>
+    <p:dissolve/>
+  </p:transition>
+  <p:timing>
+    <p:tnLst>
+      <p:par>
+        <p:cTn id="1" dur="indefinite" restart="never" nodeType="tmRoot"/>
+      </p:par>
+    </p:tnLst>
+  </p:timing>
+</p:sld>
+</file>
+
+<file path=ppt/slides/slide22.xml><?xml version="1.0" encoding="utf-8"?>
+<p:sld xmlns:a="http://schemas.openxmlformats.org/drawingml/2006/main" xmlns:r="http://schemas.openxmlformats.org/officeDocument/2006/relationships" xmlns:p="http://schemas.openxmlformats.org/presentationml/2006/main">
+  <p:cSld>
+    <p:spTree>
+      <p:nvGrpSpPr>
+        <p:cNvPr id="1" name=""/>
+        <p:cNvGrpSpPr/>
+        <p:nvPr/>
+      </p:nvGrpSpPr>
+      <p:grpSpPr>
+        <a:xfrm>
+          <a:off x="0" y="0"/>
+          <a:ext cx="0" cy="0"/>
+          <a:chOff x="0" y="0"/>
+          <a:chExt cx="0" cy="0"/>
+        </a:xfrm>
+      </p:grpSpPr>
+      <p:sp>
+        <p:nvSpPr>
+          <p:cNvPr id="2" name="Title 1"/>
+          <p:cNvSpPr>
+            <a:spLocks noGrp="1"/>
+          </p:cNvSpPr>
+          <p:nvPr>
+            <p:ph type="title"/>
+          </p:nvPr>
+        </p:nvSpPr>
+        <p:spPr/>
+        <p:txBody>
+          <a:bodyPr/>
+          <a:lstStyle/>
+          <a:p>
+            <a:r>
+              <a:rPr lang="en-CA" dirty="0" smtClean="0"/>
+              <a:t>11. Use Cases : Notification Agent</a:t>
+            </a:r>
+            <a:endParaRPr lang="en-CA" dirty="0"/>
+          </a:p>
+        </p:txBody>
+      </p:sp>
+      <p:sp>
+        <p:nvSpPr>
+          <p:cNvPr id="4" name="Date Placeholder 3"/>
+          <p:cNvSpPr>
+            <a:spLocks noGrp="1"/>
+          </p:cNvSpPr>
+          <p:nvPr>
+            <p:ph type="dt" sz="half" idx="10"/>
+          </p:nvPr>
+        </p:nvSpPr>
+        <p:spPr/>
+        <p:txBody>
+          <a:bodyPr/>
+          <a:lstStyle/>
+          <a:p>
+            <a:r>
+              <a:rPr lang="en-US" dirty="0" smtClean="0"/>
+              <a:t>SENG696 </a:t>
+            </a:r>
+            <a:r>
+              <a:rPr lang="en-US" dirty="0"/>
+              <a:t>(Fall </a:t>
+            </a:r>
+            <a:r>
+              <a:rPr lang="en-US" dirty="0" smtClean="0"/>
+              <a:t>2021)</a:t>
+            </a:r>
+            <a:endParaRPr lang="en-US" altLang="ja-JP" dirty="0"/>
+          </a:p>
+        </p:txBody>
+      </p:sp>
+      <p:sp>
+        <p:nvSpPr>
+          <p:cNvPr id="6" name="Slide Number Placeholder 5"/>
+          <p:cNvSpPr>
+            <a:spLocks noGrp="1"/>
+          </p:cNvSpPr>
+          <p:nvPr>
+            <p:ph type="sldNum" sz="quarter" idx="12"/>
+          </p:nvPr>
+        </p:nvSpPr>
+        <p:spPr/>
+        <p:txBody>
+          <a:bodyPr/>
+          <a:lstStyle/>
+          <a:p>
+            <a:fld id="{A4BAB868-1E00-44C6-B1AB-DFCC5F9865BA}" type="slidenum">
+              <a:rPr lang="ja-JP" altLang="en-US" smtClean="0"/>
+              <a:t>22</a:t>
+            </a:fld>
+            <a:endParaRPr lang="en-US" altLang="ja-JP"/>
+          </a:p>
+        </p:txBody>
+      </p:sp>
+      <p:pic>
+        <p:nvPicPr>
+          <p:cNvPr id="5" name="Picture 4"/>
+          <p:cNvPicPr>
+            <a:picLocks noChangeAspect="1"/>
+          </p:cNvPicPr>
+          <p:nvPr/>
+        </p:nvPicPr>
+        <p:blipFill>
+          <a:blip r:embed="rId2"/>
+          <a:stretch>
+            <a:fillRect/>
+          </a:stretch>
+        </p:blipFill>
+        <p:spPr>
+          <a:xfrm>
+            <a:off x="1490662" y="1637208"/>
+            <a:ext cx="8601075" cy="4293327"/>
+          </a:xfrm>
+          <a:prstGeom prst="rect">
+            <a:avLst/>
+          </a:prstGeom>
+        </p:spPr>
+      </p:pic>
+    </p:spTree>
+    <p:extLst>
+      <p:ext uri="{BB962C8B-B14F-4D97-AF65-F5344CB8AC3E}">
+        <p14:creationId xmlns:p14="http://schemas.microsoft.com/office/powerpoint/2010/main" val="340488111"/>
+      </p:ext>
+    </p:extLst>
   </p:cSld>
   <p:clrMapOvr>
     <a:masterClrMapping/>
@@ -6063,6 +7028,7 @@
                 <a:latin typeface="Tahoma" panose="020B0604030504040204" pitchFamily="34" charset="0"/>
                 <a:ea typeface="MS PGothic" pitchFamily="50" charset="-128"/>
               </a:rPr>
+              <a:t>3</a:t>
             </a:fld>
             <a:endParaRPr lang="en-US" altLang="ja-JP" dirty="0">
               <a:solidFill>
@@ -6093,7 +7059,6 @@
               <a:rPr lang="en-CA"/>
               <a:t>2. System Description</a:t>
             </a:r>
-            <a:endParaRPr lang="en-CA"/>
           </a:p>
         </p:txBody>
       </p:sp>
@@ -6140,7 +7105,6 @@
               <a:rPr lang="en-CA" sz="2600" dirty="0"/>
               <a:t> is a multi-agent system designed to render multiple functionalities to simplify the appointment booking process to the pet-owner(user) based on the owner’s preferences. </a:t>
             </a:r>
-            <a:endParaRPr lang="en-CA" sz="2600" dirty="0"/>
           </a:p>
           <a:p>
             <a:pPr>
@@ -6154,7 +7118,6 @@
               <a:rPr lang="en-CA" sz="2600" dirty="0"/>
               <a:t>The clinic package is composed of a Video Interaction system, a Reminder generator, and a utility to generate medical reports.</a:t>
             </a:r>
-            <a:endParaRPr lang="en-CA" sz="2600" dirty="0"/>
           </a:p>
           <a:p>
             <a:pPr>
@@ -6180,7 +7143,6 @@
               <a:rPr lang="en-CA" sz="2600" dirty="0"/>
               <a:t>application deals with a doctor’s multiple available schedules to find the optimum appointment window for the pet-owner, taking into consideration the related fees and severity of the symptoms. </a:t>
             </a:r>
-            <a:endParaRPr lang="en-CA" sz="2600" dirty="0"/>
           </a:p>
           <a:p>
             <a:pPr>
@@ -6194,7 +7156,6 @@
               <a:rPr lang="en-CA" sz="2600" dirty="0"/>
               <a:t>The application has to schedule the appointment and send regular reminders for the appointment dates to the pet-owner. It also generates a medical report based upon the doctor’s feedback and stores it for future references.</a:t>
             </a:r>
-            <a:endParaRPr lang="en-CA" sz="2600" dirty="0"/>
           </a:p>
         </p:txBody>
       </p:sp>
@@ -6245,7 +7206,6 @@
               <a:rPr lang="en-CA" dirty="0"/>
               <a:t>System Description (cont’d)</a:t>
             </a:r>
-            <a:endParaRPr lang="en-CA" dirty="0"/>
           </a:p>
         </p:txBody>
       </p:sp>
@@ -6260,7 +7220,7 @@
           </p:nvPr>
         </p:nvPicPr>
         <p:blipFill>
-          <a:blip r:embed="rId1"/>
+          <a:blip r:embed="rId2"/>
           <a:stretch>
             <a:fillRect/>
           </a:stretch>
@@ -6320,6 +7280,7 @@
           <a:p>
             <a:fld id="{A4BAB868-1E00-44C6-B1AB-DFCC5F9865BA}" type="slidenum">
               <a:rPr lang="ja-JP" altLang="en-US" smtClean="0"/>
+              <a:t>4</a:t>
             </a:fld>
             <a:endParaRPr lang="en-US" altLang="ja-JP"/>
           </a:p>
@@ -6372,7 +7333,6 @@
               <a:rPr lang="en-CA" dirty="0"/>
               <a:t>3. Assumptions</a:t>
             </a:r>
-            <a:endParaRPr lang="en-CA" dirty="0"/>
           </a:p>
         </p:txBody>
       </p:sp>
@@ -6493,6 +7453,7 @@
           <a:p>
             <a:fld id="{A4BAB868-1E00-44C6-B1AB-DFCC5F9865BA}" type="slidenum">
               <a:rPr lang="ja-JP" altLang="en-US" smtClean="0"/>
+              <a:t>5</a:t>
             </a:fld>
             <a:endParaRPr lang="en-US" altLang="ja-JP"/>
           </a:p>
@@ -6545,7 +7506,6 @@
               <a:rPr lang="en-CA" dirty="0"/>
               <a:t>4. Requirements</a:t>
             </a:r>
-            <a:endParaRPr lang="en-CA" dirty="0"/>
           </a:p>
         </p:txBody>
       </p:sp>
@@ -6581,12 +7541,6 @@
               </a:rPr>
               <a:t>The Video Enabled e-Vet System shall provide a web interface allowing the clients to login and register themselves.</a:t>
             </a:r>
-            <a:endParaRPr lang="en-CA" sz="2400" dirty="0">
-              <a:effectLst/>
-              <a:latin typeface="Calibri" panose="020F0502020204030204" pitchFamily="34" charset="0"/>
-              <a:ea typeface="Calibri" panose="020F0502020204030204" pitchFamily="34" charset="0"/>
-              <a:cs typeface="Times New Roman" panose="02020503050405090304" pitchFamily="18" charset="0"/>
-            </a:endParaRPr>
           </a:p>
           <a:p>
             <a:pPr>
@@ -6606,12 +7560,6 @@
               </a:rPr>
               <a:t>It shall allow patients to schedule their appointments.</a:t>
             </a:r>
-            <a:endParaRPr lang="en-CA" sz="2400" dirty="0">
-              <a:effectLst/>
-              <a:latin typeface="Calibri" panose="020F0502020204030204" pitchFamily="34" charset="0"/>
-              <a:ea typeface="Calibri" panose="020F0502020204030204" pitchFamily="34" charset="0"/>
-              <a:cs typeface="Times New Roman" panose="02020503050405090304" pitchFamily="18" charset="0"/>
-            </a:endParaRPr>
           </a:p>
           <a:p>
             <a:pPr>
@@ -6631,12 +7579,6 @@
               </a:rPr>
               <a:t>It shall record patient’s profile in a database and display it based on their name/id.</a:t>
             </a:r>
-            <a:endParaRPr lang="en-CA" sz="2400" dirty="0">
-              <a:effectLst/>
-              <a:latin typeface="Calibri" panose="020F0502020204030204" pitchFamily="34" charset="0"/>
-              <a:ea typeface="Calibri" panose="020F0502020204030204" pitchFamily="34" charset="0"/>
-              <a:cs typeface="Times New Roman" panose="02020503050405090304" pitchFamily="18" charset="0"/>
-            </a:endParaRPr>
           </a:p>
           <a:p>
             <a:pPr>
@@ -6656,12 +7598,6 @@
               </a:rPr>
               <a:t>It shall remind patients of their appointments.</a:t>
             </a:r>
-            <a:endParaRPr lang="en-CA" sz="2400" dirty="0">
-              <a:effectLst/>
-              <a:latin typeface="Calibri" panose="020F0502020204030204" pitchFamily="34" charset="0"/>
-              <a:ea typeface="Calibri" panose="020F0502020204030204" pitchFamily="34" charset="0"/>
-              <a:cs typeface="Times New Roman" panose="02020503050405090304" pitchFamily="18" charset="0"/>
-            </a:endParaRPr>
           </a:p>
           <a:p>
             <a:pPr>
@@ -6681,12 +7617,6 @@
               </a:rPr>
               <a:t>It shall send an appointment confirmation to the patient, including an invitation to the scheduled video enabled meeting</a:t>
             </a:r>
-            <a:endParaRPr lang="en-CA" sz="2400" dirty="0">
-              <a:effectLst/>
-              <a:latin typeface="Calibri" panose="020F0502020204030204" pitchFamily="34" charset="0"/>
-              <a:ea typeface="Calibri" panose="020F0502020204030204" pitchFamily="34" charset="0"/>
-              <a:cs typeface="Times New Roman" panose="02020503050405090304" pitchFamily="18" charset="0"/>
-            </a:endParaRPr>
           </a:p>
           <a:p>
             <a:pPr>
@@ -6706,12 +7636,6 @@
               </a:rPr>
               <a:t>It shall provide multiple printable letter templates to doctors</a:t>
             </a:r>
-            <a:endParaRPr lang="en-CA" sz="2400" dirty="0">
-              <a:effectLst/>
-              <a:latin typeface="Calibri" panose="020F0502020204030204" pitchFamily="34" charset="0"/>
-              <a:ea typeface="Calibri" panose="020F0502020204030204" pitchFamily="34" charset="0"/>
-              <a:cs typeface="Times New Roman" panose="02020503050405090304" pitchFamily="18" charset="0"/>
-            </a:endParaRPr>
           </a:p>
           <a:p>
             <a:endParaRPr lang="en-CA" dirty="0"/>
@@ -6766,6 +7690,7 @@
           <a:p>
             <a:fld id="{A4BAB868-1E00-44C6-B1AB-DFCC5F9865BA}" type="slidenum">
               <a:rPr lang="ja-JP" altLang="en-US" smtClean="0"/>
+              <a:t>6</a:t>
             </a:fld>
             <a:endParaRPr lang="en-US" altLang="ja-JP"/>
           </a:p>
@@ -6854,12 +7779,6 @@
               </a:rPr>
               <a:t>The e-vet system can send a recommendation letter to specialists on behalf of doctors.</a:t>
             </a:r>
-            <a:endParaRPr lang="en-CA" sz="1600" dirty="0">
-              <a:effectLst/>
-              <a:latin typeface="Calibri" panose="020F0502020204030204" pitchFamily="34" charset="0"/>
-              <a:ea typeface="Calibri" panose="020F0502020204030204" pitchFamily="34" charset="0"/>
-              <a:cs typeface="Times New Roman" panose="02020503050405090304" pitchFamily="18" charset="0"/>
-            </a:endParaRPr>
           </a:p>
           <a:p>
             <a:pPr>
@@ -6887,12 +7806,6 @@
               </a:rPr>
               <a:t> should offer multiple payment options.</a:t>
             </a:r>
-            <a:endParaRPr lang="en-CA" sz="1600" dirty="0">
-              <a:effectLst/>
-              <a:latin typeface="Calibri" panose="020F0502020204030204" pitchFamily="34" charset="0"/>
-              <a:ea typeface="Calibri" panose="020F0502020204030204" pitchFamily="34" charset="0"/>
-              <a:cs typeface="Times New Roman" panose="02020503050405090304" pitchFamily="18" charset="0"/>
-            </a:endParaRPr>
           </a:p>
           <a:p>
             <a:pPr>
@@ -6920,12 +7833,6 @@
               </a:rPr>
               <a:t> should have a mechanism to reply to instant scientific questions to physicians (similar to an encyclopedia).</a:t>
             </a:r>
-            <a:endParaRPr lang="en-CA" sz="1600" dirty="0">
-              <a:effectLst/>
-              <a:latin typeface="Calibri" panose="020F0502020204030204" pitchFamily="34" charset="0"/>
-              <a:ea typeface="Calibri" panose="020F0502020204030204" pitchFamily="34" charset="0"/>
-              <a:cs typeface="Times New Roman" panose="02020503050405090304" pitchFamily="18" charset="0"/>
-            </a:endParaRPr>
           </a:p>
           <a:p>
             <a:pPr>
@@ -6953,12 +7860,6 @@
               </a:rPr>
               <a:t> can search in the ontology for relevant documents. </a:t>
             </a:r>
-            <a:endParaRPr lang="en-CA" sz="1600" dirty="0">
-              <a:effectLst/>
-              <a:latin typeface="Calibri" panose="020F0502020204030204" pitchFamily="34" charset="0"/>
-              <a:ea typeface="Calibri" panose="020F0502020204030204" pitchFamily="34" charset="0"/>
-              <a:cs typeface="Times New Roman" panose="02020503050405090304" pitchFamily="18" charset="0"/>
-            </a:endParaRPr>
           </a:p>
           <a:p>
             <a:pPr>
@@ -6978,12 +7879,6 @@
               </a:rPr>
               <a:t>Doctors can also register themselves on the portal, giving the client freedom to choose their doctor(s).</a:t>
             </a:r>
-            <a:endParaRPr lang="en-CA" sz="1600" dirty="0">
-              <a:effectLst/>
-              <a:latin typeface="Calibri" panose="020F0502020204030204" pitchFamily="34" charset="0"/>
-              <a:ea typeface="Calibri" panose="020F0502020204030204" pitchFamily="34" charset="0"/>
-              <a:cs typeface="Times New Roman" panose="02020503050405090304" pitchFamily="18" charset="0"/>
-            </a:endParaRPr>
           </a:p>
           <a:p>
             <a:pPr>
@@ -7003,12 +7898,6 @@
               </a:rPr>
               <a:t>Recording patient feedback on the doctor and doctor feedback on the patient.</a:t>
             </a:r>
-            <a:endParaRPr lang="en-CA" sz="1600" dirty="0">
-              <a:effectLst/>
-              <a:latin typeface="Calibri" panose="020F0502020204030204" pitchFamily="34" charset="0"/>
-              <a:ea typeface="Calibri" panose="020F0502020204030204" pitchFamily="34" charset="0"/>
-              <a:cs typeface="Times New Roman" panose="02020503050405090304" pitchFamily="18" charset="0"/>
-            </a:endParaRPr>
           </a:p>
           <a:p>
             <a:pPr>
@@ -7028,12 +7917,6 @@
               </a:rPr>
               <a:t>E-pharmacy: customers can purchase medicines and other essentials through the portal and get them delivered to their homes. </a:t>
             </a:r>
-            <a:endParaRPr lang="en-CA" sz="1600" dirty="0">
-              <a:effectLst/>
-              <a:latin typeface="Calibri" panose="020F0502020204030204" pitchFamily="34" charset="0"/>
-              <a:ea typeface="Calibri" panose="020F0502020204030204" pitchFamily="34" charset="0"/>
-              <a:cs typeface="Times New Roman" panose="02020503050405090304" pitchFamily="18" charset="0"/>
-            </a:endParaRPr>
           </a:p>
           <a:p>
             <a:pPr>
@@ -7053,12 +7936,6 @@
               </a:rPr>
               <a:t>Patients can complete a lab requisition through the portal.</a:t>
             </a:r>
-            <a:endParaRPr lang="en-CA" sz="1600" dirty="0">
-              <a:effectLst/>
-              <a:latin typeface="Calibri" panose="020F0502020204030204" pitchFamily="34" charset="0"/>
-              <a:ea typeface="Calibri" panose="020F0502020204030204" pitchFamily="34" charset="0"/>
-              <a:cs typeface="Times New Roman" panose="02020503050405090304" pitchFamily="18" charset="0"/>
-            </a:endParaRPr>
           </a:p>
           <a:p>
             <a:pPr>
@@ -7078,12 +7955,6 @@
               </a:rPr>
               <a:t>Patients can communicate with the doctor via text messaging.</a:t>
             </a:r>
-            <a:endParaRPr lang="en-CA" sz="1600" dirty="0">
-              <a:effectLst/>
-              <a:latin typeface="Calibri" panose="020F0502020204030204" pitchFamily="34" charset="0"/>
-              <a:ea typeface="Calibri" panose="020F0502020204030204" pitchFamily="34" charset="0"/>
-              <a:cs typeface="Times New Roman" panose="02020503050405090304" pitchFamily="18" charset="0"/>
-            </a:endParaRPr>
           </a:p>
           <a:p>
             <a:pPr>
@@ -7103,12 +7974,6 @@
               </a:rPr>
               <a:t>The system should display desired graphs and statistics based on a patient’s profile.</a:t>
             </a:r>
-            <a:endParaRPr lang="en-CA" sz="1600" dirty="0">
-              <a:effectLst/>
-              <a:latin typeface="Calibri" panose="020F0502020204030204" pitchFamily="34" charset="0"/>
-              <a:ea typeface="Calibri" panose="020F0502020204030204" pitchFamily="34" charset="0"/>
-              <a:cs typeface="Times New Roman" panose="02020503050405090304" pitchFamily="18" charset="0"/>
-            </a:endParaRPr>
           </a:p>
           <a:p>
             <a:endParaRPr lang="en-CA" sz="1600" dirty="0"/>
@@ -7163,6 +8028,7 @@
           <a:p>
             <a:fld id="{A4BAB868-1E00-44C6-B1AB-DFCC5F9865BA}" type="slidenum">
               <a:rPr lang="ja-JP" altLang="en-US" smtClean="0"/>
+              <a:t>7</a:t>
             </a:fld>
             <a:endParaRPr lang="en-US" altLang="ja-JP" dirty="0"/>
           </a:p>
@@ -7469,6 +8335,7 @@
           <a:p>
             <a:fld id="{A4BAB868-1E00-44C6-B1AB-DFCC5F9865BA}" type="slidenum">
               <a:rPr lang="ja-JP" altLang="en-US" smtClean="0"/>
+              <a:t>8</a:t>
             </a:fld>
             <a:endParaRPr lang="en-US" altLang="ja-JP"/>
           </a:p>
@@ -7559,16 +8426,6 @@
               </a:rPr>
               <a:t>Appointment Agent</a:t>
             </a:r>
-            <a:endParaRPr lang="en-US" sz="1800" b="1" i="1" dirty="0">
-              <a:solidFill>
-                <a:srgbClr val="D60093"/>
-              </a:solidFill>
-              <a:effectLst>
-                <a:outerShdw blurRad="38100" dist="38100" dir="2700000" algn="tl">
-                  <a:srgbClr val="C0C0C0"/>
-                </a:outerShdw>
-              </a:effectLst>
-            </a:endParaRPr>
           </a:p>
           <a:p>
             <a:pPr marL="0" lvl="0" indent="0">
@@ -7728,6 +8585,7 @@
           <a:p>
             <a:fld id="{A4BAB868-1E00-44C6-B1AB-DFCC5F9865BA}" type="slidenum">
               <a:rPr lang="ja-JP" altLang="en-US" smtClean="0"/>
+              <a:t>9</a:t>
             </a:fld>
             <a:endParaRPr lang="en-US" altLang="ja-JP"/>
           </a:p>

</xml_diff>

<commit_message>
Added Database Table Info and ER Diagram Signed-off-by: anish30145784 <anish.mukherjee1@ucalgary.ca>
</commit_message>
<xml_diff>
--- a/GroupD_ProjectPresentation.pptx
+++ b/GroupD_ProjectPresentation.pptx
@@ -12,11 +12,11 @@
     <p:sldId id="262" r:id="rId6"/>
     <p:sldId id="264" r:id="rId7"/>
     <p:sldId id="265" r:id="rId8"/>
-    <p:sldId id="269" r:id="rId9"/>
-    <p:sldId id="270" r:id="rId10"/>
-    <p:sldId id="260" r:id="rId11"/>
-    <p:sldId id="263" r:id="rId12"/>
-    <p:sldId id="271" r:id="rId13"/>
+    <p:sldId id="283" r:id="rId9"/>
+    <p:sldId id="284" r:id="rId10"/>
+    <p:sldId id="285" r:id="rId11"/>
+    <p:sldId id="286" r:id="rId12"/>
+    <p:sldId id="287" r:id="rId13"/>
     <p:sldId id="266" r:id="rId14"/>
     <p:sldId id="267" r:id="rId15"/>
     <p:sldId id="268" r:id="rId16"/>
@@ -31,6 +31,10 @@
     <p:sldId id="276" r:id="rId25"/>
     <p:sldId id="281" r:id="rId26"/>
     <p:sldId id="282" r:id="rId27"/>
+    <p:sldId id="288" r:id="rId28"/>
+    <p:sldId id="289" r:id="rId29"/>
+    <p:sldId id="290" r:id="rId30"/>
+    <p:sldId id="291" r:id="rId31"/>
   </p:sldIdLst>
   <p:sldSz cx="12192000" cy="6858000"/>
   <p:notesSz cx="6858000" cy="9144000"/>
@@ -3910,6 +3914,16 @@
               </a:spcAft>
             </a:pPr>
             <a:r>
+              <a:rPr lang="en-US" dirty="0" smtClean="0">
+                <a:solidFill>
+                  <a:srgbClr val="000000"/>
+                </a:solidFill>
+                <a:latin typeface="Tahoma" panose="020B0604030504040204" pitchFamily="34" charset="0"/>
+                <a:ea typeface="MS PGothic" pitchFamily="50" charset="-128"/>
+              </a:rPr>
+              <a:t>SENG696 </a:t>
+            </a:r>
+            <a:r>
               <a:rPr lang="en-US" dirty="0">
                 <a:solidFill>
                   <a:srgbClr val="000000"/>
@@ -3917,7 +3931,17 @@
                 <a:latin typeface="Tahoma" panose="020B0604030504040204" pitchFamily="34" charset="0"/>
                 <a:ea typeface="MS PGothic" pitchFamily="50" charset="-128"/>
               </a:rPr>
-              <a:t>SENG696 (Fall 2021)</a:t>
+              <a:t>(Fall </a:t>
+            </a:r>
+            <a:r>
+              <a:rPr lang="en-US" dirty="0" smtClean="0">
+                <a:solidFill>
+                  <a:srgbClr val="000000"/>
+                </a:solidFill>
+                <a:latin typeface="Tahoma" panose="020B0604030504040204" pitchFamily="34" charset="0"/>
+                <a:ea typeface="MS PGothic" pitchFamily="50" charset="-128"/>
+              </a:rPr>
+              <a:t>2021)</a:t>
             </a:r>
             <a:endParaRPr lang="en-US" altLang="ja-JP" dirty="0">
               <a:solidFill>
@@ -4022,6 +4046,19 @@
               <a:buNone/>
             </a:pPr>
             <a:r>
+              <a:rPr lang="en-US" sz="2000" b="1" i="1" dirty="0" smtClean="0">
+                <a:solidFill>
+                  <a:srgbClr val="D60093"/>
+                </a:solidFill>
+                <a:effectLst>
+                  <a:outerShdw blurRad="38100" dist="38100" dir="2700000" algn="tl">
+                    <a:srgbClr val="C0C0C0"/>
+                  </a:outerShdw>
+                </a:effectLst>
+              </a:rPr>
+              <a:t>Reminder(Notification) </a:t>
+            </a:r>
+            <a:r>
               <a:rPr lang="en-US" sz="2000" b="1" i="1" dirty="0">
                 <a:solidFill>
                   <a:srgbClr val="D60093"/>
@@ -4032,7 +4069,7 @@
                   </a:outerShdw>
                 </a:effectLst>
               </a:rPr>
-              <a:t>Reminder Agent</a:t>
+              <a:t>Agent</a:t>
             </a:r>
           </a:p>
           <a:p>
@@ -4063,8 +4100,32 @@
               <a:buChar char="§"/>
             </a:pPr>
             <a:r>
-              <a:rPr lang="en-CA" sz="1600" dirty="0"/>
-              <a:t>The Reminder Agent communicates with the Clinic Agent, by waiting for its signals after an appointment is booked. If the user has activated reminders at the time of booking an appointment, the Reminder Agent would be sending automated SMS messages and e-mail notifications to the user on his/her registered e-mail account and mobile number. </a:t>
+              <a:rPr lang="en-CA" sz="1700" dirty="0"/>
+              <a:t>The </a:t>
+            </a:r>
+            <a:r>
+              <a:rPr lang="en-CA" sz="1700" dirty="0" smtClean="0"/>
+              <a:t>Notification </a:t>
+            </a:r>
+            <a:r>
+              <a:rPr lang="en-CA" sz="1700" dirty="0"/>
+              <a:t>Agent communicates with the Clinic </a:t>
+            </a:r>
+            <a:r>
+              <a:rPr lang="en-CA" sz="1700" dirty="0" smtClean="0"/>
+              <a:t>Agent </a:t>
+            </a:r>
+            <a:r>
+              <a:rPr lang="en-CA" sz="1700" dirty="0"/>
+              <a:t>at the time of booking an appointment, the Reminder Agent would be sending automated SMS messages and </a:t>
+            </a:r>
+            <a:r>
+              <a:rPr lang="en-CA" sz="1700" dirty="0" smtClean="0"/>
+              <a:t>E-mail </a:t>
+            </a:r>
+            <a:r>
+              <a:rPr lang="en-CA" sz="1700" dirty="0"/>
+              <a:t>notifications to the user on his/her registered e-mail account and mobile number. </a:t>
             </a:r>
           </a:p>
           <a:p>
@@ -4076,8 +4137,16 @@
               <a:buChar char="§"/>
             </a:pPr>
             <a:r>
-              <a:rPr lang="en-CA" sz="1600" dirty="0"/>
-              <a:t>Instead of a receptionist logging in every time to trigger a reminder, the Agent by itself sends the message at regular intervals(hours/days) as chosen by the user.</a:t>
+              <a:rPr lang="en-CA" sz="1700" dirty="0"/>
+              <a:t>Instead of a receptionist logging in every time to trigger a reminder, the Agent by itself sends the message at regular </a:t>
+            </a:r>
+            <a:r>
+              <a:rPr lang="en-CA" sz="1700" dirty="0" smtClean="0"/>
+              <a:t>intervals as </a:t>
+            </a:r>
+            <a:r>
+              <a:rPr lang="en-CA" sz="1700" dirty="0"/>
+              <a:t>chosen by the user.</a:t>
             </a:r>
           </a:p>
           <a:p>
@@ -4089,7 +4158,7 @@
               <a:buChar char="§"/>
             </a:pPr>
             <a:r>
-              <a:rPr lang="en-CA" sz="1600" dirty="0"/>
+              <a:rPr lang="en-CA" sz="1700" dirty="0"/>
               <a:t>In case the appointment is cancelled or updated, the Reminder Agent also intelligently updates the text message and sends an updated notification to the user. </a:t>
             </a:r>
           </a:p>
@@ -4102,8 +4171,16 @@
               <a:buChar char="§"/>
             </a:pPr>
             <a:r>
-              <a:rPr lang="en-CA" sz="1600" dirty="0"/>
-              <a:t>Once the appointment is complete, the Reminder Agent directly accesses the database to disable the alerting mechanism for that particular appointment. </a:t>
+              <a:rPr lang="en-CA" sz="1700" dirty="0"/>
+              <a:t>Once the appointment is complete, the Reminder Agent directly accesses the database to </a:t>
+            </a:r>
+            <a:r>
+              <a:rPr lang="en-CA" sz="1700" dirty="0" smtClean="0"/>
+              <a:t>update </a:t>
+            </a:r>
+            <a:r>
+              <a:rPr lang="en-CA" sz="1700" dirty="0"/>
+              <a:t>the alerting mechanism for that particular appointment. </a:t>
             </a:r>
           </a:p>
           <a:p>
@@ -4115,7 +4192,7 @@
               <a:buChar char="§"/>
             </a:pPr>
             <a:r>
-              <a:rPr lang="en-CA" sz="1600" dirty="0"/>
+              <a:rPr lang="en-CA" sz="1700" dirty="0"/>
               <a:t>In order to check if the registered email/phone number is valid, the Reminder Agent will trigger an acknowledgement  message at the time of booking the appointment. Subsequently, the other reminder messages will be forwarded in due course.</a:t>
             </a:r>
           </a:p>
@@ -4128,34 +4205,31 @@
               <a:buChar char="§"/>
             </a:pPr>
             <a:r>
-              <a:rPr lang="en-CA" sz="1600" dirty="0"/>
-              <a:t>The Reminder Agent also triggers a notification once the report has been generated, based upon the feedback from the veterinarian. In this case, it will await signal from the Template Agent.</a:t>
-            </a:r>
-          </a:p>
-          <a:p>
-            <a:pPr>
-              <a:lnSpc>
-                <a:spcPct val="80000"/>
-              </a:lnSpc>
-              <a:buFont typeface="Wingdings" panose="05000000000000000000" pitchFamily="2" charset="2"/>
-              <a:buChar char="§"/>
-            </a:pPr>
-            <a:r>
-              <a:rPr lang="en-CA" sz="1600" dirty="0"/>
-              <a:t>The Agent will keep a track of all the reminders sent to a particular number in the database for tracking purposes.</a:t>
-            </a:r>
-          </a:p>
-          <a:p>
-            <a:pPr>
-              <a:lnSpc>
-                <a:spcPct val="80000"/>
-              </a:lnSpc>
-            </a:pPr>
-            <a:endParaRPr lang="en-CA" sz="1600" dirty="0"/>
+              <a:rPr lang="en-CA" sz="1700" dirty="0"/>
+              <a:t>The </a:t>
+            </a:r>
+            <a:r>
+              <a:rPr lang="en-CA" sz="1700" dirty="0" smtClean="0"/>
+              <a:t>Agent </a:t>
+            </a:r>
+            <a:r>
+              <a:rPr lang="en-CA" sz="1700" dirty="0"/>
+              <a:t>also triggers a notification once the report has been generated, based upon the feedback from the veterinarian. In this case, it will await signal from the Template Agent</a:t>
+            </a:r>
+            <a:r>
+              <a:rPr lang="en-CA" sz="1700" dirty="0" smtClean="0"/>
+              <a:t>.</a:t>
+            </a:r>
+            <a:endParaRPr lang="en-CA" sz="1700" dirty="0"/>
           </a:p>
         </p:txBody>
       </p:sp>
     </p:spTree>
+    <p:extLst>
+      <p:ext uri="{BB962C8B-B14F-4D97-AF65-F5344CB8AC3E}">
+        <p14:creationId xmlns:p14="http://schemas.microsoft.com/office/powerpoint/2010/main" val="3412423258"/>
+      </p:ext>
+    </p:extLst>
   </p:cSld>
   <p:clrMapOvr>
     <a:masterClrMapping/>
@@ -4229,6 +4303,19 @@
               <a:buNone/>
             </a:pPr>
             <a:r>
+              <a:rPr lang="en-US" sz="2400" b="1" i="1" dirty="0" smtClean="0">
+                <a:solidFill>
+                  <a:srgbClr val="D60093"/>
+                </a:solidFill>
+                <a:effectLst>
+                  <a:outerShdw blurRad="38100" dist="38100" dir="2700000" algn="tl">
+                    <a:srgbClr val="C0C0C0"/>
+                  </a:outerShdw>
+                </a:effectLst>
+              </a:rPr>
+              <a:t>Template(PDF) </a:t>
+            </a:r>
+            <a:r>
               <a:rPr lang="en-US" sz="2400" b="1" i="1" dirty="0">
                 <a:solidFill>
                   <a:srgbClr val="D60093"/>
@@ -4239,13 +4326,29 @@
                   </a:outerShdw>
                 </a:effectLst>
               </a:rPr>
-              <a:t>Template Agent</a:t>
+              <a:t>Agent</a:t>
             </a:r>
           </a:p>
           <a:p>
             <a:r>
               <a:rPr lang="en-US" sz="2400" dirty="0"/>
-              <a:t>The Template Agent provides the doctor with different letter templates. Depending upon the video interaction between the doctor and the patient, the doctor can select and use the in-built template to report their diagnosis.</a:t>
+              <a:t>The Template Agent provides the doctor with </a:t>
+            </a:r>
+            <a:r>
+              <a:rPr lang="en-US" sz="2400" dirty="0" smtClean="0"/>
+              <a:t>letter reports. </a:t>
+            </a:r>
+            <a:r>
+              <a:rPr lang="en-US" sz="2400" dirty="0"/>
+              <a:t>Depending upon the video interaction between the doctor and the patient, the doctor can select and use the in-built template to </a:t>
+            </a:r>
+            <a:r>
+              <a:rPr lang="en-US" sz="2400" dirty="0" smtClean="0"/>
+              <a:t>document </a:t>
+            </a:r>
+            <a:r>
+              <a:rPr lang="en-US" sz="2400" dirty="0"/>
+              <a:t>their diagnosis.</a:t>
             </a:r>
           </a:p>
           <a:p>
@@ -4257,8 +4360,13 @@
           <a:p>
             <a:r>
               <a:rPr lang="en-US" sz="2400" dirty="0"/>
-              <a:t>If the Template Agent receives a request from the Clinic System Agent, the doctor is requested to input their feedback. </a:t>
-            </a:r>
+              <a:t>If the Template Agent receives a request from the Clinic System Agent, the doctor is requested to input their </a:t>
+            </a:r>
+            <a:r>
+              <a:rPr lang="en-US" sz="2400" dirty="0" smtClean="0"/>
+              <a:t>feedback through mail. </a:t>
+            </a:r>
+            <a:endParaRPr lang="en-US" sz="2400" dirty="0"/>
           </a:p>
           <a:p>
             <a:r>
@@ -4285,8 +4393,16 @@
           <a:lstStyle/>
           <a:p>
             <a:r>
+              <a:rPr lang="en-US" dirty="0" smtClean="0"/>
+              <a:t>SENG696 </a:t>
+            </a:r>
+            <a:r>
               <a:rPr lang="en-US" dirty="0"/>
-              <a:t>SENG696 (Fall 2021)</a:t>
+              <a:t>(Fall </a:t>
+            </a:r>
+            <a:r>
+              <a:rPr lang="en-US" dirty="0" smtClean="0"/>
+              <a:t>2021)</a:t>
             </a:r>
             <a:endParaRPr lang="en-US" altLang="ja-JP" dirty="0"/>
           </a:p>
@@ -4316,6 +4432,11 @@
         </p:txBody>
       </p:sp>
     </p:spTree>
+    <p:extLst>
+      <p:ext uri="{BB962C8B-B14F-4D97-AF65-F5344CB8AC3E}">
+        <p14:creationId xmlns:p14="http://schemas.microsoft.com/office/powerpoint/2010/main" val="1205647232"/>
+      </p:ext>
+    </p:extLst>
   </p:cSld>
   <p:clrMapOvr>
     <a:masterClrMapping/>
@@ -4389,6 +4510,32 @@
               <a:buNone/>
             </a:pPr>
             <a:r>
+              <a:rPr lang="en-US" sz="2400" b="1" i="1" dirty="0" err="1" smtClean="0">
+                <a:solidFill>
+                  <a:srgbClr val="D60093"/>
+                </a:solidFill>
+                <a:effectLst>
+                  <a:outerShdw blurRad="38100" dist="38100" dir="2700000" algn="tl">
+                    <a:srgbClr val="C0C0C0"/>
+                  </a:outerShdw>
+                </a:effectLst>
+              </a:rPr>
+              <a:t>VideoLink</a:t>
+            </a:r>
+            <a:r>
+              <a:rPr lang="en-US" sz="2400" b="1" i="1" dirty="0" smtClean="0">
+                <a:solidFill>
+                  <a:srgbClr val="D60093"/>
+                </a:solidFill>
+                <a:effectLst>
+                  <a:outerShdw blurRad="38100" dist="38100" dir="2700000" algn="tl">
+                    <a:srgbClr val="C0C0C0"/>
+                  </a:outerShdw>
+                </a:effectLst>
+              </a:rPr>
+              <a:t> </a:t>
+            </a:r>
+            <a:r>
               <a:rPr lang="en-US" sz="2400" b="1" i="1" dirty="0">
                 <a:solidFill>
                   <a:srgbClr val="D60093"/>
@@ -4399,7 +4546,7 @@
                   </a:outerShdw>
                 </a:effectLst>
               </a:rPr>
-              <a:t>Video Agent</a:t>
+              <a:t>Agent</a:t>
             </a:r>
           </a:p>
           <a:p>
@@ -4409,7 +4556,11 @@
             </a:pPr>
             <a:r>
               <a:rPr lang="en-US" sz="2200" dirty="0"/>
-              <a:t>The video agent is responsible to generate a video link at the time of the appointment of the patient and send it to the registered email id as well as the registered mobile number of the patient.</a:t>
+              <a:t>The video agent is responsible to generate a video link at the time of the appointment of the patient and send it to the registered email id as well as the registered mobile number of the patient</a:t>
+            </a:r>
+            <a:r>
+              <a:rPr lang="en-US" sz="2200" dirty="0" smtClean="0"/>
+              <a:t>.</a:t>
             </a:r>
           </a:p>
           <a:p>
@@ -4418,8 +4569,16 @@
               <a:buChar char="§"/>
             </a:pPr>
             <a:r>
+              <a:rPr lang="en-US" sz="2200" dirty="0" smtClean="0"/>
+              <a:t>The </a:t>
+            </a:r>
+            <a:r>
               <a:rPr lang="en-US" sz="2200" dirty="0"/>
-              <a:t>The video agent directly communicates with the clinic system agent and creates the links according to the time slots selected by the patients.</a:t>
+              <a:t>video agent directly communicates with the clinic system agent and creates the links according to the time slots selected by the patients</a:t>
+            </a:r>
+            <a:r>
+              <a:rPr lang="en-US" sz="2200" dirty="0" smtClean="0"/>
+              <a:t>.</a:t>
             </a:r>
           </a:p>
           <a:p>
@@ -4428,8 +4587,16 @@
               <a:buChar char="§"/>
             </a:pPr>
             <a:r>
+              <a:rPr lang="en-US" sz="2200" dirty="0" smtClean="0"/>
+              <a:t>To </a:t>
+            </a:r>
+            <a:r>
               <a:rPr lang="en-US" sz="2200" dirty="0"/>
-              <a:t>To facilitate the video-based interaction between the doctor and patient, the system will use existing video conferencing platforms (ZOOM, Google Meet, etc.)</a:t>
+              <a:t>facilitate the video-based interaction between the doctor and patient, the system will use existing ZOOM video conferencing </a:t>
+            </a:r>
+            <a:r>
+              <a:rPr lang="en-US" sz="2200" dirty="0" smtClean="0"/>
+              <a:t>platforms.</a:t>
             </a:r>
           </a:p>
           <a:p>
@@ -4438,8 +4605,16 @@
               <a:buChar char="§"/>
             </a:pPr>
             <a:r>
+              <a:rPr lang="en-US" sz="2200" dirty="0" smtClean="0"/>
+              <a:t>Patients </a:t>
+            </a:r>
+            <a:r>
               <a:rPr lang="en-US" sz="2200" dirty="0"/>
-              <a:t>Patients will be able to join the meeting at their scheduled appointment time and the link will expire in 30 minutes which is the maximum time for consultation.</a:t>
+              <a:t>will be able to join the meeting at their scheduled appointment time and the link will expire in 30 minutes which is the maximum time for consultation</a:t>
+            </a:r>
+            <a:r>
+              <a:rPr lang="en-US" sz="2200" dirty="0" smtClean="0"/>
+              <a:t>.</a:t>
             </a:r>
           </a:p>
           <a:p>
@@ -4448,8 +4623,12 @@
               <a:buChar char="§"/>
             </a:pPr>
             <a:r>
+              <a:rPr lang="en-US" sz="2200" dirty="0" smtClean="0"/>
+              <a:t>If </a:t>
+            </a:r>
+            <a:r>
               <a:rPr lang="en-US" sz="2200" dirty="0"/>
-              <a:t>If the consultation needs more time than 30 minutes then the patient will have to make another appointment with the clinic in order to continue it.</a:t>
+              <a:t>the consultation needs more time than 30 minutes then the patient will have to make another appointment with the clinic in order to continue it.</a:t>
             </a:r>
             <a:endParaRPr lang="en-CA" sz="2200" dirty="0"/>
           </a:p>
@@ -4471,8 +4650,16 @@
           <a:lstStyle/>
           <a:p>
             <a:r>
+              <a:rPr lang="en-US" dirty="0" smtClean="0"/>
+              <a:t>SENG696 </a:t>
+            </a:r>
+            <a:r>
               <a:rPr lang="en-US" dirty="0"/>
-              <a:t>SENG696 (Fall 2021)</a:t>
+              <a:t>(Fall </a:t>
+            </a:r>
+            <a:r>
+              <a:rPr lang="en-US" dirty="0" smtClean="0"/>
+              <a:t>2021)</a:t>
             </a:r>
             <a:endParaRPr lang="en-US" altLang="ja-JP" dirty="0"/>
           </a:p>
@@ -4502,6 +4689,11 @@
         </p:txBody>
       </p:sp>
     </p:spTree>
+    <p:extLst>
+      <p:ext uri="{BB962C8B-B14F-4D97-AF65-F5344CB8AC3E}">
+        <p14:creationId xmlns:p14="http://schemas.microsoft.com/office/powerpoint/2010/main" val="84794007"/>
+      </p:ext>
+    </p:extLst>
   </p:cSld>
   <p:clrMapOvr>
     <a:masterClrMapping/>
@@ -8321,7 +8513,15 @@
           <a:p>
             <a:r>
               <a:rPr lang="en-US" dirty="0"/>
-              <a:t>Use Case Definition : Appointment Agent</a:t>
+              <a:t>Use Case Definition : </a:t>
+            </a:r>
+            <a:r>
+              <a:rPr lang="en-US" dirty="0" smtClean="0"/>
+              <a:t>Notification </a:t>
+            </a:r>
+            <a:r>
+              <a:rPr lang="en-US" dirty="0"/>
+              <a:t>Agent</a:t>
             </a:r>
             <a:endParaRPr lang="en-CA" dirty="0"/>
           </a:p>
@@ -8343,28 +8543,28 @@
             <p:ph idx="1"/>
             <p:extLst>
               <p:ext uri="{D42A27DB-BD31-4B8C-83A1-F6EECF244321}">
-                <p14:modId xmlns:p14="http://schemas.microsoft.com/office/powerpoint/2010/main" val="831668553"/>
+                <p14:modId xmlns:p14="http://schemas.microsoft.com/office/powerpoint/2010/main" val="2379446386"/>
               </p:ext>
             </p:extLst>
           </p:nvPr>
         </p:nvGraphicFramePr>
         <p:xfrm>
-          <a:off x="1422402" y="1666875"/>
-          <a:ext cx="9559924" cy="4257673"/>
+          <a:off x="1715588" y="1750423"/>
+          <a:ext cx="9118692" cy="3936272"/>
         </p:xfrm>
         <a:graphic>
           <a:graphicData uri="http://schemas.openxmlformats.org/drawingml/2006/table">
             <a:tbl>
               <a:tblPr firstRow="1" firstCol="1" bandRow="1"/>
               <a:tblGrid>
-                <a:gridCol w="2260055">
+                <a:gridCol w="2155744">
                   <a:extLst>
                     <a:ext uri="{9D8B030D-6E8A-4147-A177-3AD203B41FA5}">
                       <a16:colId xmlns:a16="http://schemas.microsoft.com/office/drawing/2014/main" val="153879244"/>
                     </a:ext>
                   </a:extLst>
                 </a:gridCol>
-                <a:gridCol w="7299869">
+                <a:gridCol w="6962948">
                   <a:extLst>
                     <a:ext uri="{9D8B030D-6E8A-4147-A177-3AD203B41FA5}">
                       <a16:colId xmlns:a16="http://schemas.microsoft.com/office/drawing/2014/main" val="1494204266"/>
@@ -8372,7 +8572,7 @@
                   </a:extLst>
                 </a:gridCol>
               </a:tblGrid>
-              <a:tr h="336433">
+              <a:tr h="314047">
                 <a:tc>
                   <a:txBody>
                     <a:bodyPr/>
@@ -8456,15 +8656,33 @@
                         </a:spcAft>
                       </a:pPr>
                       <a:r>
-                        <a:rPr lang="en-IN" sz="1000">
+                        <a:rPr lang="en-IN" sz="1300" dirty="0">
                           <a:effectLst/>
                           <a:latin typeface="Calibri" panose="020F0502020204030204" pitchFamily="34" charset="0"/>
                           <a:ea typeface="Calibri" panose="020F0502020204030204" pitchFamily="34" charset="0"/>
                           <a:cs typeface="Times New Roman" panose="02020603050405020304" pitchFamily="18" charset="0"/>
                         </a:rPr>
-                        <a:t>The Clinic System Agent uses this use case to send notifications to the user</a:t>
+                        <a:t>The </a:t>
                       </a:r>
-                      <a:endParaRPr lang="en-CA" sz="1100">
+                      <a:r>
+                        <a:rPr lang="en-IN" sz="1300" dirty="0" smtClean="0">
+                          <a:effectLst/>
+                          <a:latin typeface="Calibri" panose="020F0502020204030204" pitchFamily="34" charset="0"/>
+                          <a:ea typeface="Calibri" panose="020F0502020204030204" pitchFamily="34" charset="0"/>
+                          <a:cs typeface="Times New Roman" panose="02020603050405020304" pitchFamily="18" charset="0"/>
+                        </a:rPr>
+                        <a:t>Notification Agent </a:t>
+                      </a:r>
+                      <a:r>
+                        <a:rPr lang="en-IN" sz="1300" dirty="0">
+                          <a:effectLst/>
+                          <a:latin typeface="Calibri" panose="020F0502020204030204" pitchFamily="34" charset="0"/>
+                          <a:ea typeface="Calibri" panose="020F0502020204030204" pitchFamily="34" charset="0"/>
+                          <a:cs typeface="Times New Roman" panose="02020603050405020304" pitchFamily="18" charset="0"/>
+                        </a:rPr>
+                        <a:t>uses this use case to send notifications to the user</a:t>
+                      </a:r>
+                      <a:endParaRPr lang="en-CA" sz="1300" dirty="0">
                         <a:effectLst/>
                         <a:latin typeface="Calibri" panose="020F0502020204030204" pitchFamily="34" charset="0"/>
                         <a:ea typeface="Calibri" panose="020F0502020204030204" pitchFamily="34" charset="0"/>
@@ -8517,7 +8735,7 @@
                   </a:ext>
                 </a:extLst>
               </a:tr>
-              <a:tr h="336433">
+              <a:tr h="310778">
                 <a:tc>
                   <a:txBody>
                     <a:bodyPr/>
@@ -8601,7 +8819,7 @@
                         </a:spcAft>
                       </a:pPr>
                       <a:r>
-                        <a:rPr lang="en-IN" sz="1100">
+                        <a:rPr lang="en-IN" sz="1300">
                           <a:effectLst/>
                           <a:latin typeface="Calibri" panose="020F0502020204030204" pitchFamily="34" charset="0"/>
                           <a:ea typeface="Calibri" panose="020F0502020204030204" pitchFamily="34" charset="0"/>
@@ -8609,7 +8827,7 @@
                         </a:rPr>
                         <a:t>Appointment is booked and a video link has been generated</a:t>
                       </a:r>
-                      <a:endParaRPr lang="en-CA" sz="1100">
+                      <a:endParaRPr lang="en-CA" sz="1300">
                         <a:effectLst/>
                         <a:latin typeface="Calibri" panose="020F0502020204030204" pitchFamily="34" charset="0"/>
                         <a:ea typeface="Calibri" panose="020F0502020204030204" pitchFamily="34" charset="0"/>
@@ -8662,7 +8880,7 @@
                   </a:ext>
                 </a:extLst>
               </a:tr>
-              <a:tr h="689368">
+              <a:tr h="636800">
                 <a:tc>
                   <a:txBody>
                     <a:bodyPr/>
@@ -8746,7 +8964,7 @@
                         </a:spcAft>
                       </a:pPr>
                       <a:r>
-                        <a:rPr lang="en-IN" sz="1100">
+                        <a:rPr lang="en-IN" sz="1300" dirty="0">
                           <a:effectLst/>
                           <a:latin typeface="Calibri" panose="020F0502020204030204" pitchFamily="34" charset="0"/>
                           <a:ea typeface="Calibri" panose="020F0502020204030204" pitchFamily="34" charset="0"/>
@@ -8754,7 +8972,7 @@
                         </a:rPr>
                         <a:t>Considering all Services work as expected, the notification agent sends appointment updates to user via email and/or SMS</a:t>
                       </a:r>
-                      <a:endParaRPr lang="en-CA" sz="1100">
+                      <a:endParaRPr lang="en-CA" sz="1300" dirty="0">
                         <a:effectLst/>
                         <a:latin typeface="Calibri" panose="020F0502020204030204" pitchFamily="34" charset="0"/>
                         <a:ea typeface="Calibri" panose="020F0502020204030204" pitchFamily="34" charset="0"/>
@@ -8807,7 +9025,7 @@
                   </a:ext>
                 </a:extLst>
               </a:tr>
-              <a:tr h="336433">
+              <a:tr h="310778">
                 <a:tc>
                   <a:txBody>
                     <a:bodyPr/>
@@ -8949,7 +9167,7 @@
                   </a:ext>
                 </a:extLst>
               </a:tr>
-              <a:tr h="506485">
+              <a:tr h="467863">
                 <a:tc>
                   <a:txBody>
                     <a:bodyPr/>
@@ -9033,7 +9251,7 @@
                         </a:spcAft>
                       </a:pPr>
                       <a:r>
-                        <a:rPr lang="en-IN" sz="1100">
+                        <a:rPr lang="en-IN" sz="1300" dirty="0">
                           <a:effectLst/>
                           <a:latin typeface="Calibri" panose="020F0502020204030204" pitchFamily="34" charset="0"/>
                           <a:ea typeface="Calibri" panose="020F0502020204030204" pitchFamily="34" charset="0"/>
@@ -9041,7 +9259,7 @@
                         </a:rPr>
                         <a:t>The notification agent receives user information (email-address and cell phone number) from the clinic system agent </a:t>
                       </a:r>
-                      <a:endParaRPr lang="en-CA" sz="1100">
+                      <a:endParaRPr lang="en-CA" sz="1300" dirty="0">
                         <a:effectLst/>
                         <a:latin typeface="Calibri" panose="020F0502020204030204" pitchFamily="34" charset="0"/>
                         <a:ea typeface="Calibri" panose="020F0502020204030204" pitchFamily="34" charset="0"/>
@@ -9094,7 +9312,7 @@
                   </a:ext>
                 </a:extLst>
               </a:tr>
-              <a:tr h="689368">
+              <a:tr h="636800">
                 <a:tc>
                   <a:txBody>
                     <a:bodyPr/>
@@ -9178,7 +9396,7 @@
                         </a:spcAft>
                       </a:pPr>
                       <a:r>
-                        <a:rPr lang="en-IN" sz="1100">
+                        <a:rPr lang="en-IN" sz="1300" dirty="0">
                           <a:effectLst/>
                           <a:latin typeface="Calibri" panose="020F0502020204030204" pitchFamily="34" charset="0"/>
                           <a:ea typeface="Calibri" panose="020F0502020204030204" pitchFamily="34" charset="0"/>
@@ -9186,7 +9404,7 @@
                         </a:rPr>
                         <a:t>The notification agent also receives video link information from the video agent</a:t>
                       </a:r>
-                      <a:endParaRPr lang="en-CA" sz="1100">
+                      <a:endParaRPr lang="en-CA" sz="1300" dirty="0">
                         <a:effectLst/>
                         <a:latin typeface="Calibri" panose="020F0502020204030204" pitchFamily="34" charset="0"/>
                         <a:ea typeface="Calibri" panose="020F0502020204030204" pitchFamily="34" charset="0"/>
@@ -9239,7 +9457,7 @@
                   </a:ext>
                 </a:extLst>
               </a:tr>
-              <a:tr h="689368">
+              <a:tr h="636800">
                 <a:tc>
                   <a:txBody>
                     <a:bodyPr/>
@@ -9323,7 +9541,7 @@
                         </a:spcAft>
                       </a:pPr>
                       <a:r>
-                        <a:rPr lang="en-IN" sz="1100">
+                        <a:rPr lang="en-IN" sz="1300" dirty="0">
                           <a:effectLst/>
                           <a:latin typeface="Calibri" panose="020F0502020204030204" pitchFamily="34" charset="0"/>
                           <a:ea typeface="Calibri" panose="020F0502020204030204" pitchFamily="34" charset="0"/>
@@ -9331,7 +9549,7 @@
                         </a:rPr>
                         <a:t>The notification agent receives status update request from the clinic system agent at regular intervals</a:t>
                       </a:r>
-                      <a:endParaRPr lang="en-CA" sz="1100">
+                      <a:endParaRPr lang="en-CA" sz="1300" dirty="0">
                         <a:effectLst/>
                         <a:latin typeface="Calibri" panose="020F0502020204030204" pitchFamily="34" charset="0"/>
                         <a:ea typeface="Calibri" panose="020F0502020204030204" pitchFamily="34" charset="0"/>
@@ -9384,7 +9602,7 @@
                   </a:ext>
                 </a:extLst>
               </a:tr>
-              <a:tr h="673785">
+              <a:tr h="622406">
                 <a:tc>
                   <a:txBody>
                     <a:bodyPr/>
@@ -9468,7 +9686,7 @@
                         </a:spcAft>
                       </a:pPr>
                       <a:r>
-                        <a:rPr lang="en-IN" sz="1100" dirty="0">
+                        <a:rPr lang="en-IN" sz="1300" dirty="0">
                           <a:effectLst/>
                           <a:latin typeface="Calibri" panose="020F0502020204030204" pitchFamily="34" charset="0"/>
                           <a:ea typeface="Calibri" panose="020F0502020204030204" pitchFamily="34" charset="0"/>
@@ -9476,7 +9694,7 @@
                         </a:rPr>
                         <a:t>The notification agent sends out notification to the user in form of updates and daily remainders </a:t>
                       </a:r>
-                      <a:endParaRPr lang="en-CA" sz="1100" dirty="0">
+                      <a:endParaRPr lang="en-CA" sz="1300" dirty="0">
                         <a:effectLst/>
                         <a:latin typeface="Calibri" panose="020F0502020204030204" pitchFamily="34" charset="0"/>
                         <a:ea typeface="Calibri" panose="020F0502020204030204" pitchFamily="34" charset="0"/>
@@ -9676,7 +9894,15 @@
           <a:p>
             <a:r>
               <a:rPr lang="en-US" dirty="0"/>
-              <a:t>Use Case Definition : Appointment Agent</a:t>
+              <a:t>Use Case Definition : </a:t>
+            </a:r>
+            <a:r>
+              <a:rPr lang="en-US" dirty="0" smtClean="0"/>
+              <a:t>Notification </a:t>
+            </a:r>
+            <a:r>
+              <a:rPr lang="en-US" dirty="0"/>
+              <a:t>Agent</a:t>
             </a:r>
             <a:endParaRPr lang="en-CA" dirty="0"/>
           </a:p>
@@ -11359,6 +11585,521 @@
 </p:sld>
 </file>
 
+<file path=ppt/slides/slide27.xml><?xml version="1.0" encoding="utf-8"?>
+<p:sld xmlns:a="http://schemas.openxmlformats.org/drawingml/2006/main" xmlns:r="http://schemas.openxmlformats.org/officeDocument/2006/relationships" xmlns:p="http://schemas.openxmlformats.org/presentationml/2006/main">
+  <p:cSld>
+    <p:spTree>
+      <p:nvGrpSpPr>
+        <p:cNvPr id="1" name=""/>
+        <p:cNvGrpSpPr/>
+        <p:nvPr/>
+      </p:nvGrpSpPr>
+      <p:grpSpPr>
+        <a:xfrm>
+          <a:off x="0" y="0"/>
+          <a:ext cx="0" cy="0"/>
+          <a:chOff x="0" y="0"/>
+          <a:chExt cx="0" cy="0"/>
+        </a:xfrm>
+      </p:grpSpPr>
+      <p:sp>
+        <p:nvSpPr>
+          <p:cNvPr id="2" name="Title 1"/>
+          <p:cNvSpPr>
+            <a:spLocks noGrp="1"/>
+          </p:cNvSpPr>
+          <p:nvPr>
+            <p:ph type="title"/>
+          </p:nvPr>
+        </p:nvSpPr>
+        <p:spPr/>
+        <p:txBody>
+          <a:bodyPr/>
+          <a:lstStyle/>
+          <a:p>
+            <a:r>
+              <a:rPr lang="en-CA" dirty="0" smtClean="0"/>
+              <a:t>Data Specification : E-R Diagram</a:t>
+            </a:r>
+            <a:endParaRPr lang="en-CA" dirty="0"/>
+          </a:p>
+        </p:txBody>
+      </p:sp>
+      <p:sp>
+        <p:nvSpPr>
+          <p:cNvPr id="4" name="Date Placeholder 3"/>
+          <p:cNvSpPr>
+            <a:spLocks noGrp="1"/>
+          </p:cNvSpPr>
+          <p:nvPr>
+            <p:ph type="dt" sz="half" idx="10"/>
+          </p:nvPr>
+        </p:nvSpPr>
+        <p:spPr/>
+        <p:txBody>
+          <a:bodyPr/>
+          <a:lstStyle/>
+          <a:p>
+            <a:r>
+              <a:rPr lang="en-US" dirty="0" smtClean="0"/>
+              <a:t>SENG696 </a:t>
+            </a:r>
+            <a:r>
+              <a:rPr lang="en-US" dirty="0"/>
+              <a:t>(Fall </a:t>
+            </a:r>
+            <a:r>
+              <a:rPr lang="en-US" dirty="0" smtClean="0"/>
+              <a:t>2021)</a:t>
+            </a:r>
+            <a:endParaRPr lang="en-US" altLang="ja-JP" dirty="0"/>
+          </a:p>
+        </p:txBody>
+      </p:sp>
+      <p:sp>
+        <p:nvSpPr>
+          <p:cNvPr id="6" name="Slide Number Placeholder 5"/>
+          <p:cNvSpPr>
+            <a:spLocks noGrp="1"/>
+          </p:cNvSpPr>
+          <p:nvPr>
+            <p:ph type="sldNum" sz="quarter" idx="12"/>
+          </p:nvPr>
+        </p:nvSpPr>
+        <p:spPr/>
+        <p:txBody>
+          <a:bodyPr/>
+          <a:lstStyle/>
+          <a:p>
+            <a:fld id="{A4BAB868-1E00-44C6-B1AB-DFCC5F9865BA}" type="slidenum">
+              <a:rPr lang="ja-JP" altLang="en-US" smtClean="0"/>
+              <a:t>27</a:t>
+            </a:fld>
+            <a:endParaRPr lang="en-US" altLang="ja-JP"/>
+          </a:p>
+        </p:txBody>
+      </p:sp>
+      <p:pic>
+        <p:nvPicPr>
+          <p:cNvPr id="5" name="Picture 4"/>
+          <p:cNvPicPr>
+            <a:picLocks noChangeAspect="1"/>
+          </p:cNvPicPr>
+          <p:nvPr/>
+        </p:nvPicPr>
+        <p:blipFill>
+          <a:blip r:embed="rId2"/>
+          <a:stretch>
+            <a:fillRect/>
+          </a:stretch>
+        </p:blipFill>
+        <p:spPr>
+          <a:xfrm>
+            <a:off x="1716541" y="1567543"/>
+            <a:ext cx="9629775" cy="4464004"/>
+          </a:xfrm>
+          <a:prstGeom prst="rect">
+            <a:avLst/>
+          </a:prstGeom>
+        </p:spPr>
+      </p:pic>
+    </p:spTree>
+    <p:extLst>
+      <p:ext uri="{BB962C8B-B14F-4D97-AF65-F5344CB8AC3E}">
+        <p14:creationId xmlns:p14="http://schemas.microsoft.com/office/powerpoint/2010/main" val="2083541549"/>
+      </p:ext>
+    </p:extLst>
+  </p:cSld>
+  <p:clrMapOvr>
+    <a:masterClrMapping/>
+  </p:clrMapOvr>
+  <p:transition>
+    <p:dissolve/>
+  </p:transition>
+  <p:timing>
+    <p:tnLst>
+      <p:par>
+        <p:cTn id="1" dur="indefinite" restart="never" nodeType="tmRoot"/>
+      </p:par>
+    </p:tnLst>
+  </p:timing>
+</p:sld>
+</file>
+
+<file path=ppt/slides/slide28.xml><?xml version="1.0" encoding="utf-8"?>
+<p:sld xmlns:a="http://schemas.openxmlformats.org/drawingml/2006/main" xmlns:r="http://schemas.openxmlformats.org/officeDocument/2006/relationships" xmlns:p="http://schemas.openxmlformats.org/presentationml/2006/main">
+  <p:cSld>
+    <p:spTree>
+      <p:nvGrpSpPr>
+        <p:cNvPr id="1" name=""/>
+        <p:cNvGrpSpPr/>
+        <p:nvPr/>
+      </p:nvGrpSpPr>
+      <p:grpSpPr>
+        <a:xfrm>
+          <a:off x="0" y="0"/>
+          <a:ext cx="0" cy="0"/>
+          <a:chOff x="0" y="0"/>
+          <a:chExt cx="0" cy="0"/>
+        </a:xfrm>
+      </p:grpSpPr>
+      <p:sp>
+        <p:nvSpPr>
+          <p:cNvPr id="2" name="Title 1"/>
+          <p:cNvSpPr>
+            <a:spLocks noGrp="1"/>
+          </p:cNvSpPr>
+          <p:nvPr>
+            <p:ph type="title"/>
+          </p:nvPr>
+        </p:nvSpPr>
+        <p:spPr/>
+        <p:txBody>
+          <a:bodyPr/>
+          <a:lstStyle/>
+          <a:p>
+            <a:r>
+              <a:rPr lang="en-CA" dirty="0" smtClean="0"/>
+              <a:t>Typical Data Definition</a:t>
+            </a:r>
+            <a:endParaRPr lang="en-CA" dirty="0"/>
+          </a:p>
+        </p:txBody>
+      </p:sp>
+      <p:sp>
+        <p:nvSpPr>
+          <p:cNvPr id="4" name="Date Placeholder 3"/>
+          <p:cNvSpPr>
+            <a:spLocks noGrp="1"/>
+          </p:cNvSpPr>
+          <p:nvPr>
+            <p:ph type="dt" sz="half" idx="10"/>
+          </p:nvPr>
+        </p:nvSpPr>
+        <p:spPr/>
+        <p:txBody>
+          <a:bodyPr/>
+          <a:lstStyle/>
+          <a:p>
+            <a:r>
+              <a:rPr lang="en-US" dirty="0" smtClean="0"/>
+              <a:t>SENG696 </a:t>
+            </a:r>
+            <a:r>
+              <a:rPr lang="en-US" dirty="0"/>
+              <a:t>(Fall </a:t>
+            </a:r>
+            <a:r>
+              <a:rPr lang="en-US" dirty="0" smtClean="0"/>
+              <a:t>2021)</a:t>
+            </a:r>
+            <a:endParaRPr lang="en-US" altLang="ja-JP" dirty="0"/>
+          </a:p>
+        </p:txBody>
+      </p:sp>
+      <p:sp>
+        <p:nvSpPr>
+          <p:cNvPr id="6" name="Slide Number Placeholder 5"/>
+          <p:cNvSpPr>
+            <a:spLocks noGrp="1"/>
+          </p:cNvSpPr>
+          <p:nvPr>
+            <p:ph type="sldNum" sz="quarter" idx="12"/>
+          </p:nvPr>
+        </p:nvSpPr>
+        <p:spPr/>
+        <p:txBody>
+          <a:bodyPr/>
+          <a:lstStyle/>
+          <a:p>
+            <a:fld id="{A4BAB868-1E00-44C6-B1AB-DFCC5F9865BA}" type="slidenum">
+              <a:rPr lang="ja-JP" altLang="en-US" smtClean="0"/>
+              <a:t>28</a:t>
+            </a:fld>
+            <a:endParaRPr lang="en-US" altLang="ja-JP"/>
+          </a:p>
+        </p:txBody>
+      </p:sp>
+      <p:sp>
+        <p:nvSpPr>
+          <p:cNvPr id="3" name="TextBox 2"/>
+          <p:cNvSpPr txBox="1"/>
+          <p:nvPr/>
+        </p:nvSpPr>
+        <p:spPr>
+          <a:xfrm>
+            <a:off x="1219200" y="1541417"/>
+            <a:ext cx="10075817" cy="923330"/>
+          </a:xfrm>
+          <a:prstGeom prst="rect">
+            <a:avLst/>
+          </a:prstGeom>
+          <a:noFill/>
+        </p:spPr>
+        <p:txBody>
+          <a:bodyPr wrap="square" rtlCol="0">
+            <a:spAutoFit/>
+          </a:bodyPr>
+          <a:lstStyle/>
+          <a:p>
+            <a:r>
+              <a:rPr lang="en-US" b="1" i="1" dirty="0" smtClean="0">
+                <a:solidFill>
+                  <a:srgbClr val="00B050"/>
+                </a:solidFill>
+              </a:rPr>
+              <a:t>Appointment</a:t>
+            </a:r>
+            <a:r>
+              <a:rPr lang="en-US" i="1" dirty="0" smtClean="0">
+                <a:solidFill>
+                  <a:srgbClr val="00B050"/>
+                </a:solidFill>
+              </a:rPr>
+              <a:t>: </a:t>
+            </a:r>
+            <a:r>
+              <a:rPr lang="en-US" dirty="0" smtClean="0"/>
+              <a:t>The appointment details(including Pet’s Symptoms and other client details) are stored in this table. This table also contains the appointment specific information such as criticality and feedback details. The table is used to keep track of the owner’s email, phone number and appointment status as well.</a:t>
+            </a:r>
+            <a:endParaRPr lang="en-IN" i="1" dirty="0"/>
+          </a:p>
+        </p:txBody>
+      </p:sp>
+      <p:pic>
+        <p:nvPicPr>
+          <p:cNvPr id="7" name="Picture 6"/>
+          <p:cNvPicPr>
+            <a:picLocks noChangeAspect="1"/>
+          </p:cNvPicPr>
+          <p:nvPr/>
+        </p:nvPicPr>
+        <p:blipFill>
+          <a:blip r:embed="rId2"/>
+          <a:stretch>
+            <a:fillRect/>
+          </a:stretch>
+        </p:blipFill>
+        <p:spPr>
+          <a:xfrm>
+            <a:off x="2953157" y="2602814"/>
+            <a:ext cx="6089243" cy="3403121"/>
+          </a:xfrm>
+          <a:prstGeom prst="rect">
+            <a:avLst/>
+          </a:prstGeom>
+        </p:spPr>
+      </p:pic>
+    </p:spTree>
+    <p:extLst>
+      <p:ext uri="{BB962C8B-B14F-4D97-AF65-F5344CB8AC3E}">
+        <p14:creationId xmlns:p14="http://schemas.microsoft.com/office/powerpoint/2010/main" val="1321232463"/>
+      </p:ext>
+    </p:extLst>
+  </p:cSld>
+  <p:clrMapOvr>
+    <a:masterClrMapping/>
+  </p:clrMapOvr>
+  <p:transition>
+    <p:dissolve/>
+  </p:transition>
+  <p:timing>
+    <p:tnLst>
+      <p:par>
+        <p:cTn id="1" dur="indefinite" restart="never" nodeType="tmRoot"/>
+      </p:par>
+    </p:tnLst>
+  </p:timing>
+</p:sld>
+</file>
+
+<file path=ppt/slides/slide29.xml><?xml version="1.0" encoding="utf-8"?>
+<p:sld xmlns:a="http://schemas.openxmlformats.org/drawingml/2006/main" xmlns:r="http://schemas.openxmlformats.org/officeDocument/2006/relationships" xmlns:p="http://schemas.openxmlformats.org/presentationml/2006/main">
+  <p:cSld>
+    <p:spTree>
+      <p:nvGrpSpPr>
+        <p:cNvPr id="1" name=""/>
+        <p:cNvGrpSpPr/>
+        <p:nvPr/>
+      </p:nvGrpSpPr>
+      <p:grpSpPr>
+        <a:xfrm>
+          <a:off x="0" y="0"/>
+          <a:ext cx="0" cy="0"/>
+          <a:chOff x="0" y="0"/>
+          <a:chExt cx="0" cy="0"/>
+        </a:xfrm>
+      </p:grpSpPr>
+      <p:sp>
+        <p:nvSpPr>
+          <p:cNvPr id="2" name="Title 1"/>
+          <p:cNvSpPr>
+            <a:spLocks noGrp="1"/>
+          </p:cNvSpPr>
+          <p:nvPr>
+            <p:ph type="title"/>
+          </p:nvPr>
+        </p:nvSpPr>
+        <p:spPr/>
+        <p:txBody>
+          <a:bodyPr/>
+          <a:lstStyle/>
+          <a:p>
+            <a:r>
+              <a:rPr lang="en-CA" dirty="0" smtClean="0"/>
+              <a:t>Typical Data Definition(contd.)</a:t>
+            </a:r>
+            <a:endParaRPr lang="en-CA" dirty="0"/>
+          </a:p>
+        </p:txBody>
+      </p:sp>
+      <p:sp>
+        <p:nvSpPr>
+          <p:cNvPr id="4" name="Date Placeholder 3"/>
+          <p:cNvSpPr>
+            <a:spLocks noGrp="1"/>
+          </p:cNvSpPr>
+          <p:nvPr>
+            <p:ph type="dt" sz="half" idx="10"/>
+          </p:nvPr>
+        </p:nvSpPr>
+        <p:spPr/>
+        <p:txBody>
+          <a:bodyPr/>
+          <a:lstStyle/>
+          <a:p>
+            <a:r>
+              <a:rPr lang="en-US" dirty="0" smtClean="0"/>
+              <a:t>SENG696 </a:t>
+            </a:r>
+            <a:r>
+              <a:rPr lang="en-US" dirty="0"/>
+              <a:t>(Fall </a:t>
+            </a:r>
+            <a:r>
+              <a:rPr lang="en-US" dirty="0" smtClean="0"/>
+              <a:t>2021)</a:t>
+            </a:r>
+            <a:endParaRPr lang="en-US" altLang="ja-JP" dirty="0"/>
+          </a:p>
+        </p:txBody>
+      </p:sp>
+      <p:sp>
+        <p:nvSpPr>
+          <p:cNvPr id="6" name="Slide Number Placeholder 5"/>
+          <p:cNvSpPr>
+            <a:spLocks noGrp="1"/>
+          </p:cNvSpPr>
+          <p:nvPr>
+            <p:ph type="sldNum" sz="quarter" idx="12"/>
+          </p:nvPr>
+        </p:nvSpPr>
+        <p:spPr/>
+        <p:txBody>
+          <a:bodyPr/>
+          <a:lstStyle/>
+          <a:p>
+            <a:fld id="{A4BAB868-1E00-44C6-B1AB-DFCC5F9865BA}" type="slidenum">
+              <a:rPr lang="ja-JP" altLang="en-US" smtClean="0"/>
+              <a:t>29</a:t>
+            </a:fld>
+            <a:endParaRPr lang="en-US" altLang="ja-JP"/>
+          </a:p>
+        </p:txBody>
+      </p:sp>
+      <p:sp>
+        <p:nvSpPr>
+          <p:cNvPr id="3" name="TextBox 2"/>
+          <p:cNvSpPr txBox="1"/>
+          <p:nvPr/>
+        </p:nvSpPr>
+        <p:spPr>
+          <a:xfrm>
+            <a:off x="1219200" y="1541417"/>
+            <a:ext cx="10075817" cy="646331"/>
+          </a:xfrm>
+          <a:prstGeom prst="rect">
+            <a:avLst/>
+          </a:prstGeom>
+          <a:noFill/>
+        </p:spPr>
+        <p:txBody>
+          <a:bodyPr wrap="square" rtlCol="0">
+            <a:spAutoFit/>
+          </a:bodyPr>
+          <a:lstStyle/>
+          <a:p>
+            <a:r>
+              <a:rPr lang="en-US" b="1" i="1" dirty="0" smtClean="0">
+                <a:solidFill>
+                  <a:srgbClr val="00B050"/>
+                </a:solidFill>
+              </a:rPr>
+              <a:t>Client</a:t>
+            </a:r>
+            <a:r>
+              <a:rPr lang="en-US" i="1" dirty="0" smtClean="0">
+                <a:solidFill>
+                  <a:srgbClr val="00B050"/>
+                </a:solidFill>
+              </a:rPr>
+              <a:t>: </a:t>
+            </a:r>
+            <a:r>
+              <a:rPr lang="en-US" dirty="0" smtClean="0"/>
+              <a:t>The client details(name, contact, username, password, etc.) are stored in this table. The table is used to keep track of the owner’s information and used to auto-populate the UI after he/she logs in.</a:t>
+            </a:r>
+            <a:endParaRPr lang="en-IN" i="1" dirty="0"/>
+          </a:p>
+        </p:txBody>
+      </p:sp>
+      <p:pic>
+        <p:nvPicPr>
+          <p:cNvPr id="5" name="Picture 4"/>
+          <p:cNvPicPr>
+            <a:picLocks noChangeAspect="1"/>
+          </p:cNvPicPr>
+          <p:nvPr/>
+        </p:nvPicPr>
+        <p:blipFill>
+          <a:blip r:embed="rId2"/>
+          <a:stretch>
+            <a:fillRect/>
+          </a:stretch>
+        </p:blipFill>
+        <p:spPr>
+          <a:xfrm>
+            <a:off x="3075077" y="2554500"/>
+            <a:ext cx="6147300" cy="3042852"/>
+          </a:xfrm>
+          <a:prstGeom prst="rect">
+            <a:avLst/>
+          </a:prstGeom>
+        </p:spPr>
+      </p:pic>
+    </p:spTree>
+    <p:extLst>
+      <p:ext uri="{BB962C8B-B14F-4D97-AF65-F5344CB8AC3E}">
+        <p14:creationId xmlns:p14="http://schemas.microsoft.com/office/powerpoint/2010/main" val="3272987397"/>
+      </p:ext>
+    </p:extLst>
+  </p:cSld>
+  <p:clrMapOvr>
+    <a:masterClrMapping/>
+  </p:clrMapOvr>
+  <p:transition>
+    <p:dissolve/>
+  </p:transition>
+  <p:timing>
+    <p:tnLst>
+      <p:par>
+        <p:cTn id="1" dur="indefinite" restart="never" nodeType="tmRoot"/>
+      </p:par>
+    </p:tnLst>
+  </p:timing>
+</p:sld>
+</file>
+
 <file path=ppt/slides/slide3.xml><?xml version="1.0" encoding="utf-8"?>
 <p:sld xmlns:a="http://schemas.openxmlformats.org/drawingml/2006/main" xmlns:r="http://schemas.openxmlformats.org/officeDocument/2006/relationships" xmlns:p="http://schemas.openxmlformats.org/presentationml/2006/main">
   <p:cSld>
@@ -11599,6 +12340,193 @@
   <p:transition>
     <p:dissolve/>
   </p:transition>
+</p:sld>
+</file>
+
+<file path=ppt/slides/slide30.xml><?xml version="1.0" encoding="utf-8"?>
+<p:sld xmlns:a="http://schemas.openxmlformats.org/drawingml/2006/main" xmlns:r="http://schemas.openxmlformats.org/officeDocument/2006/relationships" xmlns:p="http://schemas.openxmlformats.org/presentationml/2006/main">
+  <p:cSld>
+    <p:spTree>
+      <p:nvGrpSpPr>
+        <p:cNvPr id="1" name=""/>
+        <p:cNvGrpSpPr/>
+        <p:nvPr/>
+      </p:nvGrpSpPr>
+      <p:grpSpPr>
+        <a:xfrm>
+          <a:off x="0" y="0"/>
+          <a:ext cx="0" cy="0"/>
+          <a:chOff x="0" y="0"/>
+          <a:chExt cx="0" cy="0"/>
+        </a:xfrm>
+      </p:grpSpPr>
+      <p:sp>
+        <p:nvSpPr>
+          <p:cNvPr id="2" name="Title 1"/>
+          <p:cNvSpPr>
+            <a:spLocks noGrp="1"/>
+          </p:cNvSpPr>
+          <p:nvPr>
+            <p:ph type="title"/>
+          </p:nvPr>
+        </p:nvSpPr>
+        <p:spPr/>
+        <p:txBody>
+          <a:bodyPr/>
+          <a:lstStyle/>
+          <a:p>
+            <a:r>
+              <a:rPr lang="en-CA" dirty="0" smtClean="0"/>
+              <a:t>Typical Data Definition(contd.)</a:t>
+            </a:r>
+            <a:endParaRPr lang="en-CA" dirty="0"/>
+          </a:p>
+        </p:txBody>
+      </p:sp>
+      <p:sp>
+        <p:nvSpPr>
+          <p:cNvPr id="4" name="Date Placeholder 3"/>
+          <p:cNvSpPr>
+            <a:spLocks noGrp="1"/>
+          </p:cNvSpPr>
+          <p:nvPr>
+            <p:ph type="dt" sz="half" idx="10"/>
+          </p:nvPr>
+        </p:nvSpPr>
+        <p:spPr/>
+        <p:txBody>
+          <a:bodyPr/>
+          <a:lstStyle/>
+          <a:p>
+            <a:r>
+              <a:rPr lang="en-US" dirty="0" smtClean="0"/>
+              <a:t>SENG696 </a:t>
+            </a:r>
+            <a:r>
+              <a:rPr lang="en-US" dirty="0"/>
+              <a:t>(Fall </a:t>
+            </a:r>
+            <a:r>
+              <a:rPr lang="en-US" dirty="0" smtClean="0"/>
+              <a:t>2021)</a:t>
+            </a:r>
+            <a:endParaRPr lang="en-US" altLang="ja-JP" dirty="0"/>
+          </a:p>
+        </p:txBody>
+      </p:sp>
+      <p:sp>
+        <p:nvSpPr>
+          <p:cNvPr id="6" name="Slide Number Placeholder 5"/>
+          <p:cNvSpPr>
+            <a:spLocks noGrp="1"/>
+          </p:cNvSpPr>
+          <p:nvPr>
+            <p:ph type="sldNum" sz="quarter" idx="12"/>
+          </p:nvPr>
+        </p:nvSpPr>
+        <p:spPr/>
+        <p:txBody>
+          <a:bodyPr/>
+          <a:lstStyle/>
+          <a:p>
+            <a:fld id="{A4BAB868-1E00-44C6-B1AB-DFCC5F9865BA}" type="slidenum">
+              <a:rPr lang="ja-JP" altLang="en-US" smtClean="0"/>
+              <a:t>30</a:t>
+            </a:fld>
+            <a:endParaRPr lang="en-US" altLang="ja-JP"/>
+          </a:p>
+        </p:txBody>
+      </p:sp>
+      <p:sp>
+        <p:nvSpPr>
+          <p:cNvPr id="3" name="TextBox 2"/>
+          <p:cNvSpPr txBox="1"/>
+          <p:nvPr/>
+        </p:nvSpPr>
+        <p:spPr>
+          <a:xfrm>
+            <a:off x="1219200" y="1558835"/>
+            <a:ext cx="10075817" cy="646331"/>
+          </a:xfrm>
+          <a:prstGeom prst="rect">
+            <a:avLst/>
+          </a:prstGeom>
+          <a:noFill/>
+        </p:spPr>
+        <p:txBody>
+          <a:bodyPr wrap="square" rtlCol="0">
+            <a:spAutoFit/>
+          </a:bodyPr>
+          <a:lstStyle/>
+          <a:p>
+            <a:r>
+              <a:rPr lang="en-US" b="1" i="1" dirty="0" smtClean="0">
+                <a:solidFill>
+                  <a:srgbClr val="00B050"/>
+                </a:solidFill>
+              </a:rPr>
+              <a:t>Doctor</a:t>
+            </a:r>
+            <a:r>
+              <a:rPr lang="en-US" i="1" dirty="0" smtClean="0">
+                <a:solidFill>
+                  <a:srgbClr val="00B050"/>
+                </a:solidFill>
+              </a:rPr>
+              <a:t>: </a:t>
+            </a:r>
+            <a:r>
+              <a:rPr lang="en-US" dirty="0" smtClean="0"/>
+              <a:t>The Doctor details(name, contact, specialty, username, password, etc.) are stored in this table. The table is used to keep track of the doctor’s information and used to auto-populate the UI after he/she logs in. </a:t>
+            </a:r>
+            <a:endParaRPr lang="en-IN" i="1" dirty="0"/>
+          </a:p>
+        </p:txBody>
+      </p:sp>
+      <p:pic>
+        <p:nvPicPr>
+          <p:cNvPr id="10" name="Picture 9"/>
+          <p:cNvPicPr>
+            <a:picLocks noChangeAspect="1"/>
+          </p:cNvPicPr>
+          <p:nvPr/>
+        </p:nvPicPr>
+        <p:blipFill>
+          <a:blip r:embed="rId2"/>
+          <a:stretch>
+            <a:fillRect/>
+          </a:stretch>
+        </p:blipFill>
+        <p:spPr>
+          <a:xfrm>
+            <a:off x="3008403" y="2360651"/>
+            <a:ext cx="6198091" cy="3407138"/>
+          </a:xfrm>
+          <a:prstGeom prst="rect">
+            <a:avLst/>
+          </a:prstGeom>
+        </p:spPr>
+      </p:pic>
+    </p:spTree>
+    <p:extLst>
+      <p:ext uri="{BB962C8B-B14F-4D97-AF65-F5344CB8AC3E}">
+        <p14:creationId xmlns:p14="http://schemas.microsoft.com/office/powerpoint/2010/main" val="3238899533"/>
+      </p:ext>
+    </p:extLst>
+  </p:cSld>
+  <p:clrMapOvr>
+    <a:masterClrMapping/>
+  </p:clrMapOvr>
+  <p:transition>
+    <p:dissolve/>
+  </p:transition>
+  <p:timing>
+    <p:tnLst>
+      <p:par>
+        <p:cTn id="1" dur="indefinite" restart="never" nodeType="tmRoot"/>
+      </p:par>
+    </p:tnLst>
+  </p:timing>
 </p:sld>
 </file>
 
@@ -12546,7 +13474,25 @@
                 <a:ea typeface="Calibri" panose="020F0502020204030204" pitchFamily="34" charset="0"/>
                 <a:cs typeface="Times New Roman" panose="02020503050405090304" pitchFamily="18" charset="0"/>
               </a:rPr>
-              <a:t>The clinic system agent accesses the request sent by the patient(user) through the web interface. In our Architecture the clinic system agent handles the correspondence with all the other agents and in this way, which acts as a central hub.</a:t>
+              <a:t>The clinic system agent accesses the request sent by the patient(user) through the web interface. In our Architecture the clinic system agent handles the correspondence with all the other </a:t>
+            </a:r>
+            <a:r>
+              <a:rPr lang="en-US" sz="1800" dirty="0" smtClean="0">
+                <a:effectLst/>
+                <a:latin typeface="Calibri" panose="020F0502020204030204" pitchFamily="34" charset="0"/>
+                <a:ea typeface="Calibri" panose="020F0502020204030204" pitchFamily="34" charset="0"/>
+                <a:cs typeface="Times New Roman" panose="02020503050405090304" pitchFamily="18" charset="0"/>
+              </a:rPr>
+              <a:t>agents(as a mediator) </a:t>
+            </a:r>
+            <a:r>
+              <a:rPr lang="en-US" sz="1800" dirty="0">
+                <a:effectLst/>
+                <a:latin typeface="Calibri" panose="020F0502020204030204" pitchFamily="34" charset="0"/>
+                <a:ea typeface="Calibri" panose="020F0502020204030204" pitchFamily="34" charset="0"/>
+                <a:cs typeface="Times New Roman" panose="02020503050405090304" pitchFamily="18" charset="0"/>
+              </a:rPr>
+              <a:t>and in this way, which acts as a central hub.</a:t>
             </a:r>
             <a:endParaRPr lang="en-IN" sz="1800" dirty="0">
               <a:effectLst/>
@@ -12618,7 +13564,16 @@
                 <a:ea typeface="Calibri" panose="020F0502020204030204" pitchFamily="34" charset="0"/>
                 <a:cs typeface="Times New Roman" panose="02020503050405090304" pitchFamily="18" charset="0"/>
               </a:rPr>
-              <a:t>The clinic system agent also generates a request for the appointment agent to book an appointment whether it’s a first or a consecutive appointment.</a:t>
+              <a:t>The clinic system agent also generates a request for the appointment agent to book an appointment whether it’s a first or a consecutive appointment</a:t>
+            </a:r>
+            <a:r>
+              <a:rPr lang="en-US" sz="1800" dirty="0" smtClean="0">
+                <a:effectLst/>
+                <a:latin typeface="Calibri" panose="020F0502020204030204" pitchFamily="34" charset="0"/>
+                <a:ea typeface="Calibri" panose="020F0502020204030204" pitchFamily="34" charset="0"/>
+                <a:cs typeface="Times New Roman" panose="02020503050405090304" pitchFamily="18" charset="0"/>
+              </a:rPr>
+              <a:t>. It also helps to update and cancel an appointment.</a:t>
             </a:r>
             <a:endParaRPr lang="en-IN" sz="1800" dirty="0">
               <a:effectLst/>
@@ -12642,7 +13597,25 @@
                 <a:ea typeface="Calibri" panose="020F0502020204030204" pitchFamily="34" charset="0"/>
                 <a:cs typeface="Times New Roman" panose="02020503050405090304" pitchFamily="18" charset="0"/>
               </a:rPr>
-              <a:t>The clinic system agent also triggers the reminder agent to remind the patient about the appointments at some given times.</a:t>
+              <a:t>The clinic system agent also triggers the </a:t>
+            </a:r>
+            <a:r>
+              <a:rPr lang="en-US" sz="1800" dirty="0" smtClean="0">
+                <a:effectLst/>
+                <a:latin typeface="Calibri" panose="020F0502020204030204" pitchFamily="34" charset="0"/>
+                <a:ea typeface="Calibri" panose="020F0502020204030204" pitchFamily="34" charset="0"/>
+                <a:cs typeface="Times New Roman" panose="02020503050405090304" pitchFamily="18" charset="0"/>
+              </a:rPr>
+              <a:t>Notification </a:t>
+            </a:r>
+            <a:r>
+              <a:rPr lang="en-US" sz="1800" dirty="0">
+                <a:effectLst/>
+                <a:latin typeface="Calibri" panose="020F0502020204030204" pitchFamily="34" charset="0"/>
+                <a:ea typeface="Calibri" panose="020F0502020204030204" pitchFamily="34" charset="0"/>
+                <a:cs typeface="Times New Roman" panose="02020503050405090304" pitchFamily="18" charset="0"/>
+              </a:rPr>
+              <a:t>agent to remind the patient about the appointments at some given times.</a:t>
             </a:r>
             <a:endParaRPr lang="en-IN" sz="1800" dirty="0">
               <a:effectLst/>
@@ -12669,7 +13642,25 @@
                 <a:ea typeface="Calibri" panose="020F0502020204030204" pitchFamily="34" charset="0"/>
                 <a:cs typeface="Times New Roman" panose="02020503050405090304" pitchFamily="18" charset="0"/>
               </a:rPr>
-              <a:t>The clinic system agent also requests template agent to generate the required template once the physician had completed the session with the patient.</a:t>
+              <a:t>The clinic system agent also requests </a:t>
+            </a:r>
+            <a:r>
+              <a:rPr lang="en-US" sz="1800" dirty="0" smtClean="0">
+                <a:effectLst/>
+                <a:latin typeface="Calibri" panose="020F0502020204030204" pitchFamily="34" charset="0"/>
+                <a:ea typeface="Calibri" panose="020F0502020204030204" pitchFamily="34" charset="0"/>
+                <a:cs typeface="Times New Roman" panose="02020503050405090304" pitchFamily="18" charset="0"/>
+              </a:rPr>
+              <a:t>template(PDF) </a:t>
+            </a:r>
+            <a:r>
+              <a:rPr lang="en-US" sz="1800" dirty="0">
+                <a:effectLst/>
+                <a:latin typeface="Calibri" panose="020F0502020204030204" pitchFamily="34" charset="0"/>
+                <a:ea typeface="Calibri" panose="020F0502020204030204" pitchFamily="34" charset="0"/>
+                <a:cs typeface="Times New Roman" panose="02020503050405090304" pitchFamily="18" charset="0"/>
+              </a:rPr>
+              <a:t>agent to generate the required template once the physician had completed the session with the patient.</a:t>
             </a:r>
             <a:endParaRPr lang="en-IN" sz="1800" dirty="0">
               <a:effectLst/>
@@ -12703,8 +13694,16 @@
           <a:lstStyle/>
           <a:p>
             <a:r>
+              <a:rPr lang="en-US" dirty="0" smtClean="0"/>
+              <a:t>SENG696 </a:t>
+            </a:r>
+            <a:r>
               <a:rPr lang="en-US" dirty="0"/>
-              <a:t>SENG696 (Fall 2021)</a:t>
+              <a:t>(Fall </a:t>
+            </a:r>
+            <a:r>
+              <a:rPr lang="en-US" dirty="0" smtClean="0"/>
+              <a:t>2021)</a:t>
             </a:r>
             <a:endParaRPr lang="en-US" altLang="ja-JP" dirty="0"/>
           </a:p>
@@ -12734,6 +13733,11 @@
         </p:txBody>
       </p:sp>
     </p:spTree>
+    <p:extLst>
+      <p:ext uri="{BB962C8B-B14F-4D97-AF65-F5344CB8AC3E}">
+        <p14:creationId xmlns:p14="http://schemas.microsoft.com/office/powerpoint/2010/main" val="1254710924"/>
+      </p:ext>
+    </p:extLst>
   </p:cSld>
   <p:clrMapOvr>
     <a:masterClrMapping/>
@@ -12915,7 +13919,61 @@
                 <a:ea typeface="Calibri" panose="020F0502020204030204" pitchFamily="34" charset="0"/>
                 <a:cs typeface="Times New Roman" panose="02020503050405090304" pitchFamily="18" charset="0"/>
               </a:rPr>
-              <a:t>The appointment agent will also interact with the clinic system agent to activate the signal regarding the reminder. The Reminder agent then will remind the patient when the appointment is due.</a:t>
+              <a:t>The appointment agent will also interact with the </a:t>
+            </a:r>
+            <a:r>
+              <a:rPr lang="en-US" sz="1800" dirty="0" smtClean="0">
+                <a:latin typeface="Calibri" panose="020F0502020204030204" pitchFamily="34" charset="0"/>
+                <a:ea typeface="Calibri" panose="020F0502020204030204" pitchFamily="34" charset="0"/>
+                <a:cs typeface="Times New Roman" panose="02020503050405090304" pitchFamily="18" charset="0"/>
+              </a:rPr>
+              <a:t>notification</a:t>
+            </a:r>
+            <a:r>
+              <a:rPr lang="en-US" sz="1800" dirty="0" smtClean="0">
+                <a:effectLst/>
+                <a:latin typeface="Calibri" panose="020F0502020204030204" pitchFamily="34" charset="0"/>
+                <a:ea typeface="Calibri" panose="020F0502020204030204" pitchFamily="34" charset="0"/>
+                <a:cs typeface="Times New Roman" panose="02020503050405090304" pitchFamily="18" charset="0"/>
+              </a:rPr>
+              <a:t> </a:t>
+            </a:r>
+            <a:r>
+              <a:rPr lang="en-US" sz="1800" dirty="0">
+                <a:effectLst/>
+                <a:latin typeface="Calibri" panose="020F0502020204030204" pitchFamily="34" charset="0"/>
+                <a:ea typeface="Calibri" panose="020F0502020204030204" pitchFamily="34" charset="0"/>
+                <a:cs typeface="Times New Roman" panose="02020503050405090304" pitchFamily="18" charset="0"/>
+              </a:rPr>
+              <a:t>agent to </a:t>
+            </a:r>
+            <a:r>
+              <a:rPr lang="en-US" sz="1800" dirty="0" smtClean="0">
+                <a:effectLst/>
+                <a:latin typeface="Calibri" panose="020F0502020204030204" pitchFamily="34" charset="0"/>
+                <a:ea typeface="Calibri" panose="020F0502020204030204" pitchFamily="34" charset="0"/>
+                <a:cs typeface="Times New Roman" panose="02020503050405090304" pitchFamily="18" charset="0"/>
+              </a:rPr>
+              <a:t>signal the sending of SMS and Email notifying the pet-owner. </a:t>
+            </a:r>
+          </a:p>
+          <a:p>
+            <a:pPr>
+              <a:lnSpc>
+                <a:spcPct val="107000"/>
+              </a:lnSpc>
+              <a:spcAft>
+                <a:spcPts val="800"/>
+              </a:spcAft>
+            </a:pPr>
+            <a:r>
+              <a:rPr lang="en-US" sz="1800" dirty="0" smtClean="0">
+                <a:effectLst/>
+                <a:latin typeface="Calibri" panose="020F0502020204030204" pitchFamily="34" charset="0"/>
+                <a:ea typeface="Calibri" panose="020F0502020204030204" pitchFamily="34" charset="0"/>
+                <a:cs typeface="Times New Roman" panose="02020503050405090304" pitchFamily="18" charset="0"/>
+              </a:rPr>
+              <a:t>This agent communicates with the video agent to share a video link for use during the online consultation.</a:t>
             </a:r>
             <a:endParaRPr lang="en-IN" sz="1800" dirty="0">
               <a:effectLst/>
@@ -12945,8 +14003,16 @@
           <a:lstStyle/>
           <a:p>
             <a:r>
+              <a:rPr lang="en-US" dirty="0" smtClean="0"/>
+              <a:t>SENG696 </a:t>
+            </a:r>
+            <a:r>
               <a:rPr lang="en-US" dirty="0"/>
-              <a:t>SENG696 (Fall 2021)</a:t>
+              <a:t>(Fall </a:t>
+            </a:r>
+            <a:r>
+              <a:rPr lang="en-US" dirty="0" smtClean="0"/>
+              <a:t>2021)</a:t>
             </a:r>
             <a:endParaRPr lang="en-US" altLang="ja-JP" dirty="0"/>
           </a:p>
@@ -12976,6 +14042,11 @@
         </p:txBody>
       </p:sp>
     </p:spTree>
+    <p:extLst>
+      <p:ext uri="{BB962C8B-B14F-4D97-AF65-F5344CB8AC3E}">
+        <p14:creationId xmlns:p14="http://schemas.microsoft.com/office/powerpoint/2010/main" val="2466213237"/>
+      </p:ext>
+    </p:extLst>
   </p:cSld>
   <p:clrMapOvr>
     <a:masterClrMapping/>

</xml_diff>

<commit_message>
Updated ER Diagram and other slides
</commit_message>
<xml_diff>
--- a/GroupD_ProjectPresentation.pptx
+++ b/GroupD_ProjectPresentation.pptx
@@ -12,10 +12,10 @@
     <p:sldId id="262" r:id="rId6"/>
     <p:sldId id="264" r:id="rId7"/>
     <p:sldId id="265" r:id="rId8"/>
-    <p:sldId id="269" r:id="rId9"/>
-    <p:sldId id="270" r:id="rId10"/>
-    <p:sldId id="260" r:id="rId11"/>
-    <p:sldId id="263" r:id="rId12"/>
+    <p:sldId id="288" r:id="rId9"/>
+    <p:sldId id="289" r:id="rId10"/>
+    <p:sldId id="290" r:id="rId11"/>
+    <p:sldId id="291" r:id="rId12"/>
     <p:sldId id="271" r:id="rId13"/>
     <p:sldId id="266" r:id="rId14"/>
     <p:sldId id="267" r:id="rId15"/>
@@ -35,6 +35,10 @@
     <p:sldId id="276" r:id="rId29"/>
     <p:sldId id="281" r:id="rId30"/>
     <p:sldId id="282" r:id="rId31"/>
+    <p:sldId id="292" r:id="rId32"/>
+    <p:sldId id="293" r:id="rId33"/>
+    <p:sldId id="294" r:id="rId34"/>
+    <p:sldId id="295" r:id="rId35"/>
   </p:sldIdLst>
   <p:sldSz cx="12192000" cy="6858000"/>
   <p:notesSz cx="6858000" cy="9144000"/>
@@ -4132,6 +4136,16 @@
               </a:spcAft>
             </a:pPr>
             <a:r>
+              <a:rPr lang="en-US" dirty="0" smtClean="0">
+                <a:solidFill>
+                  <a:srgbClr val="000000"/>
+                </a:solidFill>
+                <a:latin typeface="Tahoma" panose="020B0604030504040204" pitchFamily="34" charset="0"/>
+                <a:ea typeface="MS PGothic" pitchFamily="50" charset="-128"/>
+              </a:rPr>
+              <a:t>SENG696 </a:t>
+            </a:r>
+            <a:r>
               <a:rPr lang="en-US" dirty="0">
                 <a:solidFill>
                   <a:srgbClr val="000000"/>
@@ -4139,7 +4153,17 @@
                 <a:latin typeface="Tahoma" panose="020B0604030504040204" pitchFamily="34" charset="0"/>
                 <a:ea typeface="MS PGothic" pitchFamily="50" charset="-128"/>
               </a:rPr>
-              <a:t>SENG696 (Fall 2021)</a:t>
+              <a:t>(Fall </a:t>
+            </a:r>
+            <a:r>
+              <a:rPr lang="en-US" dirty="0" smtClean="0">
+                <a:solidFill>
+                  <a:srgbClr val="000000"/>
+                </a:solidFill>
+                <a:latin typeface="Tahoma" panose="020B0604030504040204" pitchFamily="34" charset="0"/>
+                <a:ea typeface="MS PGothic" pitchFamily="50" charset="-128"/>
+              </a:rPr>
+              <a:t>2021)</a:t>
             </a:r>
             <a:endParaRPr lang="en-US" altLang="ja-JP" dirty="0">
               <a:solidFill>
@@ -4244,6 +4268,19 @@
               <a:buNone/>
             </a:pPr>
             <a:r>
+              <a:rPr lang="en-US" sz="2000" b="1" i="1" dirty="0" smtClean="0">
+                <a:solidFill>
+                  <a:srgbClr val="D60093"/>
+                </a:solidFill>
+                <a:effectLst>
+                  <a:outerShdw blurRad="38100" dist="38100" dir="2700000" algn="tl">
+                    <a:srgbClr val="C0C0C0"/>
+                  </a:outerShdw>
+                </a:effectLst>
+              </a:rPr>
+              <a:t>Reminder(Notification) </a:t>
+            </a:r>
+            <a:r>
               <a:rPr lang="en-US" sz="2000" b="1" i="1" dirty="0">
                 <a:solidFill>
                   <a:srgbClr val="D60093"/>
@@ -4254,7 +4291,7 @@
                   </a:outerShdw>
                 </a:effectLst>
               </a:rPr>
-              <a:t>Reminder Agent</a:t>
+              <a:t>Agent</a:t>
             </a:r>
           </a:p>
           <a:p>
@@ -4285,8 +4322,32 @@
               <a:buChar char="§"/>
             </a:pPr>
             <a:r>
-              <a:rPr lang="en-CA" sz="1600" dirty="0"/>
-              <a:t>The Reminder Agent communicates with the Clinic Agent, by waiting for its signals after an appointment is booked. If the user has activated reminders at the time of booking an appointment, the Reminder Agent would be sending automated SMS messages and e-mail notifications to the user on his/her registered e-mail account and mobile number. </a:t>
+              <a:rPr lang="en-CA" sz="1700" dirty="0"/>
+              <a:t>The </a:t>
+            </a:r>
+            <a:r>
+              <a:rPr lang="en-CA" sz="1700" dirty="0" smtClean="0"/>
+              <a:t>Notification </a:t>
+            </a:r>
+            <a:r>
+              <a:rPr lang="en-CA" sz="1700" dirty="0"/>
+              <a:t>Agent communicates with the Clinic </a:t>
+            </a:r>
+            <a:r>
+              <a:rPr lang="en-CA" sz="1700" dirty="0" smtClean="0"/>
+              <a:t>Agent </a:t>
+            </a:r>
+            <a:r>
+              <a:rPr lang="en-CA" sz="1700" dirty="0"/>
+              <a:t>at the time of booking an appointment, the Reminder Agent would be sending automated SMS messages and </a:t>
+            </a:r>
+            <a:r>
+              <a:rPr lang="en-CA" sz="1700" dirty="0" smtClean="0"/>
+              <a:t>E-mail </a:t>
+            </a:r>
+            <a:r>
+              <a:rPr lang="en-CA" sz="1700" dirty="0"/>
+              <a:t>notifications to the user on his/her registered e-mail account and mobile number. </a:t>
             </a:r>
           </a:p>
           <a:p>
@@ -4298,8 +4359,16 @@
               <a:buChar char="§"/>
             </a:pPr>
             <a:r>
-              <a:rPr lang="en-CA" sz="1600" dirty="0"/>
-              <a:t>Instead of a receptionist logging in every time to trigger a reminder, the Agent by itself sends the message at regular intervals(hours/days) as chosen by the user.</a:t>
+              <a:rPr lang="en-CA" sz="1700" dirty="0"/>
+              <a:t>Instead of a receptionist logging in every time to trigger a reminder, the Agent by itself sends the message at regular </a:t>
+            </a:r>
+            <a:r>
+              <a:rPr lang="en-CA" sz="1700" dirty="0" smtClean="0"/>
+              <a:t>intervals as </a:t>
+            </a:r>
+            <a:r>
+              <a:rPr lang="en-CA" sz="1700" dirty="0"/>
+              <a:t>chosen by the user.</a:t>
             </a:r>
           </a:p>
           <a:p>
@@ -4311,7 +4380,7 @@
               <a:buChar char="§"/>
             </a:pPr>
             <a:r>
-              <a:rPr lang="en-CA" sz="1600" dirty="0"/>
+              <a:rPr lang="en-CA" sz="1700" dirty="0"/>
               <a:t>In case the appointment is cancelled or updated, the Reminder Agent also intelligently updates the text message and sends an updated notification to the user. </a:t>
             </a:r>
           </a:p>
@@ -4324,8 +4393,16 @@
               <a:buChar char="§"/>
             </a:pPr>
             <a:r>
-              <a:rPr lang="en-CA" sz="1600" dirty="0"/>
-              <a:t>Once the appointment is complete, the Reminder Agent directly accesses the database to disable the alerting mechanism for that appointment. </a:t>
+              <a:rPr lang="en-CA" sz="1700" dirty="0"/>
+              <a:t>Once the appointment is complete, the Reminder Agent directly accesses the database to </a:t>
+            </a:r>
+            <a:r>
+              <a:rPr lang="en-CA" sz="1700" dirty="0" smtClean="0"/>
+              <a:t>update </a:t>
+            </a:r>
+            <a:r>
+              <a:rPr lang="en-CA" sz="1700" dirty="0"/>
+              <a:t>the alerting mechanism for that particular appointment. </a:t>
             </a:r>
           </a:p>
           <a:p>
@@ -4337,7 +4414,7 @@
               <a:buChar char="§"/>
             </a:pPr>
             <a:r>
-              <a:rPr lang="en-CA" sz="1600" dirty="0"/>
+              <a:rPr lang="en-CA" sz="1700" dirty="0"/>
               <a:t>In order to check if the registered email/phone number is valid, the Reminder Agent will trigger an acknowledgement  message at the time of booking the appointment. Subsequently, the other reminder messages will be forwarded in due course.</a:t>
             </a:r>
           </a:p>
@@ -4350,34 +4427,31 @@
               <a:buChar char="§"/>
             </a:pPr>
             <a:r>
-              <a:rPr lang="en-CA" sz="1600" dirty="0"/>
-              <a:t>The Reminder Agent also triggers a notification once the report has been generated, based upon the feedback from the veterinarian. In this case, it will await signal from the Template Agent.</a:t>
-            </a:r>
-          </a:p>
-          <a:p>
-            <a:pPr>
-              <a:lnSpc>
-                <a:spcPct val="80000"/>
-              </a:lnSpc>
-              <a:buFont typeface="Wingdings" panose="05000000000000000000" pitchFamily="2" charset="2"/>
-              <a:buChar char="§"/>
-            </a:pPr>
-            <a:r>
-              <a:rPr lang="en-CA" sz="1600" dirty="0"/>
-              <a:t>The Agent will keep a track of all the reminders sent to a particular number in the database for tracking purposes.</a:t>
-            </a:r>
-          </a:p>
-          <a:p>
-            <a:pPr>
-              <a:lnSpc>
-                <a:spcPct val="80000"/>
-              </a:lnSpc>
-            </a:pPr>
-            <a:endParaRPr lang="en-CA" sz="1600" dirty="0"/>
+              <a:rPr lang="en-CA" sz="1700" dirty="0"/>
+              <a:t>The </a:t>
+            </a:r>
+            <a:r>
+              <a:rPr lang="en-CA" sz="1700" dirty="0" smtClean="0"/>
+              <a:t>Agent </a:t>
+            </a:r>
+            <a:r>
+              <a:rPr lang="en-CA" sz="1700" dirty="0"/>
+              <a:t>also triggers a notification once the report has been generated, based upon the feedback from the veterinarian. In this case, it will await signal from the Template Agent</a:t>
+            </a:r>
+            <a:r>
+              <a:rPr lang="en-CA" sz="1700" dirty="0" smtClean="0"/>
+              <a:t>.</a:t>
+            </a:r>
+            <a:endParaRPr lang="en-CA" sz="1700" dirty="0"/>
           </a:p>
         </p:txBody>
       </p:sp>
     </p:spTree>
+    <p:extLst>
+      <p:ext uri="{BB962C8B-B14F-4D97-AF65-F5344CB8AC3E}">
+        <p14:creationId xmlns:p14="http://schemas.microsoft.com/office/powerpoint/2010/main" val="1849926388"/>
+      </p:ext>
+    </p:extLst>
   </p:cSld>
   <p:clrMapOvr>
     <a:masterClrMapping/>
@@ -4451,6 +4525,19 @@
               <a:buNone/>
             </a:pPr>
             <a:r>
+              <a:rPr lang="en-US" sz="2400" b="1" i="1" dirty="0" smtClean="0">
+                <a:solidFill>
+                  <a:srgbClr val="D60093"/>
+                </a:solidFill>
+                <a:effectLst>
+                  <a:outerShdw blurRad="38100" dist="38100" dir="2700000" algn="tl">
+                    <a:srgbClr val="C0C0C0"/>
+                  </a:outerShdw>
+                </a:effectLst>
+              </a:rPr>
+              <a:t>Template(PDF) </a:t>
+            </a:r>
+            <a:r>
               <a:rPr lang="en-US" sz="2400" b="1" i="1" dirty="0">
                 <a:solidFill>
                   <a:srgbClr val="D60093"/>
@@ -4461,13 +4548,29 @@
                   </a:outerShdw>
                 </a:effectLst>
               </a:rPr>
-              <a:t>Template Agent</a:t>
+              <a:t>Agent</a:t>
             </a:r>
           </a:p>
           <a:p>
             <a:r>
               <a:rPr lang="en-US" sz="2400" dirty="0"/>
-              <a:t>The Template Agent provides the doctor with different letter templates. Depending upon the video interaction between the doctor and the patient, the doctor can select and use the in-built template to report their diagnosis.</a:t>
+              <a:t>The Template Agent provides the doctor with </a:t>
+            </a:r>
+            <a:r>
+              <a:rPr lang="en-US" sz="2400" dirty="0" smtClean="0"/>
+              <a:t>letter reports. </a:t>
+            </a:r>
+            <a:r>
+              <a:rPr lang="en-US" sz="2400" dirty="0"/>
+              <a:t>Depending upon the video interaction between the doctor and the patient, the doctor can select and use the in-built template to </a:t>
+            </a:r>
+            <a:r>
+              <a:rPr lang="en-US" sz="2400" dirty="0" smtClean="0"/>
+              <a:t>document </a:t>
+            </a:r>
+            <a:r>
+              <a:rPr lang="en-US" sz="2400" dirty="0"/>
+              <a:t>their diagnosis.</a:t>
             </a:r>
           </a:p>
           <a:p>
@@ -4479,8 +4582,13 @@
           <a:p>
             <a:r>
               <a:rPr lang="en-US" sz="2400" dirty="0"/>
-              <a:t>If the Template Agent receives a request from the Clinic System Agent, the doctor is requested to input their feedback. </a:t>
-            </a:r>
+              <a:t>If the Template Agent receives a request from the Clinic System Agent, the doctor is requested to input their </a:t>
+            </a:r>
+            <a:r>
+              <a:rPr lang="en-US" sz="2400" dirty="0" smtClean="0"/>
+              <a:t>feedback through mail. </a:t>
+            </a:r>
+            <a:endParaRPr lang="en-US" sz="2400" dirty="0"/>
           </a:p>
           <a:p>
             <a:r>
@@ -4507,8 +4615,16 @@
           <a:lstStyle/>
           <a:p>
             <a:r>
+              <a:rPr lang="en-US" dirty="0" smtClean="0"/>
+              <a:t>SENG696 </a:t>
+            </a:r>
+            <a:r>
               <a:rPr lang="en-US" dirty="0"/>
-              <a:t>SENG696 (Fall 2021)</a:t>
+              <a:t>(Fall </a:t>
+            </a:r>
+            <a:r>
+              <a:rPr lang="en-US" dirty="0" smtClean="0"/>
+              <a:t>2021)</a:t>
             </a:r>
             <a:endParaRPr lang="en-US" altLang="ja-JP" dirty="0"/>
           </a:p>
@@ -4538,6 +4654,11 @@
         </p:txBody>
       </p:sp>
     </p:spTree>
+    <p:extLst>
+      <p:ext uri="{BB962C8B-B14F-4D97-AF65-F5344CB8AC3E}">
+        <p14:creationId xmlns:p14="http://schemas.microsoft.com/office/powerpoint/2010/main" val="380988412"/>
+      </p:ext>
+    </p:extLst>
   </p:cSld>
   <p:clrMapOvr>
     <a:masterClrMapping/>
@@ -6815,7 +6936,7 @@
                         </a:spcAft>
                       </a:pPr>
                       <a:r>
-                        <a:rPr lang="en-IN" sz="1100">
+                        <a:rPr lang="en-IN" sz="1100" dirty="0">
                           <a:effectLst/>
                           <a:latin typeface="Calibri" panose="020F0502020204030204" pitchFamily="34" charset="0"/>
                           <a:ea typeface="Calibri" panose="020F0502020204030204" pitchFamily="34" charset="0"/>
@@ -20232,6 +20353,708 @@
 </p:sld>
 </file>
 
+<file path=ppt/slides/slide31.xml><?xml version="1.0" encoding="utf-8"?>
+<p:sld xmlns:a="http://schemas.openxmlformats.org/drawingml/2006/main" xmlns:r="http://schemas.openxmlformats.org/officeDocument/2006/relationships" xmlns:p="http://schemas.openxmlformats.org/presentationml/2006/main">
+  <p:cSld>
+    <p:spTree>
+      <p:nvGrpSpPr>
+        <p:cNvPr id="1" name=""/>
+        <p:cNvGrpSpPr/>
+        <p:nvPr/>
+      </p:nvGrpSpPr>
+      <p:grpSpPr>
+        <a:xfrm>
+          <a:off x="0" y="0"/>
+          <a:ext cx="0" cy="0"/>
+          <a:chOff x="0" y="0"/>
+          <a:chExt cx="0" cy="0"/>
+        </a:xfrm>
+      </p:grpSpPr>
+      <p:sp>
+        <p:nvSpPr>
+          <p:cNvPr id="2" name="Title 1"/>
+          <p:cNvSpPr>
+            <a:spLocks noGrp="1"/>
+          </p:cNvSpPr>
+          <p:nvPr>
+            <p:ph type="title"/>
+          </p:nvPr>
+        </p:nvSpPr>
+        <p:spPr/>
+        <p:txBody>
+          <a:bodyPr/>
+          <a:lstStyle/>
+          <a:p>
+            <a:r>
+              <a:rPr lang="en-CA" dirty="0" smtClean="0"/>
+              <a:t>Data Specification : E-R Diagram</a:t>
+            </a:r>
+            <a:endParaRPr lang="en-CA" dirty="0"/>
+          </a:p>
+        </p:txBody>
+      </p:sp>
+      <p:sp>
+        <p:nvSpPr>
+          <p:cNvPr id="4" name="Date Placeholder 3"/>
+          <p:cNvSpPr>
+            <a:spLocks noGrp="1"/>
+          </p:cNvSpPr>
+          <p:nvPr>
+            <p:ph type="dt" sz="half" idx="10"/>
+          </p:nvPr>
+        </p:nvSpPr>
+        <p:spPr/>
+        <p:txBody>
+          <a:bodyPr/>
+          <a:lstStyle/>
+          <a:p>
+            <a:r>
+              <a:rPr lang="en-US" dirty="0" smtClean="0"/>
+              <a:t>SENG696 </a:t>
+            </a:r>
+            <a:r>
+              <a:rPr lang="en-US" dirty="0"/>
+              <a:t>(Fall </a:t>
+            </a:r>
+            <a:r>
+              <a:rPr lang="en-US" dirty="0" smtClean="0"/>
+              <a:t>2021)</a:t>
+            </a:r>
+            <a:endParaRPr lang="en-US" altLang="ja-JP" dirty="0"/>
+          </a:p>
+        </p:txBody>
+      </p:sp>
+      <p:sp>
+        <p:nvSpPr>
+          <p:cNvPr id="6" name="Slide Number Placeholder 5"/>
+          <p:cNvSpPr>
+            <a:spLocks noGrp="1"/>
+          </p:cNvSpPr>
+          <p:nvPr>
+            <p:ph type="sldNum" sz="quarter" idx="12"/>
+          </p:nvPr>
+        </p:nvSpPr>
+        <p:spPr/>
+        <p:txBody>
+          <a:bodyPr/>
+          <a:lstStyle/>
+          <a:p>
+            <a:fld id="{A4BAB868-1E00-44C6-B1AB-DFCC5F9865BA}" type="slidenum">
+              <a:rPr lang="ja-JP" altLang="en-US" smtClean="0"/>
+              <a:t>31</a:t>
+            </a:fld>
+            <a:endParaRPr lang="en-US" altLang="ja-JP"/>
+          </a:p>
+        </p:txBody>
+      </p:sp>
+      <p:pic>
+        <p:nvPicPr>
+          <p:cNvPr id="5" name="Picture 4"/>
+          <p:cNvPicPr>
+            <a:picLocks noChangeAspect="1"/>
+          </p:cNvPicPr>
+          <p:nvPr/>
+        </p:nvPicPr>
+        <p:blipFill>
+          <a:blip r:embed="rId2"/>
+          <a:stretch>
+            <a:fillRect/>
+          </a:stretch>
+        </p:blipFill>
+        <p:spPr>
+          <a:xfrm>
+            <a:off x="1716541" y="1567543"/>
+            <a:ext cx="9629775" cy="4464004"/>
+          </a:xfrm>
+          <a:prstGeom prst="rect">
+            <a:avLst/>
+          </a:prstGeom>
+        </p:spPr>
+      </p:pic>
+    </p:spTree>
+    <p:extLst>
+      <p:ext uri="{BB962C8B-B14F-4D97-AF65-F5344CB8AC3E}">
+        <p14:creationId xmlns:p14="http://schemas.microsoft.com/office/powerpoint/2010/main" val="1706563711"/>
+      </p:ext>
+    </p:extLst>
+  </p:cSld>
+  <p:clrMapOvr>
+    <a:masterClrMapping/>
+  </p:clrMapOvr>
+  <p:transition>
+    <p:dissolve/>
+  </p:transition>
+  <p:timing>
+    <p:tnLst>
+      <p:par>
+        <p:cTn id="1" dur="indefinite" restart="never" nodeType="tmRoot"/>
+      </p:par>
+    </p:tnLst>
+  </p:timing>
+</p:sld>
+</file>
+
+<file path=ppt/slides/slide32.xml><?xml version="1.0" encoding="utf-8"?>
+<p:sld xmlns:a="http://schemas.openxmlformats.org/drawingml/2006/main" xmlns:r="http://schemas.openxmlformats.org/officeDocument/2006/relationships" xmlns:p="http://schemas.openxmlformats.org/presentationml/2006/main">
+  <p:cSld>
+    <p:spTree>
+      <p:nvGrpSpPr>
+        <p:cNvPr id="1" name=""/>
+        <p:cNvGrpSpPr/>
+        <p:nvPr/>
+      </p:nvGrpSpPr>
+      <p:grpSpPr>
+        <a:xfrm>
+          <a:off x="0" y="0"/>
+          <a:ext cx="0" cy="0"/>
+          <a:chOff x="0" y="0"/>
+          <a:chExt cx="0" cy="0"/>
+        </a:xfrm>
+      </p:grpSpPr>
+      <p:sp>
+        <p:nvSpPr>
+          <p:cNvPr id="2" name="Title 1"/>
+          <p:cNvSpPr>
+            <a:spLocks noGrp="1"/>
+          </p:cNvSpPr>
+          <p:nvPr>
+            <p:ph type="title"/>
+          </p:nvPr>
+        </p:nvSpPr>
+        <p:spPr/>
+        <p:txBody>
+          <a:bodyPr/>
+          <a:lstStyle/>
+          <a:p>
+            <a:r>
+              <a:rPr lang="en-CA" dirty="0" smtClean="0"/>
+              <a:t>Typical Data Definition</a:t>
+            </a:r>
+            <a:endParaRPr lang="en-CA" dirty="0"/>
+          </a:p>
+        </p:txBody>
+      </p:sp>
+      <p:sp>
+        <p:nvSpPr>
+          <p:cNvPr id="4" name="Date Placeholder 3"/>
+          <p:cNvSpPr>
+            <a:spLocks noGrp="1"/>
+          </p:cNvSpPr>
+          <p:nvPr>
+            <p:ph type="dt" sz="half" idx="10"/>
+          </p:nvPr>
+        </p:nvSpPr>
+        <p:spPr/>
+        <p:txBody>
+          <a:bodyPr/>
+          <a:lstStyle/>
+          <a:p>
+            <a:r>
+              <a:rPr lang="en-US" dirty="0" smtClean="0"/>
+              <a:t>SENG696 </a:t>
+            </a:r>
+            <a:r>
+              <a:rPr lang="en-US" dirty="0"/>
+              <a:t>(Fall </a:t>
+            </a:r>
+            <a:r>
+              <a:rPr lang="en-US" dirty="0" smtClean="0"/>
+              <a:t>2021)</a:t>
+            </a:r>
+            <a:endParaRPr lang="en-US" altLang="ja-JP" dirty="0"/>
+          </a:p>
+        </p:txBody>
+      </p:sp>
+      <p:sp>
+        <p:nvSpPr>
+          <p:cNvPr id="6" name="Slide Number Placeholder 5"/>
+          <p:cNvSpPr>
+            <a:spLocks noGrp="1"/>
+          </p:cNvSpPr>
+          <p:nvPr>
+            <p:ph type="sldNum" sz="quarter" idx="12"/>
+          </p:nvPr>
+        </p:nvSpPr>
+        <p:spPr/>
+        <p:txBody>
+          <a:bodyPr/>
+          <a:lstStyle/>
+          <a:p>
+            <a:fld id="{A4BAB868-1E00-44C6-B1AB-DFCC5F9865BA}" type="slidenum">
+              <a:rPr lang="ja-JP" altLang="en-US" smtClean="0"/>
+              <a:t>32</a:t>
+            </a:fld>
+            <a:endParaRPr lang="en-US" altLang="ja-JP"/>
+          </a:p>
+        </p:txBody>
+      </p:sp>
+      <p:sp>
+        <p:nvSpPr>
+          <p:cNvPr id="3" name="TextBox 2"/>
+          <p:cNvSpPr txBox="1"/>
+          <p:nvPr/>
+        </p:nvSpPr>
+        <p:spPr>
+          <a:xfrm>
+            <a:off x="1219200" y="1541417"/>
+            <a:ext cx="10075817" cy="923330"/>
+          </a:xfrm>
+          <a:prstGeom prst="rect">
+            <a:avLst/>
+          </a:prstGeom>
+          <a:noFill/>
+        </p:spPr>
+        <p:txBody>
+          <a:bodyPr wrap="square" rtlCol="0">
+            <a:spAutoFit/>
+          </a:bodyPr>
+          <a:lstStyle/>
+          <a:p>
+            <a:r>
+              <a:rPr lang="en-US" b="1" i="1" dirty="0" smtClean="0">
+                <a:solidFill>
+                  <a:srgbClr val="00B050"/>
+                </a:solidFill>
+              </a:rPr>
+              <a:t>Appointment</a:t>
+            </a:r>
+            <a:r>
+              <a:rPr lang="en-US" i="1" dirty="0" smtClean="0">
+                <a:solidFill>
+                  <a:srgbClr val="00B050"/>
+                </a:solidFill>
+              </a:rPr>
+              <a:t>: </a:t>
+            </a:r>
+            <a:r>
+              <a:rPr lang="en-US" dirty="0" smtClean="0"/>
+              <a:t>The appointment details(including Pet’s Symptoms and other client details) are stored in this table. This table also contains the appointment specific information such as criticality and feedback details. The table is used to keep track of the owner’s email, phone number and appointment status as well.</a:t>
+            </a:r>
+            <a:endParaRPr lang="en-IN" i="1" dirty="0"/>
+          </a:p>
+        </p:txBody>
+      </p:sp>
+      <p:pic>
+        <p:nvPicPr>
+          <p:cNvPr id="7" name="Picture 6"/>
+          <p:cNvPicPr>
+            <a:picLocks noChangeAspect="1"/>
+          </p:cNvPicPr>
+          <p:nvPr/>
+        </p:nvPicPr>
+        <p:blipFill>
+          <a:blip r:embed="rId2"/>
+          <a:stretch>
+            <a:fillRect/>
+          </a:stretch>
+        </p:blipFill>
+        <p:spPr>
+          <a:xfrm>
+            <a:off x="2953157" y="2602814"/>
+            <a:ext cx="6089243" cy="3403121"/>
+          </a:xfrm>
+          <a:prstGeom prst="rect">
+            <a:avLst/>
+          </a:prstGeom>
+        </p:spPr>
+      </p:pic>
+    </p:spTree>
+    <p:extLst>
+      <p:ext uri="{BB962C8B-B14F-4D97-AF65-F5344CB8AC3E}">
+        <p14:creationId xmlns:p14="http://schemas.microsoft.com/office/powerpoint/2010/main" val="975095220"/>
+      </p:ext>
+    </p:extLst>
+  </p:cSld>
+  <p:clrMapOvr>
+    <a:masterClrMapping/>
+  </p:clrMapOvr>
+  <p:transition>
+    <p:dissolve/>
+  </p:transition>
+  <p:timing>
+    <p:tnLst>
+      <p:par>
+        <p:cTn id="1" dur="indefinite" restart="never" nodeType="tmRoot"/>
+      </p:par>
+    </p:tnLst>
+  </p:timing>
+</p:sld>
+</file>
+
+<file path=ppt/slides/slide33.xml><?xml version="1.0" encoding="utf-8"?>
+<p:sld xmlns:a="http://schemas.openxmlformats.org/drawingml/2006/main" xmlns:r="http://schemas.openxmlformats.org/officeDocument/2006/relationships" xmlns:p="http://schemas.openxmlformats.org/presentationml/2006/main">
+  <p:cSld>
+    <p:spTree>
+      <p:nvGrpSpPr>
+        <p:cNvPr id="1" name=""/>
+        <p:cNvGrpSpPr/>
+        <p:nvPr/>
+      </p:nvGrpSpPr>
+      <p:grpSpPr>
+        <a:xfrm>
+          <a:off x="0" y="0"/>
+          <a:ext cx="0" cy="0"/>
+          <a:chOff x="0" y="0"/>
+          <a:chExt cx="0" cy="0"/>
+        </a:xfrm>
+      </p:grpSpPr>
+      <p:sp>
+        <p:nvSpPr>
+          <p:cNvPr id="2" name="Title 1"/>
+          <p:cNvSpPr>
+            <a:spLocks noGrp="1"/>
+          </p:cNvSpPr>
+          <p:nvPr>
+            <p:ph type="title"/>
+          </p:nvPr>
+        </p:nvSpPr>
+        <p:spPr/>
+        <p:txBody>
+          <a:bodyPr/>
+          <a:lstStyle/>
+          <a:p>
+            <a:r>
+              <a:rPr lang="en-CA" dirty="0" smtClean="0"/>
+              <a:t>Typical Data Definition(contd.)</a:t>
+            </a:r>
+            <a:endParaRPr lang="en-CA" dirty="0"/>
+          </a:p>
+        </p:txBody>
+      </p:sp>
+      <p:sp>
+        <p:nvSpPr>
+          <p:cNvPr id="4" name="Date Placeholder 3"/>
+          <p:cNvSpPr>
+            <a:spLocks noGrp="1"/>
+          </p:cNvSpPr>
+          <p:nvPr>
+            <p:ph type="dt" sz="half" idx="10"/>
+          </p:nvPr>
+        </p:nvSpPr>
+        <p:spPr/>
+        <p:txBody>
+          <a:bodyPr/>
+          <a:lstStyle/>
+          <a:p>
+            <a:r>
+              <a:rPr lang="en-US" dirty="0" smtClean="0"/>
+              <a:t>SENG696 </a:t>
+            </a:r>
+            <a:r>
+              <a:rPr lang="en-US" dirty="0"/>
+              <a:t>(Fall </a:t>
+            </a:r>
+            <a:r>
+              <a:rPr lang="en-US" dirty="0" smtClean="0"/>
+              <a:t>2021)</a:t>
+            </a:r>
+            <a:endParaRPr lang="en-US" altLang="ja-JP" dirty="0"/>
+          </a:p>
+        </p:txBody>
+      </p:sp>
+      <p:sp>
+        <p:nvSpPr>
+          <p:cNvPr id="6" name="Slide Number Placeholder 5"/>
+          <p:cNvSpPr>
+            <a:spLocks noGrp="1"/>
+          </p:cNvSpPr>
+          <p:nvPr>
+            <p:ph type="sldNum" sz="quarter" idx="12"/>
+          </p:nvPr>
+        </p:nvSpPr>
+        <p:spPr/>
+        <p:txBody>
+          <a:bodyPr/>
+          <a:lstStyle/>
+          <a:p>
+            <a:fld id="{A4BAB868-1E00-44C6-B1AB-DFCC5F9865BA}" type="slidenum">
+              <a:rPr lang="ja-JP" altLang="en-US" smtClean="0"/>
+              <a:t>33</a:t>
+            </a:fld>
+            <a:endParaRPr lang="en-US" altLang="ja-JP"/>
+          </a:p>
+        </p:txBody>
+      </p:sp>
+      <p:sp>
+        <p:nvSpPr>
+          <p:cNvPr id="3" name="TextBox 2"/>
+          <p:cNvSpPr txBox="1"/>
+          <p:nvPr/>
+        </p:nvSpPr>
+        <p:spPr>
+          <a:xfrm>
+            <a:off x="1219200" y="1541417"/>
+            <a:ext cx="10075817" cy="646331"/>
+          </a:xfrm>
+          <a:prstGeom prst="rect">
+            <a:avLst/>
+          </a:prstGeom>
+          <a:noFill/>
+        </p:spPr>
+        <p:txBody>
+          <a:bodyPr wrap="square" rtlCol="0">
+            <a:spAutoFit/>
+          </a:bodyPr>
+          <a:lstStyle/>
+          <a:p>
+            <a:r>
+              <a:rPr lang="en-US" b="1" i="1" dirty="0" smtClean="0">
+                <a:solidFill>
+                  <a:srgbClr val="00B050"/>
+                </a:solidFill>
+              </a:rPr>
+              <a:t>Client</a:t>
+            </a:r>
+            <a:r>
+              <a:rPr lang="en-US" i="1" dirty="0" smtClean="0">
+                <a:solidFill>
+                  <a:srgbClr val="00B050"/>
+                </a:solidFill>
+              </a:rPr>
+              <a:t>: </a:t>
+            </a:r>
+            <a:r>
+              <a:rPr lang="en-US" dirty="0" smtClean="0"/>
+              <a:t>The client details(name, contact, username, password, etc.) are stored in this table. The table is used to keep track of the owner’s information and used to auto-populate the UI after he/she logs in.</a:t>
+            </a:r>
+            <a:endParaRPr lang="en-IN" i="1" dirty="0"/>
+          </a:p>
+        </p:txBody>
+      </p:sp>
+      <p:pic>
+        <p:nvPicPr>
+          <p:cNvPr id="5" name="Picture 4"/>
+          <p:cNvPicPr>
+            <a:picLocks noChangeAspect="1"/>
+          </p:cNvPicPr>
+          <p:nvPr/>
+        </p:nvPicPr>
+        <p:blipFill>
+          <a:blip r:embed="rId2"/>
+          <a:stretch>
+            <a:fillRect/>
+          </a:stretch>
+        </p:blipFill>
+        <p:spPr>
+          <a:xfrm>
+            <a:off x="3075077" y="2554500"/>
+            <a:ext cx="6147300" cy="3042852"/>
+          </a:xfrm>
+          <a:prstGeom prst="rect">
+            <a:avLst/>
+          </a:prstGeom>
+        </p:spPr>
+      </p:pic>
+    </p:spTree>
+    <p:extLst>
+      <p:ext uri="{BB962C8B-B14F-4D97-AF65-F5344CB8AC3E}">
+        <p14:creationId xmlns:p14="http://schemas.microsoft.com/office/powerpoint/2010/main" val="3563183325"/>
+      </p:ext>
+    </p:extLst>
+  </p:cSld>
+  <p:clrMapOvr>
+    <a:masterClrMapping/>
+  </p:clrMapOvr>
+  <p:transition>
+    <p:dissolve/>
+  </p:transition>
+  <p:timing>
+    <p:tnLst>
+      <p:par>
+        <p:cTn id="1" dur="indefinite" restart="never" nodeType="tmRoot"/>
+      </p:par>
+    </p:tnLst>
+  </p:timing>
+</p:sld>
+</file>
+
+<file path=ppt/slides/slide34.xml><?xml version="1.0" encoding="utf-8"?>
+<p:sld xmlns:a="http://schemas.openxmlformats.org/drawingml/2006/main" xmlns:r="http://schemas.openxmlformats.org/officeDocument/2006/relationships" xmlns:p="http://schemas.openxmlformats.org/presentationml/2006/main">
+  <p:cSld>
+    <p:spTree>
+      <p:nvGrpSpPr>
+        <p:cNvPr id="1" name=""/>
+        <p:cNvGrpSpPr/>
+        <p:nvPr/>
+      </p:nvGrpSpPr>
+      <p:grpSpPr>
+        <a:xfrm>
+          <a:off x="0" y="0"/>
+          <a:ext cx="0" cy="0"/>
+          <a:chOff x="0" y="0"/>
+          <a:chExt cx="0" cy="0"/>
+        </a:xfrm>
+      </p:grpSpPr>
+      <p:sp>
+        <p:nvSpPr>
+          <p:cNvPr id="2" name="Title 1"/>
+          <p:cNvSpPr>
+            <a:spLocks noGrp="1"/>
+          </p:cNvSpPr>
+          <p:nvPr>
+            <p:ph type="title"/>
+          </p:nvPr>
+        </p:nvSpPr>
+        <p:spPr/>
+        <p:txBody>
+          <a:bodyPr/>
+          <a:lstStyle/>
+          <a:p>
+            <a:r>
+              <a:rPr lang="en-CA" dirty="0" smtClean="0"/>
+              <a:t>Typical Data Definition(contd.)</a:t>
+            </a:r>
+            <a:endParaRPr lang="en-CA" dirty="0"/>
+          </a:p>
+        </p:txBody>
+      </p:sp>
+      <p:sp>
+        <p:nvSpPr>
+          <p:cNvPr id="4" name="Date Placeholder 3"/>
+          <p:cNvSpPr>
+            <a:spLocks noGrp="1"/>
+          </p:cNvSpPr>
+          <p:nvPr>
+            <p:ph type="dt" sz="half" idx="10"/>
+          </p:nvPr>
+        </p:nvSpPr>
+        <p:spPr/>
+        <p:txBody>
+          <a:bodyPr/>
+          <a:lstStyle/>
+          <a:p>
+            <a:r>
+              <a:rPr lang="en-US" dirty="0" smtClean="0"/>
+              <a:t>SENG696 </a:t>
+            </a:r>
+            <a:r>
+              <a:rPr lang="en-US" dirty="0"/>
+              <a:t>(Fall </a:t>
+            </a:r>
+            <a:r>
+              <a:rPr lang="en-US" dirty="0" smtClean="0"/>
+              <a:t>2021)</a:t>
+            </a:r>
+            <a:endParaRPr lang="en-US" altLang="ja-JP" dirty="0"/>
+          </a:p>
+        </p:txBody>
+      </p:sp>
+      <p:sp>
+        <p:nvSpPr>
+          <p:cNvPr id="6" name="Slide Number Placeholder 5"/>
+          <p:cNvSpPr>
+            <a:spLocks noGrp="1"/>
+          </p:cNvSpPr>
+          <p:nvPr>
+            <p:ph type="sldNum" sz="quarter" idx="12"/>
+          </p:nvPr>
+        </p:nvSpPr>
+        <p:spPr/>
+        <p:txBody>
+          <a:bodyPr/>
+          <a:lstStyle/>
+          <a:p>
+            <a:fld id="{A4BAB868-1E00-44C6-B1AB-DFCC5F9865BA}" type="slidenum">
+              <a:rPr lang="ja-JP" altLang="en-US" smtClean="0"/>
+              <a:t>34</a:t>
+            </a:fld>
+            <a:endParaRPr lang="en-US" altLang="ja-JP"/>
+          </a:p>
+        </p:txBody>
+      </p:sp>
+      <p:sp>
+        <p:nvSpPr>
+          <p:cNvPr id="3" name="TextBox 2"/>
+          <p:cNvSpPr txBox="1"/>
+          <p:nvPr/>
+        </p:nvSpPr>
+        <p:spPr>
+          <a:xfrm>
+            <a:off x="1219200" y="1558835"/>
+            <a:ext cx="10075817" cy="646331"/>
+          </a:xfrm>
+          <a:prstGeom prst="rect">
+            <a:avLst/>
+          </a:prstGeom>
+          <a:noFill/>
+        </p:spPr>
+        <p:txBody>
+          <a:bodyPr wrap="square" rtlCol="0">
+            <a:spAutoFit/>
+          </a:bodyPr>
+          <a:lstStyle/>
+          <a:p>
+            <a:r>
+              <a:rPr lang="en-US" b="1" i="1" dirty="0" smtClean="0">
+                <a:solidFill>
+                  <a:srgbClr val="00B050"/>
+                </a:solidFill>
+              </a:rPr>
+              <a:t>Doctor</a:t>
+            </a:r>
+            <a:r>
+              <a:rPr lang="en-US" i="1" dirty="0" smtClean="0">
+                <a:solidFill>
+                  <a:srgbClr val="00B050"/>
+                </a:solidFill>
+              </a:rPr>
+              <a:t>: </a:t>
+            </a:r>
+            <a:r>
+              <a:rPr lang="en-US" dirty="0" smtClean="0"/>
+              <a:t>The Doctor details(name, contact, specialty, username, password, etc.) are stored in this table. The table is used to keep track of the doctor’s information and used to auto-populate the UI after he/she logs in. </a:t>
+            </a:r>
+            <a:endParaRPr lang="en-IN" i="1" dirty="0"/>
+          </a:p>
+        </p:txBody>
+      </p:sp>
+      <p:pic>
+        <p:nvPicPr>
+          <p:cNvPr id="10" name="Picture 9"/>
+          <p:cNvPicPr>
+            <a:picLocks noChangeAspect="1"/>
+          </p:cNvPicPr>
+          <p:nvPr/>
+        </p:nvPicPr>
+        <p:blipFill>
+          <a:blip r:embed="rId2"/>
+          <a:stretch>
+            <a:fillRect/>
+          </a:stretch>
+        </p:blipFill>
+        <p:spPr>
+          <a:xfrm>
+            <a:off x="3008403" y="2360651"/>
+            <a:ext cx="6198091" cy="3407138"/>
+          </a:xfrm>
+          <a:prstGeom prst="rect">
+            <a:avLst/>
+          </a:prstGeom>
+        </p:spPr>
+      </p:pic>
+    </p:spTree>
+    <p:extLst>
+      <p:ext uri="{BB962C8B-B14F-4D97-AF65-F5344CB8AC3E}">
+        <p14:creationId xmlns:p14="http://schemas.microsoft.com/office/powerpoint/2010/main" val="3283641002"/>
+      </p:ext>
+    </p:extLst>
+  </p:cSld>
+  <p:clrMapOvr>
+    <a:masterClrMapping/>
+  </p:clrMapOvr>
+  <p:transition>
+    <p:dissolve/>
+  </p:transition>
+  <p:timing>
+    <p:tnLst>
+      <p:par>
+        <p:cTn id="1" dur="indefinite" restart="never" nodeType="tmRoot"/>
+      </p:par>
+    </p:tnLst>
+  </p:timing>
+</p:sld>
+</file>
+
 <file path=ppt/slides/slide4.xml><?xml version="1.0" encoding="utf-8"?>
 <p:sld xmlns:a="http://schemas.openxmlformats.org/drawingml/2006/main" xmlns:r="http://schemas.openxmlformats.org/officeDocument/2006/relationships" xmlns:p="http://schemas.openxmlformats.org/presentationml/2006/main">
   <p:cSld>
@@ -21176,7 +21999,25 @@
                 <a:ea typeface="Calibri" panose="020F0502020204030204" pitchFamily="34" charset="0"/>
                 <a:cs typeface="Times New Roman" panose="02020503050405090304" pitchFamily="18" charset="0"/>
               </a:rPr>
-              <a:t>The clinic system agent accesses the request sent by the patient(user) through the web interface. In our Architecture the clinic system agent handles the correspondence with all the other agents and in this way, which acts as a central hub.</a:t>
+              <a:t>The clinic system agent accesses the request sent by the patient(user) through the web interface. In our Architecture the clinic system agent handles the correspondence with all the other </a:t>
+            </a:r>
+            <a:r>
+              <a:rPr lang="en-US" sz="1800" dirty="0" smtClean="0">
+                <a:effectLst/>
+                <a:latin typeface="Calibri" panose="020F0502020204030204" pitchFamily="34" charset="0"/>
+                <a:ea typeface="Calibri" panose="020F0502020204030204" pitchFamily="34" charset="0"/>
+                <a:cs typeface="Times New Roman" panose="02020503050405090304" pitchFamily="18" charset="0"/>
+              </a:rPr>
+              <a:t>agents(as a mediator) </a:t>
+            </a:r>
+            <a:r>
+              <a:rPr lang="en-US" sz="1800" dirty="0">
+                <a:effectLst/>
+                <a:latin typeface="Calibri" panose="020F0502020204030204" pitchFamily="34" charset="0"/>
+                <a:ea typeface="Calibri" panose="020F0502020204030204" pitchFamily="34" charset="0"/>
+                <a:cs typeface="Times New Roman" panose="02020503050405090304" pitchFamily="18" charset="0"/>
+              </a:rPr>
+              <a:t>and in this way, which acts as a central hub.</a:t>
             </a:r>
             <a:endParaRPr lang="en-IN" sz="1800" dirty="0">
               <a:effectLst/>
@@ -21248,7 +22089,16 @@
                 <a:ea typeface="Calibri" panose="020F0502020204030204" pitchFamily="34" charset="0"/>
                 <a:cs typeface="Times New Roman" panose="02020503050405090304" pitchFamily="18" charset="0"/>
               </a:rPr>
-              <a:t>The clinic system agent also generates a request for the appointment agent to book an appointment whether it’s a first or a consecutive appointment.</a:t>
+              <a:t>The clinic system agent also generates a request for the appointment agent to book an appointment whether it’s a first or a consecutive appointment</a:t>
+            </a:r>
+            <a:r>
+              <a:rPr lang="en-US" sz="1800" dirty="0" smtClean="0">
+                <a:effectLst/>
+                <a:latin typeface="Calibri" panose="020F0502020204030204" pitchFamily="34" charset="0"/>
+                <a:ea typeface="Calibri" panose="020F0502020204030204" pitchFamily="34" charset="0"/>
+                <a:cs typeface="Times New Roman" panose="02020503050405090304" pitchFamily="18" charset="0"/>
+              </a:rPr>
+              <a:t>. It also helps to update and cancel an appointment.</a:t>
             </a:r>
             <a:endParaRPr lang="en-IN" sz="1800" dirty="0">
               <a:effectLst/>
@@ -21272,7 +22122,25 @@
                 <a:ea typeface="Calibri" panose="020F0502020204030204" pitchFamily="34" charset="0"/>
                 <a:cs typeface="Times New Roman" panose="02020503050405090304" pitchFamily="18" charset="0"/>
               </a:rPr>
-              <a:t>The clinic system agent also triggers the reminder agent to remind the patient about the appointments at some given times.</a:t>
+              <a:t>The clinic system agent also triggers the </a:t>
+            </a:r>
+            <a:r>
+              <a:rPr lang="en-US" sz="1800" dirty="0" smtClean="0">
+                <a:effectLst/>
+                <a:latin typeface="Calibri" panose="020F0502020204030204" pitchFamily="34" charset="0"/>
+                <a:ea typeface="Calibri" panose="020F0502020204030204" pitchFamily="34" charset="0"/>
+                <a:cs typeface="Times New Roman" panose="02020503050405090304" pitchFamily="18" charset="0"/>
+              </a:rPr>
+              <a:t>Notification </a:t>
+            </a:r>
+            <a:r>
+              <a:rPr lang="en-US" sz="1800" dirty="0">
+                <a:effectLst/>
+                <a:latin typeface="Calibri" panose="020F0502020204030204" pitchFamily="34" charset="0"/>
+                <a:ea typeface="Calibri" panose="020F0502020204030204" pitchFamily="34" charset="0"/>
+                <a:cs typeface="Times New Roman" panose="02020503050405090304" pitchFamily="18" charset="0"/>
+              </a:rPr>
+              <a:t>agent to remind the patient about the appointments at some given times.</a:t>
             </a:r>
             <a:endParaRPr lang="en-IN" sz="1800" dirty="0">
               <a:effectLst/>
@@ -21299,7 +22167,25 @@
                 <a:ea typeface="Calibri" panose="020F0502020204030204" pitchFamily="34" charset="0"/>
                 <a:cs typeface="Times New Roman" panose="02020503050405090304" pitchFamily="18" charset="0"/>
               </a:rPr>
-              <a:t>The clinic system agent also requests template agent to generate the required template once the physician had completed the session with the patient.</a:t>
+              <a:t>The clinic system agent also requests </a:t>
+            </a:r>
+            <a:r>
+              <a:rPr lang="en-US" sz="1800" dirty="0" smtClean="0">
+                <a:effectLst/>
+                <a:latin typeface="Calibri" panose="020F0502020204030204" pitchFamily="34" charset="0"/>
+                <a:ea typeface="Calibri" panose="020F0502020204030204" pitchFamily="34" charset="0"/>
+                <a:cs typeface="Times New Roman" panose="02020503050405090304" pitchFamily="18" charset="0"/>
+              </a:rPr>
+              <a:t>template(PDF) </a:t>
+            </a:r>
+            <a:r>
+              <a:rPr lang="en-US" sz="1800" dirty="0">
+                <a:effectLst/>
+                <a:latin typeface="Calibri" panose="020F0502020204030204" pitchFamily="34" charset="0"/>
+                <a:ea typeface="Calibri" panose="020F0502020204030204" pitchFamily="34" charset="0"/>
+                <a:cs typeface="Times New Roman" panose="02020503050405090304" pitchFamily="18" charset="0"/>
+              </a:rPr>
+              <a:t>agent to generate the required template once the physician had completed the session with the patient.</a:t>
             </a:r>
             <a:endParaRPr lang="en-IN" sz="1800" dirty="0">
               <a:effectLst/>
@@ -21333,8 +22219,16 @@
           <a:lstStyle/>
           <a:p>
             <a:r>
+              <a:rPr lang="en-US" dirty="0" smtClean="0"/>
+              <a:t>SENG696 </a:t>
+            </a:r>
+            <a:r>
               <a:rPr lang="en-US" dirty="0"/>
-              <a:t>SENG696 (Fall 2021)</a:t>
+              <a:t>(Fall </a:t>
+            </a:r>
+            <a:r>
+              <a:rPr lang="en-US" dirty="0" smtClean="0"/>
+              <a:t>2021)</a:t>
             </a:r>
             <a:endParaRPr lang="en-US" altLang="ja-JP" dirty="0"/>
           </a:p>
@@ -21364,6 +22258,11 @@
         </p:txBody>
       </p:sp>
     </p:spTree>
+    <p:extLst>
+      <p:ext uri="{BB962C8B-B14F-4D97-AF65-F5344CB8AC3E}">
+        <p14:creationId xmlns:p14="http://schemas.microsoft.com/office/powerpoint/2010/main" val="221322606"/>
+      </p:ext>
+    </p:extLst>
   </p:cSld>
   <p:clrMapOvr>
     <a:masterClrMapping/>
@@ -21545,7 +22444,88 @@
                 <a:ea typeface="Calibri" panose="020F0502020204030204" pitchFamily="34" charset="0"/>
                 <a:cs typeface="Times New Roman" panose="02020503050405090304" pitchFamily="18" charset="0"/>
               </a:rPr>
-              <a:t>The appointment agent will also interact with the clinic system agent to activate the signal regarding the reminder. The Reminder agent then will remind the patient when the appointment is due.</a:t>
+              <a:t>The appointment agent will also interact with the </a:t>
+            </a:r>
+            <a:r>
+              <a:rPr lang="en-US" sz="1800" dirty="0" smtClean="0">
+                <a:latin typeface="Calibri" panose="020F0502020204030204" pitchFamily="34" charset="0"/>
+                <a:ea typeface="Calibri" panose="020F0502020204030204" pitchFamily="34" charset="0"/>
+                <a:cs typeface="Times New Roman" panose="02020503050405090304" pitchFamily="18" charset="0"/>
+              </a:rPr>
+              <a:t>notification</a:t>
+            </a:r>
+            <a:r>
+              <a:rPr lang="en-US" sz="1800" dirty="0" smtClean="0">
+                <a:effectLst/>
+                <a:latin typeface="Calibri" panose="020F0502020204030204" pitchFamily="34" charset="0"/>
+                <a:ea typeface="Calibri" panose="020F0502020204030204" pitchFamily="34" charset="0"/>
+                <a:cs typeface="Times New Roman" panose="02020503050405090304" pitchFamily="18" charset="0"/>
+              </a:rPr>
+              <a:t> </a:t>
+            </a:r>
+            <a:r>
+              <a:rPr lang="en-US" sz="1800" dirty="0">
+                <a:effectLst/>
+                <a:latin typeface="Calibri" panose="020F0502020204030204" pitchFamily="34" charset="0"/>
+                <a:ea typeface="Calibri" panose="020F0502020204030204" pitchFamily="34" charset="0"/>
+                <a:cs typeface="Times New Roman" panose="02020503050405090304" pitchFamily="18" charset="0"/>
+              </a:rPr>
+              <a:t>agent to </a:t>
+            </a:r>
+            <a:r>
+              <a:rPr lang="en-US" sz="1800" dirty="0" smtClean="0">
+                <a:effectLst/>
+                <a:latin typeface="Calibri" panose="020F0502020204030204" pitchFamily="34" charset="0"/>
+                <a:ea typeface="Calibri" panose="020F0502020204030204" pitchFamily="34" charset="0"/>
+                <a:cs typeface="Times New Roman" panose="02020503050405090304" pitchFamily="18" charset="0"/>
+              </a:rPr>
+              <a:t>signal the sending of SMS and Email notifying the pet-owner. </a:t>
+            </a:r>
+          </a:p>
+          <a:p>
+            <a:pPr>
+              <a:lnSpc>
+                <a:spcPct val="107000"/>
+              </a:lnSpc>
+              <a:spcAft>
+                <a:spcPts val="800"/>
+              </a:spcAft>
+            </a:pPr>
+            <a:r>
+              <a:rPr lang="en-US" sz="1800" dirty="0" smtClean="0">
+                <a:effectLst/>
+                <a:latin typeface="Calibri" panose="020F0502020204030204" pitchFamily="34" charset="0"/>
+                <a:ea typeface="Calibri" panose="020F0502020204030204" pitchFamily="34" charset="0"/>
+                <a:cs typeface="Times New Roman" panose="02020503050405090304" pitchFamily="18" charset="0"/>
+              </a:rPr>
+              <a:t>This agent communicates with the video agent to share a video link for use during the online consultation</a:t>
+            </a:r>
+            <a:r>
+              <a:rPr lang="en-US" sz="1800" dirty="0" smtClean="0">
+                <a:effectLst/>
+                <a:latin typeface="Calibri" panose="020F0502020204030204" pitchFamily="34" charset="0"/>
+                <a:ea typeface="Calibri" panose="020F0502020204030204" pitchFamily="34" charset="0"/>
+                <a:cs typeface="Times New Roman" panose="02020503050405090304" pitchFamily="18" charset="0"/>
+              </a:rPr>
+              <a:t>.</a:t>
+            </a:r>
+          </a:p>
+          <a:p>
+            <a:pPr>
+              <a:lnSpc>
+                <a:spcPct val="107000"/>
+              </a:lnSpc>
+              <a:spcAft>
+                <a:spcPts val="800"/>
+              </a:spcAft>
+            </a:pPr>
+            <a:r>
+              <a:rPr lang="en-US" sz="1800" dirty="0" smtClean="0">
+                <a:latin typeface="Calibri" panose="020F0502020204030204" pitchFamily="34" charset="0"/>
+                <a:ea typeface="Calibri" panose="020F0502020204030204" pitchFamily="34" charset="0"/>
+                <a:cs typeface="Times New Roman" panose="02020503050405090304" pitchFamily="18" charset="0"/>
+              </a:rPr>
+              <a:t>The agent will initiate call to the PDF Agent to create a report based on the Doctor’s diagnosis.</a:t>
             </a:r>
             <a:endParaRPr lang="en-IN" sz="1800" dirty="0">
               <a:effectLst/>
@@ -21575,8 +22555,16 @@
           <a:lstStyle/>
           <a:p>
             <a:r>
+              <a:rPr lang="en-US" dirty="0" smtClean="0"/>
+              <a:t>SENG696 </a:t>
+            </a:r>
+            <a:r>
               <a:rPr lang="en-US" dirty="0"/>
-              <a:t>SENG696 (Fall 2021)</a:t>
+              <a:t>(Fall </a:t>
+            </a:r>
+            <a:r>
+              <a:rPr lang="en-US" dirty="0" smtClean="0"/>
+              <a:t>2021)</a:t>
             </a:r>
             <a:endParaRPr lang="en-US" altLang="ja-JP" dirty="0"/>
           </a:p>
@@ -21606,6 +22594,11 @@
         </p:txBody>
       </p:sp>
     </p:spTree>
+    <p:extLst>
+      <p:ext uri="{BB962C8B-B14F-4D97-AF65-F5344CB8AC3E}">
+        <p14:creationId xmlns:p14="http://schemas.microsoft.com/office/powerpoint/2010/main" val="1756131708"/>
+      </p:ext>
+    </p:extLst>
   </p:cSld>
   <p:clrMapOvr>
     <a:masterClrMapping/>

</xml_diff>

<commit_message>
Included Video Agent Invocation
</commit_message>
<xml_diff>
--- a/GroupD_ProjectPresentation.pptx
+++ b/GroupD_ProjectPresentation.pptx
@@ -44,10 +44,11 @@
     <p:sldId id="276" r:id="rId38"/>
     <p:sldId id="281" r:id="rId39"/>
     <p:sldId id="282" r:id="rId40"/>
-    <p:sldId id="292" r:id="rId41"/>
-    <p:sldId id="293" r:id="rId42"/>
-    <p:sldId id="294" r:id="rId43"/>
-    <p:sldId id="295" r:id="rId44"/>
+    <p:sldId id="308" r:id="rId41"/>
+    <p:sldId id="292" r:id="rId42"/>
+    <p:sldId id="293" r:id="rId43"/>
+    <p:sldId id="294" r:id="rId44"/>
+    <p:sldId id="295" r:id="rId45"/>
   </p:sldIdLst>
   <p:sldSz cx="12192000" cy="6858000"/>
   <p:notesSz cx="6858000" cy="9144000"/>
@@ -3891,6 +3892,13 @@
   <p:transition>
     <p:dissolve/>
   </p:transition>
+  <p:timing>
+    <p:tnLst>
+      <p:par>
+        <p:cTn id="1" dur="indefinite" restart="never" nodeType="tmRoot"/>
+      </p:par>
+    </p:tnLst>
+  </p:timing>
 </p:sld>
 </file>
 
@@ -4017,6 +4025,13 @@
   <p:transition>
     <p:dissolve/>
   </p:transition>
+  <p:timing>
+    <p:tnLst>
+      <p:par>
+        <p:cTn id="1" dur="indefinite" restart="never" nodeType="tmRoot"/>
+      </p:par>
+    </p:tnLst>
+  </p:timing>
 </p:sld>
 </file>
 
@@ -4143,6 +4158,13 @@
   <p:transition>
     <p:dissolve/>
   </p:transition>
+  <p:timing>
+    <p:tnLst>
+      <p:par>
+        <p:cTn id="1" dur="indefinite" restart="never" nodeType="tmRoot"/>
+      </p:par>
+    </p:tnLst>
+  </p:timing>
 </p:sld>
 </file>
 
@@ -4269,6 +4291,13 @@
   <p:transition>
     <p:dissolve/>
   </p:transition>
+  <p:timing>
+    <p:tnLst>
+      <p:par>
+        <p:cTn id="1" dur="indefinite" restart="never" nodeType="tmRoot"/>
+      </p:par>
+    </p:tnLst>
+  </p:timing>
 </p:sld>
 </file>
 
@@ -4573,6 +4602,13 @@
   <p:transition>
     <p:dissolve/>
   </p:transition>
+  <p:timing>
+    <p:tnLst>
+      <p:par>
+        <p:cTn id="1" dur="indefinite" restart="never" nodeType="tmRoot"/>
+      </p:par>
+    </p:tnLst>
+  </p:timing>
 </p:sld>
 </file>
 
@@ -4874,6 +4910,13 @@
   <p:transition>
     <p:dissolve/>
   </p:transition>
+  <p:timing>
+    <p:tnLst>
+      <p:par>
+        <p:cTn id="1" dur="indefinite" restart="never" nodeType="tmRoot"/>
+      </p:par>
+    </p:tnLst>
+  </p:timing>
 </p:sld>
 </file>
 
@@ -5155,6 +5198,13 @@
   <p:transition>
     <p:dissolve/>
   </p:transition>
+  <p:timing>
+    <p:tnLst>
+      <p:par>
+        <p:cTn id="1" dur="indefinite" restart="never" nodeType="tmRoot"/>
+      </p:par>
+    </p:tnLst>
+  </p:timing>
 </p:sld>
 </file>
 
@@ -5320,6 +5370,13 @@
   <p:transition>
     <p:dissolve/>
   </p:transition>
+  <p:timing>
+    <p:tnLst>
+      <p:par>
+        <p:cTn id="1" dur="indefinite" restart="never" nodeType="tmRoot"/>
+      </p:par>
+    </p:tnLst>
+  </p:timing>
 </p:sld>
 </file>
 
@@ -5506,6 +5563,13 @@
   <p:transition>
     <p:dissolve/>
   </p:transition>
+  <p:timing>
+    <p:tnLst>
+      <p:par>
+        <p:cTn id="1" dur="indefinite" restart="never" nodeType="tmRoot"/>
+      </p:par>
+    </p:tnLst>
+  </p:timing>
 </p:sld>
 </file>
 
@@ -5626,6 +5690,13 @@
   <p:transition>
     <p:dissolve/>
   </p:transition>
+  <p:timing>
+    <p:tnLst>
+      <p:par>
+        <p:cTn id="1" dur="indefinite" restart="never" nodeType="tmRoot"/>
+      </p:par>
+    </p:tnLst>
+  </p:timing>
 </p:sld>
 </file>
 
@@ -6451,6 +6522,13 @@
   <p:transition>
     <p:dissolve/>
   </p:transition>
+  <p:timing>
+    <p:tnLst>
+      <p:par>
+        <p:cTn id="1" dur="indefinite" restart="never" nodeType="tmRoot"/>
+      </p:par>
+    </p:tnLst>
+  </p:timing>
 </p:sld>
 </file>
 
@@ -6696,6 +6774,13 @@
   <p:transition>
     <p:dissolve/>
   </p:transition>
+  <p:timing>
+    <p:tnLst>
+      <p:par>
+        <p:cTn id="1" dur="indefinite" restart="never" nodeType="tmRoot"/>
+      </p:par>
+    </p:tnLst>
+  </p:timing>
 </p:sld>
 </file>
 
@@ -6816,6 +6901,13 @@
   <p:transition>
     <p:dissolve/>
   </p:transition>
+  <p:timing>
+    <p:tnLst>
+      <p:par>
+        <p:cTn id="1" dur="indefinite" restart="never" nodeType="tmRoot"/>
+      </p:par>
+    </p:tnLst>
+  </p:timing>
 </p:sld>
 </file>
 
@@ -7632,6 +7724,13 @@
   <p:transition>
     <p:dissolve/>
   </p:transition>
+  <p:timing>
+    <p:tnLst>
+      <p:par>
+        <p:cTn id="1" dur="indefinite" restart="never" nodeType="tmRoot"/>
+      </p:par>
+    </p:tnLst>
+  </p:timing>
 </p:sld>
 </file>
 
@@ -7808,6 +7907,15 @@
               </a:buClr>
               <a:buSzPct val="150000"/>
             </a:pPr>
+            <a:r>
+              <a:rPr lang="en-US" dirty="0">
+                <a:solidFill>
+                  <a:srgbClr val="000000"/>
+                </a:solidFill>
+                <a:latin typeface="TimesNewRomanPSMT"/>
+              </a:rPr>
+              <a:t/>
+            </a:r>
             <a:br>
               <a:rPr lang="en-US" dirty="0">
                 <a:solidFill>
@@ -7856,6 +7964,15 @@
               </a:buClr>
               <a:buSzPct val="150000"/>
             </a:pPr>
+            <a:r>
+              <a:rPr lang="en-US" dirty="0">
+                <a:solidFill>
+                  <a:srgbClr val="000000"/>
+                </a:solidFill>
+                <a:latin typeface="TimesNewRomanPSMT"/>
+              </a:rPr>
+              <a:t/>
+            </a:r>
             <a:br>
               <a:rPr lang="en-US" dirty="0">
                 <a:solidFill>
@@ -7913,6 +8030,15 @@
               </a:buClr>
               <a:buSzPct val="150000"/>
             </a:pPr>
+            <a:r>
+              <a:rPr lang="en-US" dirty="0">
+                <a:solidFill>
+                  <a:srgbClr val="000000"/>
+                </a:solidFill>
+                <a:latin typeface="TimesNewRomanPSMT"/>
+              </a:rPr>
+              <a:t/>
+            </a:r>
             <a:br>
               <a:rPr lang="en-US" dirty="0">
                 <a:solidFill>
@@ -7968,6 +8094,10 @@
                 <a:latin typeface="TimesNewRomanPSMT"/>
               </a:rPr>
               <a:t>provides the service discovery base-service (a superset of UDDI). </a:t>
+            </a:r>
+            <a:r>
+              <a:rPr lang="en-US" dirty="0"/>
+              <a:t/>
             </a:r>
             <a:br>
               <a:rPr lang="en-US" dirty="0"/>
@@ -7989,6 +8119,13 @@
   <p:transition>
     <p:dissolve/>
   </p:transition>
+  <p:timing>
+    <p:tnLst>
+      <p:par>
+        <p:cTn id="1" dur="indefinite" restart="never" nodeType="tmRoot"/>
+      </p:par>
+    </p:tnLst>
+  </p:timing>
 </p:sld>
 </file>
 
@@ -8211,6 +8348,13 @@
   <p:transition>
     <p:dissolve/>
   </p:transition>
+  <p:timing>
+    <p:tnLst>
+      <p:par>
+        <p:cTn id="1" dur="indefinite" restart="never" nodeType="tmRoot"/>
+      </p:par>
+    </p:tnLst>
+  </p:timing>
 </p:sld>
 </file>
 
@@ -8248,8 +8392,13 @@
           <a:p>
             <a:r>
               <a:rPr lang="en-CA" dirty="0"/>
-              <a:t>Technology Overview</a:t>
-            </a:r>
+              <a:t>Technology </a:t>
+            </a:r>
+            <a:r>
+              <a:rPr lang="en-CA" dirty="0" smtClean="0"/>
+              <a:t>Overview(contd.)</a:t>
+            </a:r>
+            <a:endParaRPr lang="en-CA" dirty="0"/>
           </a:p>
         </p:txBody>
       </p:sp>
@@ -8451,6 +8600,13 @@
   <p:transition>
     <p:dissolve/>
   </p:transition>
+  <p:timing>
+    <p:tnLst>
+      <p:par>
+        <p:cTn id="1" dur="indefinite" restart="never" nodeType="tmRoot"/>
+      </p:par>
+    </p:tnLst>
+  </p:timing>
 </p:sld>
 </file>
 
@@ -8576,6 +8732,13 @@
   <p:transition>
     <p:dissolve/>
   </p:transition>
+  <p:timing>
+    <p:tnLst>
+      <p:par>
+        <p:cTn id="1" dur="indefinite" restart="never" nodeType="tmRoot"/>
+      </p:par>
+    </p:tnLst>
+  </p:timing>
 </p:sld>
 </file>
 
@@ -10516,6 +10679,13 @@
   <p:transition>
     <p:dissolve/>
   </p:transition>
+  <p:timing>
+    <p:tnLst>
+      <p:par>
+        <p:cTn id="1" dur="indefinite" restart="never" nodeType="tmRoot"/>
+      </p:par>
+    </p:tnLst>
+  </p:timing>
 </p:sld>
 </file>
 
@@ -13192,6 +13362,13 @@
   <p:transition>
     <p:dissolve/>
   </p:transition>
+  <p:timing>
+    <p:tnLst>
+      <p:par>
+        <p:cTn id="1" dur="indefinite" restart="never" nodeType="tmRoot"/>
+      </p:par>
+    </p:tnLst>
+  </p:timing>
 </p:sld>
 </file>
 
@@ -13317,6 +13494,13 @@
   <p:transition>
     <p:dissolve/>
   </p:transition>
+  <p:timing>
+    <p:tnLst>
+      <p:par>
+        <p:cTn id="1" dur="indefinite" restart="never" nodeType="tmRoot"/>
+      </p:par>
+    </p:tnLst>
+  </p:timing>
 </p:sld>
 </file>
 
@@ -14671,6 +14855,13 @@
   <p:transition>
     <p:dissolve/>
   </p:transition>
+  <p:timing>
+    <p:tnLst>
+      <p:par>
+        <p:cTn id="1" dur="indefinite" restart="never" nodeType="tmRoot"/>
+      </p:par>
+    </p:tnLst>
+  </p:timing>
 </p:sld>
 </file>
 
@@ -14914,6 +15105,13 @@
   <p:transition>
     <p:dissolve/>
   </p:transition>
+  <p:timing>
+    <p:tnLst>
+      <p:par>
+        <p:cTn id="1" dur="indefinite" restart="never" nodeType="tmRoot"/>
+      </p:par>
+    </p:tnLst>
+  </p:timing>
 </p:sld>
 </file>
 
@@ -17140,6 +17338,13 @@
   <p:transition>
     <p:dissolve/>
   </p:transition>
+  <p:timing>
+    <p:tnLst>
+      <p:par>
+        <p:cTn id="1" dur="indefinite" restart="never" nodeType="tmRoot"/>
+      </p:par>
+    </p:tnLst>
+  </p:timing>
 </p:sld>
 </file>
 
@@ -17270,6 +17475,13 @@
   <p:transition>
     <p:dissolve/>
   </p:transition>
+  <p:timing>
+    <p:tnLst>
+      <p:par>
+        <p:cTn id="1" dur="indefinite" restart="never" nodeType="tmRoot"/>
+      </p:par>
+    </p:tnLst>
+  </p:timing>
 </p:sld>
 </file>
 
@@ -18624,6 +18836,13 @@
   <p:transition>
     <p:dissolve/>
   </p:transition>
+  <p:timing>
+    <p:tnLst>
+      <p:par>
+        <p:cTn id="1" dur="indefinite" restart="never" nodeType="tmRoot"/>
+      </p:par>
+    </p:tnLst>
+  </p:timing>
 </p:sld>
 </file>
 
@@ -20836,6 +21055,13 @@
   <p:transition>
     <p:dissolve/>
   </p:transition>
+  <p:timing>
+    <p:tnLst>
+      <p:par>
+        <p:cTn id="1" dur="indefinite" restart="never" nodeType="tmRoot"/>
+      </p:par>
+    </p:tnLst>
+  </p:timing>
 </p:sld>
 </file>
 
@@ -20961,6 +21187,13 @@
   <p:transition>
     <p:dissolve/>
   </p:transition>
+  <p:timing>
+    <p:tnLst>
+      <p:par>
+        <p:cTn id="1" dur="indefinite" restart="never" nodeType="tmRoot"/>
+      </p:par>
+    </p:tnLst>
+  </p:timing>
 </p:sld>
 </file>
 
@@ -22309,6 +22542,13 @@
   <p:transition>
     <p:dissolve/>
   </p:transition>
+  <p:timing>
+    <p:tnLst>
+      <p:par>
+        <p:cTn id="1" dur="indefinite" restart="never" nodeType="tmRoot"/>
+      </p:par>
+    </p:tnLst>
+  </p:timing>
 </p:sld>
 </file>
 
@@ -22378,7 +22618,7 @@
             <p:ph idx="1"/>
             <p:extLst>
               <p:ext uri="{D42A27DB-BD31-4B8C-83A1-F6EECF244321}">
-                <p14:modId xmlns:p14="http://schemas.microsoft.com/office/powerpoint/2010/main" val="1430341796"/>
+                <p14:modId xmlns:p14="http://schemas.microsoft.com/office/powerpoint/2010/main" val="264032175"/>
               </p:ext>
             </p:extLst>
           </p:nvPr>
@@ -23029,14 +23269,14 @@
                         <a:t>Error message will be generated with the SQL </a:t>
                       </a:r>
                       <a:r>
-                        <a:rPr lang="en-US" sz="1100" b="0" i="0" u="none" strike="noStrike" dirty="0" err="1">
+                        <a:rPr lang="en-US" sz="1100" b="0" i="0" u="none" strike="noStrike" dirty="0" smtClean="0">
                           <a:solidFill>
                             <a:srgbClr val="000000"/>
                           </a:solidFill>
                           <a:effectLst/>
                           <a:latin typeface="Calibri" panose="020F0502020204030204" pitchFamily="34" charset="0"/>
                         </a:rPr>
-                        <a:t>eception</a:t>
+                        <a:t>exception</a:t>
                       </a:r>
                       <a:r>
                         <a:rPr lang="en-US" sz="1100" b="0" i="0" u="none" strike="noStrike" dirty="0">
@@ -24488,6 +24728,13 @@
   <p:transition>
     <p:dissolve/>
   </p:transition>
+  <p:timing>
+    <p:tnLst>
+      <p:par>
+        <p:cTn id="1" dur="indefinite" restart="never" nodeType="tmRoot"/>
+      </p:par>
+    </p:tnLst>
+  </p:timing>
 </p:sld>
 </file>
 
@@ -24613,6 +24860,13 @@
   <p:transition>
     <p:dissolve/>
   </p:transition>
+  <p:timing>
+    <p:tnLst>
+      <p:par>
+        <p:cTn id="1" dur="indefinite" restart="never" nodeType="tmRoot"/>
+      </p:par>
+    </p:tnLst>
+  </p:timing>
 </p:sld>
 </file>
 
@@ -25967,6 +26221,13 @@
   <p:transition>
     <p:dissolve/>
   </p:transition>
+  <p:timing>
+    <p:tnLst>
+      <p:par>
+        <p:cTn id="1" dur="indefinite" restart="never" nodeType="tmRoot"/>
+      </p:par>
+    </p:tnLst>
+  </p:timing>
 </p:sld>
 </file>
 
@@ -26032,7 +26293,7 @@
             <p:ph idx="1"/>
             <p:extLst>
               <p:ext uri="{D42A27DB-BD31-4B8C-83A1-F6EECF244321}">
-                <p14:modId xmlns:p14="http://schemas.microsoft.com/office/powerpoint/2010/main" val="154739386"/>
+                <p14:modId xmlns:p14="http://schemas.microsoft.com/office/powerpoint/2010/main" val="2554392169"/>
               </p:ext>
             </p:extLst>
           </p:nvPr>
@@ -26384,17 +26645,27 @@
                           <a:effectLst/>
                           <a:latin typeface="Calibri" panose="020F0502020204030204" pitchFamily="34" charset="0"/>
                         </a:rPr>
-                        <a:t>Error Message is generated stating that </a:t>
+                        <a:t>Error Message is generated stating </a:t>
                       </a:r>
                       <a:r>
-                        <a:rPr lang="en-US" sz="1100" b="0" i="0" u="none" strike="noStrike" dirty="0" err="1">
+                        <a:rPr lang="en-US" sz="1100" b="0" i="0" u="none" strike="noStrike">
                           <a:solidFill>
                             <a:srgbClr val="000000"/>
                           </a:solidFill>
                           <a:effectLst/>
                           <a:latin typeface="Calibri" panose="020F0502020204030204" pitchFamily="34" charset="0"/>
                         </a:rPr>
-                        <a:t>stystem</a:t>
+                        <a:t>that </a:t>
+                      </a:r>
+                      <a:r>
+                        <a:rPr lang="en-US" sz="1100" b="0" i="0" u="none" strike="noStrike" smtClean="0">
+                          <a:solidFill>
+                            <a:srgbClr val="000000"/>
+                          </a:solidFill>
+                          <a:effectLst/>
+                          <a:latin typeface="Calibri" panose="020F0502020204030204" pitchFamily="34" charset="0"/>
+                        </a:rPr>
+                        <a:t>system </a:t>
                       </a:r>
                       <a:r>
                         <a:rPr lang="en-US" sz="1100" b="0" i="0" u="none" strike="noStrike" dirty="0">
@@ -26404,7 +26675,7 @@
                           <a:effectLst/>
                           <a:latin typeface="Calibri" panose="020F0502020204030204" pitchFamily="34" charset="0"/>
                         </a:rPr>
-                        <a:t> is not accessible.</a:t>
+                        <a:t>is not accessible.</a:t>
                       </a:r>
                     </a:p>
                   </a:txBody>
@@ -26763,14 +27034,14 @@
                         <a:t>Error Message is generated when the agent is unable to send </a:t>
                       </a:r>
                       <a:r>
-                        <a:rPr lang="en-US" sz="1100" b="0" i="0" u="none" strike="noStrike" dirty="0" err="1">
+                        <a:rPr lang="en-US" sz="1100" b="0" i="0" u="none" strike="noStrike" dirty="0" smtClean="0">
                           <a:solidFill>
                             <a:srgbClr val="000000"/>
                           </a:solidFill>
                           <a:effectLst/>
                           <a:latin typeface="Calibri" panose="020F0502020204030204" pitchFamily="34" charset="0"/>
                         </a:rPr>
-                        <a:t>sms</a:t>
+                        <a:t>SMS </a:t>
                       </a:r>
                       <a:r>
                         <a:rPr lang="en-US" sz="1100" b="0" i="0" u="none" strike="noStrike" dirty="0">
@@ -26780,7 +27051,7 @@
                           <a:effectLst/>
                           <a:latin typeface="Calibri" panose="020F0502020204030204" pitchFamily="34" charset="0"/>
                         </a:rPr>
-                        <a:t> or any SQL database error.</a:t>
+                        <a:t>or any SQL database error.</a:t>
                       </a:r>
                     </a:p>
                   </a:txBody>
@@ -28369,6 +28640,13 @@
   <p:transition>
     <p:dissolve/>
   </p:transition>
+  <p:timing>
+    <p:tnLst>
+      <p:par>
+        <p:cTn id="1" dur="indefinite" restart="never" nodeType="tmRoot"/>
+      </p:par>
+    </p:tnLst>
+  </p:timing>
 </p:sld>
 </file>
 
@@ -28488,6 +28766,13 @@
   <p:transition>
     <p:dissolve/>
   </p:transition>
+  <p:timing>
+    <p:tnLst>
+      <p:par>
+        <p:cTn id="1" dur="indefinite" restart="never" nodeType="tmRoot"/>
+      </p:par>
+    </p:tnLst>
+  </p:timing>
 </p:sld>
 </file>
 
@@ -28524,9 +28809,10 @@
           <a:lstStyle/>
           <a:p>
             <a:r>
-              <a:rPr lang="en-CA" dirty="0"/>
-              <a:t>Data Specification : E-R Diagram</a:t>
-            </a:r>
+              <a:rPr lang="en-CA" dirty="0" smtClean="0"/>
+              <a:t>Class Diagram : Agents</a:t>
+            </a:r>
+            <a:endParaRPr lang="en-CA" dirty="0"/>
           </a:p>
         </p:txBody>
       </p:sp>
@@ -28571,6 +28857,138 @@
             <a:fld id="{A4BAB868-1E00-44C6-B1AB-DFCC5F9865BA}" type="slidenum">
               <a:rPr lang="ja-JP" altLang="en-US" smtClean="0"/>
               <a:t>40</a:t>
+            </a:fld>
+            <a:endParaRPr lang="en-US" altLang="ja-JP"/>
+          </a:p>
+        </p:txBody>
+      </p:sp>
+      <p:pic>
+        <p:nvPicPr>
+          <p:cNvPr id="3" name="Picture 2"/>
+          <p:cNvPicPr>
+            <a:picLocks noChangeAspect="1"/>
+          </p:cNvPicPr>
+          <p:nvPr/>
+        </p:nvPicPr>
+        <p:blipFill>
+          <a:blip r:embed="rId2"/>
+          <a:stretch>
+            <a:fillRect/>
+          </a:stretch>
+        </p:blipFill>
+        <p:spPr>
+          <a:xfrm>
+            <a:off x="757646" y="1704575"/>
+            <a:ext cx="10737668" cy="4260796"/>
+          </a:xfrm>
+          <a:prstGeom prst="rect">
+            <a:avLst/>
+          </a:prstGeom>
+        </p:spPr>
+      </p:pic>
+    </p:spTree>
+    <p:extLst>
+      <p:ext uri="{BB962C8B-B14F-4D97-AF65-F5344CB8AC3E}">
+        <p14:creationId xmlns:p14="http://schemas.microsoft.com/office/powerpoint/2010/main" val="952125234"/>
+      </p:ext>
+    </p:extLst>
+  </p:cSld>
+  <p:clrMapOvr>
+    <a:masterClrMapping/>
+  </p:clrMapOvr>
+  <p:transition>
+    <p:dissolve/>
+  </p:transition>
+  <p:timing>
+    <p:tnLst>
+      <p:par>
+        <p:cTn id="1" dur="indefinite" restart="never" nodeType="tmRoot"/>
+      </p:par>
+    </p:tnLst>
+  </p:timing>
+</p:sld>
+</file>
+
+<file path=ppt/slides/slide41.xml><?xml version="1.0" encoding="utf-8"?>
+<p:sld xmlns:a="http://schemas.openxmlformats.org/drawingml/2006/main" xmlns:r="http://schemas.openxmlformats.org/officeDocument/2006/relationships" xmlns:p="http://schemas.openxmlformats.org/presentationml/2006/main">
+  <p:cSld>
+    <p:spTree>
+      <p:nvGrpSpPr>
+        <p:cNvPr id="1" name=""/>
+        <p:cNvGrpSpPr/>
+        <p:nvPr/>
+      </p:nvGrpSpPr>
+      <p:grpSpPr>
+        <a:xfrm>
+          <a:off x="0" y="0"/>
+          <a:ext cx="0" cy="0"/>
+          <a:chOff x="0" y="0"/>
+          <a:chExt cx="0" cy="0"/>
+        </a:xfrm>
+      </p:grpSpPr>
+      <p:sp>
+        <p:nvSpPr>
+          <p:cNvPr id="2" name="Title 1"/>
+          <p:cNvSpPr>
+            <a:spLocks noGrp="1"/>
+          </p:cNvSpPr>
+          <p:nvPr>
+            <p:ph type="title"/>
+          </p:nvPr>
+        </p:nvSpPr>
+        <p:spPr/>
+        <p:txBody>
+          <a:bodyPr/>
+          <a:lstStyle/>
+          <a:p>
+            <a:r>
+              <a:rPr lang="en-CA" dirty="0"/>
+              <a:t>Data Specification : E-R Diagram</a:t>
+            </a:r>
+          </a:p>
+        </p:txBody>
+      </p:sp>
+      <p:sp>
+        <p:nvSpPr>
+          <p:cNvPr id="4" name="Date Placeholder 3"/>
+          <p:cNvSpPr>
+            <a:spLocks noGrp="1"/>
+          </p:cNvSpPr>
+          <p:nvPr>
+            <p:ph type="dt" sz="half" idx="10"/>
+          </p:nvPr>
+        </p:nvSpPr>
+        <p:spPr/>
+        <p:txBody>
+          <a:bodyPr/>
+          <a:lstStyle/>
+          <a:p>
+            <a:r>
+              <a:rPr lang="en-US" dirty="0"/>
+              <a:t>SENG696 (Fall 2021)</a:t>
+            </a:r>
+            <a:endParaRPr lang="en-US" altLang="ja-JP" dirty="0"/>
+          </a:p>
+        </p:txBody>
+      </p:sp>
+      <p:sp>
+        <p:nvSpPr>
+          <p:cNvPr id="6" name="Slide Number Placeholder 5"/>
+          <p:cNvSpPr>
+            <a:spLocks noGrp="1"/>
+          </p:cNvSpPr>
+          <p:nvPr>
+            <p:ph type="sldNum" sz="quarter" idx="12"/>
+          </p:nvPr>
+        </p:nvSpPr>
+        <p:spPr/>
+        <p:txBody>
+          <a:bodyPr/>
+          <a:lstStyle/>
+          <a:p>
+            <a:fld id="{A4BAB868-1E00-44C6-B1AB-DFCC5F9865BA}" type="slidenum">
+              <a:rPr lang="ja-JP" altLang="en-US" smtClean="0"/>
+              <a:t>41</a:t>
             </a:fld>
             <a:endParaRPr lang="en-US" altLang="ja-JP"/>
           </a:p>
@@ -28613,10 +29031,17 @@
   <p:transition>
     <p:dissolve/>
   </p:transition>
+  <p:timing>
+    <p:tnLst>
+      <p:par>
+        <p:cTn id="1" dur="indefinite" restart="never" nodeType="tmRoot"/>
+      </p:par>
+    </p:tnLst>
+  </p:timing>
 </p:sld>
 </file>
 
-<file path=ppt/slides/slide41.xml><?xml version="1.0" encoding="utf-8"?>
+<file path=ppt/slides/slide42.xml><?xml version="1.0" encoding="utf-8"?>
 <p:sld xmlns:a="http://schemas.openxmlformats.org/drawingml/2006/main" xmlns:r="http://schemas.openxmlformats.org/officeDocument/2006/relationships" xmlns:p="http://schemas.openxmlformats.org/presentationml/2006/main">
   <p:cSld>
     <p:spTree>
@@ -28695,7 +29120,7 @@
           <a:p>
             <a:fld id="{A4BAB868-1E00-44C6-B1AB-DFCC5F9865BA}" type="slidenum">
               <a:rPr lang="ja-JP" altLang="en-US" smtClean="0"/>
-              <a:t>41</a:t>
+              <a:t>42</a:t>
             </a:fld>
             <a:endParaRPr lang="en-US" altLang="ja-JP"/>
           </a:p>
@@ -28784,10 +29209,17 @@
   <p:transition>
     <p:dissolve/>
   </p:transition>
+  <p:timing>
+    <p:tnLst>
+      <p:par>
+        <p:cTn id="1" dur="indefinite" restart="never" nodeType="tmRoot"/>
+      </p:par>
+    </p:tnLst>
+  </p:timing>
 </p:sld>
 </file>
 
-<file path=ppt/slides/slide42.xml><?xml version="1.0" encoding="utf-8"?>
+<file path=ppt/slides/slide43.xml><?xml version="1.0" encoding="utf-8"?>
 <p:sld xmlns:a="http://schemas.openxmlformats.org/drawingml/2006/main" xmlns:r="http://schemas.openxmlformats.org/officeDocument/2006/relationships" xmlns:p="http://schemas.openxmlformats.org/presentationml/2006/main">
   <p:cSld>
     <p:spTree>
@@ -28866,7 +29298,7 @@
           <a:p>
             <a:fld id="{A4BAB868-1E00-44C6-B1AB-DFCC5F9865BA}" type="slidenum">
               <a:rPr lang="ja-JP" altLang="en-US" smtClean="0"/>
-              <a:t>42</a:t>
+              <a:t>43</a:t>
             </a:fld>
             <a:endParaRPr lang="en-US" altLang="ja-JP"/>
           </a:p>
@@ -28955,10 +29387,17 @@
   <p:transition>
     <p:dissolve/>
   </p:transition>
+  <p:timing>
+    <p:tnLst>
+      <p:par>
+        <p:cTn id="1" dur="indefinite" restart="never" nodeType="tmRoot"/>
+      </p:par>
+    </p:tnLst>
+  </p:timing>
 </p:sld>
 </file>
 
-<file path=ppt/slides/slide43.xml><?xml version="1.0" encoding="utf-8"?>
+<file path=ppt/slides/slide44.xml><?xml version="1.0" encoding="utf-8"?>
 <p:sld xmlns:a="http://schemas.openxmlformats.org/drawingml/2006/main" xmlns:r="http://schemas.openxmlformats.org/officeDocument/2006/relationships" xmlns:p="http://schemas.openxmlformats.org/presentationml/2006/main">
   <p:cSld>
     <p:spTree>
@@ -29037,7 +29476,7 @@
           <a:p>
             <a:fld id="{A4BAB868-1E00-44C6-B1AB-DFCC5F9865BA}" type="slidenum">
               <a:rPr lang="ja-JP" altLang="en-US" smtClean="0"/>
-              <a:t>43</a:t>
+              <a:t>44</a:t>
             </a:fld>
             <a:endParaRPr lang="en-US" altLang="ja-JP"/>
           </a:p>
@@ -29126,6 +29565,13 @@
   <p:transition>
     <p:dissolve/>
   </p:transition>
+  <p:timing>
+    <p:tnLst>
+      <p:par>
+        <p:cTn id="1" dur="indefinite" restart="never" nodeType="tmRoot"/>
+      </p:par>
+    </p:tnLst>
+  </p:timing>
 </p:sld>
 </file>
 
@@ -29291,6 +29737,13 @@
   <p:transition>
     <p:dissolve/>
   </p:transition>
+  <p:timing>
+    <p:tnLst>
+      <p:par>
+        <p:cTn id="1" dur="indefinite" restart="never" nodeType="tmRoot"/>
+      </p:par>
+    </p:tnLst>
+  </p:timing>
 </p:sld>
 </file>
 
@@ -29520,6 +29973,13 @@
   <p:transition>
     <p:dissolve/>
   </p:transition>
+  <p:timing>
+    <p:tnLst>
+      <p:par>
+        <p:cTn id="1" dur="indefinite" restart="never" nodeType="tmRoot"/>
+      </p:par>
+    </p:tnLst>
+  </p:timing>
 </p:sld>
 </file>
 
@@ -29858,6 +30318,13 @@
   <p:transition>
     <p:dissolve/>
   </p:transition>
+  <p:timing>
+    <p:tnLst>
+      <p:par>
+        <p:cTn id="1" dur="indefinite" restart="never" nodeType="tmRoot"/>
+      </p:par>
+    </p:tnLst>
+  </p:timing>
 </p:sld>
 </file>
 
@@ -30230,6 +30697,13 @@
   <p:transition>
     <p:dissolve/>
   </p:transition>
+  <p:timing>
+    <p:tnLst>
+      <p:par>
+        <p:cTn id="1" dur="indefinite" restart="never" nodeType="tmRoot"/>
+      </p:par>
+    </p:tnLst>
+  </p:timing>
 </p:sld>
 </file>
 
@@ -30612,6 +31086,13 @@
   <p:transition>
     <p:dissolve/>
   </p:transition>
+  <p:timing>
+    <p:tnLst>
+      <p:par>
+        <p:cTn id="1" dur="indefinite" restart="never" nodeType="tmRoot"/>
+      </p:par>
+    </p:tnLst>
+  </p:timing>
 </p:sld>
 </file>
 

</xml_diff>